<commit_message>
mockup att e logo nova
</commit_message>
<xml_diff>
--- a/Mockup/mockup1.pptx
+++ b/Mockup/mockup1.pptx
@@ -243,7 +243,7 @@
           <a:p>
             <a:fld id="{8FD46BB3-C0C0-42DD-A915-951B3E7D476A}" type="datetimeFigureOut">
               <a:rPr lang="pt-BR" smtClean="0"/>
-              <a:t>15/04/2019</a:t>
+              <a:t>18/04/2019</a:t>
             </a:fld>
             <a:endParaRPr lang="pt-BR"/>
           </a:p>
@@ -413,7 +413,7 @@
           <a:p>
             <a:fld id="{8FD46BB3-C0C0-42DD-A915-951B3E7D476A}" type="datetimeFigureOut">
               <a:rPr lang="pt-BR" smtClean="0"/>
-              <a:t>15/04/2019</a:t>
+              <a:t>18/04/2019</a:t>
             </a:fld>
             <a:endParaRPr lang="pt-BR"/>
           </a:p>
@@ -593,7 +593,7 @@
           <a:p>
             <a:fld id="{8FD46BB3-C0C0-42DD-A915-951B3E7D476A}" type="datetimeFigureOut">
               <a:rPr lang="pt-BR" smtClean="0"/>
-              <a:t>15/04/2019</a:t>
+              <a:t>18/04/2019</a:t>
             </a:fld>
             <a:endParaRPr lang="pt-BR"/>
           </a:p>
@@ -763,7 +763,7 @@
           <a:p>
             <a:fld id="{8FD46BB3-C0C0-42DD-A915-951B3E7D476A}" type="datetimeFigureOut">
               <a:rPr lang="pt-BR" smtClean="0"/>
-              <a:t>15/04/2019</a:t>
+              <a:t>18/04/2019</a:t>
             </a:fld>
             <a:endParaRPr lang="pt-BR"/>
           </a:p>
@@ -1009,7 +1009,7 @@
           <a:p>
             <a:fld id="{8FD46BB3-C0C0-42DD-A915-951B3E7D476A}" type="datetimeFigureOut">
               <a:rPr lang="pt-BR" smtClean="0"/>
-              <a:t>15/04/2019</a:t>
+              <a:t>18/04/2019</a:t>
             </a:fld>
             <a:endParaRPr lang="pt-BR"/>
           </a:p>
@@ -1241,7 +1241,7 @@
           <a:p>
             <a:fld id="{8FD46BB3-C0C0-42DD-A915-951B3E7D476A}" type="datetimeFigureOut">
               <a:rPr lang="pt-BR" smtClean="0"/>
-              <a:t>15/04/2019</a:t>
+              <a:t>18/04/2019</a:t>
             </a:fld>
             <a:endParaRPr lang="pt-BR"/>
           </a:p>
@@ -1608,7 +1608,7 @@
           <a:p>
             <a:fld id="{8FD46BB3-C0C0-42DD-A915-951B3E7D476A}" type="datetimeFigureOut">
               <a:rPr lang="pt-BR" smtClean="0"/>
-              <a:t>15/04/2019</a:t>
+              <a:t>18/04/2019</a:t>
             </a:fld>
             <a:endParaRPr lang="pt-BR"/>
           </a:p>
@@ -1726,7 +1726,7 @@
           <a:p>
             <a:fld id="{8FD46BB3-C0C0-42DD-A915-951B3E7D476A}" type="datetimeFigureOut">
               <a:rPr lang="pt-BR" smtClean="0"/>
-              <a:t>15/04/2019</a:t>
+              <a:t>18/04/2019</a:t>
             </a:fld>
             <a:endParaRPr lang="pt-BR"/>
           </a:p>
@@ -1821,7 +1821,7 @@
           <a:p>
             <a:fld id="{8FD46BB3-C0C0-42DD-A915-951B3E7D476A}" type="datetimeFigureOut">
               <a:rPr lang="pt-BR" smtClean="0"/>
-              <a:t>15/04/2019</a:t>
+              <a:t>18/04/2019</a:t>
             </a:fld>
             <a:endParaRPr lang="pt-BR"/>
           </a:p>
@@ -2098,7 +2098,7 @@
           <a:p>
             <a:fld id="{8FD46BB3-C0C0-42DD-A915-951B3E7D476A}" type="datetimeFigureOut">
               <a:rPr lang="pt-BR" smtClean="0"/>
-              <a:t>15/04/2019</a:t>
+              <a:t>18/04/2019</a:t>
             </a:fld>
             <a:endParaRPr lang="pt-BR"/>
           </a:p>
@@ -2351,7 +2351,7 @@
           <a:p>
             <a:fld id="{8FD46BB3-C0C0-42DD-A915-951B3E7D476A}" type="datetimeFigureOut">
               <a:rPr lang="pt-BR" smtClean="0"/>
-              <a:t>15/04/2019</a:t>
+              <a:t>18/04/2019</a:t>
             </a:fld>
             <a:endParaRPr lang="pt-BR"/>
           </a:p>
@@ -2564,7 +2564,7 @@
           <a:p>
             <a:fld id="{8FD46BB3-C0C0-42DD-A915-951B3E7D476A}" type="datetimeFigureOut">
               <a:rPr lang="pt-BR" smtClean="0"/>
-              <a:t>15/04/2019</a:t>
+              <a:t>18/04/2019</a:t>
             </a:fld>
             <a:endParaRPr lang="pt-BR"/>
           </a:p>
@@ -3169,7 +3169,7 @@
         </p:nvSpPr>
         <p:spPr>
           <a:xfrm>
-            <a:off x="-1" y="660400"/>
+            <a:off x="0" y="660400"/>
             <a:ext cx="2946401" cy="6197600"/>
           </a:xfrm>
           <a:prstGeom prst="rect">
@@ -3204,6 +3204,47 @@
           <a:p>
             <a:pPr algn="ctr"/>
             <a:endParaRPr lang="pt-BR"/>
+          </a:p>
+        </p:txBody>
+      </p:sp>
+      <p:sp>
+        <p:nvSpPr>
+          <p:cNvPr id="12" name="CaixaDeTexto 11"/>
+          <p:cNvSpPr txBox="1"/>
+          <p:nvPr/>
+        </p:nvSpPr>
+        <p:spPr>
+          <a:xfrm>
+            <a:off x="527002" y="887984"/>
+            <a:ext cx="2062148" cy="307777"/>
+          </a:xfrm>
+          <a:prstGeom prst="rect">
+            <a:avLst/>
+          </a:prstGeom>
+          <a:noFill/>
+        </p:spPr>
+        <p:txBody>
+          <a:bodyPr wrap="square" rtlCol="0">
+            <a:spAutoFit/>
+          </a:bodyPr>
+          <a:lstStyle/>
+          <a:p>
+            <a:pPr algn="ctr"/>
+            <a:r>
+              <a:rPr lang="pt-BR" sz="1400" dirty="0" smtClean="0">
+                <a:solidFill>
+                  <a:srgbClr val="8E959E"/>
+                </a:solidFill>
+                <a:latin typeface="Century Gothic" panose="020B0502020202020204" pitchFamily="34" charset="0"/>
+              </a:rPr>
+              <a:t>Campeonatos</a:t>
+            </a:r>
+            <a:endParaRPr lang="pt-BR" sz="1400" dirty="0">
+              <a:solidFill>
+                <a:srgbClr val="8E959E"/>
+              </a:solidFill>
+              <a:latin typeface="Century Gothic" panose="020B0502020202020204" pitchFamily="34" charset="0"/>
+            </a:endParaRPr>
           </a:p>
         </p:txBody>
       </p:sp>
@@ -3257,8 +3298,8 @@
         </p:nvGrpSpPr>
         <p:grpSpPr>
           <a:xfrm>
-            <a:off x="205580" y="790545"/>
-            <a:ext cx="289720" cy="289720"/>
+            <a:off x="228900" y="929632"/>
+            <a:ext cx="219104" cy="219104"/>
             <a:chOff x="116680" y="900935"/>
             <a:chExt cx="289720" cy="289720"/>
           </a:xfrm>
@@ -3278,7 +3319,7 @@
               <a:avLst/>
             </a:prstGeom>
             <a:solidFill>
-              <a:srgbClr val="4D535B"/>
+              <a:srgbClr val="8E959E"/>
             </a:solidFill>
             <a:ln>
               <a:noFill/>
@@ -3326,7 +3367,7 @@
             <a:noFill/>
             <a:ln w="28575">
               <a:solidFill>
-                <a:srgbClr val="4D535B"/>
+                <a:srgbClr val="8E959E"/>
               </a:solidFill>
             </a:ln>
           </p:spPr>
@@ -3356,6 +3397,766 @@
           </p:txBody>
         </p:sp>
       </p:grpSp>
+      <p:cxnSp>
+        <p:nvCxnSpPr>
+          <p:cNvPr id="10" name="Conector reto 9"/>
+          <p:cNvCxnSpPr/>
+          <p:nvPr/>
+        </p:nvCxnSpPr>
+        <p:spPr>
+          <a:xfrm>
+            <a:off x="653967" y="831207"/>
+            <a:ext cx="0" cy="425450"/>
+          </a:xfrm>
+          <a:prstGeom prst="line">
+            <a:avLst/>
+          </a:prstGeom>
+          <a:ln>
+            <a:solidFill>
+              <a:srgbClr val="51575F"/>
+            </a:solidFill>
+          </a:ln>
+        </p:spPr>
+        <p:style>
+          <a:lnRef idx="1">
+            <a:schemeClr val="accent1"/>
+          </a:lnRef>
+          <a:fillRef idx="0">
+            <a:schemeClr val="accent1"/>
+          </a:fillRef>
+          <a:effectRef idx="0">
+            <a:schemeClr val="accent1"/>
+          </a:effectRef>
+          <a:fontRef idx="minor">
+            <a:schemeClr val="tx1"/>
+          </a:fontRef>
+        </p:style>
+      </p:cxnSp>
+      <p:sp>
+        <p:nvSpPr>
+          <p:cNvPr id="15" name="Retângulo 14"/>
+          <p:cNvSpPr/>
+          <p:nvPr/>
+        </p:nvSpPr>
+        <p:spPr>
+          <a:xfrm>
+            <a:off x="3167315" y="1253554"/>
+            <a:ext cx="4299916" cy="5305924"/>
+          </a:xfrm>
+          <a:prstGeom prst="rect">
+            <a:avLst/>
+          </a:prstGeom>
+          <a:solidFill>
+            <a:srgbClr val="35393F"/>
+          </a:solidFill>
+          <a:ln>
+            <a:noFill/>
+          </a:ln>
+        </p:spPr>
+        <p:style>
+          <a:lnRef idx="2">
+            <a:schemeClr val="accent1">
+              <a:shade val="50000"/>
+            </a:schemeClr>
+          </a:lnRef>
+          <a:fillRef idx="1">
+            <a:schemeClr val="accent1"/>
+          </a:fillRef>
+          <a:effectRef idx="0">
+            <a:schemeClr val="accent1"/>
+          </a:effectRef>
+          <a:fontRef idx="minor">
+            <a:schemeClr val="lt1"/>
+          </a:fontRef>
+        </p:style>
+        <p:txBody>
+          <a:bodyPr rtlCol="0" anchor="ctr"/>
+          <a:lstStyle/>
+          <a:p>
+            <a:pPr algn="ctr"/>
+            <a:endParaRPr lang="pt-BR"/>
+          </a:p>
+        </p:txBody>
+      </p:sp>
+      <p:sp>
+        <p:nvSpPr>
+          <p:cNvPr id="16" name="CaixaDeTexto 15"/>
+          <p:cNvSpPr txBox="1"/>
+          <p:nvPr/>
+        </p:nvSpPr>
+        <p:spPr>
+          <a:xfrm>
+            <a:off x="6235185" y="122588"/>
+            <a:ext cx="2905920" cy="400110"/>
+          </a:xfrm>
+          <a:prstGeom prst="rect">
+            <a:avLst/>
+          </a:prstGeom>
+          <a:noFill/>
+        </p:spPr>
+        <p:txBody>
+          <a:bodyPr wrap="square" rtlCol="0">
+            <a:spAutoFit/>
+          </a:bodyPr>
+          <a:lstStyle/>
+          <a:p>
+            <a:pPr algn="ctr"/>
+            <a:r>
+              <a:rPr lang="pt-BR" sz="2000" dirty="0" smtClean="0">
+                <a:solidFill>
+                  <a:srgbClr val="FF3F3F"/>
+                </a:solidFill>
+                <a:latin typeface="Century Gothic" panose="020B0502020202020204" pitchFamily="34" charset="0"/>
+              </a:rPr>
+              <a:t>Nome Campeonato</a:t>
+            </a:r>
+            <a:endParaRPr lang="pt-BR" sz="2000" dirty="0">
+              <a:solidFill>
+                <a:srgbClr val="FF3F3F"/>
+              </a:solidFill>
+              <a:latin typeface="Century Gothic" panose="020B0502020202020204" pitchFamily="34" charset="0"/>
+            </a:endParaRPr>
+          </a:p>
+        </p:txBody>
+      </p:sp>
+      <p:sp>
+        <p:nvSpPr>
+          <p:cNvPr id="17" name="CaixaDeTexto 16"/>
+          <p:cNvSpPr txBox="1"/>
+          <p:nvPr/>
+        </p:nvSpPr>
+        <p:spPr>
+          <a:xfrm>
+            <a:off x="4683205" y="215342"/>
+            <a:ext cx="1551980" cy="276999"/>
+          </a:xfrm>
+          <a:prstGeom prst="rect">
+            <a:avLst/>
+          </a:prstGeom>
+          <a:noFill/>
+        </p:spPr>
+        <p:txBody>
+          <a:bodyPr wrap="square" rtlCol="0">
+            <a:spAutoFit/>
+          </a:bodyPr>
+          <a:lstStyle/>
+          <a:p>
+            <a:pPr algn="ctr"/>
+            <a:r>
+              <a:rPr lang="pt-BR" sz="1200" dirty="0" smtClean="0">
+                <a:solidFill>
+                  <a:srgbClr val="96A0A0"/>
+                </a:solidFill>
+                <a:latin typeface="Century Gothic" panose="020B0502020202020204" pitchFamily="34" charset="0"/>
+              </a:rPr>
+              <a:t>CAMPEONATO</a:t>
+            </a:r>
+            <a:endParaRPr lang="pt-BR" sz="1200" dirty="0">
+              <a:solidFill>
+                <a:srgbClr val="96A0A0"/>
+              </a:solidFill>
+              <a:latin typeface="Century Gothic" panose="020B0502020202020204" pitchFamily="34" charset="0"/>
+            </a:endParaRPr>
+          </a:p>
+        </p:txBody>
+      </p:sp>
+      <p:cxnSp>
+        <p:nvCxnSpPr>
+          <p:cNvPr id="18" name="Conector reto 17"/>
+          <p:cNvCxnSpPr/>
+          <p:nvPr/>
+        </p:nvCxnSpPr>
+        <p:spPr>
+          <a:xfrm>
+            <a:off x="6203739" y="153090"/>
+            <a:ext cx="0" cy="346647"/>
+          </a:xfrm>
+          <a:prstGeom prst="line">
+            <a:avLst/>
+          </a:prstGeom>
+          <a:ln>
+            <a:solidFill>
+              <a:srgbClr val="51575F"/>
+            </a:solidFill>
+          </a:ln>
+        </p:spPr>
+        <p:style>
+          <a:lnRef idx="1">
+            <a:schemeClr val="accent1"/>
+          </a:lnRef>
+          <a:fillRef idx="0">
+            <a:schemeClr val="accent1"/>
+          </a:fillRef>
+          <a:effectRef idx="0">
+            <a:schemeClr val="accent1"/>
+          </a:effectRef>
+          <a:fontRef idx="minor">
+            <a:schemeClr val="tx1"/>
+          </a:fontRef>
+        </p:style>
+      </p:cxnSp>
+      <p:sp>
+        <p:nvSpPr>
+          <p:cNvPr id="24" name="Retângulo 23"/>
+          <p:cNvSpPr/>
+          <p:nvPr/>
+        </p:nvSpPr>
+        <p:spPr>
+          <a:xfrm>
+            <a:off x="7688145" y="1253554"/>
+            <a:ext cx="4299916" cy="5305924"/>
+          </a:xfrm>
+          <a:prstGeom prst="rect">
+            <a:avLst/>
+          </a:prstGeom>
+          <a:solidFill>
+            <a:srgbClr val="35393F"/>
+          </a:solidFill>
+          <a:ln>
+            <a:noFill/>
+          </a:ln>
+        </p:spPr>
+        <p:style>
+          <a:lnRef idx="2">
+            <a:schemeClr val="accent1">
+              <a:shade val="50000"/>
+            </a:schemeClr>
+          </a:lnRef>
+          <a:fillRef idx="1">
+            <a:schemeClr val="accent1"/>
+          </a:fillRef>
+          <a:effectRef idx="0">
+            <a:schemeClr val="accent1"/>
+          </a:effectRef>
+          <a:fontRef idx="minor">
+            <a:schemeClr val="lt1"/>
+          </a:fontRef>
+        </p:style>
+        <p:txBody>
+          <a:bodyPr rtlCol="0" anchor="ctr"/>
+          <a:lstStyle/>
+          <a:p>
+            <a:pPr algn="ctr"/>
+            <a:endParaRPr lang="pt-BR"/>
+          </a:p>
+        </p:txBody>
+      </p:sp>
+      <p:sp>
+        <p:nvSpPr>
+          <p:cNvPr id="25" name="CaixaDeTexto 24"/>
+          <p:cNvSpPr txBox="1"/>
+          <p:nvPr/>
+        </p:nvSpPr>
+        <p:spPr>
+          <a:xfrm>
+            <a:off x="3864313" y="813490"/>
+            <a:ext cx="2905920" cy="400110"/>
+          </a:xfrm>
+          <a:prstGeom prst="rect">
+            <a:avLst/>
+          </a:prstGeom>
+          <a:noFill/>
+        </p:spPr>
+        <p:txBody>
+          <a:bodyPr wrap="square" rtlCol="0">
+            <a:spAutoFit/>
+          </a:bodyPr>
+          <a:lstStyle/>
+          <a:p>
+            <a:pPr algn="ctr"/>
+            <a:r>
+              <a:rPr lang="pt-BR" sz="2000" dirty="0" smtClean="0">
+                <a:solidFill>
+                  <a:srgbClr val="D93F40"/>
+                </a:solidFill>
+                <a:latin typeface="Century Gothic" panose="020B0502020202020204" pitchFamily="34" charset="0"/>
+              </a:rPr>
+              <a:t>Time 1</a:t>
+            </a:r>
+            <a:endParaRPr lang="pt-BR" sz="2000" dirty="0">
+              <a:solidFill>
+                <a:srgbClr val="D93F40"/>
+              </a:solidFill>
+              <a:latin typeface="Century Gothic" panose="020B0502020202020204" pitchFamily="34" charset="0"/>
+            </a:endParaRPr>
+          </a:p>
+        </p:txBody>
+      </p:sp>
+      <p:sp>
+        <p:nvSpPr>
+          <p:cNvPr id="26" name="CaixaDeTexto 25"/>
+          <p:cNvSpPr txBox="1"/>
+          <p:nvPr/>
+        </p:nvSpPr>
+        <p:spPr>
+          <a:xfrm>
+            <a:off x="8385143" y="813490"/>
+            <a:ext cx="2905920" cy="400110"/>
+          </a:xfrm>
+          <a:prstGeom prst="rect">
+            <a:avLst/>
+          </a:prstGeom>
+          <a:noFill/>
+        </p:spPr>
+        <p:txBody>
+          <a:bodyPr wrap="square" rtlCol="0">
+            <a:spAutoFit/>
+          </a:bodyPr>
+          <a:lstStyle/>
+          <a:p>
+            <a:pPr algn="ctr"/>
+            <a:r>
+              <a:rPr lang="pt-BR" sz="2000" dirty="0" smtClean="0">
+                <a:solidFill>
+                  <a:srgbClr val="2D70C1"/>
+                </a:solidFill>
+                <a:latin typeface="Century Gothic" panose="020B0502020202020204" pitchFamily="34" charset="0"/>
+              </a:rPr>
+              <a:t>Time 2</a:t>
+            </a:r>
+            <a:endParaRPr lang="pt-BR" sz="2000" dirty="0">
+              <a:solidFill>
+                <a:srgbClr val="2D70C1"/>
+              </a:solidFill>
+              <a:latin typeface="Century Gothic" panose="020B0502020202020204" pitchFamily="34" charset="0"/>
+            </a:endParaRPr>
+          </a:p>
+        </p:txBody>
+      </p:sp>
+      <p:cxnSp>
+        <p:nvCxnSpPr>
+          <p:cNvPr id="32" name="Conector reto 31"/>
+          <p:cNvCxnSpPr/>
+          <p:nvPr/>
+        </p:nvCxnSpPr>
+        <p:spPr>
+          <a:xfrm>
+            <a:off x="3730919" y="2353691"/>
+            <a:ext cx="3172708" cy="0"/>
+          </a:xfrm>
+          <a:prstGeom prst="line">
+            <a:avLst/>
+          </a:prstGeom>
+          <a:ln>
+            <a:solidFill>
+              <a:srgbClr val="51575F"/>
+            </a:solidFill>
+          </a:ln>
+        </p:spPr>
+        <p:style>
+          <a:lnRef idx="1">
+            <a:schemeClr val="accent1"/>
+          </a:lnRef>
+          <a:fillRef idx="0">
+            <a:schemeClr val="accent1"/>
+          </a:fillRef>
+          <a:effectRef idx="0">
+            <a:schemeClr val="accent1"/>
+          </a:effectRef>
+          <a:fontRef idx="minor">
+            <a:schemeClr val="tx1"/>
+          </a:fontRef>
+        </p:style>
+      </p:cxnSp>
+      <p:cxnSp>
+        <p:nvCxnSpPr>
+          <p:cNvPr id="37" name="Conector reto 36"/>
+          <p:cNvCxnSpPr/>
+          <p:nvPr/>
+        </p:nvCxnSpPr>
+        <p:spPr>
+          <a:xfrm>
+            <a:off x="3730919" y="3420491"/>
+            <a:ext cx="3172708" cy="0"/>
+          </a:xfrm>
+          <a:prstGeom prst="line">
+            <a:avLst/>
+          </a:prstGeom>
+          <a:ln>
+            <a:solidFill>
+              <a:srgbClr val="51575F"/>
+            </a:solidFill>
+          </a:ln>
+        </p:spPr>
+        <p:style>
+          <a:lnRef idx="1">
+            <a:schemeClr val="accent1"/>
+          </a:lnRef>
+          <a:fillRef idx="0">
+            <a:schemeClr val="accent1"/>
+          </a:fillRef>
+          <a:effectRef idx="0">
+            <a:schemeClr val="accent1"/>
+          </a:effectRef>
+          <a:fontRef idx="minor">
+            <a:schemeClr val="tx1"/>
+          </a:fontRef>
+        </p:style>
+      </p:cxnSp>
+      <p:cxnSp>
+        <p:nvCxnSpPr>
+          <p:cNvPr id="38" name="Conector reto 37"/>
+          <p:cNvCxnSpPr/>
+          <p:nvPr/>
+        </p:nvCxnSpPr>
+        <p:spPr>
+          <a:xfrm>
+            <a:off x="3730919" y="4423791"/>
+            <a:ext cx="3172708" cy="0"/>
+          </a:xfrm>
+          <a:prstGeom prst="line">
+            <a:avLst/>
+          </a:prstGeom>
+          <a:ln>
+            <a:solidFill>
+              <a:srgbClr val="51575F"/>
+            </a:solidFill>
+          </a:ln>
+        </p:spPr>
+        <p:style>
+          <a:lnRef idx="1">
+            <a:schemeClr val="accent1"/>
+          </a:lnRef>
+          <a:fillRef idx="0">
+            <a:schemeClr val="accent1"/>
+          </a:fillRef>
+          <a:effectRef idx="0">
+            <a:schemeClr val="accent1"/>
+          </a:effectRef>
+          <a:fontRef idx="minor">
+            <a:schemeClr val="tx1"/>
+          </a:fontRef>
+        </p:style>
+      </p:cxnSp>
+      <p:cxnSp>
+        <p:nvCxnSpPr>
+          <p:cNvPr id="39" name="Conector reto 38"/>
+          <p:cNvCxnSpPr/>
+          <p:nvPr/>
+        </p:nvCxnSpPr>
+        <p:spPr>
+          <a:xfrm>
+            <a:off x="3730919" y="5452491"/>
+            <a:ext cx="3172708" cy="0"/>
+          </a:xfrm>
+          <a:prstGeom prst="line">
+            <a:avLst/>
+          </a:prstGeom>
+          <a:ln>
+            <a:solidFill>
+              <a:srgbClr val="51575F"/>
+            </a:solidFill>
+          </a:ln>
+        </p:spPr>
+        <p:style>
+          <a:lnRef idx="1">
+            <a:schemeClr val="accent1"/>
+          </a:lnRef>
+          <a:fillRef idx="0">
+            <a:schemeClr val="accent1"/>
+          </a:fillRef>
+          <a:effectRef idx="0">
+            <a:schemeClr val="accent1"/>
+          </a:effectRef>
+          <a:fontRef idx="minor">
+            <a:schemeClr val="tx1"/>
+          </a:fontRef>
+        </p:style>
+      </p:cxnSp>
+      <p:cxnSp>
+        <p:nvCxnSpPr>
+          <p:cNvPr id="68" name="Conector reto 67"/>
+          <p:cNvCxnSpPr/>
+          <p:nvPr/>
+        </p:nvCxnSpPr>
+        <p:spPr>
+          <a:xfrm>
+            <a:off x="8251749" y="2353691"/>
+            <a:ext cx="3172708" cy="0"/>
+          </a:xfrm>
+          <a:prstGeom prst="line">
+            <a:avLst/>
+          </a:prstGeom>
+          <a:ln>
+            <a:solidFill>
+              <a:srgbClr val="51575F"/>
+            </a:solidFill>
+          </a:ln>
+        </p:spPr>
+        <p:style>
+          <a:lnRef idx="1">
+            <a:schemeClr val="accent1"/>
+          </a:lnRef>
+          <a:fillRef idx="0">
+            <a:schemeClr val="accent1"/>
+          </a:fillRef>
+          <a:effectRef idx="0">
+            <a:schemeClr val="accent1"/>
+          </a:effectRef>
+          <a:fontRef idx="minor">
+            <a:schemeClr val="tx1"/>
+          </a:fontRef>
+        </p:style>
+      </p:cxnSp>
+      <p:cxnSp>
+        <p:nvCxnSpPr>
+          <p:cNvPr id="69" name="Conector reto 68"/>
+          <p:cNvCxnSpPr/>
+          <p:nvPr/>
+        </p:nvCxnSpPr>
+        <p:spPr>
+          <a:xfrm>
+            <a:off x="8251749" y="3420491"/>
+            <a:ext cx="3172708" cy="0"/>
+          </a:xfrm>
+          <a:prstGeom prst="line">
+            <a:avLst/>
+          </a:prstGeom>
+          <a:ln>
+            <a:solidFill>
+              <a:srgbClr val="51575F"/>
+            </a:solidFill>
+          </a:ln>
+        </p:spPr>
+        <p:style>
+          <a:lnRef idx="1">
+            <a:schemeClr val="accent1"/>
+          </a:lnRef>
+          <a:fillRef idx="0">
+            <a:schemeClr val="accent1"/>
+          </a:fillRef>
+          <a:effectRef idx="0">
+            <a:schemeClr val="accent1"/>
+          </a:effectRef>
+          <a:fontRef idx="minor">
+            <a:schemeClr val="tx1"/>
+          </a:fontRef>
+        </p:style>
+      </p:cxnSp>
+      <p:cxnSp>
+        <p:nvCxnSpPr>
+          <p:cNvPr id="70" name="Conector reto 69"/>
+          <p:cNvCxnSpPr/>
+          <p:nvPr/>
+        </p:nvCxnSpPr>
+        <p:spPr>
+          <a:xfrm>
+            <a:off x="8251749" y="4423791"/>
+            <a:ext cx="3172708" cy="0"/>
+          </a:xfrm>
+          <a:prstGeom prst="line">
+            <a:avLst/>
+          </a:prstGeom>
+          <a:ln>
+            <a:solidFill>
+              <a:srgbClr val="51575F"/>
+            </a:solidFill>
+          </a:ln>
+        </p:spPr>
+        <p:style>
+          <a:lnRef idx="1">
+            <a:schemeClr val="accent1"/>
+          </a:lnRef>
+          <a:fillRef idx="0">
+            <a:schemeClr val="accent1"/>
+          </a:fillRef>
+          <a:effectRef idx="0">
+            <a:schemeClr val="accent1"/>
+          </a:effectRef>
+          <a:fontRef idx="minor">
+            <a:schemeClr val="tx1"/>
+          </a:fontRef>
+        </p:style>
+      </p:cxnSp>
+      <p:cxnSp>
+        <p:nvCxnSpPr>
+          <p:cNvPr id="71" name="Conector reto 70"/>
+          <p:cNvCxnSpPr/>
+          <p:nvPr/>
+        </p:nvCxnSpPr>
+        <p:spPr>
+          <a:xfrm>
+            <a:off x="8251749" y="5452491"/>
+            <a:ext cx="3172708" cy="0"/>
+          </a:xfrm>
+          <a:prstGeom prst="line">
+            <a:avLst/>
+          </a:prstGeom>
+          <a:ln>
+            <a:solidFill>
+              <a:srgbClr val="51575F"/>
+            </a:solidFill>
+          </a:ln>
+        </p:spPr>
+        <p:style>
+          <a:lnRef idx="1">
+            <a:schemeClr val="accent1"/>
+          </a:lnRef>
+          <a:fillRef idx="0">
+            <a:schemeClr val="accent1"/>
+          </a:fillRef>
+          <a:effectRef idx="0">
+            <a:schemeClr val="accent1"/>
+          </a:effectRef>
+          <a:fontRef idx="minor">
+            <a:schemeClr val="tx1"/>
+          </a:fontRef>
+        </p:style>
+      </p:cxnSp>
+      <p:sp>
+        <p:nvSpPr>
+          <p:cNvPr id="77" name="CaixaDeTexto 76"/>
+          <p:cNvSpPr txBox="1"/>
+          <p:nvPr/>
+        </p:nvSpPr>
+        <p:spPr>
+          <a:xfrm>
+            <a:off x="221755" y="1572228"/>
+            <a:ext cx="2062148" cy="307777"/>
+          </a:xfrm>
+          <a:prstGeom prst="rect">
+            <a:avLst/>
+          </a:prstGeom>
+          <a:noFill/>
+        </p:spPr>
+        <p:txBody>
+          <a:bodyPr wrap="square" rtlCol="0">
+            <a:spAutoFit/>
+          </a:bodyPr>
+          <a:lstStyle/>
+          <a:p>
+            <a:pPr algn="ctr"/>
+            <a:r>
+              <a:rPr lang="pt-BR" sz="1400" dirty="0" err="1" smtClean="0">
+                <a:solidFill>
+                  <a:srgbClr val="8E959E"/>
+                </a:solidFill>
+                <a:latin typeface="Century Gothic" panose="020B0502020202020204" pitchFamily="34" charset="0"/>
+              </a:rPr>
+              <a:t>Stream</a:t>
+            </a:r>
+            <a:endParaRPr lang="pt-BR" sz="1400" dirty="0">
+              <a:solidFill>
+                <a:srgbClr val="8E959E"/>
+              </a:solidFill>
+              <a:latin typeface="Century Gothic" panose="020B0502020202020204" pitchFamily="34" charset="0"/>
+            </a:endParaRPr>
+          </a:p>
+        </p:txBody>
+      </p:sp>
+      <p:cxnSp>
+        <p:nvCxnSpPr>
+          <p:cNvPr id="81" name="Conector reto 80"/>
+          <p:cNvCxnSpPr/>
+          <p:nvPr/>
+        </p:nvCxnSpPr>
+        <p:spPr>
+          <a:xfrm>
+            <a:off x="653967" y="1526262"/>
+            <a:ext cx="0" cy="425450"/>
+          </a:xfrm>
+          <a:prstGeom prst="line">
+            <a:avLst/>
+          </a:prstGeom>
+          <a:ln>
+            <a:solidFill>
+              <a:srgbClr val="51575F"/>
+            </a:solidFill>
+          </a:ln>
+        </p:spPr>
+        <p:style>
+          <a:lnRef idx="1">
+            <a:schemeClr val="accent1"/>
+          </a:lnRef>
+          <a:fillRef idx="0">
+            <a:schemeClr val="accent1"/>
+          </a:fillRef>
+          <a:effectRef idx="0">
+            <a:schemeClr val="accent1"/>
+          </a:effectRef>
+          <a:fontRef idx="minor">
+            <a:schemeClr val="tx1"/>
+          </a:fontRef>
+        </p:style>
+      </p:cxnSp>
+      <p:pic>
+        <p:nvPicPr>
+          <p:cNvPr id="1027" name="Picture 2" descr="Imagem relacionada"/>
+          <p:cNvPicPr>
+            <a:picLocks noChangeAspect="1" noChangeArrowheads="1"/>
+          </p:cNvPicPr>
+          <p:nvPr/>
+        </p:nvPicPr>
+        <p:blipFill>
+          <a:blip r:embed="rId3" cstate="print">
+            <a:duotone>
+              <a:schemeClr val="bg2">
+                <a:shade val="45000"/>
+                <a:satMod val="135000"/>
+              </a:schemeClr>
+              <a:prstClr val="white"/>
+            </a:duotone>
+            <a:extLst>
+              <a:ext uri="{BEBA8EAE-BF5A-486C-A8C5-ECC9F3942E4B}">
+                <a14:imgProps xmlns:a14="http://schemas.microsoft.com/office/drawing/2010/main">
+                  <a14:imgLayer r:embed="rId4">
+                    <a14:imgEffect>
+                      <a14:backgroundRemoval t="7422" b="89648" l="977" r="98828">
+                        <a14:foregroundMark x1="6250" y1="41992" x2="5469" y2="48242"/>
+                        <a14:foregroundMark x1="75977" y1="42969" x2="77344" y2="46289"/>
+                        <a14:foregroundMark x1="93164" y1="44727" x2="93359" y2="47852"/>
+                        <a14:foregroundMark x1="53320" y1="50781" x2="53320" y2="50781"/>
+                        <a14:foregroundMark x1="22656" y1="45898" x2="22656" y2="45898"/>
+                        <a14:backgroundMark x1="13281" y1="39844" x2="19727" y2="70117"/>
+                        <a14:backgroundMark x1="32813" y1="50000" x2="37109" y2="66211"/>
+                        <a14:backgroundMark x1="33203" y1="59375" x2="32031" y2="45508"/>
+                        <a14:backgroundMark x1="30078" y1="82617" x2="18359" y2="64063"/>
+                        <a14:backgroundMark x1="11914" y1="47070" x2="12695" y2="35352"/>
+                        <a14:backgroundMark x1="59375" y1="30469" x2="71875" y2="47852"/>
+                        <a14:backgroundMark x1="87695" y1="52539" x2="70313" y2="14844"/>
+                        <a14:backgroundMark x1="83008" y1="69727" x2="87109" y2="41602"/>
+                        <a14:backgroundMark x1="95508" y1="76563" x2="97070" y2="60742"/>
+                        <a14:backgroundMark x1="8789" y1="25586" x2="7227" y2="28125"/>
+                        <a14:backgroundMark x1="5469" y1="29492" x2="3906" y2="32813"/>
+                        <a14:backgroundMark x1="8789" y1="24219" x2="19727" y2="1367"/>
+                      </a14:backgroundRemoval>
+                    </a14:imgEffect>
+                    <a14:imgEffect>
+                      <a14:brightnessContrast contrast="40000"/>
+                    </a14:imgEffect>
+                  </a14:imgLayer>
+                </a14:imgProps>
+              </a:ext>
+              <a:ext uri="{28A0092B-C50C-407E-A947-70E740481C1C}">
+                <a14:useLocalDpi xmlns:a14="http://schemas.microsoft.com/office/drawing/2010/main" val="0"/>
+              </a:ext>
+            </a:extLst>
+          </a:blip>
+          <a:srcRect/>
+          <a:stretch>
+            <a:fillRect/>
+          </a:stretch>
+        </p:blipFill>
+        <p:spPr bwMode="auto">
+          <a:xfrm>
+            <a:off x="179648" y="1590432"/>
+            <a:ext cx="280691" cy="280691"/>
+          </a:xfrm>
+          <a:prstGeom prst="rect">
+            <a:avLst/>
+          </a:prstGeom>
+          <a:noFill/>
+          <a:extLst>
+            <a:ext uri="{909E8E84-426E-40DD-AFC4-6F175D3DCCD1}">
+              <a14:hiddenFill xmlns:a14="http://schemas.microsoft.com/office/drawing/2010/main">
+                <a:solidFill>
+                  <a:srgbClr val="FFFFFF"/>
+                </a:solidFill>
+              </a14:hiddenFill>
+            </a:ext>
+          </a:extLst>
+        </p:spPr>
+      </p:pic>
     </p:spTree>
     <p:extLst>
       <p:ext uri="{BB962C8B-B14F-4D97-AF65-F5344CB8AC3E}">

</xml_diff>

<commit_message>
mockup login e animacoes
</commit_message>
<xml_diff>
--- a/Mockup/mockup1.pptx
+++ b/Mockup/mockup1.pptx
@@ -5,8 +5,9 @@
     <p:sldMasterId id="2147483648" r:id="rId1"/>
   </p:sldMasterIdLst>
   <p:sldIdLst>
-    <p:sldId id="256" r:id="rId2"/>
-    <p:sldId id="257" r:id="rId3"/>
+    <p:sldId id="258" r:id="rId2"/>
+    <p:sldId id="256" r:id="rId3"/>
+    <p:sldId id="257" r:id="rId4"/>
   </p:sldIdLst>
   <p:sldSz cx="12192000" cy="6858000"/>
   <p:notesSz cx="6858000" cy="9144000"/>
@@ -242,7 +243,7 @@
           <a:p>
             <a:fld id="{8FD46BB3-C0C0-42DD-A915-951B3E7D476A}" type="datetimeFigureOut">
               <a:rPr lang="pt-BR" smtClean="0"/>
-              <a:t>19/04/2019</a:t>
+              <a:t>21/04/2019</a:t>
             </a:fld>
             <a:endParaRPr lang="pt-BR"/>
           </a:p>
@@ -410,7 +411,7 @@
           <a:p>
             <a:fld id="{8FD46BB3-C0C0-42DD-A915-951B3E7D476A}" type="datetimeFigureOut">
               <a:rPr lang="pt-BR" smtClean="0"/>
-              <a:t>19/04/2019</a:t>
+              <a:t>21/04/2019</a:t>
             </a:fld>
             <a:endParaRPr lang="pt-BR"/>
           </a:p>
@@ -588,7 +589,7 @@
           <a:p>
             <a:fld id="{8FD46BB3-C0C0-42DD-A915-951B3E7D476A}" type="datetimeFigureOut">
               <a:rPr lang="pt-BR" smtClean="0"/>
-              <a:t>19/04/2019</a:t>
+              <a:t>21/04/2019</a:t>
             </a:fld>
             <a:endParaRPr lang="pt-BR"/>
           </a:p>
@@ -756,7 +757,7 @@
           <a:p>
             <a:fld id="{8FD46BB3-C0C0-42DD-A915-951B3E7D476A}" type="datetimeFigureOut">
               <a:rPr lang="pt-BR" smtClean="0"/>
-              <a:t>19/04/2019</a:t>
+              <a:t>21/04/2019</a:t>
             </a:fld>
             <a:endParaRPr lang="pt-BR"/>
           </a:p>
@@ -1001,7 +1002,7 @@
           <a:p>
             <a:fld id="{8FD46BB3-C0C0-42DD-A915-951B3E7D476A}" type="datetimeFigureOut">
               <a:rPr lang="pt-BR" smtClean="0"/>
-              <a:t>19/04/2019</a:t>
+              <a:t>21/04/2019</a:t>
             </a:fld>
             <a:endParaRPr lang="pt-BR"/>
           </a:p>
@@ -1230,7 +1231,7 @@
           <a:p>
             <a:fld id="{8FD46BB3-C0C0-42DD-A915-951B3E7D476A}" type="datetimeFigureOut">
               <a:rPr lang="pt-BR" smtClean="0"/>
-              <a:t>19/04/2019</a:t>
+              <a:t>21/04/2019</a:t>
             </a:fld>
             <a:endParaRPr lang="pt-BR"/>
           </a:p>
@@ -1594,7 +1595,7 @@
           <a:p>
             <a:fld id="{8FD46BB3-C0C0-42DD-A915-951B3E7D476A}" type="datetimeFigureOut">
               <a:rPr lang="pt-BR" smtClean="0"/>
-              <a:t>19/04/2019</a:t>
+              <a:t>21/04/2019</a:t>
             </a:fld>
             <a:endParaRPr lang="pt-BR"/>
           </a:p>
@@ -1711,7 +1712,7 @@
           <a:p>
             <a:fld id="{8FD46BB3-C0C0-42DD-A915-951B3E7D476A}" type="datetimeFigureOut">
               <a:rPr lang="pt-BR" smtClean="0"/>
-              <a:t>19/04/2019</a:t>
+              <a:t>21/04/2019</a:t>
             </a:fld>
             <a:endParaRPr lang="pt-BR"/>
           </a:p>
@@ -1806,7 +1807,7 @@
           <a:p>
             <a:fld id="{8FD46BB3-C0C0-42DD-A915-951B3E7D476A}" type="datetimeFigureOut">
               <a:rPr lang="pt-BR" smtClean="0"/>
-              <a:t>19/04/2019</a:t>
+              <a:t>21/04/2019</a:t>
             </a:fld>
             <a:endParaRPr lang="pt-BR"/>
           </a:p>
@@ -2081,7 +2082,7 @@
           <a:p>
             <a:fld id="{8FD46BB3-C0C0-42DD-A915-951B3E7D476A}" type="datetimeFigureOut">
               <a:rPr lang="pt-BR" smtClean="0"/>
-              <a:t>19/04/2019</a:t>
+              <a:t>21/04/2019</a:t>
             </a:fld>
             <a:endParaRPr lang="pt-BR"/>
           </a:p>
@@ -2333,7 +2334,7 @@
           <a:p>
             <a:fld id="{8FD46BB3-C0C0-42DD-A915-951B3E7D476A}" type="datetimeFigureOut">
               <a:rPr lang="pt-BR" smtClean="0"/>
-              <a:t>19/04/2019</a:t>
+              <a:t>21/04/2019</a:t>
             </a:fld>
             <a:endParaRPr lang="pt-BR"/>
           </a:p>
@@ -2547,7 +2548,7 @@
           <a:p>
             <a:fld id="{8FD46BB3-C0C0-42DD-A915-951B3E7D476A}" type="datetimeFigureOut">
               <a:rPr lang="pt-BR" smtClean="0"/>
-              <a:t>19/04/2019</a:t>
+              <a:t>21/04/2019</a:t>
             </a:fld>
             <a:endParaRPr lang="pt-BR"/>
           </a:p>
@@ -2954,6 +2955,447 @@
       </p:grpSpPr>
       <p:sp>
         <p:nvSpPr>
+          <p:cNvPr id="4" name="Retângulo 3">
+            <a:extLst>
+              <a:ext uri="{FF2B5EF4-FFF2-40B4-BE49-F238E27FC236}">
+                <a16:creationId xmlns:a16="http://schemas.microsoft.com/office/drawing/2014/main" id="{6FACACD4-5562-4696-BCE0-F02E9D91D2AA}"/>
+              </a:ext>
+            </a:extLst>
+          </p:cNvPr>
+          <p:cNvSpPr/>
+          <p:nvPr/>
+        </p:nvSpPr>
+        <p:spPr>
+          <a:xfrm>
+            <a:off x="4049230" y="1540857"/>
+            <a:ext cx="4093535" cy="3886928"/>
+          </a:xfrm>
+          <a:prstGeom prst="rect">
+            <a:avLst/>
+          </a:prstGeom>
+          <a:solidFill>
+            <a:srgbClr val="383C42"/>
+          </a:solidFill>
+          <a:ln>
+            <a:noFill/>
+          </a:ln>
+        </p:spPr>
+        <p:style>
+          <a:lnRef idx="2">
+            <a:schemeClr val="accent1">
+              <a:shade val="50000"/>
+            </a:schemeClr>
+          </a:lnRef>
+          <a:fillRef idx="1">
+            <a:schemeClr val="accent1"/>
+          </a:fillRef>
+          <a:effectRef idx="0">
+            <a:schemeClr val="accent1"/>
+          </a:effectRef>
+          <a:fontRef idx="minor">
+            <a:schemeClr val="lt1"/>
+          </a:fontRef>
+        </p:style>
+        <p:txBody>
+          <a:bodyPr rtlCol="0" anchor="ctr"/>
+          <a:lstStyle/>
+          <a:p>
+            <a:pPr algn="ctr"/>
+            <a:endParaRPr lang="pt-BR"/>
+          </a:p>
+        </p:txBody>
+      </p:sp>
+      <p:pic>
+        <p:nvPicPr>
+          <p:cNvPr id="11" name="Imagem 10">
+            <a:extLst>
+              <a:ext uri="{FF2B5EF4-FFF2-40B4-BE49-F238E27FC236}">
+                <a16:creationId xmlns:a16="http://schemas.microsoft.com/office/drawing/2014/main" id="{5FFE1D78-FD77-4B48-87D6-4CD50841CB09}"/>
+              </a:ext>
+            </a:extLst>
+          </p:cNvPr>
+          <p:cNvPicPr>
+            <a:picLocks noChangeAspect="1"/>
+          </p:cNvPicPr>
+          <p:nvPr/>
+        </p:nvPicPr>
+        <p:blipFill>
+          <a:blip r:embed="rId2">
+            <a:extLst>
+              <a:ext uri="{28A0092B-C50C-407E-A947-70E740481C1C}">
+                <a14:useLocalDpi xmlns:a14="http://schemas.microsoft.com/office/drawing/2010/main" val="0"/>
+              </a:ext>
+            </a:extLst>
+          </a:blip>
+          <a:stretch>
+            <a:fillRect/>
+          </a:stretch>
+        </p:blipFill>
+        <p:spPr>
+          <a:xfrm>
+            <a:off x="4383707" y="1776324"/>
+            <a:ext cx="3424583" cy="666732"/>
+          </a:xfrm>
+          <a:prstGeom prst="rect">
+            <a:avLst/>
+          </a:prstGeom>
+        </p:spPr>
+      </p:pic>
+      <p:cxnSp>
+        <p:nvCxnSpPr>
+          <p:cNvPr id="12" name="Conector reto 11">
+            <a:extLst>
+              <a:ext uri="{FF2B5EF4-FFF2-40B4-BE49-F238E27FC236}">
+                <a16:creationId xmlns:a16="http://schemas.microsoft.com/office/drawing/2014/main" id="{A51E6E16-42F4-40E0-8F3C-FC862D20C4B3}"/>
+              </a:ext>
+            </a:extLst>
+          </p:cNvPr>
+          <p:cNvCxnSpPr>
+            <a:cxnSpLocks/>
+          </p:cNvCxnSpPr>
+          <p:nvPr/>
+        </p:nvCxnSpPr>
+        <p:spPr>
+          <a:xfrm>
+            <a:off x="4509644" y="2987129"/>
+            <a:ext cx="3172708" cy="0"/>
+          </a:xfrm>
+          <a:prstGeom prst="line">
+            <a:avLst/>
+          </a:prstGeom>
+          <a:ln>
+            <a:solidFill>
+              <a:srgbClr val="51575F"/>
+            </a:solidFill>
+          </a:ln>
+        </p:spPr>
+        <p:style>
+          <a:lnRef idx="1">
+            <a:schemeClr val="accent1"/>
+          </a:lnRef>
+          <a:fillRef idx="0">
+            <a:schemeClr val="accent1"/>
+          </a:fillRef>
+          <a:effectRef idx="0">
+            <a:schemeClr val="accent1"/>
+          </a:effectRef>
+          <a:fontRef idx="minor">
+            <a:schemeClr val="tx1"/>
+          </a:fontRef>
+        </p:style>
+      </p:cxnSp>
+      <p:cxnSp>
+        <p:nvCxnSpPr>
+          <p:cNvPr id="14" name="Conector reto 13">
+            <a:extLst>
+              <a:ext uri="{FF2B5EF4-FFF2-40B4-BE49-F238E27FC236}">
+                <a16:creationId xmlns:a16="http://schemas.microsoft.com/office/drawing/2014/main" id="{087C0C49-568B-48C3-9360-6D594639F424}"/>
+              </a:ext>
+            </a:extLst>
+          </p:cNvPr>
+          <p:cNvCxnSpPr>
+            <a:cxnSpLocks/>
+          </p:cNvCxnSpPr>
+          <p:nvPr/>
+        </p:nvCxnSpPr>
+        <p:spPr>
+          <a:xfrm>
+            <a:off x="4509644" y="3601020"/>
+            <a:ext cx="3172708" cy="0"/>
+          </a:xfrm>
+          <a:prstGeom prst="line">
+            <a:avLst/>
+          </a:prstGeom>
+          <a:ln>
+            <a:solidFill>
+              <a:srgbClr val="51575F"/>
+            </a:solidFill>
+          </a:ln>
+        </p:spPr>
+        <p:style>
+          <a:lnRef idx="1">
+            <a:schemeClr val="accent1"/>
+          </a:lnRef>
+          <a:fillRef idx="0">
+            <a:schemeClr val="accent1"/>
+          </a:fillRef>
+          <a:effectRef idx="0">
+            <a:schemeClr val="accent1"/>
+          </a:effectRef>
+          <a:fontRef idx="minor">
+            <a:schemeClr val="tx1"/>
+          </a:fontRef>
+        </p:style>
+      </p:cxnSp>
+      <p:sp>
+        <p:nvSpPr>
+          <p:cNvPr id="15" name="CaixaDeTexto 14">
+            <a:extLst>
+              <a:ext uri="{FF2B5EF4-FFF2-40B4-BE49-F238E27FC236}">
+                <a16:creationId xmlns:a16="http://schemas.microsoft.com/office/drawing/2014/main" id="{499A2AF7-8EBF-4450-B393-16B4FCD8B68B}"/>
+              </a:ext>
+            </a:extLst>
+          </p:cNvPr>
+          <p:cNvSpPr txBox="1"/>
+          <p:nvPr/>
+        </p:nvSpPr>
+        <p:spPr>
+          <a:xfrm>
+            <a:off x="4509644" y="2678523"/>
+            <a:ext cx="2062148" cy="276999"/>
+          </a:xfrm>
+          <a:prstGeom prst="rect">
+            <a:avLst/>
+          </a:prstGeom>
+          <a:noFill/>
+        </p:spPr>
+        <p:txBody>
+          <a:bodyPr wrap="square" rtlCol="0">
+            <a:spAutoFit/>
+          </a:bodyPr>
+          <a:lstStyle/>
+          <a:p>
+            <a:r>
+              <a:rPr lang="pt-BR" sz="1200" dirty="0">
+                <a:solidFill>
+                  <a:srgbClr val="606770"/>
+                </a:solidFill>
+                <a:latin typeface="Century Gothic" panose="020B0502020202020204" pitchFamily="34" charset="0"/>
+              </a:rPr>
+              <a:t>Usuário</a:t>
+            </a:r>
+          </a:p>
+        </p:txBody>
+      </p:sp>
+      <p:sp>
+        <p:nvSpPr>
+          <p:cNvPr id="16" name="CaixaDeTexto 15">
+            <a:extLst>
+              <a:ext uri="{FF2B5EF4-FFF2-40B4-BE49-F238E27FC236}">
+                <a16:creationId xmlns:a16="http://schemas.microsoft.com/office/drawing/2014/main" id="{C337F4C4-5741-4242-B4F7-BFD963061467}"/>
+              </a:ext>
+            </a:extLst>
+          </p:cNvPr>
+          <p:cNvSpPr txBox="1"/>
+          <p:nvPr/>
+        </p:nvSpPr>
+        <p:spPr>
+          <a:xfrm>
+            <a:off x="4509644" y="3292413"/>
+            <a:ext cx="2062148" cy="276999"/>
+          </a:xfrm>
+          <a:prstGeom prst="rect">
+            <a:avLst/>
+          </a:prstGeom>
+          <a:noFill/>
+        </p:spPr>
+        <p:txBody>
+          <a:bodyPr wrap="square" rtlCol="0">
+            <a:spAutoFit/>
+          </a:bodyPr>
+          <a:lstStyle/>
+          <a:p>
+            <a:r>
+              <a:rPr lang="pt-BR" sz="1200" dirty="0">
+                <a:solidFill>
+                  <a:srgbClr val="606770"/>
+                </a:solidFill>
+                <a:latin typeface="Century Gothic" panose="020B0502020202020204" pitchFamily="34" charset="0"/>
+              </a:rPr>
+              <a:t>Senha</a:t>
+            </a:r>
+          </a:p>
+        </p:txBody>
+      </p:sp>
+      <p:sp>
+        <p:nvSpPr>
+          <p:cNvPr id="17" name="Retângulo 16">
+            <a:hlinkClick r:id="rId3" action="ppaction://hlinksldjump"/>
+            <a:extLst>
+              <a:ext uri="{FF2B5EF4-FFF2-40B4-BE49-F238E27FC236}">
+                <a16:creationId xmlns:a16="http://schemas.microsoft.com/office/drawing/2014/main" id="{8B8201F9-1A22-4F0A-B1B8-9B97104EFB16}"/>
+              </a:ext>
+            </a:extLst>
+          </p:cNvPr>
+          <p:cNvSpPr/>
+          <p:nvPr/>
+        </p:nvSpPr>
+        <p:spPr>
+          <a:xfrm>
+            <a:off x="4509644" y="4157588"/>
+            <a:ext cx="3172708" cy="488111"/>
+          </a:xfrm>
+          <a:prstGeom prst="rect">
+            <a:avLst/>
+          </a:prstGeom>
+          <a:solidFill>
+            <a:srgbClr val="F54747"/>
+          </a:solidFill>
+          <a:ln>
+            <a:noFill/>
+          </a:ln>
+        </p:spPr>
+        <p:style>
+          <a:lnRef idx="2">
+            <a:schemeClr val="accent1">
+              <a:shade val="50000"/>
+            </a:schemeClr>
+          </a:lnRef>
+          <a:fillRef idx="1">
+            <a:schemeClr val="accent1"/>
+          </a:fillRef>
+          <a:effectRef idx="0">
+            <a:schemeClr val="accent1"/>
+          </a:effectRef>
+          <a:fontRef idx="minor">
+            <a:schemeClr val="lt1"/>
+          </a:fontRef>
+        </p:style>
+        <p:txBody>
+          <a:bodyPr rtlCol="0" anchor="ctr"/>
+          <a:lstStyle/>
+          <a:p>
+            <a:pPr algn="ctr"/>
+            <a:r>
+              <a:rPr lang="pt-BR" sz="1200" dirty="0">
+                <a:latin typeface="Century Gothic" panose="020B0502020202020204" pitchFamily="34" charset="0"/>
+              </a:rPr>
+              <a:t>LOGIN</a:t>
+            </a:r>
+          </a:p>
+        </p:txBody>
+      </p:sp>
+      <p:sp>
+        <p:nvSpPr>
+          <p:cNvPr id="20" name="CaixaDeTexto 19">
+            <a:extLst>
+              <a:ext uri="{FF2B5EF4-FFF2-40B4-BE49-F238E27FC236}">
+                <a16:creationId xmlns:a16="http://schemas.microsoft.com/office/drawing/2014/main" id="{C2FA4E75-5CF9-4ACA-BF30-4922E4FE68E5}"/>
+              </a:ext>
+            </a:extLst>
+          </p:cNvPr>
+          <p:cNvSpPr txBox="1"/>
+          <p:nvPr/>
+        </p:nvSpPr>
+        <p:spPr>
+          <a:xfrm>
+            <a:off x="5667332" y="3600278"/>
+            <a:ext cx="2062148" cy="261610"/>
+          </a:xfrm>
+          <a:prstGeom prst="rect">
+            <a:avLst/>
+          </a:prstGeom>
+          <a:noFill/>
+        </p:spPr>
+        <p:txBody>
+          <a:bodyPr wrap="square" rtlCol="0">
+            <a:spAutoFit/>
+          </a:bodyPr>
+          <a:lstStyle/>
+          <a:p>
+            <a:pPr algn="r"/>
+            <a:r>
+              <a:rPr lang="pt-BR" sz="1100" dirty="0">
+                <a:solidFill>
+                  <a:srgbClr val="F54747"/>
+                </a:solidFill>
+                <a:latin typeface="Century Gothic" panose="020B0502020202020204" pitchFamily="34" charset="0"/>
+              </a:rPr>
+              <a:t>Esqueci minha senha</a:t>
+            </a:r>
+          </a:p>
+        </p:txBody>
+      </p:sp>
+      <p:sp>
+        <p:nvSpPr>
+          <p:cNvPr id="21" name="CaixaDeTexto 20">
+            <a:extLst>
+              <a:ext uri="{FF2B5EF4-FFF2-40B4-BE49-F238E27FC236}">
+                <a16:creationId xmlns:a16="http://schemas.microsoft.com/office/drawing/2014/main" id="{AD86491D-0365-4C0C-A26D-1BB69E80FB70}"/>
+              </a:ext>
+            </a:extLst>
+          </p:cNvPr>
+          <p:cNvSpPr txBox="1"/>
+          <p:nvPr/>
+        </p:nvSpPr>
+        <p:spPr>
+          <a:xfrm>
+            <a:off x="4607443" y="4870474"/>
+            <a:ext cx="2977108" cy="261610"/>
+          </a:xfrm>
+          <a:prstGeom prst="rect">
+            <a:avLst/>
+          </a:prstGeom>
+          <a:noFill/>
+        </p:spPr>
+        <p:txBody>
+          <a:bodyPr wrap="square" rtlCol="0">
+            <a:spAutoFit/>
+          </a:bodyPr>
+          <a:lstStyle/>
+          <a:p>
+            <a:pPr algn="ctr"/>
+            <a:r>
+              <a:rPr lang="pt-BR" sz="1100" dirty="0">
+                <a:solidFill>
+                  <a:srgbClr val="606770"/>
+                </a:solidFill>
+                <a:latin typeface="Century Gothic" panose="020B0502020202020204" pitchFamily="34" charset="0"/>
+              </a:rPr>
+              <a:t>Não tem uma conta?   </a:t>
+            </a:r>
+            <a:r>
+              <a:rPr lang="pt-BR" sz="1100" b="1" dirty="0">
+                <a:solidFill>
+                  <a:srgbClr val="F54747"/>
+                </a:solidFill>
+                <a:latin typeface="Century Gothic" panose="020B0502020202020204" pitchFamily="34" charset="0"/>
+              </a:rPr>
+              <a:t>Cadastre-se</a:t>
+            </a:r>
+          </a:p>
+        </p:txBody>
+      </p:sp>
+    </p:spTree>
+    <p:extLst>
+      <p:ext uri="{BB962C8B-B14F-4D97-AF65-F5344CB8AC3E}">
+        <p14:creationId xmlns:p14="http://schemas.microsoft.com/office/powerpoint/2010/main" val="3246144959"/>
+      </p:ext>
+    </p:extLst>
+  </p:cSld>
+  <p:clrMapOvr>
+    <a:masterClrMapping/>
+  </p:clrMapOvr>
+  <mc:AlternateContent xmlns:mc="http://schemas.openxmlformats.org/markup-compatibility/2006" xmlns:p14="http://schemas.microsoft.com/office/powerpoint/2010/main">
+    <mc:Choice Requires="p14">
+      <p:transition spd="slow" p14:dur="2000" advClick="0"/>
+    </mc:Choice>
+    <mc:Fallback xmlns="">
+      <p:transition spd="slow" advClick="0"/>
+    </mc:Fallback>
+  </mc:AlternateContent>
+</p:sld>
+</file>
+
+<file path=ppt/slides/slide2.xml><?xml version="1.0" encoding="utf-8"?>
+<p:sld xmlns:a="http://schemas.openxmlformats.org/drawingml/2006/main" xmlns:r="http://schemas.openxmlformats.org/officeDocument/2006/relationships" xmlns:p="http://schemas.openxmlformats.org/presentationml/2006/main">
+  <p:cSld>
+    <p:spTree>
+      <p:nvGrpSpPr>
+        <p:cNvPr id="1" name=""/>
+        <p:cNvGrpSpPr/>
+        <p:nvPr/>
+      </p:nvGrpSpPr>
+      <p:grpSpPr>
+        <a:xfrm>
+          <a:off x="0" y="0"/>
+          <a:ext cx="0" cy="0"/>
+          <a:chOff x="0" y="0"/>
+          <a:chExt cx="0" cy="0"/>
+        </a:xfrm>
+      </p:grpSpPr>
+      <p:sp>
+        <p:nvSpPr>
           <p:cNvPr id="2" name="Retângulo 1"/>
           <p:cNvSpPr/>
           <p:nvPr/>
@@ -3166,13 +3608,65 @@
       </p:sp>
       <p:sp>
         <p:nvSpPr>
+          <p:cNvPr id="35" name="Retângulo 34">
+            <a:extLst>
+              <a:ext uri="{FF2B5EF4-FFF2-40B4-BE49-F238E27FC236}">
+                <a16:creationId xmlns:a16="http://schemas.microsoft.com/office/drawing/2014/main" id="{C705C556-7A01-4E74-9922-7A1755841669}"/>
+              </a:ext>
+            </a:extLst>
+          </p:cNvPr>
+          <p:cNvSpPr/>
+          <p:nvPr/>
+        </p:nvSpPr>
+        <p:spPr>
+          <a:xfrm>
+            <a:off x="0" y="660400"/>
+            <a:ext cx="2946399" cy="660400"/>
+          </a:xfrm>
+          <a:prstGeom prst="rect">
+            <a:avLst/>
+          </a:prstGeom>
+          <a:solidFill>
+            <a:srgbClr val="43484F"/>
+          </a:solidFill>
+          <a:ln>
+            <a:noFill/>
+          </a:ln>
+        </p:spPr>
+        <p:style>
+          <a:lnRef idx="2">
+            <a:schemeClr val="accent1">
+              <a:shade val="50000"/>
+            </a:schemeClr>
+          </a:lnRef>
+          <a:fillRef idx="1">
+            <a:schemeClr val="accent1"/>
+          </a:fillRef>
+          <a:effectRef idx="0">
+            <a:schemeClr val="accent1"/>
+          </a:effectRef>
+          <a:fontRef idx="minor">
+            <a:schemeClr val="lt1"/>
+          </a:fontRef>
+        </p:style>
+        <p:txBody>
+          <a:bodyPr rtlCol="0" anchor="ctr"/>
+          <a:lstStyle/>
+          <a:p>
+            <a:pPr algn="ctr"/>
+            <a:endParaRPr lang="pt-BR"/>
+          </a:p>
+        </p:txBody>
+      </p:sp>
+      <p:sp>
+        <p:nvSpPr>
           <p:cNvPr id="12" name="CaixaDeTexto 11"/>
           <p:cNvSpPr txBox="1"/>
           <p:nvPr/>
         </p:nvSpPr>
         <p:spPr>
           <a:xfrm>
-            <a:off x="527002" y="887984"/>
+            <a:off x="527002" y="823368"/>
             <a:ext cx="2062148" cy="307777"/>
           </a:xfrm>
           <a:prstGeom prst="rect">
@@ -3249,7 +3743,7 @@
         </p:nvGrpSpPr>
         <p:grpSpPr>
           <a:xfrm>
-            <a:off x="228900" y="929632"/>
+            <a:off x="228900" y="865016"/>
             <a:ext cx="219104" cy="219104"/>
             <a:chOff x="116680" y="900935"/>
             <a:chExt cx="289720" cy="289720"/>
@@ -3270,7 +3764,7 @@
               <a:avLst/>
             </a:prstGeom>
             <a:solidFill>
-              <a:srgbClr val="8E959E"/>
+              <a:srgbClr val="F54747"/>
             </a:solidFill>
             <a:ln>
               <a:noFill/>
@@ -3318,8 +3812,1011 @@
             <a:noFill/>
             <a:ln w="28575">
               <a:solidFill>
+                <a:srgbClr val="F54747"/>
+              </a:solidFill>
+            </a:ln>
+          </p:spPr>
+          <p:style>
+            <a:lnRef idx="2">
+              <a:schemeClr val="accent1">
+                <a:shade val="50000"/>
+              </a:schemeClr>
+            </a:lnRef>
+            <a:fillRef idx="1">
+              <a:schemeClr val="accent1"/>
+            </a:fillRef>
+            <a:effectRef idx="0">
+              <a:schemeClr val="accent1"/>
+            </a:effectRef>
+            <a:fontRef idx="minor">
+              <a:schemeClr val="lt1"/>
+            </a:fontRef>
+          </p:style>
+          <p:txBody>
+            <a:bodyPr rtlCol="0" anchor="ctr"/>
+            <a:lstStyle/>
+            <a:p>
+              <a:pPr algn="ctr"/>
+              <a:endParaRPr lang="pt-BR" dirty="0"/>
+            </a:p>
+          </p:txBody>
+        </p:sp>
+      </p:grpSp>
+      <p:cxnSp>
+        <p:nvCxnSpPr>
+          <p:cNvPr id="10" name="Conector reto 9"/>
+          <p:cNvCxnSpPr/>
+          <p:nvPr/>
+        </p:nvCxnSpPr>
+        <p:spPr>
+          <a:xfrm>
+            <a:off x="653967" y="766591"/>
+            <a:ext cx="0" cy="425450"/>
+          </a:xfrm>
+          <a:prstGeom prst="line">
+            <a:avLst/>
+          </a:prstGeom>
+          <a:ln>
+            <a:solidFill>
+              <a:srgbClr val="51575F"/>
+            </a:solidFill>
+          </a:ln>
+        </p:spPr>
+        <p:style>
+          <a:lnRef idx="1">
+            <a:schemeClr val="accent1"/>
+          </a:lnRef>
+          <a:fillRef idx="0">
+            <a:schemeClr val="accent1"/>
+          </a:fillRef>
+          <a:effectRef idx="0">
+            <a:schemeClr val="accent1"/>
+          </a:effectRef>
+          <a:fontRef idx="minor">
+            <a:schemeClr val="tx1"/>
+          </a:fontRef>
+        </p:style>
+      </p:cxnSp>
+      <p:sp>
+        <p:nvSpPr>
+          <p:cNvPr id="15" name="Retângulo 14"/>
+          <p:cNvSpPr/>
+          <p:nvPr/>
+        </p:nvSpPr>
+        <p:spPr>
+          <a:xfrm>
+            <a:off x="3167315" y="1253554"/>
+            <a:ext cx="4299916" cy="5305924"/>
+          </a:xfrm>
+          <a:prstGeom prst="rect">
+            <a:avLst/>
+          </a:prstGeom>
+          <a:solidFill>
+            <a:srgbClr val="35393F"/>
+          </a:solidFill>
+          <a:ln>
+            <a:noFill/>
+          </a:ln>
+        </p:spPr>
+        <p:style>
+          <a:lnRef idx="2">
+            <a:schemeClr val="accent1">
+              <a:shade val="50000"/>
+            </a:schemeClr>
+          </a:lnRef>
+          <a:fillRef idx="1">
+            <a:schemeClr val="accent1"/>
+          </a:fillRef>
+          <a:effectRef idx="0">
+            <a:schemeClr val="accent1"/>
+          </a:effectRef>
+          <a:fontRef idx="minor">
+            <a:schemeClr val="lt1"/>
+          </a:fontRef>
+        </p:style>
+        <p:txBody>
+          <a:bodyPr rtlCol="0" anchor="ctr"/>
+          <a:lstStyle/>
+          <a:p>
+            <a:pPr algn="ctr"/>
+            <a:endParaRPr lang="pt-BR"/>
+          </a:p>
+        </p:txBody>
+      </p:sp>
+      <p:sp>
+        <p:nvSpPr>
+          <p:cNvPr id="16" name="CaixaDeTexto 15"/>
+          <p:cNvSpPr txBox="1"/>
+          <p:nvPr/>
+        </p:nvSpPr>
+        <p:spPr>
+          <a:xfrm>
+            <a:off x="6235185" y="122588"/>
+            <a:ext cx="2905920" cy="400110"/>
+          </a:xfrm>
+          <a:prstGeom prst="rect">
+            <a:avLst/>
+          </a:prstGeom>
+          <a:noFill/>
+        </p:spPr>
+        <p:txBody>
+          <a:bodyPr wrap="square" rtlCol="0">
+            <a:spAutoFit/>
+          </a:bodyPr>
+          <a:lstStyle/>
+          <a:p>
+            <a:pPr algn="ctr"/>
+            <a:r>
+              <a:rPr lang="pt-BR" sz="2000" dirty="0">
+                <a:solidFill>
+                  <a:srgbClr val="FF3F3F"/>
+                </a:solidFill>
+                <a:latin typeface="Century Gothic" panose="020B0502020202020204" pitchFamily="34" charset="0"/>
+              </a:rPr>
+              <a:t>Nome Campeonato</a:t>
+            </a:r>
+          </a:p>
+        </p:txBody>
+      </p:sp>
+      <p:sp>
+        <p:nvSpPr>
+          <p:cNvPr id="17" name="CaixaDeTexto 16"/>
+          <p:cNvSpPr txBox="1"/>
+          <p:nvPr/>
+        </p:nvSpPr>
+        <p:spPr>
+          <a:xfrm>
+            <a:off x="4544020" y="194685"/>
+            <a:ext cx="1551980" cy="276999"/>
+          </a:xfrm>
+          <a:prstGeom prst="rect">
+            <a:avLst/>
+          </a:prstGeom>
+          <a:noFill/>
+        </p:spPr>
+        <p:txBody>
+          <a:bodyPr wrap="square" rtlCol="0">
+            <a:spAutoFit/>
+          </a:bodyPr>
+          <a:lstStyle/>
+          <a:p>
+            <a:pPr algn="r"/>
+            <a:r>
+              <a:rPr lang="pt-BR" sz="1200" dirty="0">
+                <a:solidFill>
+                  <a:srgbClr val="96A0A0"/>
+                </a:solidFill>
+                <a:latin typeface="Century Gothic" panose="020B0502020202020204" pitchFamily="34" charset="0"/>
+              </a:rPr>
+              <a:t>CAMPEONATO</a:t>
+            </a:r>
+          </a:p>
+        </p:txBody>
+      </p:sp>
+      <p:cxnSp>
+        <p:nvCxnSpPr>
+          <p:cNvPr id="18" name="Conector reto 17"/>
+          <p:cNvCxnSpPr/>
+          <p:nvPr/>
+        </p:nvCxnSpPr>
+        <p:spPr>
+          <a:xfrm>
+            <a:off x="6203739" y="153090"/>
+            <a:ext cx="0" cy="346647"/>
+          </a:xfrm>
+          <a:prstGeom prst="line">
+            <a:avLst/>
+          </a:prstGeom>
+          <a:ln>
+            <a:solidFill>
+              <a:srgbClr val="51575F"/>
+            </a:solidFill>
+          </a:ln>
+        </p:spPr>
+        <p:style>
+          <a:lnRef idx="1">
+            <a:schemeClr val="accent1"/>
+          </a:lnRef>
+          <a:fillRef idx="0">
+            <a:schemeClr val="accent1"/>
+          </a:fillRef>
+          <a:effectRef idx="0">
+            <a:schemeClr val="accent1"/>
+          </a:effectRef>
+          <a:fontRef idx="minor">
+            <a:schemeClr val="tx1"/>
+          </a:fontRef>
+        </p:style>
+      </p:cxnSp>
+      <p:sp>
+        <p:nvSpPr>
+          <p:cNvPr id="24" name="Retângulo 23"/>
+          <p:cNvSpPr/>
+          <p:nvPr/>
+        </p:nvSpPr>
+        <p:spPr>
+          <a:xfrm>
+            <a:off x="7688145" y="1253554"/>
+            <a:ext cx="4299916" cy="5305924"/>
+          </a:xfrm>
+          <a:prstGeom prst="rect">
+            <a:avLst/>
+          </a:prstGeom>
+          <a:solidFill>
+            <a:srgbClr val="35393F"/>
+          </a:solidFill>
+          <a:ln>
+            <a:noFill/>
+          </a:ln>
+        </p:spPr>
+        <p:style>
+          <a:lnRef idx="2">
+            <a:schemeClr val="accent1">
+              <a:shade val="50000"/>
+            </a:schemeClr>
+          </a:lnRef>
+          <a:fillRef idx="1">
+            <a:schemeClr val="accent1"/>
+          </a:fillRef>
+          <a:effectRef idx="0">
+            <a:schemeClr val="accent1"/>
+          </a:effectRef>
+          <a:fontRef idx="minor">
+            <a:schemeClr val="lt1"/>
+          </a:fontRef>
+        </p:style>
+        <p:txBody>
+          <a:bodyPr rtlCol="0" anchor="ctr"/>
+          <a:lstStyle/>
+          <a:p>
+            <a:pPr algn="ctr"/>
+            <a:endParaRPr lang="pt-BR"/>
+          </a:p>
+        </p:txBody>
+      </p:sp>
+      <p:sp>
+        <p:nvSpPr>
+          <p:cNvPr id="25" name="CaixaDeTexto 24"/>
+          <p:cNvSpPr txBox="1"/>
+          <p:nvPr/>
+        </p:nvSpPr>
+        <p:spPr>
+          <a:xfrm>
+            <a:off x="3864313" y="813490"/>
+            <a:ext cx="2905920" cy="400110"/>
+          </a:xfrm>
+          <a:prstGeom prst="rect">
+            <a:avLst/>
+          </a:prstGeom>
+          <a:noFill/>
+        </p:spPr>
+        <p:txBody>
+          <a:bodyPr wrap="square" rtlCol="0">
+            <a:spAutoFit/>
+          </a:bodyPr>
+          <a:lstStyle/>
+          <a:p>
+            <a:pPr algn="ctr"/>
+            <a:r>
+              <a:rPr lang="pt-BR" sz="2000" dirty="0">
+                <a:solidFill>
+                  <a:srgbClr val="D93F40"/>
+                </a:solidFill>
+                <a:latin typeface="Century Gothic" panose="020B0502020202020204" pitchFamily="34" charset="0"/>
+              </a:rPr>
+              <a:t>Time 1</a:t>
+            </a:r>
+          </a:p>
+        </p:txBody>
+      </p:sp>
+      <p:sp>
+        <p:nvSpPr>
+          <p:cNvPr id="26" name="CaixaDeTexto 25"/>
+          <p:cNvSpPr txBox="1"/>
+          <p:nvPr/>
+        </p:nvSpPr>
+        <p:spPr>
+          <a:xfrm>
+            <a:off x="8385143" y="813490"/>
+            <a:ext cx="2905920" cy="400110"/>
+          </a:xfrm>
+          <a:prstGeom prst="rect">
+            <a:avLst/>
+          </a:prstGeom>
+          <a:noFill/>
+        </p:spPr>
+        <p:txBody>
+          <a:bodyPr wrap="square" rtlCol="0">
+            <a:spAutoFit/>
+          </a:bodyPr>
+          <a:lstStyle/>
+          <a:p>
+            <a:pPr algn="ctr"/>
+            <a:r>
+              <a:rPr lang="pt-BR" sz="2000" dirty="0">
+                <a:solidFill>
+                  <a:srgbClr val="2D70C1"/>
+                </a:solidFill>
+                <a:latin typeface="Century Gothic" panose="020B0502020202020204" pitchFamily="34" charset="0"/>
+              </a:rPr>
+              <a:t>Time 2</a:t>
+            </a:r>
+          </a:p>
+        </p:txBody>
+      </p:sp>
+      <p:cxnSp>
+        <p:nvCxnSpPr>
+          <p:cNvPr id="32" name="Conector reto 31"/>
+          <p:cNvCxnSpPr/>
+          <p:nvPr/>
+        </p:nvCxnSpPr>
+        <p:spPr>
+          <a:xfrm>
+            <a:off x="3730919" y="2353691"/>
+            <a:ext cx="3172708" cy="0"/>
+          </a:xfrm>
+          <a:prstGeom prst="line">
+            <a:avLst/>
+          </a:prstGeom>
+          <a:ln>
+            <a:solidFill>
+              <a:srgbClr val="51575F"/>
+            </a:solidFill>
+          </a:ln>
+        </p:spPr>
+        <p:style>
+          <a:lnRef idx="1">
+            <a:schemeClr val="accent1"/>
+          </a:lnRef>
+          <a:fillRef idx="0">
+            <a:schemeClr val="accent1"/>
+          </a:fillRef>
+          <a:effectRef idx="0">
+            <a:schemeClr val="accent1"/>
+          </a:effectRef>
+          <a:fontRef idx="minor">
+            <a:schemeClr val="tx1"/>
+          </a:fontRef>
+        </p:style>
+      </p:cxnSp>
+      <p:cxnSp>
+        <p:nvCxnSpPr>
+          <p:cNvPr id="37" name="Conector reto 36"/>
+          <p:cNvCxnSpPr/>
+          <p:nvPr/>
+        </p:nvCxnSpPr>
+        <p:spPr>
+          <a:xfrm>
+            <a:off x="3730919" y="3420491"/>
+            <a:ext cx="3172708" cy="0"/>
+          </a:xfrm>
+          <a:prstGeom prst="line">
+            <a:avLst/>
+          </a:prstGeom>
+          <a:ln>
+            <a:solidFill>
+              <a:srgbClr val="51575F"/>
+            </a:solidFill>
+          </a:ln>
+        </p:spPr>
+        <p:style>
+          <a:lnRef idx="1">
+            <a:schemeClr val="accent1"/>
+          </a:lnRef>
+          <a:fillRef idx="0">
+            <a:schemeClr val="accent1"/>
+          </a:fillRef>
+          <a:effectRef idx="0">
+            <a:schemeClr val="accent1"/>
+          </a:effectRef>
+          <a:fontRef idx="minor">
+            <a:schemeClr val="tx1"/>
+          </a:fontRef>
+        </p:style>
+      </p:cxnSp>
+      <p:cxnSp>
+        <p:nvCxnSpPr>
+          <p:cNvPr id="38" name="Conector reto 37"/>
+          <p:cNvCxnSpPr/>
+          <p:nvPr/>
+        </p:nvCxnSpPr>
+        <p:spPr>
+          <a:xfrm>
+            <a:off x="3730919" y="4423791"/>
+            <a:ext cx="3172708" cy="0"/>
+          </a:xfrm>
+          <a:prstGeom prst="line">
+            <a:avLst/>
+          </a:prstGeom>
+          <a:ln>
+            <a:solidFill>
+              <a:srgbClr val="51575F"/>
+            </a:solidFill>
+          </a:ln>
+        </p:spPr>
+        <p:style>
+          <a:lnRef idx="1">
+            <a:schemeClr val="accent1"/>
+          </a:lnRef>
+          <a:fillRef idx="0">
+            <a:schemeClr val="accent1"/>
+          </a:fillRef>
+          <a:effectRef idx="0">
+            <a:schemeClr val="accent1"/>
+          </a:effectRef>
+          <a:fontRef idx="minor">
+            <a:schemeClr val="tx1"/>
+          </a:fontRef>
+        </p:style>
+      </p:cxnSp>
+      <p:cxnSp>
+        <p:nvCxnSpPr>
+          <p:cNvPr id="39" name="Conector reto 38"/>
+          <p:cNvCxnSpPr/>
+          <p:nvPr/>
+        </p:nvCxnSpPr>
+        <p:spPr>
+          <a:xfrm>
+            <a:off x="3730919" y="5452491"/>
+            <a:ext cx="3172708" cy="0"/>
+          </a:xfrm>
+          <a:prstGeom prst="line">
+            <a:avLst/>
+          </a:prstGeom>
+          <a:ln>
+            <a:solidFill>
+              <a:srgbClr val="51575F"/>
+            </a:solidFill>
+          </a:ln>
+        </p:spPr>
+        <p:style>
+          <a:lnRef idx="1">
+            <a:schemeClr val="accent1"/>
+          </a:lnRef>
+          <a:fillRef idx="0">
+            <a:schemeClr val="accent1"/>
+          </a:fillRef>
+          <a:effectRef idx="0">
+            <a:schemeClr val="accent1"/>
+          </a:effectRef>
+          <a:fontRef idx="minor">
+            <a:schemeClr val="tx1"/>
+          </a:fontRef>
+        </p:style>
+      </p:cxnSp>
+      <p:cxnSp>
+        <p:nvCxnSpPr>
+          <p:cNvPr id="68" name="Conector reto 67"/>
+          <p:cNvCxnSpPr/>
+          <p:nvPr/>
+        </p:nvCxnSpPr>
+        <p:spPr>
+          <a:xfrm>
+            <a:off x="8251749" y="2353691"/>
+            <a:ext cx="3172708" cy="0"/>
+          </a:xfrm>
+          <a:prstGeom prst="line">
+            <a:avLst/>
+          </a:prstGeom>
+          <a:ln>
+            <a:solidFill>
+              <a:srgbClr val="51575F"/>
+            </a:solidFill>
+          </a:ln>
+        </p:spPr>
+        <p:style>
+          <a:lnRef idx="1">
+            <a:schemeClr val="accent1"/>
+          </a:lnRef>
+          <a:fillRef idx="0">
+            <a:schemeClr val="accent1"/>
+          </a:fillRef>
+          <a:effectRef idx="0">
+            <a:schemeClr val="accent1"/>
+          </a:effectRef>
+          <a:fontRef idx="minor">
+            <a:schemeClr val="tx1"/>
+          </a:fontRef>
+        </p:style>
+      </p:cxnSp>
+      <p:cxnSp>
+        <p:nvCxnSpPr>
+          <p:cNvPr id="69" name="Conector reto 68"/>
+          <p:cNvCxnSpPr/>
+          <p:nvPr/>
+        </p:nvCxnSpPr>
+        <p:spPr>
+          <a:xfrm>
+            <a:off x="8251749" y="3420491"/>
+            <a:ext cx="3172708" cy="0"/>
+          </a:xfrm>
+          <a:prstGeom prst="line">
+            <a:avLst/>
+          </a:prstGeom>
+          <a:ln>
+            <a:solidFill>
+              <a:srgbClr val="51575F"/>
+            </a:solidFill>
+          </a:ln>
+        </p:spPr>
+        <p:style>
+          <a:lnRef idx="1">
+            <a:schemeClr val="accent1"/>
+          </a:lnRef>
+          <a:fillRef idx="0">
+            <a:schemeClr val="accent1"/>
+          </a:fillRef>
+          <a:effectRef idx="0">
+            <a:schemeClr val="accent1"/>
+          </a:effectRef>
+          <a:fontRef idx="minor">
+            <a:schemeClr val="tx1"/>
+          </a:fontRef>
+        </p:style>
+      </p:cxnSp>
+      <p:cxnSp>
+        <p:nvCxnSpPr>
+          <p:cNvPr id="70" name="Conector reto 69"/>
+          <p:cNvCxnSpPr/>
+          <p:nvPr/>
+        </p:nvCxnSpPr>
+        <p:spPr>
+          <a:xfrm>
+            <a:off x="8251749" y="4423791"/>
+            <a:ext cx="3172708" cy="0"/>
+          </a:xfrm>
+          <a:prstGeom prst="line">
+            <a:avLst/>
+          </a:prstGeom>
+          <a:ln>
+            <a:solidFill>
+              <a:srgbClr val="51575F"/>
+            </a:solidFill>
+          </a:ln>
+        </p:spPr>
+        <p:style>
+          <a:lnRef idx="1">
+            <a:schemeClr val="accent1"/>
+          </a:lnRef>
+          <a:fillRef idx="0">
+            <a:schemeClr val="accent1"/>
+          </a:fillRef>
+          <a:effectRef idx="0">
+            <a:schemeClr val="accent1"/>
+          </a:effectRef>
+          <a:fontRef idx="minor">
+            <a:schemeClr val="tx1"/>
+          </a:fontRef>
+        </p:style>
+      </p:cxnSp>
+      <p:cxnSp>
+        <p:nvCxnSpPr>
+          <p:cNvPr id="71" name="Conector reto 70"/>
+          <p:cNvCxnSpPr/>
+          <p:nvPr/>
+        </p:nvCxnSpPr>
+        <p:spPr>
+          <a:xfrm>
+            <a:off x="8251749" y="5452491"/>
+            <a:ext cx="3172708" cy="0"/>
+          </a:xfrm>
+          <a:prstGeom prst="line">
+            <a:avLst/>
+          </a:prstGeom>
+          <a:ln>
+            <a:solidFill>
+              <a:srgbClr val="51575F"/>
+            </a:solidFill>
+          </a:ln>
+        </p:spPr>
+        <p:style>
+          <a:lnRef idx="1">
+            <a:schemeClr val="accent1"/>
+          </a:lnRef>
+          <a:fillRef idx="0">
+            <a:schemeClr val="accent1"/>
+          </a:fillRef>
+          <a:effectRef idx="0">
+            <a:schemeClr val="accent1"/>
+          </a:effectRef>
+          <a:fontRef idx="minor">
+            <a:schemeClr val="tx1"/>
+          </a:fontRef>
+        </p:style>
+      </p:cxnSp>
+      <p:sp>
+        <p:nvSpPr>
+          <p:cNvPr id="77" name="CaixaDeTexto 76"/>
+          <p:cNvSpPr txBox="1"/>
+          <p:nvPr/>
+        </p:nvSpPr>
+        <p:spPr>
+          <a:xfrm>
+            <a:off x="221755" y="1483768"/>
+            <a:ext cx="2062148" cy="307777"/>
+          </a:xfrm>
+          <a:prstGeom prst="rect">
+            <a:avLst/>
+          </a:prstGeom>
+          <a:noFill/>
+        </p:spPr>
+        <p:txBody>
+          <a:bodyPr wrap="square" rtlCol="0">
+            <a:spAutoFit/>
+          </a:bodyPr>
+          <a:lstStyle/>
+          <a:p>
+            <a:pPr algn="ctr"/>
+            <a:r>
+              <a:rPr lang="pt-BR" sz="1400" dirty="0" err="1">
+                <a:solidFill>
+                  <a:srgbClr val="8E959E"/>
+                </a:solidFill>
+                <a:latin typeface="Century Gothic" panose="020B0502020202020204" pitchFamily="34" charset="0"/>
+              </a:rPr>
+              <a:t>Stream</a:t>
+            </a:r>
+            <a:endParaRPr lang="pt-BR" sz="1400" dirty="0">
+              <a:solidFill>
                 <a:srgbClr val="8E959E"/>
               </a:solidFill>
+              <a:latin typeface="Century Gothic" panose="020B0502020202020204" pitchFamily="34" charset="0"/>
+            </a:endParaRPr>
+          </a:p>
+        </p:txBody>
+      </p:sp>
+      <p:cxnSp>
+        <p:nvCxnSpPr>
+          <p:cNvPr id="81" name="Conector reto 80"/>
+          <p:cNvCxnSpPr/>
+          <p:nvPr/>
+        </p:nvCxnSpPr>
+        <p:spPr>
+          <a:xfrm>
+            <a:off x="653967" y="1437802"/>
+            <a:ext cx="0" cy="425450"/>
+          </a:xfrm>
+          <a:prstGeom prst="line">
+            <a:avLst/>
+          </a:prstGeom>
+          <a:ln>
+            <a:solidFill>
+              <a:srgbClr val="51575F"/>
+            </a:solidFill>
+          </a:ln>
+        </p:spPr>
+        <p:style>
+          <a:lnRef idx="1">
+            <a:schemeClr val="accent1"/>
+          </a:lnRef>
+          <a:fillRef idx="0">
+            <a:schemeClr val="accent1"/>
+          </a:fillRef>
+          <a:effectRef idx="0">
+            <a:schemeClr val="accent1"/>
+          </a:effectRef>
+          <a:fontRef idx="minor">
+            <a:schemeClr val="tx1"/>
+          </a:fontRef>
+        </p:style>
+      </p:cxnSp>
+      <p:sp>
+        <p:nvSpPr>
+          <p:cNvPr id="4" name="CaixaDeTexto 3">
+            <a:extLst>
+              <a:ext uri="{FF2B5EF4-FFF2-40B4-BE49-F238E27FC236}">
+                <a16:creationId xmlns:a16="http://schemas.microsoft.com/office/drawing/2014/main" id="{D49FFA6C-9A50-4238-B562-4A7C73E02608}"/>
+              </a:ext>
+            </a:extLst>
+          </p:cNvPr>
+          <p:cNvSpPr txBox="1"/>
+          <p:nvPr/>
+        </p:nvSpPr>
+        <p:spPr>
+          <a:xfrm>
+            <a:off x="6771587" y="1206589"/>
+            <a:ext cx="486030" cy="1200329"/>
+          </a:xfrm>
+          <a:prstGeom prst="rect">
+            <a:avLst/>
+          </a:prstGeom>
+          <a:noFill/>
+        </p:spPr>
+        <p:txBody>
+          <a:bodyPr wrap="none" rtlCol="0">
+            <a:spAutoFit/>
+          </a:bodyPr>
+          <a:lstStyle/>
+          <a:p>
+            <a:r>
+              <a:rPr lang="pt-BR" sz="7200" dirty="0">
+                <a:solidFill>
+                  <a:srgbClr val="FF0000"/>
+                </a:solidFill>
+              </a:rPr>
+              <a:t>!</a:t>
+            </a:r>
+          </a:p>
+        </p:txBody>
+      </p:sp>
+      <p:sp>
+        <p:nvSpPr>
+          <p:cNvPr id="43" name="Retângulo 42">
+            <a:extLst>
+              <a:ext uri="{FF2B5EF4-FFF2-40B4-BE49-F238E27FC236}">
+                <a16:creationId xmlns:a16="http://schemas.microsoft.com/office/drawing/2014/main" id="{8E319368-83DC-4BBE-BF59-CF1093CA0BBE}"/>
+              </a:ext>
+            </a:extLst>
+          </p:cNvPr>
+          <p:cNvSpPr/>
+          <p:nvPr/>
+        </p:nvSpPr>
+        <p:spPr>
+          <a:xfrm>
+            <a:off x="-1355" y="660400"/>
+            <a:ext cx="45719" cy="660400"/>
+          </a:xfrm>
+          <a:prstGeom prst="rect">
+            <a:avLst/>
+          </a:prstGeom>
+          <a:solidFill>
+            <a:srgbClr val="F54747"/>
+          </a:solidFill>
+          <a:ln>
+            <a:noFill/>
+          </a:ln>
+        </p:spPr>
+        <p:style>
+          <a:lnRef idx="2">
+            <a:schemeClr val="accent1">
+              <a:shade val="50000"/>
+            </a:schemeClr>
+          </a:lnRef>
+          <a:fillRef idx="1">
+            <a:schemeClr val="accent1"/>
+          </a:fillRef>
+          <a:effectRef idx="0">
+            <a:schemeClr val="accent1"/>
+          </a:effectRef>
+          <a:fontRef idx="minor">
+            <a:schemeClr val="lt1"/>
+          </a:fontRef>
+        </p:style>
+        <p:txBody>
+          <a:bodyPr rtlCol="0" anchor="ctr"/>
+          <a:lstStyle/>
+          <a:p>
+            <a:pPr algn="ctr"/>
+            <a:endParaRPr lang="pt-BR"/>
+          </a:p>
+        </p:txBody>
+      </p:sp>
+      <p:pic>
+        <p:nvPicPr>
+          <p:cNvPr id="27" name="Imagem 26">
+            <a:extLst>
+              <a:ext uri="{FF2B5EF4-FFF2-40B4-BE49-F238E27FC236}">
+                <a16:creationId xmlns:a16="http://schemas.microsoft.com/office/drawing/2014/main" id="{2D9BF9F2-DF69-444D-A7DE-C8EDFEB24E9A}"/>
+              </a:ext>
+            </a:extLst>
+          </p:cNvPr>
+          <p:cNvPicPr>
+            <a:picLocks noChangeAspect="1"/>
+          </p:cNvPicPr>
+          <p:nvPr/>
+        </p:nvPicPr>
+        <p:blipFill>
+          <a:blip r:embed="rId3" cstate="print">
+            <a:extLst>
+              <a:ext uri="{28A0092B-C50C-407E-A947-70E740481C1C}">
+                <a14:useLocalDpi xmlns:a14="http://schemas.microsoft.com/office/drawing/2010/main" val="0"/>
+              </a:ext>
+            </a:extLst>
+          </a:blip>
+          <a:stretch>
+            <a:fillRect/>
+          </a:stretch>
+        </p:blipFill>
+        <p:spPr>
+          <a:xfrm>
+            <a:off x="195299" y="1494503"/>
+            <a:ext cx="286306" cy="286306"/>
+          </a:xfrm>
+          <a:prstGeom prst="rect">
+            <a:avLst/>
+          </a:prstGeom>
+        </p:spPr>
+      </p:pic>
+      <p:sp>
+        <p:nvSpPr>
+          <p:cNvPr id="44" name="Retângulo 43">
+            <a:hlinkClick r:id="rId4" action="ppaction://hlinksldjump"/>
+            <a:extLst>
+              <a:ext uri="{FF2B5EF4-FFF2-40B4-BE49-F238E27FC236}">
+                <a16:creationId xmlns:a16="http://schemas.microsoft.com/office/drawing/2014/main" id="{3BB04BED-09EA-4F10-A182-1371CCA30217}"/>
+              </a:ext>
+            </a:extLst>
+          </p:cNvPr>
+          <p:cNvSpPr/>
+          <p:nvPr/>
+        </p:nvSpPr>
+        <p:spPr>
+          <a:xfrm>
+            <a:off x="0" y="1315402"/>
+            <a:ext cx="2945320" cy="660400"/>
+          </a:xfrm>
+          <a:prstGeom prst="rect">
+            <a:avLst/>
+          </a:prstGeom>
+          <a:solidFill>
+            <a:srgbClr val="43484F">
+              <a:alpha val="0"/>
+            </a:srgbClr>
+          </a:solidFill>
+          <a:ln>
+            <a:noFill/>
+          </a:ln>
+        </p:spPr>
+        <p:style>
+          <a:lnRef idx="2">
+            <a:schemeClr val="accent1">
+              <a:shade val="50000"/>
+            </a:schemeClr>
+          </a:lnRef>
+          <a:fillRef idx="1">
+            <a:schemeClr val="accent1"/>
+          </a:fillRef>
+          <a:effectRef idx="0">
+            <a:schemeClr val="accent1"/>
+          </a:effectRef>
+          <a:fontRef idx="minor">
+            <a:schemeClr val="lt1"/>
+          </a:fontRef>
+        </p:style>
+        <p:txBody>
+          <a:bodyPr rtlCol="0" anchor="ctr"/>
+          <a:lstStyle/>
+          <a:p>
+            <a:pPr algn="ctr"/>
+            <a:endParaRPr lang="pt-BR"/>
+          </a:p>
+        </p:txBody>
+      </p:sp>
+    </p:spTree>
+    <p:extLst>
+      <p:ext uri="{BB962C8B-B14F-4D97-AF65-F5344CB8AC3E}">
+        <p14:creationId xmlns:p14="http://schemas.microsoft.com/office/powerpoint/2010/main" val="1937689596"/>
+      </p:ext>
+    </p:extLst>
+  </p:cSld>
+  <p:clrMapOvr>
+    <a:masterClrMapping/>
+  </p:clrMapOvr>
+  <mc:AlternateContent xmlns:mc="http://schemas.openxmlformats.org/markup-compatibility/2006" xmlns:p14="http://schemas.microsoft.com/office/powerpoint/2010/main">
+    <mc:Choice Requires="p14">
+      <p:transition spd="slow" p14:dur="2000" advClick="0"/>
+    </mc:Choice>
+    <mc:Fallback xmlns="">
+      <p:transition spd="slow" advClick="0"/>
+    </mc:Fallback>
+  </mc:AlternateContent>
+</p:sld>
+</file>
+
+<file path=ppt/slides/slide3.xml><?xml version="1.0" encoding="utf-8"?>
+<p:sld xmlns:a="http://schemas.openxmlformats.org/drawingml/2006/main" xmlns:r="http://schemas.openxmlformats.org/officeDocument/2006/relationships" xmlns:p="http://schemas.openxmlformats.org/presentationml/2006/main">
+  <p:cSld>
+    <p:spTree>
+      <p:nvGrpSpPr>
+        <p:cNvPr id="1" name=""/>
+        <p:cNvGrpSpPr/>
+        <p:nvPr/>
+      </p:nvGrpSpPr>
+      <p:grpSpPr>
+        <a:xfrm>
+          <a:off x="0" y="0"/>
+          <a:ext cx="0" cy="0"/>
+          <a:chOff x="0" y="0"/>
+          <a:chExt cx="0" cy="0"/>
+        </a:xfrm>
+      </p:grpSpPr>
+      <p:sp>
+        <p:nvSpPr>
+          <p:cNvPr id="36" name="Retângulo 35">
+            <a:extLst>
+              <a:ext uri="{FF2B5EF4-FFF2-40B4-BE49-F238E27FC236}">
+                <a16:creationId xmlns:a16="http://schemas.microsoft.com/office/drawing/2014/main" id="{21CA09FC-C1CE-41AE-A231-35B1C662A7EA}"/>
+              </a:ext>
+            </a:extLst>
+          </p:cNvPr>
+          <p:cNvSpPr/>
+          <p:nvPr/>
+        </p:nvSpPr>
+        <p:spPr>
+          <a:xfrm>
+            <a:off x="3157998" y="1437802"/>
+            <a:ext cx="4299916" cy="1420891"/>
+          </a:xfrm>
+          <a:prstGeom prst="rect">
+            <a:avLst/>
+          </a:prstGeom>
+          <a:solidFill>
+            <a:srgbClr val="35393F"/>
+          </a:solidFill>
+          <a:ln>
+            <a:noFill/>
+          </a:ln>
+        </p:spPr>
+        <p:style>
+          <a:lnRef idx="2">
+            <a:schemeClr val="accent1">
+              <a:shade val="50000"/>
+            </a:schemeClr>
+          </a:lnRef>
+          <a:fillRef idx="1">
+            <a:schemeClr val="accent1"/>
+          </a:fillRef>
+          <a:effectRef idx="0">
+            <a:schemeClr val="accent1"/>
+          </a:effectRef>
+          <a:fontRef idx="minor">
+            <a:schemeClr val="lt1"/>
+          </a:fontRef>
+        </p:style>
+        <p:txBody>
+          <a:bodyPr rtlCol="0" anchor="ctr"/>
+          <a:lstStyle/>
+          <a:p>
+            <a:pPr algn="ctr"/>
+            <a:endParaRPr lang="pt-BR"/>
+          </a:p>
+        </p:txBody>
+      </p:sp>
+      <p:grpSp>
+        <p:nvGrpSpPr>
+          <p:cNvPr id="2" name="Agrupar 1">
+            <a:extLst>
+              <a:ext uri="{FF2B5EF4-FFF2-40B4-BE49-F238E27FC236}">
+                <a16:creationId xmlns:a16="http://schemas.microsoft.com/office/drawing/2014/main" id="{5DAA36FF-8918-4B4D-838A-C4E114BA24FF}"/>
+              </a:ext>
+            </a:extLst>
+          </p:cNvPr>
+          <p:cNvGrpSpPr/>
+          <p:nvPr/>
+        </p:nvGrpSpPr>
+        <p:grpSpPr>
+          <a:xfrm>
+            <a:off x="3162046" y="858294"/>
+            <a:ext cx="2662493" cy="399776"/>
+            <a:chOff x="3162046" y="1207568"/>
+            <a:chExt cx="2662493" cy="399776"/>
+          </a:xfrm>
+        </p:grpSpPr>
+        <p:sp>
+          <p:nvSpPr>
+            <p:cNvPr id="63" name="Retângulo 62">
+              <a:extLst>
+                <a:ext uri="{FF2B5EF4-FFF2-40B4-BE49-F238E27FC236}">
+                  <a16:creationId xmlns:a16="http://schemas.microsoft.com/office/drawing/2014/main" id="{4AD2FEC4-2006-4AFA-82BB-71CD5016AF15}"/>
+                </a:ext>
+              </a:extLst>
+            </p:cNvPr>
+            <p:cNvSpPr/>
+            <p:nvPr/>
+          </p:nvSpPr>
+          <p:spPr>
+            <a:xfrm>
+              <a:off x="3162046" y="1207568"/>
+              <a:ext cx="2662493" cy="399776"/>
+            </a:xfrm>
+            <a:prstGeom prst="rect">
+              <a:avLst/>
+            </a:prstGeom>
+            <a:solidFill>
+              <a:srgbClr val="2E3136"/>
+            </a:solidFill>
+            <a:ln>
+              <a:noFill/>
             </a:ln>
           </p:spPr>
           <p:style>
@@ -3347,58 +4844,69 @@
             </a:p>
           </p:txBody>
         </p:sp>
+        <p:sp>
+          <p:nvSpPr>
+            <p:cNvPr id="64" name="CaixaDeTexto 63">
+              <a:extLst>
+                <a:ext uri="{FF2B5EF4-FFF2-40B4-BE49-F238E27FC236}">
+                  <a16:creationId xmlns:a16="http://schemas.microsoft.com/office/drawing/2014/main" id="{8E0D5B91-1AB7-4051-8111-65FDD174C04A}"/>
+                </a:ext>
+              </a:extLst>
+            </p:cNvPr>
+            <p:cNvSpPr txBox="1"/>
+            <p:nvPr/>
+          </p:nvSpPr>
+          <p:spPr>
+            <a:xfrm>
+              <a:off x="3192336" y="1287454"/>
+              <a:ext cx="2587546" cy="276999"/>
+            </a:xfrm>
+            <a:prstGeom prst="rect">
+              <a:avLst/>
+            </a:prstGeom>
+            <a:noFill/>
+          </p:spPr>
+          <p:txBody>
+            <a:bodyPr wrap="square" rtlCol="0">
+              <a:spAutoFit/>
+            </a:bodyPr>
+            <a:lstStyle/>
+            <a:p>
+              <a:r>
+                <a:rPr lang="pt-BR" sz="1200" dirty="0">
+                  <a:solidFill>
+                    <a:srgbClr val="8E959E"/>
+                  </a:solidFill>
+                  <a:latin typeface="Century Gothic" panose="020B0502020202020204" pitchFamily="34" charset="0"/>
+                </a:rPr>
+                <a:t>Ordenar por maior canal</a:t>
+              </a:r>
+            </a:p>
+          </p:txBody>
+        </p:sp>
       </p:grpSp>
-      <p:cxnSp>
-        <p:nvCxnSpPr>
-          <p:cNvPr id="10" name="Conector reto 9"/>
-          <p:cNvCxnSpPr/>
-          <p:nvPr/>
-        </p:nvCxnSpPr>
-        <p:spPr>
-          <a:xfrm>
-            <a:off x="653967" y="831207"/>
-            <a:ext cx="0" cy="425450"/>
-          </a:xfrm>
-          <a:prstGeom prst="line">
-            <a:avLst/>
-          </a:prstGeom>
-          <a:ln>
-            <a:solidFill>
-              <a:srgbClr val="51575F"/>
-            </a:solidFill>
-          </a:ln>
-        </p:spPr>
-        <p:style>
-          <a:lnRef idx="1">
-            <a:schemeClr val="accent1"/>
-          </a:lnRef>
-          <a:fillRef idx="0">
-            <a:schemeClr val="accent1"/>
-          </a:fillRef>
-          <a:effectRef idx="0">
-            <a:schemeClr val="accent1"/>
-          </a:effectRef>
-          <a:fontRef idx="minor">
-            <a:schemeClr val="tx1"/>
-          </a:fontRef>
-        </p:style>
-      </p:cxnSp>
-      <p:sp>
-        <p:nvSpPr>
-          <p:cNvPr id="15" name="Retângulo 14"/>
+      <p:sp>
+        <p:nvSpPr>
+          <p:cNvPr id="65" name="Retângulo 64">
+            <a:extLst>
+              <a:ext uri="{FF2B5EF4-FFF2-40B4-BE49-F238E27FC236}">
+                <a16:creationId xmlns:a16="http://schemas.microsoft.com/office/drawing/2014/main" id="{AD7063F5-39CD-4946-953B-3093EB79A5A6}"/>
+              </a:ext>
+            </a:extLst>
+          </p:cNvPr>
           <p:cNvSpPr/>
           <p:nvPr/>
         </p:nvSpPr>
         <p:spPr>
           <a:xfrm>
-            <a:off x="3167315" y="1253554"/>
-            <a:ext cx="4299916" cy="5305924"/>
+            <a:off x="2259532" y="280187"/>
+            <a:ext cx="4423657" cy="975768"/>
           </a:xfrm>
           <a:prstGeom prst="rect">
             <a:avLst/>
           </a:prstGeom>
           <a:solidFill>
-            <a:srgbClr val="35393F"/>
+            <a:srgbClr val="2D3035"/>
           </a:solidFill>
           <a:ln>
             <a:noFill/>
@@ -3429,730 +4937,6 @@
           </a:p>
         </p:txBody>
       </p:sp>
-      <p:sp>
-        <p:nvSpPr>
-          <p:cNvPr id="16" name="CaixaDeTexto 15"/>
-          <p:cNvSpPr txBox="1"/>
-          <p:nvPr/>
-        </p:nvSpPr>
-        <p:spPr>
-          <a:xfrm>
-            <a:off x="6235185" y="122588"/>
-            <a:ext cx="2905920" cy="400110"/>
-          </a:xfrm>
-          <a:prstGeom prst="rect">
-            <a:avLst/>
-          </a:prstGeom>
-          <a:noFill/>
-        </p:spPr>
-        <p:txBody>
-          <a:bodyPr wrap="square" rtlCol="0">
-            <a:spAutoFit/>
-          </a:bodyPr>
-          <a:lstStyle/>
-          <a:p>
-            <a:pPr algn="ctr"/>
-            <a:r>
-              <a:rPr lang="pt-BR" sz="2000" dirty="0">
-                <a:solidFill>
-                  <a:srgbClr val="FF3F3F"/>
-                </a:solidFill>
-                <a:latin typeface="Century Gothic" panose="020B0502020202020204" pitchFamily="34" charset="0"/>
-              </a:rPr>
-              <a:t>Nome Campeonato</a:t>
-            </a:r>
-          </a:p>
-        </p:txBody>
-      </p:sp>
-      <p:sp>
-        <p:nvSpPr>
-          <p:cNvPr id="17" name="CaixaDeTexto 16"/>
-          <p:cNvSpPr txBox="1"/>
-          <p:nvPr/>
-        </p:nvSpPr>
-        <p:spPr>
-          <a:xfrm>
-            <a:off x="4544020" y="215342"/>
-            <a:ext cx="1551980" cy="276999"/>
-          </a:xfrm>
-          <a:prstGeom prst="rect">
-            <a:avLst/>
-          </a:prstGeom>
-          <a:noFill/>
-        </p:spPr>
-        <p:txBody>
-          <a:bodyPr wrap="square" rtlCol="0">
-            <a:spAutoFit/>
-          </a:bodyPr>
-          <a:lstStyle/>
-          <a:p>
-            <a:pPr algn="r"/>
-            <a:r>
-              <a:rPr lang="pt-BR" sz="1200" dirty="0">
-                <a:solidFill>
-                  <a:srgbClr val="96A0A0"/>
-                </a:solidFill>
-                <a:latin typeface="Century Gothic" panose="020B0502020202020204" pitchFamily="34" charset="0"/>
-              </a:rPr>
-              <a:t>CAMPEONATO</a:t>
-            </a:r>
-          </a:p>
-        </p:txBody>
-      </p:sp>
-      <p:cxnSp>
-        <p:nvCxnSpPr>
-          <p:cNvPr id="18" name="Conector reto 17"/>
-          <p:cNvCxnSpPr/>
-          <p:nvPr/>
-        </p:nvCxnSpPr>
-        <p:spPr>
-          <a:xfrm>
-            <a:off x="6203739" y="153090"/>
-            <a:ext cx="0" cy="346647"/>
-          </a:xfrm>
-          <a:prstGeom prst="line">
-            <a:avLst/>
-          </a:prstGeom>
-          <a:ln>
-            <a:solidFill>
-              <a:srgbClr val="51575F"/>
-            </a:solidFill>
-          </a:ln>
-        </p:spPr>
-        <p:style>
-          <a:lnRef idx="1">
-            <a:schemeClr val="accent1"/>
-          </a:lnRef>
-          <a:fillRef idx="0">
-            <a:schemeClr val="accent1"/>
-          </a:fillRef>
-          <a:effectRef idx="0">
-            <a:schemeClr val="accent1"/>
-          </a:effectRef>
-          <a:fontRef idx="minor">
-            <a:schemeClr val="tx1"/>
-          </a:fontRef>
-        </p:style>
-      </p:cxnSp>
-      <p:sp>
-        <p:nvSpPr>
-          <p:cNvPr id="24" name="Retângulo 23"/>
-          <p:cNvSpPr/>
-          <p:nvPr/>
-        </p:nvSpPr>
-        <p:spPr>
-          <a:xfrm>
-            <a:off x="7688145" y="1253554"/>
-            <a:ext cx="4299916" cy="5305924"/>
-          </a:xfrm>
-          <a:prstGeom prst="rect">
-            <a:avLst/>
-          </a:prstGeom>
-          <a:solidFill>
-            <a:srgbClr val="35393F"/>
-          </a:solidFill>
-          <a:ln>
-            <a:noFill/>
-          </a:ln>
-        </p:spPr>
-        <p:style>
-          <a:lnRef idx="2">
-            <a:schemeClr val="accent1">
-              <a:shade val="50000"/>
-            </a:schemeClr>
-          </a:lnRef>
-          <a:fillRef idx="1">
-            <a:schemeClr val="accent1"/>
-          </a:fillRef>
-          <a:effectRef idx="0">
-            <a:schemeClr val="accent1"/>
-          </a:effectRef>
-          <a:fontRef idx="minor">
-            <a:schemeClr val="lt1"/>
-          </a:fontRef>
-        </p:style>
-        <p:txBody>
-          <a:bodyPr rtlCol="0" anchor="ctr"/>
-          <a:lstStyle/>
-          <a:p>
-            <a:pPr algn="ctr"/>
-            <a:endParaRPr lang="pt-BR"/>
-          </a:p>
-        </p:txBody>
-      </p:sp>
-      <p:sp>
-        <p:nvSpPr>
-          <p:cNvPr id="25" name="CaixaDeTexto 24"/>
-          <p:cNvSpPr txBox="1"/>
-          <p:nvPr/>
-        </p:nvSpPr>
-        <p:spPr>
-          <a:xfrm>
-            <a:off x="3864313" y="813490"/>
-            <a:ext cx="2905920" cy="400110"/>
-          </a:xfrm>
-          <a:prstGeom prst="rect">
-            <a:avLst/>
-          </a:prstGeom>
-          <a:noFill/>
-        </p:spPr>
-        <p:txBody>
-          <a:bodyPr wrap="square" rtlCol="0">
-            <a:spAutoFit/>
-          </a:bodyPr>
-          <a:lstStyle/>
-          <a:p>
-            <a:pPr algn="ctr"/>
-            <a:r>
-              <a:rPr lang="pt-BR" sz="2000" dirty="0">
-                <a:solidFill>
-                  <a:srgbClr val="D93F40"/>
-                </a:solidFill>
-                <a:latin typeface="Century Gothic" panose="020B0502020202020204" pitchFamily="34" charset="0"/>
-              </a:rPr>
-              <a:t>Time 1</a:t>
-            </a:r>
-          </a:p>
-        </p:txBody>
-      </p:sp>
-      <p:sp>
-        <p:nvSpPr>
-          <p:cNvPr id="26" name="CaixaDeTexto 25"/>
-          <p:cNvSpPr txBox="1"/>
-          <p:nvPr/>
-        </p:nvSpPr>
-        <p:spPr>
-          <a:xfrm>
-            <a:off x="8385143" y="813490"/>
-            <a:ext cx="2905920" cy="400110"/>
-          </a:xfrm>
-          <a:prstGeom prst="rect">
-            <a:avLst/>
-          </a:prstGeom>
-          <a:noFill/>
-        </p:spPr>
-        <p:txBody>
-          <a:bodyPr wrap="square" rtlCol="0">
-            <a:spAutoFit/>
-          </a:bodyPr>
-          <a:lstStyle/>
-          <a:p>
-            <a:pPr algn="ctr"/>
-            <a:r>
-              <a:rPr lang="pt-BR" sz="2000" dirty="0">
-                <a:solidFill>
-                  <a:srgbClr val="2D70C1"/>
-                </a:solidFill>
-                <a:latin typeface="Century Gothic" panose="020B0502020202020204" pitchFamily="34" charset="0"/>
-              </a:rPr>
-              <a:t>Time 2</a:t>
-            </a:r>
-          </a:p>
-        </p:txBody>
-      </p:sp>
-      <p:cxnSp>
-        <p:nvCxnSpPr>
-          <p:cNvPr id="32" name="Conector reto 31"/>
-          <p:cNvCxnSpPr/>
-          <p:nvPr/>
-        </p:nvCxnSpPr>
-        <p:spPr>
-          <a:xfrm>
-            <a:off x="3730919" y="2353691"/>
-            <a:ext cx="3172708" cy="0"/>
-          </a:xfrm>
-          <a:prstGeom prst="line">
-            <a:avLst/>
-          </a:prstGeom>
-          <a:ln>
-            <a:solidFill>
-              <a:srgbClr val="51575F"/>
-            </a:solidFill>
-          </a:ln>
-        </p:spPr>
-        <p:style>
-          <a:lnRef idx="1">
-            <a:schemeClr val="accent1"/>
-          </a:lnRef>
-          <a:fillRef idx="0">
-            <a:schemeClr val="accent1"/>
-          </a:fillRef>
-          <a:effectRef idx="0">
-            <a:schemeClr val="accent1"/>
-          </a:effectRef>
-          <a:fontRef idx="minor">
-            <a:schemeClr val="tx1"/>
-          </a:fontRef>
-        </p:style>
-      </p:cxnSp>
-      <p:cxnSp>
-        <p:nvCxnSpPr>
-          <p:cNvPr id="37" name="Conector reto 36"/>
-          <p:cNvCxnSpPr/>
-          <p:nvPr/>
-        </p:nvCxnSpPr>
-        <p:spPr>
-          <a:xfrm>
-            <a:off x="3730919" y="3420491"/>
-            <a:ext cx="3172708" cy="0"/>
-          </a:xfrm>
-          <a:prstGeom prst="line">
-            <a:avLst/>
-          </a:prstGeom>
-          <a:ln>
-            <a:solidFill>
-              <a:srgbClr val="51575F"/>
-            </a:solidFill>
-          </a:ln>
-        </p:spPr>
-        <p:style>
-          <a:lnRef idx="1">
-            <a:schemeClr val="accent1"/>
-          </a:lnRef>
-          <a:fillRef idx="0">
-            <a:schemeClr val="accent1"/>
-          </a:fillRef>
-          <a:effectRef idx="0">
-            <a:schemeClr val="accent1"/>
-          </a:effectRef>
-          <a:fontRef idx="minor">
-            <a:schemeClr val="tx1"/>
-          </a:fontRef>
-        </p:style>
-      </p:cxnSp>
-      <p:cxnSp>
-        <p:nvCxnSpPr>
-          <p:cNvPr id="38" name="Conector reto 37"/>
-          <p:cNvCxnSpPr/>
-          <p:nvPr/>
-        </p:nvCxnSpPr>
-        <p:spPr>
-          <a:xfrm>
-            <a:off x="3730919" y="4423791"/>
-            <a:ext cx="3172708" cy="0"/>
-          </a:xfrm>
-          <a:prstGeom prst="line">
-            <a:avLst/>
-          </a:prstGeom>
-          <a:ln>
-            <a:solidFill>
-              <a:srgbClr val="51575F"/>
-            </a:solidFill>
-          </a:ln>
-        </p:spPr>
-        <p:style>
-          <a:lnRef idx="1">
-            <a:schemeClr val="accent1"/>
-          </a:lnRef>
-          <a:fillRef idx="0">
-            <a:schemeClr val="accent1"/>
-          </a:fillRef>
-          <a:effectRef idx="0">
-            <a:schemeClr val="accent1"/>
-          </a:effectRef>
-          <a:fontRef idx="minor">
-            <a:schemeClr val="tx1"/>
-          </a:fontRef>
-        </p:style>
-      </p:cxnSp>
-      <p:cxnSp>
-        <p:nvCxnSpPr>
-          <p:cNvPr id="39" name="Conector reto 38"/>
-          <p:cNvCxnSpPr/>
-          <p:nvPr/>
-        </p:nvCxnSpPr>
-        <p:spPr>
-          <a:xfrm>
-            <a:off x="3730919" y="5452491"/>
-            <a:ext cx="3172708" cy="0"/>
-          </a:xfrm>
-          <a:prstGeom prst="line">
-            <a:avLst/>
-          </a:prstGeom>
-          <a:ln>
-            <a:solidFill>
-              <a:srgbClr val="51575F"/>
-            </a:solidFill>
-          </a:ln>
-        </p:spPr>
-        <p:style>
-          <a:lnRef idx="1">
-            <a:schemeClr val="accent1"/>
-          </a:lnRef>
-          <a:fillRef idx="0">
-            <a:schemeClr val="accent1"/>
-          </a:fillRef>
-          <a:effectRef idx="0">
-            <a:schemeClr val="accent1"/>
-          </a:effectRef>
-          <a:fontRef idx="minor">
-            <a:schemeClr val="tx1"/>
-          </a:fontRef>
-        </p:style>
-      </p:cxnSp>
-      <p:cxnSp>
-        <p:nvCxnSpPr>
-          <p:cNvPr id="68" name="Conector reto 67"/>
-          <p:cNvCxnSpPr/>
-          <p:nvPr/>
-        </p:nvCxnSpPr>
-        <p:spPr>
-          <a:xfrm>
-            <a:off x="8251749" y="2353691"/>
-            <a:ext cx="3172708" cy="0"/>
-          </a:xfrm>
-          <a:prstGeom prst="line">
-            <a:avLst/>
-          </a:prstGeom>
-          <a:ln>
-            <a:solidFill>
-              <a:srgbClr val="51575F"/>
-            </a:solidFill>
-          </a:ln>
-        </p:spPr>
-        <p:style>
-          <a:lnRef idx="1">
-            <a:schemeClr val="accent1"/>
-          </a:lnRef>
-          <a:fillRef idx="0">
-            <a:schemeClr val="accent1"/>
-          </a:fillRef>
-          <a:effectRef idx="0">
-            <a:schemeClr val="accent1"/>
-          </a:effectRef>
-          <a:fontRef idx="minor">
-            <a:schemeClr val="tx1"/>
-          </a:fontRef>
-        </p:style>
-      </p:cxnSp>
-      <p:cxnSp>
-        <p:nvCxnSpPr>
-          <p:cNvPr id="69" name="Conector reto 68"/>
-          <p:cNvCxnSpPr/>
-          <p:nvPr/>
-        </p:nvCxnSpPr>
-        <p:spPr>
-          <a:xfrm>
-            <a:off x="8251749" y="3420491"/>
-            <a:ext cx="3172708" cy="0"/>
-          </a:xfrm>
-          <a:prstGeom prst="line">
-            <a:avLst/>
-          </a:prstGeom>
-          <a:ln>
-            <a:solidFill>
-              <a:srgbClr val="51575F"/>
-            </a:solidFill>
-          </a:ln>
-        </p:spPr>
-        <p:style>
-          <a:lnRef idx="1">
-            <a:schemeClr val="accent1"/>
-          </a:lnRef>
-          <a:fillRef idx="0">
-            <a:schemeClr val="accent1"/>
-          </a:fillRef>
-          <a:effectRef idx="0">
-            <a:schemeClr val="accent1"/>
-          </a:effectRef>
-          <a:fontRef idx="minor">
-            <a:schemeClr val="tx1"/>
-          </a:fontRef>
-        </p:style>
-      </p:cxnSp>
-      <p:cxnSp>
-        <p:nvCxnSpPr>
-          <p:cNvPr id="70" name="Conector reto 69"/>
-          <p:cNvCxnSpPr/>
-          <p:nvPr/>
-        </p:nvCxnSpPr>
-        <p:spPr>
-          <a:xfrm>
-            <a:off x="8251749" y="4423791"/>
-            <a:ext cx="3172708" cy="0"/>
-          </a:xfrm>
-          <a:prstGeom prst="line">
-            <a:avLst/>
-          </a:prstGeom>
-          <a:ln>
-            <a:solidFill>
-              <a:srgbClr val="51575F"/>
-            </a:solidFill>
-          </a:ln>
-        </p:spPr>
-        <p:style>
-          <a:lnRef idx="1">
-            <a:schemeClr val="accent1"/>
-          </a:lnRef>
-          <a:fillRef idx="0">
-            <a:schemeClr val="accent1"/>
-          </a:fillRef>
-          <a:effectRef idx="0">
-            <a:schemeClr val="accent1"/>
-          </a:effectRef>
-          <a:fontRef idx="minor">
-            <a:schemeClr val="tx1"/>
-          </a:fontRef>
-        </p:style>
-      </p:cxnSp>
-      <p:cxnSp>
-        <p:nvCxnSpPr>
-          <p:cNvPr id="71" name="Conector reto 70"/>
-          <p:cNvCxnSpPr/>
-          <p:nvPr/>
-        </p:nvCxnSpPr>
-        <p:spPr>
-          <a:xfrm>
-            <a:off x="8251749" y="5452491"/>
-            <a:ext cx="3172708" cy="0"/>
-          </a:xfrm>
-          <a:prstGeom prst="line">
-            <a:avLst/>
-          </a:prstGeom>
-          <a:ln>
-            <a:solidFill>
-              <a:srgbClr val="51575F"/>
-            </a:solidFill>
-          </a:ln>
-        </p:spPr>
-        <p:style>
-          <a:lnRef idx="1">
-            <a:schemeClr val="accent1"/>
-          </a:lnRef>
-          <a:fillRef idx="0">
-            <a:schemeClr val="accent1"/>
-          </a:fillRef>
-          <a:effectRef idx="0">
-            <a:schemeClr val="accent1"/>
-          </a:effectRef>
-          <a:fontRef idx="minor">
-            <a:schemeClr val="tx1"/>
-          </a:fontRef>
-        </p:style>
-      </p:cxnSp>
-      <p:sp>
-        <p:nvSpPr>
-          <p:cNvPr id="77" name="CaixaDeTexto 76"/>
-          <p:cNvSpPr txBox="1"/>
-          <p:nvPr/>
-        </p:nvSpPr>
-        <p:spPr>
-          <a:xfrm>
-            <a:off x="221755" y="1572228"/>
-            <a:ext cx="2062148" cy="307777"/>
-          </a:xfrm>
-          <a:prstGeom prst="rect">
-            <a:avLst/>
-          </a:prstGeom>
-          <a:noFill/>
-        </p:spPr>
-        <p:txBody>
-          <a:bodyPr wrap="square" rtlCol="0">
-            <a:spAutoFit/>
-          </a:bodyPr>
-          <a:lstStyle/>
-          <a:p>
-            <a:pPr algn="ctr"/>
-            <a:r>
-              <a:rPr lang="pt-BR" sz="1400" dirty="0" err="1">
-                <a:solidFill>
-                  <a:srgbClr val="8E959E"/>
-                </a:solidFill>
-                <a:latin typeface="Century Gothic" panose="020B0502020202020204" pitchFamily="34" charset="0"/>
-              </a:rPr>
-              <a:t>Stream</a:t>
-            </a:r>
-            <a:endParaRPr lang="pt-BR" sz="1400" dirty="0">
-              <a:solidFill>
-                <a:srgbClr val="8E959E"/>
-              </a:solidFill>
-              <a:latin typeface="Century Gothic" panose="020B0502020202020204" pitchFamily="34" charset="0"/>
-            </a:endParaRPr>
-          </a:p>
-        </p:txBody>
-      </p:sp>
-      <p:cxnSp>
-        <p:nvCxnSpPr>
-          <p:cNvPr id="81" name="Conector reto 80"/>
-          <p:cNvCxnSpPr/>
-          <p:nvPr/>
-        </p:nvCxnSpPr>
-        <p:spPr>
-          <a:xfrm>
-            <a:off x="653967" y="1526262"/>
-            <a:ext cx="0" cy="425450"/>
-          </a:xfrm>
-          <a:prstGeom prst="line">
-            <a:avLst/>
-          </a:prstGeom>
-          <a:ln>
-            <a:solidFill>
-              <a:srgbClr val="51575F"/>
-            </a:solidFill>
-          </a:ln>
-        </p:spPr>
-        <p:style>
-          <a:lnRef idx="1">
-            <a:schemeClr val="accent1"/>
-          </a:lnRef>
-          <a:fillRef idx="0">
-            <a:schemeClr val="accent1"/>
-          </a:fillRef>
-          <a:effectRef idx="0">
-            <a:schemeClr val="accent1"/>
-          </a:effectRef>
-          <a:fontRef idx="minor">
-            <a:schemeClr val="tx1"/>
-          </a:fontRef>
-        </p:style>
-      </p:cxnSp>
-      <p:pic>
-        <p:nvPicPr>
-          <p:cNvPr id="1027" name="Picture 2" descr="Imagem relacionada"/>
-          <p:cNvPicPr>
-            <a:picLocks noChangeAspect="1" noChangeArrowheads="1"/>
-          </p:cNvPicPr>
-          <p:nvPr/>
-        </p:nvPicPr>
-        <p:blipFill>
-          <a:blip r:embed="rId3" cstate="print">
-            <a:duotone>
-              <a:srgbClr val="E7E6E6">
-                <a:shade val="45000"/>
-                <a:satMod val="135000"/>
-              </a:srgbClr>
-              <a:prstClr val="white"/>
-            </a:duotone>
-            <a:extLst>
-              <a:ext uri="{BEBA8EAE-BF5A-486C-A8C5-ECC9F3942E4B}">
-                <a14:imgProps xmlns:a14="http://schemas.microsoft.com/office/drawing/2010/main">
-                  <a14:imgLayer r:embed="rId4">
-                    <a14:imgEffect>
-                      <a14:backgroundRemoval t="7422" b="89648" l="977" r="98828">
-                        <a14:foregroundMark x1="6250" y1="41992" x2="5469" y2="48242"/>
-                        <a14:foregroundMark x1="75977" y1="42969" x2="77344" y2="46289"/>
-                        <a14:foregroundMark x1="93164" y1="44727" x2="93359" y2="47852"/>
-                        <a14:foregroundMark x1="53320" y1="50781" x2="53320" y2="50781"/>
-                        <a14:foregroundMark x1="22656" y1="45898" x2="22656" y2="45898"/>
-                        <a14:backgroundMark x1="13281" y1="39844" x2="19727" y2="70117"/>
-                        <a14:backgroundMark x1="32813" y1="50000" x2="37109" y2="66211"/>
-                        <a14:backgroundMark x1="33203" y1="59375" x2="32031" y2="45508"/>
-                        <a14:backgroundMark x1="30078" y1="82617" x2="18359" y2="64063"/>
-                        <a14:backgroundMark x1="11914" y1="47070" x2="12695" y2="35352"/>
-                        <a14:backgroundMark x1="59375" y1="30469" x2="71875" y2="47852"/>
-                        <a14:backgroundMark x1="87695" y1="52539" x2="70313" y2="14844"/>
-                        <a14:backgroundMark x1="83008" y1="69727" x2="87109" y2="41602"/>
-                        <a14:backgroundMark x1="95508" y1="76563" x2="97070" y2="60742"/>
-                        <a14:backgroundMark x1="8789" y1="25586" x2="7227" y2="28125"/>
-                        <a14:backgroundMark x1="5469" y1="29492" x2="3906" y2="32813"/>
-                        <a14:backgroundMark x1="8789" y1="24219" x2="19727" y2="1367"/>
-                      </a14:backgroundRemoval>
-                    </a14:imgEffect>
-                    <a14:imgEffect>
-                      <a14:brightnessContrast contrast="40000"/>
-                    </a14:imgEffect>
-                  </a14:imgLayer>
-                </a14:imgProps>
-              </a:ext>
-              <a:ext uri="{28A0092B-C50C-407E-A947-70E740481C1C}">
-                <a14:useLocalDpi xmlns:a14="http://schemas.microsoft.com/office/drawing/2010/main" val="0"/>
-              </a:ext>
-            </a:extLst>
-          </a:blip>
-          <a:srcRect/>
-          <a:stretch>
-            <a:fillRect/>
-          </a:stretch>
-        </p:blipFill>
-        <p:spPr bwMode="auto">
-          <a:xfrm>
-            <a:off x="179648" y="1590432"/>
-            <a:ext cx="280691" cy="280691"/>
-          </a:xfrm>
-          <a:prstGeom prst="rect">
-            <a:avLst/>
-          </a:prstGeom>
-          <a:noFill/>
-          <a:extLst>
-            <a:ext uri="{909E8E84-426E-40DD-AFC4-6F175D3DCCD1}">
-              <a14:hiddenFill xmlns:a14="http://schemas.microsoft.com/office/drawing/2010/main">
-                <a:solidFill>
-                  <a:srgbClr val="FFFFFF"/>
-                </a:solidFill>
-              </a14:hiddenFill>
-            </a:ext>
-          </a:extLst>
-        </p:spPr>
-      </p:pic>
-      <p:sp>
-        <p:nvSpPr>
-          <p:cNvPr id="4" name="CaixaDeTexto 3">
-            <a:extLst>
-              <a:ext uri="{FF2B5EF4-FFF2-40B4-BE49-F238E27FC236}">
-                <a16:creationId xmlns:a16="http://schemas.microsoft.com/office/drawing/2014/main" id="{D49FFA6C-9A50-4238-B562-4A7C73E02608}"/>
-              </a:ext>
-            </a:extLst>
-          </p:cNvPr>
-          <p:cNvSpPr txBox="1"/>
-          <p:nvPr/>
-        </p:nvSpPr>
-        <p:spPr>
-          <a:xfrm>
-            <a:off x="6771587" y="1206589"/>
-            <a:ext cx="486030" cy="1200329"/>
-          </a:xfrm>
-          <a:prstGeom prst="rect">
-            <a:avLst/>
-          </a:prstGeom>
-          <a:noFill/>
-        </p:spPr>
-        <p:txBody>
-          <a:bodyPr wrap="none" rtlCol="0">
-            <a:spAutoFit/>
-          </a:bodyPr>
-          <a:lstStyle/>
-          <a:p>
-            <a:r>
-              <a:rPr lang="pt-BR" sz="7200" dirty="0">
-                <a:solidFill>
-                  <a:srgbClr val="FF0000"/>
-                </a:solidFill>
-              </a:rPr>
-              <a:t>!</a:t>
-            </a:r>
-          </a:p>
-        </p:txBody>
-      </p:sp>
-    </p:spTree>
-    <p:extLst>
-      <p:ext uri="{BB962C8B-B14F-4D97-AF65-F5344CB8AC3E}">
-        <p14:creationId xmlns:p14="http://schemas.microsoft.com/office/powerpoint/2010/main" val="1937689596"/>
-      </p:ext>
-    </p:extLst>
-  </p:cSld>
-  <p:clrMapOvr>
-    <a:masterClrMapping/>
-  </p:clrMapOvr>
-</p:sld>
-</file>
-
-<file path=ppt/slides/slide2.xml><?xml version="1.0" encoding="utf-8"?>
-<p:sld xmlns:a="http://schemas.openxmlformats.org/drawingml/2006/main" xmlns:r="http://schemas.openxmlformats.org/officeDocument/2006/relationships" xmlns:p="http://schemas.openxmlformats.org/presentationml/2006/main">
-  <p:cSld>
-    <p:spTree>
-      <p:nvGrpSpPr>
-        <p:cNvPr id="1" name=""/>
-        <p:cNvGrpSpPr/>
-        <p:nvPr/>
-      </p:nvGrpSpPr>
-      <p:grpSpPr>
-        <a:xfrm>
-          <a:off x="0" y="0"/>
-          <a:ext cx="0" cy="0"/>
-          <a:chOff x="0" y="0"/>
-          <a:chExt cx="0" cy="0"/>
-        </a:xfrm>
-      </p:grpSpPr>
       <p:sp>
         <p:nvSpPr>
           <p:cNvPr id="4" name="Retângulo 3">
@@ -4401,47 +5185,6 @@
           </a:p>
         </p:txBody>
       </p:sp>
-      <p:sp>
-        <p:nvSpPr>
-          <p:cNvPr id="10" name="CaixaDeTexto 9">
-            <a:extLst>
-              <a:ext uri="{FF2B5EF4-FFF2-40B4-BE49-F238E27FC236}">
-                <a16:creationId xmlns:a16="http://schemas.microsoft.com/office/drawing/2014/main" id="{0B129529-EADC-47C9-9E19-7289C26E5FD5}"/>
-              </a:ext>
-            </a:extLst>
-          </p:cNvPr>
-          <p:cNvSpPr txBox="1"/>
-          <p:nvPr/>
-        </p:nvSpPr>
-        <p:spPr>
-          <a:xfrm>
-            <a:off x="527002" y="887984"/>
-            <a:ext cx="2062148" cy="307777"/>
-          </a:xfrm>
-          <a:prstGeom prst="rect">
-            <a:avLst/>
-          </a:prstGeom>
-          <a:noFill/>
-        </p:spPr>
-        <p:txBody>
-          <a:bodyPr wrap="square" rtlCol="0">
-            <a:spAutoFit/>
-          </a:bodyPr>
-          <a:lstStyle/>
-          <a:p>
-            <a:pPr algn="ctr"/>
-            <a:r>
-              <a:rPr lang="pt-BR" sz="1400" dirty="0">
-                <a:solidFill>
-                  <a:srgbClr val="8E959E"/>
-                </a:solidFill>
-                <a:latin typeface="Century Gothic" panose="020B0502020202020204" pitchFamily="34" charset="0"/>
-              </a:rPr>
-              <a:t>Campeonatos</a:t>
-            </a:r>
-          </a:p>
-        </p:txBody>
-      </p:sp>
       <p:pic>
         <p:nvPicPr>
           <p:cNvPr id="11" name="Picture 2" descr="Resultado de imagem para user icon">
@@ -4490,12 +5233,922 @@
           </a:extLst>
         </p:spPr>
       </p:pic>
+      <p:sp>
+        <p:nvSpPr>
+          <p:cNvPr id="17" name="CaixaDeTexto 16">
+            <a:extLst>
+              <a:ext uri="{FF2B5EF4-FFF2-40B4-BE49-F238E27FC236}">
+                <a16:creationId xmlns:a16="http://schemas.microsoft.com/office/drawing/2014/main" id="{31CBF609-074B-4D0E-9088-8771998C0240}"/>
+              </a:ext>
+            </a:extLst>
+          </p:cNvPr>
+          <p:cNvSpPr txBox="1"/>
+          <p:nvPr/>
+        </p:nvSpPr>
+        <p:spPr>
+          <a:xfrm>
+            <a:off x="6235185" y="122588"/>
+            <a:ext cx="2905920" cy="400110"/>
+          </a:xfrm>
+          <a:prstGeom prst="rect">
+            <a:avLst/>
+          </a:prstGeom>
+          <a:noFill/>
+        </p:spPr>
+        <p:txBody>
+          <a:bodyPr wrap="square" rtlCol="0">
+            <a:spAutoFit/>
+          </a:bodyPr>
+          <a:lstStyle/>
+          <a:p>
+            <a:pPr algn="ctr"/>
+            <a:r>
+              <a:rPr lang="pt-BR" sz="2000" dirty="0">
+                <a:solidFill>
+                  <a:srgbClr val="FF3F3F"/>
+                </a:solidFill>
+                <a:latin typeface="Century Gothic" panose="020B0502020202020204" pitchFamily="34" charset="0"/>
+              </a:rPr>
+              <a:t>Nome Campeonato</a:t>
+            </a:r>
+          </a:p>
+        </p:txBody>
+      </p:sp>
+      <p:cxnSp>
+        <p:nvCxnSpPr>
+          <p:cNvPr id="19" name="Conector reto 18">
+            <a:extLst>
+              <a:ext uri="{FF2B5EF4-FFF2-40B4-BE49-F238E27FC236}">
+                <a16:creationId xmlns:a16="http://schemas.microsoft.com/office/drawing/2014/main" id="{2FF80A08-18E5-4488-984B-1F3A5A68DC09}"/>
+              </a:ext>
+            </a:extLst>
+          </p:cNvPr>
+          <p:cNvCxnSpPr/>
+          <p:nvPr/>
+        </p:nvCxnSpPr>
+        <p:spPr>
+          <a:xfrm>
+            <a:off x="6203739" y="153090"/>
+            <a:ext cx="0" cy="346647"/>
+          </a:xfrm>
+          <a:prstGeom prst="line">
+            <a:avLst/>
+          </a:prstGeom>
+          <a:ln>
+            <a:solidFill>
+              <a:srgbClr val="51575F"/>
+            </a:solidFill>
+          </a:ln>
+        </p:spPr>
+        <p:style>
+          <a:lnRef idx="1">
+            <a:schemeClr val="accent1"/>
+          </a:lnRef>
+          <a:fillRef idx="0">
+            <a:schemeClr val="accent1"/>
+          </a:fillRef>
+          <a:effectRef idx="0">
+            <a:schemeClr val="accent1"/>
+          </a:effectRef>
+          <a:fontRef idx="minor">
+            <a:schemeClr val="tx1"/>
+          </a:fontRef>
+        </p:style>
+      </p:cxnSp>
+      <p:sp>
+        <p:nvSpPr>
+          <p:cNvPr id="35" name="CaixaDeTexto 34">
+            <a:extLst>
+              <a:ext uri="{FF2B5EF4-FFF2-40B4-BE49-F238E27FC236}">
+                <a16:creationId xmlns:a16="http://schemas.microsoft.com/office/drawing/2014/main" id="{AC01DF42-CBE7-4930-AF4E-B4CAE5DC4B1A}"/>
+              </a:ext>
+            </a:extLst>
+          </p:cNvPr>
+          <p:cNvSpPr txBox="1"/>
+          <p:nvPr/>
+        </p:nvSpPr>
+        <p:spPr>
+          <a:xfrm>
+            <a:off x="4544020" y="202018"/>
+            <a:ext cx="1551980" cy="276999"/>
+          </a:xfrm>
+          <a:prstGeom prst="rect">
+            <a:avLst/>
+          </a:prstGeom>
+          <a:noFill/>
+        </p:spPr>
+        <p:txBody>
+          <a:bodyPr wrap="square" rtlCol="0">
+            <a:spAutoFit/>
+          </a:bodyPr>
+          <a:lstStyle/>
+          <a:p>
+            <a:pPr algn="r"/>
+            <a:r>
+              <a:rPr lang="pt-BR" sz="1200" dirty="0">
+                <a:solidFill>
+                  <a:srgbClr val="96A0A0"/>
+                </a:solidFill>
+                <a:latin typeface="Century Gothic" panose="020B0502020202020204" pitchFamily="34" charset="0"/>
+              </a:rPr>
+              <a:t>STREAM</a:t>
+            </a:r>
+          </a:p>
+        </p:txBody>
+      </p:sp>
+      <p:sp>
+        <p:nvSpPr>
+          <p:cNvPr id="37" name="Retângulo 36">
+            <a:extLst>
+              <a:ext uri="{FF2B5EF4-FFF2-40B4-BE49-F238E27FC236}">
+                <a16:creationId xmlns:a16="http://schemas.microsoft.com/office/drawing/2014/main" id="{C368B579-8001-4B67-9E7F-D31C70ADCC8E}"/>
+              </a:ext>
+            </a:extLst>
+          </p:cNvPr>
+          <p:cNvSpPr/>
+          <p:nvPr/>
+        </p:nvSpPr>
+        <p:spPr>
+          <a:xfrm>
+            <a:off x="7688145" y="1453849"/>
+            <a:ext cx="4299916" cy="1420891"/>
+          </a:xfrm>
+          <a:prstGeom prst="rect">
+            <a:avLst/>
+          </a:prstGeom>
+          <a:solidFill>
+            <a:srgbClr val="35393F"/>
+          </a:solidFill>
+          <a:ln>
+            <a:noFill/>
+          </a:ln>
+        </p:spPr>
+        <p:style>
+          <a:lnRef idx="2">
+            <a:schemeClr val="accent1">
+              <a:shade val="50000"/>
+            </a:schemeClr>
+          </a:lnRef>
+          <a:fillRef idx="1">
+            <a:schemeClr val="accent1"/>
+          </a:fillRef>
+          <a:effectRef idx="0">
+            <a:schemeClr val="accent1"/>
+          </a:effectRef>
+          <a:fontRef idx="minor">
+            <a:schemeClr val="lt1"/>
+          </a:fontRef>
+        </p:style>
+        <p:txBody>
+          <a:bodyPr rtlCol="0" anchor="ctr"/>
+          <a:lstStyle/>
+          <a:p>
+            <a:pPr algn="ctr"/>
+            <a:endParaRPr lang="pt-BR"/>
+          </a:p>
+        </p:txBody>
+      </p:sp>
+      <p:pic>
+        <p:nvPicPr>
+          <p:cNvPr id="1026" name="Picture 2" descr="Resultado de imagem para twitch icon">
+            <a:extLst>
+              <a:ext uri="{FF2B5EF4-FFF2-40B4-BE49-F238E27FC236}">
+                <a16:creationId xmlns:a16="http://schemas.microsoft.com/office/drawing/2014/main" id="{023610D3-26F3-458E-8C55-0C12AFB12D0F}"/>
+              </a:ext>
+            </a:extLst>
+          </p:cNvPr>
+          <p:cNvPicPr>
+            <a:picLocks noChangeAspect="1" noChangeArrowheads="1"/>
+          </p:cNvPicPr>
+          <p:nvPr/>
+        </p:nvPicPr>
+        <p:blipFill>
+          <a:blip r:embed="rId3" cstate="print">
+            <a:extLst>
+              <a:ext uri="{28A0092B-C50C-407E-A947-70E740481C1C}">
+                <a14:useLocalDpi xmlns:a14="http://schemas.microsoft.com/office/drawing/2010/main" val="0"/>
+              </a:ext>
+            </a:extLst>
+          </a:blip>
+          <a:srcRect/>
+          <a:stretch>
+            <a:fillRect/>
+          </a:stretch>
+        </p:blipFill>
+        <p:spPr bwMode="auto">
+          <a:xfrm>
+            <a:off x="3479245" y="1759830"/>
+            <a:ext cx="748598" cy="783710"/>
+          </a:xfrm>
+          <a:prstGeom prst="rect">
+            <a:avLst/>
+          </a:prstGeom>
+          <a:noFill/>
+          <a:extLst>
+            <a:ext uri="{909E8E84-426E-40DD-AFC4-6F175D3DCCD1}">
+              <a14:hiddenFill xmlns:a14="http://schemas.microsoft.com/office/drawing/2010/main">
+                <a:solidFill>
+                  <a:srgbClr val="FFFFFF"/>
+                </a:solidFill>
+              </a14:hiddenFill>
+            </a:ext>
+          </a:extLst>
+        </p:spPr>
+      </p:pic>
+      <p:pic>
+        <p:nvPicPr>
+          <p:cNvPr id="1034" name="Picture 10" descr="Resultado de imagem para youtube icon">
+            <a:extLst>
+              <a:ext uri="{FF2B5EF4-FFF2-40B4-BE49-F238E27FC236}">
+                <a16:creationId xmlns:a16="http://schemas.microsoft.com/office/drawing/2014/main" id="{E39AE99F-1A92-46AC-96BE-4ED4F0974D28}"/>
+              </a:ext>
+            </a:extLst>
+          </p:cNvPr>
+          <p:cNvPicPr>
+            <a:picLocks noChangeAspect="1" noChangeArrowheads="1"/>
+          </p:cNvPicPr>
+          <p:nvPr/>
+        </p:nvPicPr>
+        <p:blipFill>
+          <a:blip r:embed="rId4" cstate="print">
+            <a:extLst>
+              <a:ext uri="{BEBA8EAE-BF5A-486C-A8C5-ECC9F3942E4B}">
+                <a14:imgProps xmlns:a14="http://schemas.microsoft.com/office/drawing/2010/main">
+                  <a14:imgLayer r:embed="rId5">
+                    <a14:imgEffect>
+                      <a14:brightnessContrast contrast="-27000"/>
+                    </a14:imgEffect>
+                  </a14:imgLayer>
+                </a14:imgProps>
+              </a:ext>
+              <a:ext uri="{28A0092B-C50C-407E-A947-70E740481C1C}">
+                <a14:useLocalDpi xmlns:a14="http://schemas.microsoft.com/office/drawing/2010/main" val="0"/>
+              </a:ext>
+            </a:extLst>
+          </a:blip>
+          <a:srcRect/>
+          <a:stretch>
+            <a:fillRect/>
+          </a:stretch>
+        </p:blipFill>
+        <p:spPr bwMode="auto">
+          <a:xfrm>
+            <a:off x="8002875" y="1735088"/>
+            <a:ext cx="833194" cy="833194"/>
+          </a:xfrm>
+          <a:prstGeom prst="rect">
+            <a:avLst/>
+          </a:prstGeom>
+          <a:noFill/>
+          <a:extLst>
+            <a:ext uri="{909E8E84-426E-40DD-AFC4-6F175D3DCCD1}">
+              <a14:hiddenFill xmlns:a14="http://schemas.microsoft.com/office/drawing/2010/main">
+                <a:solidFill>
+                  <a:srgbClr val="FFFFFF"/>
+                </a:solidFill>
+              </a14:hiddenFill>
+            </a:ext>
+          </a:extLst>
+        </p:spPr>
+      </p:pic>
+      <p:sp>
+        <p:nvSpPr>
+          <p:cNvPr id="46" name="Retângulo 45">
+            <a:extLst>
+              <a:ext uri="{FF2B5EF4-FFF2-40B4-BE49-F238E27FC236}">
+                <a16:creationId xmlns:a16="http://schemas.microsoft.com/office/drawing/2014/main" id="{986FB9E3-D1C0-4262-9B2C-A7DAEE1F76F6}"/>
+              </a:ext>
+            </a:extLst>
+          </p:cNvPr>
+          <p:cNvSpPr/>
+          <p:nvPr/>
+        </p:nvSpPr>
+        <p:spPr>
+          <a:xfrm>
+            <a:off x="3167315" y="3071932"/>
+            <a:ext cx="4299916" cy="1420891"/>
+          </a:xfrm>
+          <a:prstGeom prst="rect">
+            <a:avLst/>
+          </a:prstGeom>
+          <a:solidFill>
+            <a:srgbClr val="35393F"/>
+          </a:solidFill>
+          <a:ln>
+            <a:noFill/>
+          </a:ln>
+        </p:spPr>
+        <p:style>
+          <a:lnRef idx="2">
+            <a:schemeClr val="accent1">
+              <a:shade val="50000"/>
+            </a:schemeClr>
+          </a:lnRef>
+          <a:fillRef idx="1">
+            <a:schemeClr val="accent1"/>
+          </a:fillRef>
+          <a:effectRef idx="0">
+            <a:schemeClr val="accent1"/>
+          </a:effectRef>
+          <a:fontRef idx="minor">
+            <a:schemeClr val="lt1"/>
+          </a:fontRef>
+        </p:style>
+        <p:txBody>
+          <a:bodyPr rtlCol="0" anchor="ctr"/>
+          <a:lstStyle/>
+          <a:p>
+            <a:pPr algn="ctr"/>
+            <a:endParaRPr lang="pt-BR"/>
+          </a:p>
+        </p:txBody>
+      </p:sp>
+      <p:sp>
+        <p:nvSpPr>
+          <p:cNvPr id="47" name="Retângulo 46">
+            <a:extLst>
+              <a:ext uri="{FF2B5EF4-FFF2-40B4-BE49-F238E27FC236}">
+                <a16:creationId xmlns:a16="http://schemas.microsoft.com/office/drawing/2014/main" id="{B6103B61-BAA5-41E6-8640-F927E985685A}"/>
+              </a:ext>
+            </a:extLst>
+          </p:cNvPr>
+          <p:cNvSpPr/>
+          <p:nvPr/>
+        </p:nvSpPr>
+        <p:spPr>
+          <a:xfrm>
+            <a:off x="7688145" y="3071932"/>
+            <a:ext cx="4299916" cy="1420891"/>
+          </a:xfrm>
+          <a:prstGeom prst="rect">
+            <a:avLst/>
+          </a:prstGeom>
+          <a:solidFill>
+            <a:srgbClr val="35393F"/>
+          </a:solidFill>
+          <a:ln>
+            <a:noFill/>
+          </a:ln>
+        </p:spPr>
+        <p:style>
+          <a:lnRef idx="2">
+            <a:schemeClr val="accent1">
+              <a:shade val="50000"/>
+            </a:schemeClr>
+          </a:lnRef>
+          <a:fillRef idx="1">
+            <a:schemeClr val="accent1"/>
+          </a:fillRef>
+          <a:effectRef idx="0">
+            <a:schemeClr val="accent1"/>
+          </a:effectRef>
+          <a:fontRef idx="minor">
+            <a:schemeClr val="lt1"/>
+          </a:fontRef>
+        </p:style>
+        <p:txBody>
+          <a:bodyPr rtlCol="0" anchor="ctr"/>
+          <a:lstStyle/>
+          <a:p>
+            <a:pPr algn="ctr"/>
+            <a:endParaRPr lang="pt-BR"/>
+          </a:p>
+        </p:txBody>
+      </p:sp>
+      <p:pic>
+        <p:nvPicPr>
+          <p:cNvPr id="1036" name="Picture 12" descr="Resultado de imagem para smashcast">
+            <a:extLst>
+              <a:ext uri="{FF2B5EF4-FFF2-40B4-BE49-F238E27FC236}">
+                <a16:creationId xmlns:a16="http://schemas.microsoft.com/office/drawing/2014/main" id="{05136D1A-F45E-482E-894D-5C25653FAB65}"/>
+              </a:ext>
+            </a:extLst>
+          </p:cNvPr>
+          <p:cNvPicPr>
+            <a:picLocks noChangeAspect="1" noChangeArrowheads="1"/>
+          </p:cNvPicPr>
+          <p:nvPr/>
+        </p:nvPicPr>
+        <p:blipFill>
+          <a:blip r:embed="rId6" cstate="print">
+            <a:extLst>
+              <a:ext uri="{28A0092B-C50C-407E-A947-70E740481C1C}">
+                <a14:useLocalDpi xmlns:a14="http://schemas.microsoft.com/office/drawing/2010/main" val="0"/>
+              </a:ext>
+            </a:extLst>
+          </a:blip>
+          <a:srcRect/>
+          <a:stretch>
+            <a:fillRect/>
+          </a:stretch>
+        </p:blipFill>
+        <p:spPr bwMode="auto">
+          <a:xfrm>
+            <a:off x="3444133" y="3390522"/>
+            <a:ext cx="783710" cy="783710"/>
+          </a:xfrm>
+          <a:prstGeom prst="rect">
+            <a:avLst/>
+          </a:prstGeom>
+          <a:noFill/>
+          <a:extLst>
+            <a:ext uri="{909E8E84-426E-40DD-AFC4-6F175D3DCCD1}">
+              <a14:hiddenFill xmlns:a14="http://schemas.microsoft.com/office/drawing/2010/main">
+                <a:solidFill>
+                  <a:srgbClr val="FFFFFF"/>
+                </a:solidFill>
+              </a14:hiddenFill>
+            </a:ext>
+          </a:extLst>
+        </p:spPr>
+      </p:pic>
+      <p:pic>
+        <p:nvPicPr>
+          <p:cNvPr id="1038" name="Picture 14" descr="Resultado de imagem para mixer stream">
+            <a:extLst>
+              <a:ext uri="{FF2B5EF4-FFF2-40B4-BE49-F238E27FC236}">
+                <a16:creationId xmlns:a16="http://schemas.microsoft.com/office/drawing/2014/main" id="{20D300FC-FAF8-41BD-BB26-74E48BA2553E}"/>
+              </a:ext>
+            </a:extLst>
+          </p:cNvPr>
+          <p:cNvPicPr>
+            <a:picLocks noChangeAspect="1" noChangeArrowheads="1"/>
+          </p:cNvPicPr>
+          <p:nvPr/>
+        </p:nvPicPr>
+        <p:blipFill>
+          <a:blip r:embed="rId7" cstate="print">
+            <a:extLst>
+              <a:ext uri="{BEBA8EAE-BF5A-486C-A8C5-ECC9F3942E4B}">
+                <a14:imgProps xmlns:a14="http://schemas.microsoft.com/office/drawing/2010/main">
+                  <a14:imgLayer r:embed="rId8">
+                    <a14:imgEffect>
+                      <a14:backgroundRemoval t="9778" b="89778" l="7556" r="92000">
+                        <a14:foregroundMark x1="9333" y1="20444" x2="9333" y2="20444"/>
+                        <a14:foregroundMark x1="74667" y1="32889" x2="74667" y2="32889"/>
+                        <a14:foregroundMark x1="92000" y1="80000" x2="92000" y2="80000"/>
+                        <a14:foregroundMark x1="13778" y1="80444" x2="13778" y2="80444"/>
+                        <a14:foregroundMark x1="11556" y1="77333" x2="11556" y2="77333"/>
+                        <a14:foregroundMark x1="8000" y1="78222" x2="8000" y2="78222"/>
+                        <a14:foregroundMark x1="7556" y1="17778" x2="7556" y2="17778"/>
+                      </a14:backgroundRemoval>
+                    </a14:imgEffect>
+                  </a14:imgLayer>
+                </a14:imgProps>
+              </a:ext>
+              <a:ext uri="{28A0092B-C50C-407E-A947-70E740481C1C}">
+                <a14:useLocalDpi xmlns:a14="http://schemas.microsoft.com/office/drawing/2010/main" val="0"/>
+              </a:ext>
+            </a:extLst>
+          </a:blip>
+          <a:srcRect/>
+          <a:stretch>
+            <a:fillRect/>
+          </a:stretch>
+        </p:blipFill>
+        <p:spPr bwMode="auto">
+          <a:xfrm>
+            <a:off x="8027617" y="3390522"/>
+            <a:ext cx="783710" cy="783710"/>
+          </a:xfrm>
+          <a:prstGeom prst="rect">
+            <a:avLst/>
+          </a:prstGeom>
+          <a:noFill/>
+          <a:extLst>
+            <a:ext uri="{909E8E84-426E-40DD-AFC4-6F175D3DCCD1}">
+              <a14:hiddenFill xmlns:a14="http://schemas.microsoft.com/office/drawing/2010/main">
+                <a:solidFill>
+                  <a:srgbClr val="FFFFFF"/>
+                </a:solidFill>
+              </a14:hiddenFill>
+            </a:ext>
+          </a:extLst>
+        </p:spPr>
+      </p:pic>
+      <p:sp>
+        <p:nvSpPr>
+          <p:cNvPr id="52" name="CaixaDeTexto 51">
+            <a:extLst>
+              <a:ext uri="{FF2B5EF4-FFF2-40B4-BE49-F238E27FC236}">
+                <a16:creationId xmlns:a16="http://schemas.microsoft.com/office/drawing/2014/main" id="{869E2FB8-AC9A-414E-A75D-4E93BD889321}"/>
+              </a:ext>
+            </a:extLst>
+          </p:cNvPr>
+          <p:cNvSpPr txBox="1"/>
+          <p:nvPr/>
+        </p:nvSpPr>
+        <p:spPr>
+          <a:xfrm>
+            <a:off x="4772765" y="1712277"/>
+            <a:ext cx="2062148" cy="307777"/>
+          </a:xfrm>
+          <a:prstGeom prst="rect">
+            <a:avLst/>
+          </a:prstGeom>
+          <a:noFill/>
+        </p:spPr>
+        <p:txBody>
+          <a:bodyPr wrap="square" rtlCol="0">
+            <a:spAutoFit/>
+          </a:bodyPr>
+          <a:lstStyle/>
+          <a:p>
+            <a:r>
+              <a:rPr lang="pt-BR" sz="1400" dirty="0">
+                <a:solidFill>
+                  <a:srgbClr val="8E959E"/>
+                </a:solidFill>
+                <a:latin typeface="Century Gothic" panose="020B0502020202020204" pitchFamily="34" charset="0"/>
+              </a:rPr>
+              <a:t>230394</a:t>
+            </a:r>
+          </a:p>
+        </p:txBody>
+      </p:sp>
+      <p:pic>
+        <p:nvPicPr>
+          <p:cNvPr id="1042" name="Picture 18" descr="Resultado de imagem para views icon">
+            <a:extLst>
+              <a:ext uri="{FF2B5EF4-FFF2-40B4-BE49-F238E27FC236}">
+                <a16:creationId xmlns:a16="http://schemas.microsoft.com/office/drawing/2014/main" id="{DFAEE494-C9F1-494F-875C-B72202D2A443}"/>
+              </a:ext>
+            </a:extLst>
+          </p:cNvPr>
+          <p:cNvPicPr>
+            <a:picLocks noChangeAspect="1" noChangeArrowheads="1"/>
+          </p:cNvPicPr>
+          <p:nvPr/>
+        </p:nvPicPr>
+        <p:blipFill>
+          <a:blip r:embed="rId9" cstate="print">
+            <a:duotone>
+              <a:schemeClr val="accent3">
+                <a:shade val="45000"/>
+                <a:satMod val="135000"/>
+              </a:schemeClr>
+              <a:prstClr val="white"/>
+            </a:duotone>
+            <a:extLst>
+              <a:ext uri="{28A0092B-C50C-407E-A947-70E740481C1C}">
+                <a14:useLocalDpi xmlns:a14="http://schemas.microsoft.com/office/drawing/2010/main" val="0"/>
+              </a:ext>
+            </a:extLst>
+          </a:blip>
+          <a:srcRect/>
+          <a:stretch>
+            <a:fillRect/>
+          </a:stretch>
+        </p:blipFill>
+        <p:spPr bwMode="auto">
+          <a:xfrm>
+            <a:off x="4506546" y="1742692"/>
+            <a:ext cx="240714" cy="240714"/>
+          </a:xfrm>
+          <a:prstGeom prst="rect">
+            <a:avLst/>
+          </a:prstGeom>
+          <a:noFill/>
+          <a:extLst>
+            <a:ext uri="{909E8E84-426E-40DD-AFC4-6F175D3DCCD1}">
+              <a14:hiddenFill xmlns:a14="http://schemas.microsoft.com/office/drawing/2010/main">
+                <a:solidFill>
+                  <a:srgbClr val="FFFFFF"/>
+                </a:solidFill>
+              </a14:hiddenFill>
+            </a:ext>
+          </a:extLst>
+        </p:spPr>
+      </p:pic>
+      <p:sp>
+        <p:nvSpPr>
+          <p:cNvPr id="57" name="CaixaDeTexto 56">
+            <a:extLst>
+              <a:ext uri="{FF2B5EF4-FFF2-40B4-BE49-F238E27FC236}">
+                <a16:creationId xmlns:a16="http://schemas.microsoft.com/office/drawing/2014/main" id="{46EB0027-88C6-4CB9-9577-14FF3BAC22E8}"/>
+              </a:ext>
+            </a:extLst>
+          </p:cNvPr>
+          <p:cNvSpPr txBox="1"/>
+          <p:nvPr/>
+        </p:nvSpPr>
+        <p:spPr>
+          <a:xfrm>
+            <a:off x="9306510" y="1704673"/>
+            <a:ext cx="2062148" cy="307777"/>
+          </a:xfrm>
+          <a:prstGeom prst="rect">
+            <a:avLst/>
+          </a:prstGeom>
+          <a:noFill/>
+        </p:spPr>
+        <p:txBody>
+          <a:bodyPr wrap="square" rtlCol="0">
+            <a:spAutoFit/>
+          </a:bodyPr>
+          <a:lstStyle/>
+          <a:p>
+            <a:r>
+              <a:rPr lang="pt-BR" sz="1400" dirty="0">
+                <a:solidFill>
+                  <a:srgbClr val="8E959E"/>
+                </a:solidFill>
+                <a:latin typeface="Century Gothic" panose="020B0502020202020204" pitchFamily="34" charset="0"/>
+              </a:rPr>
+              <a:t>230394</a:t>
+            </a:r>
+          </a:p>
+        </p:txBody>
+      </p:sp>
+      <p:pic>
+        <p:nvPicPr>
+          <p:cNvPr id="58" name="Picture 18" descr="Resultado de imagem para views icon">
+            <a:extLst>
+              <a:ext uri="{FF2B5EF4-FFF2-40B4-BE49-F238E27FC236}">
+                <a16:creationId xmlns:a16="http://schemas.microsoft.com/office/drawing/2014/main" id="{10ABD8BA-3F7B-41E2-AD4C-95AF321BE077}"/>
+              </a:ext>
+            </a:extLst>
+          </p:cNvPr>
+          <p:cNvPicPr>
+            <a:picLocks noChangeAspect="1" noChangeArrowheads="1"/>
+          </p:cNvPicPr>
+          <p:nvPr/>
+        </p:nvPicPr>
+        <p:blipFill>
+          <a:blip r:embed="rId9" cstate="print">
+            <a:duotone>
+              <a:schemeClr val="accent3">
+                <a:shade val="45000"/>
+                <a:satMod val="135000"/>
+              </a:schemeClr>
+              <a:prstClr val="white"/>
+            </a:duotone>
+            <a:extLst>
+              <a:ext uri="{28A0092B-C50C-407E-A947-70E740481C1C}">
+                <a14:useLocalDpi xmlns:a14="http://schemas.microsoft.com/office/drawing/2010/main" val="0"/>
+              </a:ext>
+            </a:extLst>
+          </a:blip>
+          <a:srcRect/>
+          <a:stretch>
+            <a:fillRect/>
+          </a:stretch>
+        </p:blipFill>
+        <p:spPr bwMode="auto">
+          <a:xfrm>
+            <a:off x="9040291" y="1735088"/>
+            <a:ext cx="240714" cy="240714"/>
+          </a:xfrm>
+          <a:prstGeom prst="rect">
+            <a:avLst/>
+          </a:prstGeom>
+          <a:noFill/>
+          <a:extLst>
+            <a:ext uri="{909E8E84-426E-40DD-AFC4-6F175D3DCCD1}">
+              <a14:hiddenFill xmlns:a14="http://schemas.microsoft.com/office/drawing/2010/main">
+                <a:solidFill>
+                  <a:srgbClr val="FFFFFF"/>
+                </a:solidFill>
+              </a14:hiddenFill>
+            </a:ext>
+          </a:extLst>
+        </p:spPr>
+      </p:pic>
+      <p:sp>
+        <p:nvSpPr>
+          <p:cNvPr id="59" name="CaixaDeTexto 58">
+            <a:extLst>
+              <a:ext uri="{FF2B5EF4-FFF2-40B4-BE49-F238E27FC236}">
+                <a16:creationId xmlns:a16="http://schemas.microsoft.com/office/drawing/2014/main" id="{EB22B81B-4791-4DED-9EAD-0497484641E0}"/>
+              </a:ext>
+            </a:extLst>
+          </p:cNvPr>
+          <p:cNvSpPr txBox="1"/>
+          <p:nvPr/>
+        </p:nvSpPr>
+        <p:spPr>
+          <a:xfrm>
+            <a:off x="9306510" y="3334182"/>
+            <a:ext cx="2062148" cy="307777"/>
+          </a:xfrm>
+          <a:prstGeom prst="rect">
+            <a:avLst/>
+          </a:prstGeom>
+          <a:noFill/>
+        </p:spPr>
+        <p:txBody>
+          <a:bodyPr wrap="square" rtlCol="0">
+            <a:spAutoFit/>
+          </a:bodyPr>
+          <a:lstStyle/>
+          <a:p>
+            <a:r>
+              <a:rPr lang="pt-BR" sz="1400" dirty="0">
+                <a:solidFill>
+                  <a:srgbClr val="8E959E"/>
+                </a:solidFill>
+                <a:latin typeface="Century Gothic" panose="020B0502020202020204" pitchFamily="34" charset="0"/>
+              </a:rPr>
+              <a:t>230394</a:t>
+            </a:r>
+          </a:p>
+        </p:txBody>
+      </p:sp>
+      <p:pic>
+        <p:nvPicPr>
+          <p:cNvPr id="60" name="Picture 18" descr="Resultado de imagem para views icon">
+            <a:extLst>
+              <a:ext uri="{FF2B5EF4-FFF2-40B4-BE49-F238E27FC236}">
+                <a16:creationId xmlns:a16="http://schemas.microsoft.com/office/drawing/2014/main" id="{E38FFC39-E597-493A-BAE8-86DCD4D541CC}"/>
+              </a:ext>
+            </a:extLst>
+          </p:cNvPr>
+          <p:cNvPicPr>
+            <a:picLocks noChangeAspect="1" noChangeArrowheads="1"/>
+          </p:cNvPicPr>
+          <p:nvPr/>
+        </p:nvPicPr>
+        <p:blipFill>
+          <a:blip r:embed="rId9" cstate="print">
+            <a:duotone>
+              <a:schemeClr val="accent3">
+                <a:shade val="45000"/>
+                <a:satMod val="135000"/>
+              </a:schemeClr>
+              <a:prstClr val="white"/>
+            </a:duotone>
+            <a:extLst>
+              <a:ext uri="{28A0092B-C50C-407E-A947-70E740481C1C}">
+                <a14:useLocalDpi xmlns:a14="http://schemas.microsoft.com/office/drawing/2010/main" val="0"/>
+              </a:ext>
+            </a:extLst>
+          </a:blip>
+          <a:srcRect/>
+          <a:stretch>
+            <a:fillRect/>
+          </a:stretch>
+        </p:blipFill>
+        <p:spPr bwMode="auto">
+          <a:xfrm>
+            <a:off x="9040291" y="3364597"/>
+            <a:ext cx="240714" cy="240714"/>
+          </a:xfrm>
+          <a:prstGeom prst="rect">
+            <a:avLst/>
+          </a:prstGeom>
+          <a:noFill/>
+          <a:extLst>
+            <a:ext uri="{909E8E84-426E-40DD-AFC4-6F175D3DCCD1}">
+              <a14:hiddenFill xmlns:a14="http://schemas.microsoft.com/office/drawing/2010/main">
+                <a:solidFill>
+                  <a:srgbClr val="FFFFFF"/>
+                </a:solidFill>
+              </a14:hiddenFill>
+            </a:ext>
+          </a:extLst>
+        </p:spPr>
+      </p:pic>
+      <p:sp>
+        <p:nvSpPr>
+          <p:cNvPr id="61" name="CaixaDeTexto 60">
+            <a:extLst>
+              <a:ext uri="{FF2B5EF4-FFF2-40B4-BE49-F238E27FC236}">
+                <a16:creationId xmlns:a16="http://schemas.microsoft.com/office/drawing/2014/main" id="{96863D6D-E5C9-4278-8E5D-D97EFD8B8A85}"/>
+              </a:ext>
+            </a:extLst>
+          </p:cNvPr>
+          <p:cNvSpPr txBox="1"/>
+          <p:nvPr/>
+        </p:nvSpPr>
+        <p:spPr>
+          <a:xfrm>
+            <a:off x="4708858" y="3334182"/>
+            <a:ext cx="2062148" cy="307777"/>
+          </a:xfrm>
+          <a:prstGeom prst="rect">
+            <a:avLst/>
+          </a:prstGeom>
+          <a:noFill/>
+        </p:spPr>
+        <p:txBody>
+          <a:bodyPr wrap="square" rtlCol="0">
+            <a:spAutoFit/>
+          </a:bodyPr>
+          <a:lstStyle/>
+          <a:p>
+            <a:r>
+              <a:rPr lang="pt-BR" sz="1400" dirty="0">
+                <a:solidFill>
+                  <a:srgbClr val="8E959E"/>
+                </a:solidFill>
+                <a:latin typeface="Century Gothic" panose="020B0502020202020204" pitchFamily="34" charset="0"/>
+              </a:rPr>
+              <a:t>230394</a:t>
+            </a:r>
+          </a:p>
+        </p:txBody>
+      </p:sp>
+      <p:pic>
+        <p:nvPicPr>
+          <p:cNvPr id="62" name="Picture 18" descr="Resultado de imagem para views icon">
+            <a:extLst>
+              <a:ext uri="{FF2B5EF4-FFF2-40B4-BE49-F238E27FC236}">
+                <a16:creationId xmlns:a16="http://schemas.microsoft.com/office/drawing/2014/main" id="{3596F593-7F02-4648-BD6E-762AF8805D7C}"/>
+              </a:ext>
+            </a:extLst>
+          </p:cNvPr>
+          <p:cNvPicPr>
+            <a:picLocks noChangeAspect="1" noChangeArrowheads="1"/>
+          </p:cNvPicPr>
+          <p:nvPr/>
+        </p:nvPicPr>
+        <p:blipFill>
+          <a:blip r:embed="rId9" cstate="print">
+            <a:duotone>
+              <a:schemeClr val="accent3">
+                <a:shade val="45000"/>
+                <a:satMod val="135000"/>
+              </a:schemeClr>
+              <a:prstClr val="white"/>
+            </a:duotone>
+            <a:extLst>
+              <a:ext uri="{28A0092B-C50C-407E-A947-70E740481C1C}">
+                <a14:useLocalDpi xmlns:a14="http://schemas.microsoft.com/office/drawing/2010/main" val="0"/>
+              </a:ext>
+            </a:extLst>
+          </a:blip>
+          <a:srcRect/>
+          <a:stretch>
+            <a:fillRect/>
+          </a:stretch>
+        </p:blipFill>
+        <p:spPr bwMode="auto">
+          <a:xfrm>
+            <a:off x="4442639" y="3364597"/>
+            <a:ext cx="240714" cy="240714"/>
+          </a:xfrm>
+          <a:prstGeom prst="rect">
+            <a:avLst/>
+          </a:prstGeom>
+          <a:noFill/>
+          <a:extLst>
+            <a:ext uri="{909E8E84-426E-40DD-AFC4-6F175D3DCCD1}">
+              <a14:hiddenFill xmlns:a14="http://schemas.microsoft.com/office/drawing/2010/main">
+                <a:solidFill>
+                  <a:srgbClr val="FFFFFF"/>
+                </a:solidFill>
+              </a14:hiddenFill>
+            </a:ext>
+          </a:extLst>
+        </p:spPr>
+      </p:pic>
+      <p:sp>
+        <p:nvSpPr>
+          <p:cNvPr id="43" name="CaixaDeTexto 42">
+            <a:extLst>
+              <a:ext uri="{FF2B5EF4-FFF2-40B4-BE49-F238E27FC236}">
+                <a16:creationId xmlns:a16="http://schemas.microsoft.com/office/drawing/2014/main" id="{E701E20B-935D-4096-A6D7-15F71E3F3491}"/>
+              </a:ext>
+            </a:extLst>
+          </p:cNvPr>
+          <p:cNvSpPr txBox="1"/>
+          <p:nvPr/>
+        </p:nvSpPr>
+        <p:spPr>
+          <a:xfrm>
+            <a:off x="527002" y="823368"/>
+            <a:ext cx="2062148" cy="307777"/>
+          </a:xfrm>
+          <a:prstGeom prst="rect">
+            <a:avLst/>
+          </a:prstGeom>
+          <a:noFill/>
+        </p:spPr>
+        <p:txBody>
+          <a:bodyPr wrap="square" rtlCol="0">
+            <a:spAutoFit/>
+          </a:bodyPr>
+          <a:lstStyle/>
+          <a:p>
+            <a:pPr algn="ctr"/>
+            <a:r>
+              <a:rPr lang="pt-BR" sz="1400" dirty="0">
+                <a:solidFill>
+                  <a:srgbClr val="8E959E"/>
+                </a:solidFill>
+                <a:latin typeface="Century Gothic" panose="020B0502020202020204" pitchFamily="34" charset="0"/>
+              </a:rPr>
+              <a:t>Campeonatos</a:t>
+            </a:r>
+          </a:p>
+        </p:txBody>
+      </p:sp>
       <p:grpSp>
         <p:nvGrpSpPr>
-          <p:cNvPr id="12" name="Agrupar 11">
+          <p:cNvPr id="44" name="Agrupar 43">
             <a:extLst>
               <a:ext uri="{FF2B5EF4-FFF2-40B4-BE49-F238E27FC236}">
-                <a16:creationId xmlns:a16="http://schemas.microsoft.com/office/drawing/2014/main" id="{CF01F14E-D336-4AE5-921D-08E79ACA58BC}"/>
+                <a16:creationId xmlns:a16="http://schemas.microsoft.com/office/drawing/2014/main" id="{439356FC-F892-44FA-823F-D1B5D126BAC9}"/>
               </a:ext>
             </a:extLst>
           </p:cNvPr>
@@ -4504,7 +6157,7 @@
         </p:nvGrpSpPr>
         <p:grpSpPr>
           <a:xfrm>
-            <a:off x="228900" y="929632"/>
+            <a:off x="228900" y="865016"/>
             <a:ext cx="219104" cy="219104"/>
             <a:chOff x="116680" y="900935"/>
             <a:chExt cx="289720" cy="289720"/>
@@ -4512,10 +6165,10 @@
         </p:grpSpPr>
         <p:sp>
           <p:nvSpPr>
-            <p:cNvPr id="13" name="Estrela de 5 Pontas 6">
+            <p:cNvPr id="45" name="Estrela de 5 Pontas 6">
               <a:extLst>
                 <a:ext uri="{FF2B5EF4-FFF2-40B4-BE49-F238E27FC236}">
-                  <a16:creationId xmlns:a16="http://schemas.microsoft.com/office/drawing/2014/main" id="{6D7A0E12-58B7-4345-BB4E-59A1E0F7DA1F}"/>
+                  <a16:creationId xmlns:a16="http://schemas.microsoft.com/office/drawing/2014/main" id="{99AB8DE1-9405-4FE1-8738-D9702EA7CDD7}"/>
                 </a:ext>
               </a:extLst>
             </p:cNvPr>
@@ -4564,10 +6217,10 @@
         </p:sp>
         <p:sp>
           <p:nvSpPr>
-            <p:cNvPr id="14" name="Elipse 13">
+            <p:cNvPr id="48" name="Elipse 47">
               <a:extLst>
                 <a:ext uri="{FF2B5EF4-FFF2-40B4-BE49-F238E27FC236}">
-                  <a16:creationId xmlns:a16="http://schemas.microsoft.com/office/drawing/2014/main" id="{A682EB07-83AC-480F-828D-8A68602EB787}"/>
+                  <a16:creationId xmlns:a16="http://schemas.microsoft.com/office/drawing/2014/main" id="{1CCD781B-85EA-4E89-B58D-F2634F237B43}"/>
                 </a:ext>
               </a:extLst>
             </p:cNvPr>
@@ -4617,10 +6270,10 @@
       </p:grpSp>
       <p:cxnSp>
         <p:nvCxnSpPr>
-          <p:cNvPr id="15" name="Conector reto 14">
+          <p:cNvPr id="49" name="Conector reto 48">
             <a:extLst>
               <a:ext uri="{FF2B5EF4-FFF2-40B4-BE49-F238E27FC236}">
-                <a16:creationId xmlns:a16="http://schemas.microsoft.com/office/drawing/2014/main" id="{7494EAE7-0534-4016-8E50-D29AB1A042D8}"/>
+                <a16:creationId xmlns:a16="http://schemas.microsoft.com/office/drawing/2014/main" id="{D4DAB119-54A9-48C5-9FD0-741BFF15D4A5}"/>
               </a:ext>
             </a:extLst>
           </p:cNvPr>
@@ -4629,7 +6282,7 @@
         </p:nvCxnSpPr>
         <p:spPr>
           <a:xfrm>
-            <a:off x="653967" y="831207"/>
+            <a:off x="653967" y="766591"/>
             <a:ext cx="0" cy="425450"/>
           </a:xfrm>
           <a:prstGeom prst="line">
@@ -4658,10 +6311,62 @@
       </p:cxnSp>
       <p:sp>
         <p:nvSpPr>
-          <p:cNvPr id="17" name="CaixaDeTexto 16">
+          <p:cNvPr id="54" name="Retângulo 53">
             <a:extLst>
               <a:ext uri="{FF2B5EF4-FFF2-40B4-BE49-F238E27FC236}">
-                <a16:creationId xmlns:a16="http://schemas.microsoft.com/office/drawing/2014/main" id="{31CBF609-074B-4D0E-9088-8771998C0240}"/>
+                <a16:creationId xmlns:a16="http://schemas.microsoft.com/office/drawing/2014/main" id="{8FBB6534-EC95-4B7D-B9D5-00E1B1136062}"/>
+              </a:ext>
+            </a:extLst>
+          </p:cNvPr>
+          <p:cNvSpPr/>
+          <p:nvPr/>
+        </p:nvSpPr>
+        <p:spPr>
+          <a:xfrm>
+            <a:off x="0" y="1315402"/>
+            <a:ext cx="2945320" cy="660400"/>
+          </a:xfrm>
+          <a:prstGeom prst="rect">
+            <a:avLst/>
+          </a:prstGeom>
+          <a:solidFill>
+            <a:srgbClr val="43484F"/>
+          </a:solidFill>
+          <a:ln>
+            <a:noFill/>
+          </a:ln>
+        </p:spPr>
+        <p:style>
+          <a:lnRef idx="2">
+            <a:schemeClr val="accent1">
+              <a:shade val="50000"/>
+            </a:schemeClr>
+          </a:lnRef>
+          <a:fillRef idx="1">
+            <a:schemeClr val="accent1"/>
+          </a:fillRef>
+          <a:effectRef idx="0">
+            <a:schemeClr val="accent1"/>
+          </a:effectRef>
+          <a:fontRef idx="minor">
+            <a:schemeClr val="lt1"/>
+          </a:fontRef>
+        </p:style>
+        <p:txBody>
+          <a:bodyPr rtlCol="0" anchor="ctr"/>
+          <a:lstStyle/>
+          <a:p>
+            <a:pPr algn="ctr"/>
+            <a:endParaRPr lang="pt-BR"/>
+          </a:p>
+        </p:txBody>
+      </p:sp>
+      <p:sp>
+        <p:nvSpPr>
+          <p:cNvPr id="50" name="CaixaDeTexto 49">
+            <a:extLst>
+              <a:ext uri="{FF2B5EF4-FFF2-40B4-BE49-F238E27FC236}">
+                <a16:creationId xmlns:a16="http://schemas.microsoft.com/office/drawing/2014/main" id="{4BCA26F2-3CC6-4AE1-BA77-202CFC05D0B9}"/>
               </a:ext>
             </a:extLst>
           </p:cNvPr>
@@ -4670,89 +6375,7 @@
         </p:nvSpPr>
         <p:spPr>
           <a:xfrm>
-            <a:off x="6235185" y="122588"/>
-            <a:ext cx="2905920" cy="400110"/>
-          </a:xfrm>
-          <a:prstGeom prst="rect">
-            <a:avLst/>
-          </a:prstGeom>
-          <a:noFill/>
-        </p:spPr>
-        <p:txBody>
-          <a:bodyPr wrap="square" rtlCol="0">
-            <a:spAutoFit/>
-          </a:bodyPr>
-          <a:lstStyle/>
-          <a:p>
-            <a:pPr algn="ctr"/>
-            <a:r>
-              <a:rPr lang="pt-BR" sz="2000" dirty="0">
-                <a:solidFill>
-                  <a:srgbClr val="FF3F3F"/>
-                </a:solidFill>
-                <a:latin typeface="Century Gothic" panose="020B0502020202020204" pitchFamily="34" charset="0"/>
-              </a:rPr>
-              <a:t>Nome Campeonato</a:t>
-            </a:r>
-          </a:p>
-        </p:txBody>
-      </p:sp>
-      <p:cxnSp>
-        <p:nvCxnSpPr>
-          <p:cNvPr id="19" name="Conector reto 18">
-            <a:extLst>
-              <a:ext uri="{FF2B5EF4-FFF2-40B4-BE49-F238E27FC236}">
-                <a16:creationId xmlns:a16="http://schemas.microsoft.com/office/drawing/2014/main" id="{2FF80A08-18E5-4488-984B-1F3A5A68DC09}"/>
-              </a:ext>
-            </a:extLst>
-          </p:cNvPr>
-          <p:cNvCxnSpPr/>
-          <p:nvPr/>
-        </p:nvCxnSpPr>
-        <p:spPr>
-          <a:xfrm>
-            <a:off x="6203739" y="153090"/>
-            <a:ext cx="0" cy="346647"/>
-          </a:xfrm>
-          <a:prstGeom prst="line">
-            <a:avLst/>
-          </a:prstGeom>
-          <a:ln>
-            <a:solidFill>
-              <a:srgbClr val="51575F"/>
-            </a:solidFill>
-          </a:ln>
-        </p:spPr>
-        <p:style>
-          <a:lnRef idx="1">
-            <a:schemeClr val="accent1"/>
-          </a:lnRef>
-          <a:fillRef idx="0">
-            <a:schemeClr val="accent1"/>
-          </a:fillRef>
-          <a:effectRef idx="0">
-            <a:schemeClr val="accent1"/>
-          </a:effectRef>
-          <a:fontRef idx="minor">
-            <a:schemeClr val="tx1"/>
-          </a:fontRef>
-        </p:style>
-      </p:cxnSp>
-      <p:sp>
-        <p:nvSpPr>
-          <p:cNvPr id="31" name="CaixaDeTexto 30">
-            <a:extLst>
-              <a:ext uri="{FF2B5EF4-FFF2-40B4-BE49-F238E27FC236}">
-                <a16:creationId xmlns:a16="http://schemas.microsoft.com/office/drawing/2014/main" id="{C01345BC-9C6F-487A-BE8E-B122EA38331F}"/>
-              </a:ext>
-            </a:extLst>
-          </p:cNvPr>
-          <p:cNvSpPr txBox="1"/>
-          <p:nvPr/>
-        </p:nvSpPr>
-        <p:spPr>
-          <a:xfrm>
-            <a:off x="221755" y="1572228"/>
+            <a:off x="221755" y="1483768"/>
             <a:ext cx="2062148" cy="307777"/>
           </a:xfrm>
           <a:prstGeom prst="rect">
@@ -4787,10 +6410,10 @@
       </p:sp>
       <p:cxnSp>
         <p:nvCxnSpPr>
-          <p:cNvPr id="32" name="Conector reto 31">
+          <p:cNvPr id="51" name="Conector reto 50">
             <a:extLst>
               <a:ext uri="{FF2B5EF4-FFF2-40B4-BE49-F238E27FC236}">
-                <a16:creationId xmlns:a16="http://schemas.microsoft.com/office/drawing/2014/main" id="{962A2CA8-1CE2-4F47-91F2-8D26924AEA7C}"/>
+                <a16:creationId xmlns:a16="http://schemas.microsoft.com/office/drawing/2014/main" id="{9B4EBDA9-8E22-49E7-980F-889725CE2E53}"/>
               </a:ext>
             </a:extLst>
           </p:cNvPr>
@@ -4799,7 +6422,7 @@
         </p:nvCxnSpPr>
         <p:spPr>
           <a:xfrm>
-            <a:off x="653967" y="1526262"/>
+            <a:off x="653967" y="1437802"/>
             <a:ext cx="0" cy="425450"/>
           </a:xfrm>
           <a:prstGeom prst="line">
@@ -4828,135 +6451,46 @@
       </p:cxnSp>
       <p:pic>
         <p:nvPicPr>
-          <p:cNvPr id="33" name="Picture 2" descr="Imagem relacionada">
+          <p:cNvPr id="10" name="Imagem 9">
             <a:extLst>
               <a:ext uri="{FF2B5EF4-FFF2-40B4-BE49-F238E27FC236}">
-                <a16:creationId xmlns:a16="http://schemas.microsoft.com/office/drawing/2014/main" id="{772E2736-102D-43A1-B5C3-834FA36CBDC1}"/>
+                <a16:creationId xmlns:a16="http://schemas.microsoft.com/office/drawing/2014/main" id="{CF4077FA-98DB-441C-BCAB-001DF816B164}"/>
               </a:ext>
             </a:extLst>
           </p:cNvPr>
           <p:cNvPicPr>
-            <a:picLocks noChangeAspect="1" noChangeArrowheads="1"/>
+            <a:picLocks noChangeAspect="1"/>
           </p:cNvPicPr>
           <p:nvPr/>
         </p:nvPicPr>
         <p:blipFill>
-          <a:blip r:embed="rId3" cstate="print">
-            <a:duotone>
-              <a:schemeClr val="bg2">
-                <a:shade val="45000"/>
-                <a:satMod val="135000"/>
-              </a:schemeClr>
-              <a:prstClr val="white"/>
-            </a:duotone>
+          <a:blip r:embed="rId10" cstate="print">
             <a:extLst>
-              <a:ext uri="{BEBA8EAE-BF5A-486C-A8C5-ECC9F3942E4B}">
-                <a14:imgProps xmlns:a14="http://schemas.microsoft.com/office/drawing/2010/main">
-                  <a14:imgLayer r:embed="rId4">
-                    <a14:imgEffect>
-                      <a14:backgroundRemoval t="7422" b="89648" l="977" r="98828">
-                        <a14:foregroundMark x1="6250" y1="41992" x2="5469" y2="48242"/>
-                        <a14:foregroundMark x1="75977" y1="42969" x2="77344" y2="46289"/>
-                        <a14:foregroundMark x1="93164" y1="44727" x2="93359" y2="47852"/>
-                        <a14:foregroundMark x1="53320" y1="50781" x2="53320" y2="50781"/>
-                        <a14:foregroundMark x1="22656" y1="45898" x2="22656" y2="45898"/>
-                        <a14:backgroundMark x1="13281" y1="39844" x2="19727" y2="70117"/>
-                        <a14:backgroundMark x1="32813" y1="50000" x2="37109" y2="66211"/>
-                        <a14:backgroundMark x1="33203" y1="59375" x2="32031" y2="45508"/>
-                        <a14:backgroundMark x1="30078" y1="82617" x2="18359" y2="64063"/>
-                        <a14:backgroundMark x1="11914" y1="47070" x2="12695" y2="35352"/>
-                        <a14:backgroundMark x1="59375" y1="30469" x2="71875" y2="47852"/>
-                        <a14:backgroundMark x1="87695" y1="52539" x2="70313" y2="14844"/>
-                        <a14:backgroundMark x1="83008" y1="69727" x2="87109" y2="41602"/>
-                        <a14:backgroundMark x1="95508" y1="76563" x2="97070" y2="60742"/>
-                        <a14:backgroundMark x1="8789" y1="25586" x2="7227" y2="28125"/>
-                        <a14:backgroundMark x1="5469" y1="29492" x2="3906" y2="32813"/>
-                        <a14:backgroundMark x1="8789" y1="24219" x2="19727" y2="1367"/>
-                      </a14:backgroundRemoval>
-                    </a14:imgEffect>
-                    <a14:imgEffect>
-                      <a14:brightnessContrast contrast="40000"/>
-                    </a14:imgEffect>
-                  </a14:imgLayer>
-                </a14:imgProps>
-              </a:ext>
               <a:ext uri="{28A0092B-C50C-407E-A947-70E740481C1C}">
                 <a14:useLocalDpi xmlns:a14="http://schemas.microsoft.com/office/drawing/2010/main" val="0"/>
               </a:ext>
             </a:extLst>
           </a:blip>
-          <a:srcRect/>
           <a:stretch>
             <a:fillRect/>
           </a:stretch>
         </p:blipFill>
-        <p:spPr bwMode="auto">
-          <a:xfrm>
-            <a:off x="179648" y="1590432"/>
-            <a:ext cx="280691" cy="280691"/>
+        <p:spPr>
+          <a:xfrm>
+            <a:off x="195299" y="1494503"/>
+            <a:ext cx="286306" cy="286306"/>
           </a:xfrm>
           <a:prstGeom prst="rect">
             <a:avLst/>
           </a:prstGeom>
-          <a:noFill/>
-          <a:extLst>
-            <a:ext uri="{909E8E84-426E-40DD-AFC4-6F175D3DCCD1}">
-              <a14:hiddenFill xmlns:a14="http://schemas.microsoft.com/office/drawing/2010/main">
-                <a:solidFill>
-                  <a:srgbClr val="FFFFFF"/>
-                </a:solidFill>
-              </a14:hiddenFill>
-            </a:ext>
-          </a:extLst>
         </p:spPr>
       </p:pic>
       <p:sp>
         <p:nvSpPr>
-          <p:cNvPr id="35" name="CaixaDeTexto 34">
+          <p:cNvPr id="55" name="Retângulo 54">
             <a:extLst>
               <a:ext uri="{FF2B5EF4-FFF2-40B4-BE49-F238E27FC236}">
-                <a16:creationId xmlns:a16="http://schemas.microsoft.com/office/drawing/2014/main" id="{AC01DF42-CBE7-4930-AF4E-B4CAE5DC4B1A}"/>
-              </a:ext>
-            </a:extLst>
-          </p:cNvPr>
-          <p:cNvSpPr txBox="1"/>
-          <p:nvPr/>
-        </p:nvSpPr>
-        <p:spPr>
-          <a:xfrm>
-            <a:off x="4544020" y="215342"/>
-            <a:ext cx="1551980" cy="276999"/>
-          </a:xfrm>
-          <a:prstGeom prst="rect">
-            <a:avLst/>
-          </a:prstGeom>
-          <a:noFill/>
-        </p:spPr>
-        <p:txBody>
-          <a:bodyPr wrap="square" rtlCol="0">
-            <a:spAutoFit/>
-          </a:bodyPr>
-          <a:lstStyle/>
-          <a:p>
-            <a:pPr algn="r"/>
-            <a:r>
-              <a:rPr lang="pt-BR" sz="1200" dirty="0">
-                <a:solidFill>
-                  <a:srgbClr val="96A0A0"/>
-                </a:solidFill>
-                <a:latin typeface="Century Gothic" panose="020B0502020202020204" pitchFamily="34" charset="0"/>
-              </a:rPr>
-              <a:t>STREAM</a:t>
-            </a:r>
-          </a:p>
-        </p:txBody>
-      </p:sp>
-      <p:sp>
-        <p:nvSpPr>
-          <p:cNvPr id="36" name="Retângulo 35">
-            <a:extLst>
-              <a:ext uri="{FF2B5EF4-FFF2-40B4-BE49-F238E27FC236}">
-                <a16:creationId xmlns:a16="http://schemas.microsoft.com/office/drawing/2014/main" id="{21CA09FC-C1CE-41AE-A231-35B1C662A7EA}"/>
+                <a16:creationId xmlns:a16="http://schemas.microsoft.com/office/drawing/2014/main" id="{BF38DE58-7828-4AB0-9BE5-1A1C832A2AE1}"/>
               </a:ext>
             </a:extLst>
           </p:cNvPr>
@@ -4965,14 +6499,14 @@
         </p:nvSpPr>
         <p:spPr>
           <a:xfrm>
-            <a:off x="3167315" y="1453849"/>
-            <a:ext cx="4299916" cy="1420891"/>
+            <a:off x="-4188" y="1315402"/>
+            <a:ext cx="45719" cy="660400"/>
           </a:xfrm>
           <a:prstGeom prst="rect">
             <a:avLst/>
           </a:prstGeom>
           <a:solidFill>
-            <a:srgbClr val="35393F"/>
+            <a:srgbClr val="F54747"/>
           </a:solidFill>
           <a:ln>
             <a:noFill/>
@@ -5005,10 +6539,50 @@
       </p:sp>
       <p:sp>
         <p:nvSpPr>
-          <p:cNvPr id="37" name="Retângulo 36">
+          <p:cNvPr id="41" name="CaixaDeTexto 40">
             <a:extLst>
               <a:ext uri="{FF2B5EF4-FFF2-40B4-BE49-F238E27FC236}">
-                <a16:creationId xmlns:a16="http://schemas.microsoft.com/office/drawing/2014/main" id="{C368B579-8001-4B67-9E7F-D31C70ADCC8E}"/>
+                <a16:creationId xmlns:a16="http://schemas.microsoft.com/office/drawing/2014/main" id="{4A1EDBB6-27C9-4C9E-89DA-EA893209CD5F}"/>
+              </a:ext>
+            </a:extLst>
+          </p:cNvPr>
+          <p:cNvSpPr txBox="1"/>
+          <p:nvPr/>
+        </p:nvSpPr>
+        <p:spPr>
+          <a:xfrm>
+            <a:off x="6771587" y="3182212"/>
+            <a:ext cx="486030" cy="1200329"/>
+          </a:xfrm>
+          <a:prstGeom prst="rect">
+            <a:avLst/>
+          </a:prstGeom>
+          <a:noFill/>
+        </p:spPr>
+        <p:txBody>
+          <a:bodyPr wrap="none" rtlCol="0">
+            <a:spAutoFit/>
+          </a:bodyPr>
+          <a:lstStyle/>
+          <a:p>
+            <a:r>
+              <a:rPr lang="pt-BR" sz="7200" dirty="0">
+                <a:solidFill>
+                  <a:srgbClr val="FF0000"/>
+                </a:solidFill>
+              </a:rPr>
+              <a:t>!</a:t>
+            </a:r>
+          </a:p>
+        </p:txBody>
+      </p:sp>
+      <p:sp>
+        <p:nvSpPr>
+          <p:cNvPr id="56" name="Retângulo 55">
+            <a:hlinkClick r:id="rId11" action="ppaction://hlinksldjump"/>
+            <a:extLst>
+              <a:ext uri="{FF2B5EF4-FFF2-40B4-BE49-F238E27FC236}">
+                <a16:creationId xmlns:a16="http://schemas.microsoft.com/office/drawing/2014/main" id="{33CCF585-334E-4CD6-A4D7-3CB98775F742}"/>
               </a:ext>
             </a:extLst>
           </p:cNvPr>
@@ -5017,14 +6591,16 @@
         </p:nvSpPr>
         <p:spPr>
           <a:xfrm>
-            <a:off x="7688145" y="1453849"/>
-            <a:ext cx="4299916" cy="1420891"/>
+            <a:off x="-4188" y="639110"/>
+            <a:ext cx="2945320" cy="660400"/>
           </a:xfrm>
           <a:prstGeom prst="rect">
             <a:avLst/>
           </a:prstGeom>
           <a:solidFill>
-            <a:srgbClr val="35393F"/>
+            <a:srgbClr val="43484F">
+              <a:alpha val="0"/>
+            </a:srgbClr>
           </a:solidFill>
           <a:ln>
             <a:noFill/>
@@ -5055,53 +6631,6 @@
           </a:p>
         </p:txBody>
       </p:sp>
-      <p:pic>
-        <p:nvPicPr>
-          <p:cNvPr id="1026" name="Picture 2" descr="Resultado de imagem para twitch icon">
-            <a:extLst>
-              <a:ext uri="{FF2B5EF4-FFF2-40B4-BE49-F238E27FC236}">
-                <a16:creationId xmlns:a16="http://schemas.microsoft.com/office/drawing/2014/main" id="{023610D3-26F3-458E-8C55-0C12AFB12D0F}"/>
-              </a:ext>
-            </a:extLst>
-          </p:cNvPr>
-          <p:cNvPicPr>
-            <a:picLocks noChangeAspect="1" noChangeArrowheads="1"/>
-          </p:cNvPicPr>
-          <p:nvPr/>
-        </p:nvPicPr>
-        <p:blipFill>
-          <a:blip r:embed="rId5" cstate="print">
-            <a:extLst>
-              <a:ext uri="{28A0092B-C50C-407E-A947-70E740481C1C}">
-                <a14:useLocalDpi xmlns:a14="http://schemas.microsoft.com/office/drawing/2010/main" val="0"/>
-              </a:ext>
-            </a:extLst>
-          </a:blip>
-          <a:srcRect/>
-          <a:stretch>
-            <a:fillRect/>
-          </a:stretch>
-        </p:blipFill>
-        <p:spPr bwMode="auto">
-          <a:xfrm>
-            <a:off x="3479245" y="1759830"/>
-            <a:ext cx="748598" cy="783710"/>
-          </a:xfrm>
-          <a:prstGeom prst="rect">
-            <a:avLst/>
-          </a:prstGeom>
-          <a:noFill/>
-          <a:extLst>
-            <a:ext uri="{909E8E84-426E-40DD-AFC4-6F175D3DCCD1}">
-              <a14:hiddenFill xmlns:a14="http://schemas.microsoft.com/office/drawing/2010/main">
-                <a:solidFill>
-                  <a:srgbClr val="FFFFFF"/>
-                </a:solidFill>
-              </a14:hiddenFill>
-            </a:ext>
-          </a:extLst>
-        </p:spPr>
-      </p:pic>
       <p:sp>
         <p:nvSpPr>
           <p:cNvPr id="39" name="Retângulo 38">
@@ -5116,7 +6645,7 @@
         </p:nvSpPr>
         <p:spPr>
           <a:xfrm>
-            <a:off x="3175300" y="875742"/>
+            <a:off x="3162046" y="875742"/>
             <a:ext cx="2662493" cy="380915"/>
           </a:xfrm>
           <a:prstGeom prst="rect">
@@ -5168,7 +6697,7 @@
         </p:nvSpPr>
         <p:spPr>
           <a:xfrm>
-            <a:off x="3250247" y="912310"/>
+            <a:off x="3236993" y="912310"/>
             <a:ext cx="2587546" cy="276999"/>
           </a:xfrm>
           <a:prstGeom prst="rect">
@@ -5189,7 +6718,7 @@
                 </a:solidFill>
                 <a:latin typeface="Century Gothic" panose="020B0502020202020204" pitchFamily="34" charset="0"/>
               </a:rPr>
-              <a:t>Ordenar por visualizações</a:t>
+              <a:t>Ordenar por audiência</a:t>
             </a:r>
           </a:p>
         </p:txBody>
@@ -5208,7 +6737,7 @@
         </p:nvSpPr>
         <p:spPr>
           <a:xfrm rot="10800000">
-            <a:off x="5577495" y="1021413"/>
+            <a:off x="5564241" y="1021413"/>
             <a:ext cx="103902" cy="89571"/>
           </a:xfrm>
           <a:prstGeom prst="triangle">
@@ -5246,68 +6775,12 @@
           </a:p>
         </p:txBody>
       </p:sp>
-      <p:pic>
-        <p:nvPicPr>
-          <p:cNvPr id="1034" name="Picture 10" descr="Resultado de imagem para youtube icon">
+      <p:sp>
+        <p:nvSpPr>
+          <p:cNvPr id="67" name="Retângulo 66">
             <a:extLst>
               <a:ext uri="{FF2B5EF4-FFF2-40B4-BE49-F238E27FC236}">
-                <a16:creationId xmlns:a16="http://schemas.microsoft.com/office/drawing/2014/main" id="{E39AE99F-1A92-46AC-96BE-4ED4F0974D28}"/>
-              </a:ext>
-            </a:extLst>
-          </p:cNvPr>
-          <p:cNvPicPr>
-            <a:picLocks noChangeAspect="1" noChangeArrowheads="1"/>
-          </p:cNvPicPr>
-          <p:nvPr/>
-        </p:nvPicPr>
-        <p:blipFill>
-          <a:blip r:embed="rId6" cstate="print">
-            <a:extLst>
-              <a:ext uri="{BEBA8EAE-BF5A-486C-A8C5-ECC9F3942E4B}">
-                <a14:imgProps xmlns:a14="http://schemas.microsoft.com/office/drawing/2010/main">
-                  <a14:imgLayer r:embed="rId7">
-                    <a14:imgEffect>
-                      <a14:brightnessContrast contrast="-27000"/>
-                    </a14:imgEffect>
-                  </a14:imgLayer>
-                </a14:imgProps>
-              </a:ext>
-              <a:ext uri="{28A0092B-C50C-407E-A947-70E740481C1C}">
-                <a14:useLocalDpi xmlns:a14="http://schemas.microsoft.com/office/drawing/2010/main" val="0"/>
-              </a:ext>
-            </a:extLst>
-          </a:blip>
-          <a:srcRect/>
-          <a:stretch>
-            <a:fillRect/>
-          </a:stretch>
-        </p:blipFill>
-        <p:spPr bwMode="auto">
-          <a:xfrm>
-            <a:off x="8002875" y="1735088"/>
-            <a:ext cx="833194" cy="833194"/>
-          </a:xfrm>
-          <a:prstGeom prst="rect">
-            <a:avLst/>
-          </a:prstGeom>
-          <a:noFill/>
-          <a:extLst>
-            <a:ext uri="{909E8E84-426E-40DD-AFC4-6F175D3DCCD1}">
-              <a14:hiddenFill xmlns:a14="http://schemas.microsoft.com/office/drawing/2010/main">
-                <a:solidFill>
-                  <a:srgbClr val="FFFFFF"/>
-                </a:solidFill>
-              </a14:hiddenFill>
-            </a:ext>
-          </a:extLst>
-        </p:spPr>
-      </p:pic>
-      <p:sp>
-        <p:nvSpPr>
-          <p:cNvPr id="46" name="Retângulo 45">
-            <a:extLst>
-              <a:ext uri="{FF2B5EF4-FFF2-40B4-BE49-F238E27FC236}">
-                <a16:creationId xmlns:a16="http://schemas.microsoft.com/office/drawing/2014/main" id="{986FB9E3-D1C0-4262-9B2C-A7DAEE1F76F6}"/>
+                <a16:creationId xmlns:a16="http://schemas.microsoft.com/office/drawing/2014/main" id="{E98E9AF5-DF03-4A10-BD5B-C0227B292176}"/>
               </a:ext>
             </a:extLst>
           </p:cNvPr>
@@ -5316,14 +6789,16 @@
         </p:nvSpPr>
         <p:spPr>
           <a:xfrm>
-            <a:off x="3167315" y="3071932"/>
-            <a:ext cx="4299916" cy="1420891"/>
+            <a:off x="3156777" y="875391"/>
+            <a:ext cx="2662493" cy="380915"/>
           </a:xfrm>
           <a:prstGeom prst="rect">
             <a:avLst/>
           </a:prstGeom>
           <a:solidFill>
-            <a:srgbClr val="35393F"/>
+            <a:srgbClr val="35393F">
+              <a:alpha val="0"/>
+            </a:srgbClr>
           </a:solidFill>
           <a:ln>
             <a:noFill/>
@@ -5354,545 +6829,6 @@
           </a:p>
         </p:txBody>
       </p:sp>
-      <p:sp>
-        <p:nvSpPr>
-          <p:cNvPr id="47" name="Retângulo 46">
-            <a:extLst>
-              <a:ext uri="{FF2B5EF4-FFF2-40B4-BE49-F238E27FC236}">
-                <a16:creationId xmlns:a16="http://schemas.microsoft.com/office/drawing/2014/main" id="{B6103B61-BAA5-41E6-8640-F927E985685A}"/>
-              </a:ext>
-            </a:extLst>
-          </p:cNvPr>
-          <p:cNvSpPr/>
-          <p:nvPr/>
-        </p:nvSpPr>
-        <p:spPr>
-          <a:xfrm>
-            <a:off x="7688145" y="3071932"/>
-            <a:ext cx="4299916" cy="1420891"/>
-          </a:xfrm>
-          <a:prstGeom prst="rect">
-            <a:avLst/>
-          </a:prstGeom>
-          <a:solidFill>
-            <a:srgbClr val="35393F"/>
-          </a:solidFill>
-          <a:ln>
-            <a:noFill/>
-          </a:ln>
-        </p:spPr>
-        <p:style>
-          <a:lnRef idx="2">
-            <a:schemeClr val="accent1">
-              <a:shade val="50000"/>
-            </a:schemeClr>
-          </a:lnRef>
-          <a:fillRef idx="1">
-            <a:schemeClr val="accent1"/>
-          </a:fillRef>
-          <a:effectRef idx="0">
-            <a:schemeClr val="accent1"/>
-          </a:effectRef>
-          <a:fontRef idx="minor">
-            <a:schemeClr val="lt1"/>
-          </a:fontRef>
-        </p:style>
-        <p:txBody>
-          <a:bodyPr rtlCol="0" anchor="ctr"/>
-          <a:lstStyle/>
-          <a:p>
-            <a:pPr algn="ctr"/>
-            <a:endParaRPr lang="pt-BR"/>
-          </a:p>
-        </p:txBody>
-      </p:sp>
-      <p:pic>
-        <p:nvPicPr>
-          <p:cNvPr id="1036" name="Picture 12" descr="Resultado de imagem para smashcast">
-            <a:extLst>
-              <a:ext uri="{FF2B5EF4-FFF2-40B4-BE49-F238E27FC236}">
-                <a16:creationId xmlns:a16="http://schemas.microsoft.com/office/drawing/2014/main" id="{05136D1A-F45E-482E-894D-5C25653FAB65}"/>
-              </a:ext>
-            </a:extLst>
-          </p:cNvPr>
-          <p:cNvPicPr>
-            <a:picLocks noChangeAspect="1" noChangeArrowheads="1"/>
-          </p:cNvPicPr>
-          <p:nvPr/>
-        </p:nvPicPr>
-        <p:blipFill>
-          <a:blip r:embed="rId8" cstate="print">
-            <a:extLst>
-              <a:ext uri="{28A0092B-C50C-407E-A947-70E740481C1C}">
-                <a14:useLocalDpi xmlns:a14="http://schemas.microsoft.com/office/drawing/2010/main" val="0"/>
-              </a:ext>
-            </a:extLst>
-          </a:blip>
-          <a:srcRect/>
-          <a:stretch>
-            <a:fillRect/>
-          </a:stretch>
-        </p:blipFill>
-        <p:spPr bwMode="auto">
-          <a:xfrm>
-            <a:off x="3444133" y="3390522"/>
-            <a:ext cx="783710" cy="783710"/>
-          </a:xfrm>
-          <a:prstGeom prst="rect">
-            <a:avLst/>
-          </a:prstGeom>
-          <a:noFill/>
-          <a:extLst>
-            <a:ext uri="{909E8E84-426E-40DD-AFC4-6F175D3DCCD1}">
-              <a14:hiddenFill xmlns:a14="http://schemas.microsoft.com/office/drawing/2010/main">
-                <a:solidFill>
-                  <a:srgbClr val="FFFFFF"/>
-                </a:solidFill>
-              </a14:hiddenFill>
-            </a:ext>
-          </a:extLst>
-        </p:spPr>
-      </p:pic>
-      <p:pic>
-        <p:nvPicPr>
-          <p:cNvPr id="1038" name="Picture 14" descr="Resultado de imagem para mixer stream">
-            <a:extLst>
-              <a:ext uri="{FF2B5EF4-FFF2-40B4-BE49-F238E27FC236}">
-                <a16:creationId xmlns:a16="http://schemas.microsoft.com/office/drawing/2014/main" id="{20D300FC-FAF8-41BD-BB26-74E48BA2553E}"/>
-              </a:ext>
-            </a:extLst>
-          </p:cNvPr>
-          <p:cNvPicPr>
-            <a:picLocks noChangeAspect="1" noChangeArrowheads="1"/>
-          </p:cNvPicPr>
-          <p:nvPr/>
-        </p:nvPicPr>
-        <p:blipFill>
-          <a:blip r:embed="rId9" cstate="print">
-            <a:extLst>
-              <a:ext uri="{BEBA8EAE-BF5A-486C-A8C5-ECC9F3942E4B}">
-                <a14:imgProps xmlns:a14="http://schemas.microsoft.com/office/drawing/2010/main">
-                  <a14:imgLayer r:embed="rId10">
-                    <a14:imgEffect>
-                      <a14:backgroundRemoval t="9778" b="89778" l="7556" r="92000">
-                        <a14:foregroundMark x1="9333" y1="20444" x2="9333" y2="20444"/>
-                        <a14:foregroundMark x1="74667" y1="32889" x2="74667" y2="32889"/>
-                        <a14:foregroundMark x1="92000" y1="80000" x2="92000" y2="80000"/>
-                        <a14:foregroundMark x1="13778" y1="80444" x2="13778" y2="80444"/>
-                        <a14:foregroundMark x1="11556" y1="77333" x2="11556" y2="77333"/>
-                        <a14:foregroundMark x1="8000" y1="78222" x2="8000" y2="78222"/>
-                        <a14:foregroundMark x1="7556" y1="17778" x2="7556" y2="17778"/>
-                      </a14:backgroundRemoval>
-                    </a14:imgEffect>
-                  </a14:imgLayer>
-                </a14:imgProps>
-              </a:ext>
-              <a:ext uri="{28A0092B-C50C-407E-A947-70E740481C1C}">
-                <a14:useLocalDpi xmlns:a14="http://schemas.microsoft.com/office/drawing/2010/main" val="0"/>
-              </a:ext>
-            </a:extLst>
-          </a:blip>
-          <a:srcRect/>
-          <a:stretch>
-            <a:fillRect/>
-          </a:stretch>
-        </p:blipFill>
-        <p:spPr bwMode="auto">
-          <a:xfrm>
-            <a:off x="8027617" y="3390522"/>
-            <a:ext cx="783710" cy="783710"/>
-          </a:xfrm>
-          <a:prstGeom prst="rect">
-            <a:avLst/>
-          </a:prstGeom>
-          <a:noFill/>
-          <a:extLst>
-            <a:ext uri="{909E8E84-426E-40DD-AFC4-6F175D3DCCD1}">
-              <a14:hiddenFill xmlns:a14="http://schemas.microsoft.com/office/drawing/2010/main">
-                <a:solidFill>
-                  <a:srgbClr val="FFFFFF"/>
-                </a:solidFill>
-              </a14:hiddenFill>
-            </a:ext>
-          </a:extLst>
-        </p:spPr>
-      </p:pic>
-      <p:sp>
-        <p:nvSpPr>
-          <p:cNvPr id="52" name="CaixaDeTexto 51">
-            <a:extLst>
-              <a:ext uri="{FF2B5EF4-FFF2-40B4-BE49-F238E27FC236}">
-                <a16:creationId xmlns:a16="http://schemas.microsoft.com/office/drawing/2014/main" id="{869E2FB8-AC9A-414E-A75D-4E93BD889321}"/>
-              </a:ext>
-            </a:extLst>
-          </p:cNvPr>
-          <p:cNvSpPr txBox="1"/>
-          <p:nvPr/>
-        </p:nvSpPr>
-        <p:spPr>
-          <a:xfrm>
-            <a:off x="4772765" y="1712277"/>
-            <a:ext cx="2062148" cy="307777"/>
-          </a:xfrm>
-          <a:prstGeom prst="rect">
-            <a:avLst/>
-          </a:prstGeom>
-          <a:noFill/>
-        </p:spPr>
-        <p:txBody>
-          <a:bodyPr wrap="square" rtlCol="0">
-            <a:spAutoFit/>
-          </a:bodyPr>
-          <a:lstStyle/>
-          <a:p>
-            <a:r>
-              <a:rPr lang="pt-BR" sz="1400" dirty="0">
-                <a:solidFill>
-                  <a:srgbClr val="8E959E"/>
-                </a:solidFill>
-                <a:latin typeface="Century Gothic" panose="020B0502020202020204" pitchFamily="34" charset="0"/>
-              </a:rPr>
-              <a:t>230394</a:t>
-            </a:r>
-          </a:p>
-        </p:txBody>
-      </p:sp>
-      <p:pic>
-        <p:nvPicPr>
-          <p:cNvPr id="1042" name="Picture 18" descr="Resultado de imagem para views icon">
-            <a:extLst>
-              <a:ext uri="{FF2B5EF4-FFF2-40B4-BE49-F238E27FC236}">
-                <a16:creationId xmlns:a16="http://schemas.microsoft.com/office/drawing/2014/main" id="{DFAEE494-C9F1-494F-875C-B72202D2A443}"/>
-              </a:ext>
-            </a:extLst>
-          </p:cNvPr>
-          <p:cNvPicPr>
-            <a:picLocks noChangeAspect="1" noChangeArrowheads="1"/>
-          </p:cNvPicPr>
-          <p:nvPr/>
-        </p:nvPicPr>
-        <p:blipFill>
-          <a:blip r:embed="rId11" cstate="print">
-            <a:duotone>
-              <a:schemeClr val="accent3">
-                <a:shade val="45000"/>
-                <a:satMod val="135000"/>
-              </a:schemeClr>
-              <a:prstClr val="white"/>
-            </a:duotone>
-            <a:extLst>
-              <a:ext uri="{28A0092B-C50C-407E-A947-70E740481C1C}">
-                <a14:useLocalDpi xmlns:a14="http://schemas.microsoft.com/office/drawing/2010/main" val="0"/>
-              </a:ext>
-            </a:extLst>
-          </a:blip>
-          <a:srcRect/>
-          <a:stretch>
-            <a:fillRect/>
-          </a:stretch>
-        </p:blipFill>
-        <p:spPr bwMode="auto">
-          <a:xfrm>
-            <a:off x="4506546" y="1742692"/>
-            <a:ext cx="240714" cy="240714"/>
-          </a:xfrm>
-          <a:prstGeom prst="rect">
-            <a:avLst/>
-          </a:prstGeom>
-          <a:noFill/>
-          <a:extLst>
-            <a:ext uri="{909E8E84-426E-40DD-AFC4-6F175D3DCCD1}">
-              <a14:hiddenFill xmlns:a14="http://schemas.microsoft.com/office/drawing/2010/main">
-                <a:solidFill>
-                  <a:srgbClr val="FFFFFF"/>
-                </a:solidFill>
-              </a14:hiddenFill>
-            </a:ext>
-          </a:extLst>
-        </p:spPr>
-      </p:pic>
-      <p:sp>
-        <p:nvSpPr>
-          <p:cNvPr id="57" name="CaixaDeTexto 56">
-            <a:extLst>
-              <a:ext uri="{FF2B5EF4-FFF2-40B4-BE49-F238E27FC236}">
-                <a16:creationId xmlns:a16="http://schemas.microsoft.com/office/drawing/2014/main" id="{46EB0027-88C6-4CB9-9577-14FF3BAC22E8}"/>
-              </a:ext>
-            </a:extLst>
-          </p:cNvPr>
-          <p:cNvSpPr txBox="1"/>
-          <p:nvPr/>
-        </p:nvSpPr>
-        <p:spPr>
-          <a:xfrm>
-            <a:off x="9306510" y="1704673"/>
-            <a:ext cx="2062148" cy="307777"/>
-          </a:xfrm>
-          <a:prstGeom prst="rect">
-            <a:avLst/>
-          </a:prstGeom>
-          <a:noFill/>
-        </p:spPr>
-        <p:txBody>
-          <a:bodyPr wrap="square" rtlCol="0">
-            <a:spAutoFit/>
-          </a:bodyPr>
-          <a:lstStyle/>
-          <a:p>
-            <a:r>
-              <a:rPr lang="pt-BR" sz="1400" dirty="0">
-                <a:solidFill>
-                  <a:srgbClr val="8E959E"/>
-                </a:solidFill>
-                <a:latin typeface="Century Gothic" panose="020B0502020202020204" pitchFamily="34" charset="0"/>
-              </a:rPr>
-              <a:t>230394</a:t>
-            </a:r>
-          </a:p>
-        </p:txBody>
-      </p:sp>
-      <p:pic>
-        <p:nvPicPr>
-          <p:cNvPr id="58" name="Picture 18" descr="Resultado de imagem para views icon">
-            <a:extLst>
-              <a:ext uri="{FF2B5EF4-FFF2-40B4-BE49-F238E27FC236}">
-                <a16:creationId xmlns:a16="http://schemas.microsoft.com/office/drawing/2014/main" id="{10ABD8BA-3F7B-41E2-AD4C-95AF321BE077}"/>
-              </a:ext>
-            </a:extLst>
-          </p:cNvPr>
-          <p:cNvPicPr>
-            <a:picLocks noChangeAspect="1" noChangeArrowheads="1"/>
-          </p:cNvPicPr>
-          <p:nvPr/>
-        </p:nvPicPr>
-        <p:blipFill>
-          <a:blip r:embed="rId11" cstate="print">
-            <a:duotone>
-              <a:schemeClr val="accent3">
-                <a:shade val="45000"/>
-                <a:satMod val="135000"/>
-              </a:schemeClr>
-              <a:prstClr val="white"/>
-            </a:duotone>
-            <a:extLst>
-              <a:ext uri="{28A0092B-C50C-407E-A947-70E740481C1C}">
-                <a14:useLocalDpi xmlns:a14="http://schemas.microsoft.com/office/drawing/2010/main" val="0"/>
-              </a:ext>
-            </a:extLst>
-          </a:blip>
-          <a:srcRect/>
-          <a:stretch>
-            <a:fillRect/>
-          </a:stretch>
-        </p:blipFill>
-        <p:spPr bwMode="auto">
-          <a:xfrm>
-            <a:off x="9040291" y="1735088"/>
-            <a:ext cx="240714" cy="240714"/>
-          </a:xfrm>
-          <a:prstGeom prst="rect">
-            <a:avLst/>
-          </a:prstGeom>
-          <a:noFill/>
-          <a:extLst>
-            <a:ext uri="{909E8E84-426E-40DD-AFC4-6F175D3DCCD1}">
-              <a14:hiddenFill xmlns:a14="http://schemas.microsoft.com/office/drawing/2010/main">
-                <a:solidFill>
-                  <a:srgbClr val="FFFFFF"/>
-                </a:solidFill>
-              </a14:hiddenFill>
-            </a:ext>
-          </a:extLst>
-        </p:spPr>
-      </p:pic>
-      <p:sp>
-        <p:nvSpPr>
-          <p:cNvPr id="59" name="CaixaDeTexto 58">
-            <a:extLst>
-              <a:ext uri="{FF2B5EF4-FFF2-40B4-BE49-F238E27FC236}">
-                <a16:creationId xmlns:a16="http://schemas.microsoft.com/office/drawing/2014/main" id="{EB22B81B-4791-4DED-9EAD-0497484641E0}"/>
-              </a:ext>
-            </a:extLst>
-          </p:cNvPr>
-          <p:cNvSpPr txBox="1"/>
-          <p:nvPr/>
-        </p:nvSpPr>
-        <p:spPr>
-          <a:xfrm>
-            <a:off x="9306510" y="3334182"/>
-            <a:ext cx="2062148" cy="307777"/>
-          </a:xfrm>
-          <a:prstGeom prst="rect">
-            <a:avLst/>
-          </a:prstGeom>
-          <a:noFill/>
-        </p:spPr>
-        <p:txBody>
-          <a:bodyPr wrap="square" rtlCol="0">
-            <a:spAutoFit/>
-          </a:bodyPr>
-          <a:lstStyle/>
-          <a:p>
-            <a:r>
-              <a:rPr lang="pt-BR" sz="1400" dirty="0">
-                <a:solidFill>
-                  <a:srgbClr val="8E959E"/>
-                </a:solidFill>
-                <a:latin typeface="Century Gothic" panose="020B0502020202020204" pitchFamily="34" charset="0"/>
-              </a:rPr>
-              <a:t>230394</a:t>
-            </a:r>
-          </a:p>
-        </p:txBody>
-      </p:sp>
-      <p:pic>
-        <p:nvPicPr>
-          <p:cNvPr id="60" name="Picture 18" descr="Resultado de imagem para views icon">
-            <a:extLst>
-              <a:ext uri="{FF2B5EF4-FFF2-40B4-BE49-F238E27FC236}">
-                <a16:creationId xmlns:a16="http://schemas.microsoft.com/office/drawing/2014/main" id="{E38FFC39-E597-493A-BAE8-86DCD4D541CC}"/>
-              </a:ext>
-            </a:extLst>
-          </p:cNvPr>
-          <p:cNvPicPr>
-            <a:picLocks noChangeAspect="1" noChangeArrowheads="1"/>
-          </p:cNvPicPr>
-          <p:nvPr/>
-        </p:nvPicPr>
-        <p:blipFill>
-          <a:blip r:embed="rId11" cstate="print">
-            <a:duotone>
-              <a:schemeClr val="accent3">
-                <a:shade val="45000"/>
-                <a:satMod val="135000"/>
-              </a:schemeClr>
-              <a:prstClr val="white"/>
-            </a:duotone>
-            <a:extLst>
-              <a:ext uri="{28A0092B-C50C-407E-A947-70E740481C1C}">
-                <a14:useLocalDpi xmlns:a14="http://schemas.microsoft.com/office/drawing/2010/main" val="0"/>
-              </a:ext>
-            </a:extLst>
-          </a:blip>
-          <a:srcRect/>
-          <a:stretch>
-            <a:fillRect/>
-          </a:stretch>
-        </p:blipFill>
-        <p:spPr bwMode="auto">
-          <a:xfrm>
-            <a:off x="9040291" y="3364597"/>
-            <a:ext cx="240714" cy="240714"/>
-          </a:xfrm>
-          <a:prstGeom prst="rect">
-            <a:avLst/>
-          </a:prstGeom>
-          <a:noFill/>
-          <a:extLst>
-            <a:ext uri="{909E8E84-426E-40DD-AFC4-6F175D3DCCD1}">
-              <a14:hiddenFill xmlns:a14="http://schemas.microsoft.com/office/drawing/2010/main">
-                <a:solidFill>
-                  <a:srgbClr val="FFFFFF"/>
-                </a:solidFill>
-              </a14:hiddenFill>
-            </a:ext>
-          </a:extLst>
-        </p:spPr>
-      </p:pic>
-      <p:sp>
-        <p:nvSpPr>
-          <p:cNvPr id="61" name="CaixaDeTexto 60">
-            <a:extLst>
-              <a:ext uri="{FF2B5EF4-FFF2-40B4-BE49-F238E27FC236}">
-                <a16:creationId xmlns:a16="http://schemas.microsoft.com/office/drawing/2014/main" id="{96863D6D-E5C9-4278-8E5D-D97EFD8B8A85}"/>
-              </a:ext>
-            </a:extLst>
-          </p:cNvPr>
-          <p:cNvSpPr txBox="1"/>
-          <p:nvPr/>
-        </p:nvSpPr>
-        <p:spPr>
-          <a:xfrm>
-            <a:off x="4708858" y="3334182"/>
-            <a:ext cx="2062148" cy="307777"/>
-          </a:xfrm>
-          <a:prstGeom prst="rect">
-            <a:avLst/>
-          </a:prstGeom>
-          <a:noFill/>
-        </p:spPr>
-        <p:txBody>
-          <a:bodyPr wrap="square" rtlCol="0">
-            <a:spAutoFit/>
-          </a:bodyPr>
-          <a:lstStyle/>
-          <a:p>
-            <a:r>
-              <a:rPr lang="pt-BR" sz="1400" dirty="0">
-                <a:solidFill>
-                  <a:srgbClr val="8E959E"/>
-                </a:solidFill>
-                <a:latin typeface="Century Gothic" panose="020B0502020202020204" pitchFamily="34" charset="0"/>
-              </a:rPr>
-              <a:t>230394</a:t>
-            </a:r>
-          </a:p>
-        </p:txBody>
-      </p:sp>
-      <p:pic>
-        <p:nvPicPr>
-          <p:cNvPr id="62" name="Picture 18" descr="Resultado de imagem para views icon">
-            <a:extLst>
-              <a:ext uri="{FF2B5EF4-FFF2-40B4-BE49-F238E27FC236}">
-                <a16:creationId xmlns:a16="http://schemas.microsoft.com/office/drawing/2014/main" id="{3596F593-7F02-4648-BD6E-762AF8805D7C}"/>
-              </a:ext>
-            </a:extLst>
-          </p:cNvPr>
-          <p:cNvPicPr>
-            <a:picLocks noChangeAspect="1" noChangeArrowheads="1"/>
-          </p:cNvPicPr>
-          <p:nvPr/>
-        </p:nvPicPr>
-        <p:blipFill>
-          <a:blip r:embed="rId11" cstate="print">
-            <a:duotone>
-              <a:schemeClr val="accent3">
-                <a:shade val="45000"/>
-                <a:satMod val="135000"/>
-              </a:schemeClr>
-              <a:prstClr val="white"/>
-            </a:duotone>
-            <a:extLst>
-              <a:ext uri="{28A0092B-C50C-407E-A947-70E740481C1C}">
-                <a14:useLocalDpi xmlns:a14="http://schemas.microsoft.com/office/drawing/2010/main" val="0"/>
-              </a:ext>
-            </a:extLst>
-          </a:blip>
-          <a:srcRect/>
-          <a:stretch>
-            <a:fillRect/>
-          </a:stretch>
-        </p:blipFill>
-        <p:spPr bwMode="auto">
-          <a:xfrm>
-            <a:off x="4442639" y="3364597"/>
-            <a:ext cx="240714" cy="240714"/>
-          </a:xfrm>
-          <a:prstGeom prst="rect">
-            <a:avLst/>
-          </a:prstGeom>
-          <a:noFill/>
-          <a:extLst>
-            <a:ext uri="{909E8E84-426E-40DD-AFC4-6F175D3DCCD1}">
-              <a14:hiddenFill xmlns:a14="http://schemas.microsoft.com/office/drawing/2010/main">
-                <a:solidFill>
-                  <a:srgbClr val="FFFFFF"/>
-                </a:solidFill>
-              </a14:hiddenFill>
-            </a:ext>
-          </a:extLst>
-        </p:spPr>
-      </p:pic>
     </p:spTree>
     <p:extLst>
       <p:ext uri="{BB962C8B-B14F-4D97-AF65-F5344CB8AC3E}">
@@ -5903,6 +6839,127 @@
   <p:clrMapOvr>
     <a:masterClrMapping/>
   </p:clrMapOvr>
+  <mc:AlternateContent xmlns:mc="http://schemas.openxmlformats.org/markup-compatibility/2006" xmlns:p14="http://schemas.microsoft.com/office/powerpoint/2010/main">
+    <mc:Choice Requires="p14">
+      <p:transition spd="slow" p14:dur="2000" advClick="0"/>
+    </mc:Choice>
+    <mc:Fallback xmlns="">
+      <p:transition spd="slow" advClick="0"/>
+    </mc:Fallback>
+  </mc:AlternateContent>
+  <p:timing>
+    <p:tnLst>
+      <p:par>
+        <p:cTn id="1" dur="indefinite" restart="never" nodeType="tmRoot">
+          <p:childTnLst>
+            <p:seq concurrent="1" nextAc="seek">
+              <p:cTn id="2" restart="whenNotActive" fill="hold" evtFilter="cancelBubble" nodeType="interactiveSeq">
+                <p:stCondLst>
+                  <p:cond evt="onClick" delay="0">
+                    <p:tgtEl>
+                      <p:spTgt spid="67"/>
+                    </p:tgtEl>
+                  </p:cond>
+                </p:stCondLst>
+                <p:endSync evt="end" delay="0">
+                  <p:rtn val="all"/>
+                </p:endSync>
+                <p:childTnLst>
+                  <p:par>
+                    <p:cTn id="3" fill="hold">
+                      <p:stCondLst>
+                        <p:cond delay="0"/>
+                      </p:stCondLst>
+                      <p:childTnLst>
+                        <p:par>
+                          <p:cTn id="4" fill="hold">
+                            <p:stCondLst>
+                              <p:cond delay="0"/>
+                            </p:stCondLst>
+                            <p:childTnLst>
+                              <p:par>
+                                <p:cTn id="5" presetID="42" presetClass="path" presetSubtype="0" accel="50000" decel="50000" fill="hold" nodeType="clickEffect">
+                                  <p:stCondLst>
+                                    <p:cond delay="0"/>
+                                  </p:stCondLst>
+                                  <p:childTnLst>
+                                    <p:animMotion origin="layout" path="M 4.16667E-7 3.33333E-6 L 4.16667E-7 0.05555 " pathEditMode="relative" rAng="0" ptsTypes="AA">
+                                      <p:cBhvr>
+                                        <p:cTn id="6" dur="500" fill="hold"/>
+                                        <p:tgtEl>
+                                          <p:spTgt spid="2"/>
+                                        </p:tgtEl>
+                                        <p:attrNameLst>
+                                          <p:attrName>ppt_x</p:attrName>
+                                          <p:attrName>ppt_y</p:attrName>
+                                        </p:attrNameLst>
+                                      </p:cBhvr>
+                                      <p:rCtr x="0" y="2778"/>
+                                    </p:animMotion>
+                                  </p:childTnLst>
+                                </p:cTn>
+                              </p:par>
+                            </p:childTnLst>
+                          </p:cTn>
+                        </p:par>
+                      </p:childTnLst>
+                    </p:cTn>
+                  </p:par>
+                  <p:par>
+                    <p:cTn id="7" fill="hold">
+                      <p:stCondLst>
+                        <p:cond delay="indefinite"/>
+                      </p:stCondLst>
+                      <p:childTnLst>
+                        <p:par>
+                          <p:cTn id="8" fill="hold">
+                            <p:stCondLst>
+                              <p:cond delay="0"/>
+                            </p:stCondLst>
+                            <p:childTnLst>
+                              <p:par>
+                                <p:cTn id="9" presetID="42" presetClass="path" presetSubtype="0" accel="50000" decel="50000" fill="hold" nodeType="clickEffect">
+                                  <p:stCondLst>
+                                    <p:cond delay="0"/>
+                                  </p:stCondLst>
+                                  <p:childTnLst>
+                                    <p:animMotion origin="layout" path="M 4.16667E-7 0.05555 L 4.16667E-7 -3.7037E-7 " pathEditMode="relative" rAng="0" ptsTypes="AA">
+                                      <p:cBhvr>
+                                        <p:cTn id="10" dur="500" fill="hold"/>
+                                        <p:tgtEl>
+                                          <p:spTgt spid="2"/>
+                                        </p:tgtEl>
+                                        <p:attrNameLst>
+                                          <p:attrName>ppt_x</p:attrName>
+                                          <p:attrName>ppt_y</p:attrName>
+                                        </p:attrNameLst>
+                                      </p:cBhvr>
+                                      <p:rCtr x="0" y="-2917"/>
+                                    </p:animMotion>
+                                  </p:childTnLst>
+                                </p:cTn>
+                              </p:par>
+                            </p:childTnLst>
+                          </p:cTn>
+                        </p:par>
+                      </p:childTnLst>
+                    </p:cTn>
+                  </p:par>
+                </p:childTnLst>
+              </p:cTn>
+              <p:nextCondLst>
+                <p:cond evt="onClick" delay="0">
+                  <p:tgtEl>
+                    <p:spTgt spid="67"/>
+                  </p:tgtEl>
+                </p:cond>
+              </p:nextCondLst>
+            </p:seq>
+          </p:childTnLst>
+        </p:cTn>
+      </p:par>
+    </p:tnLst>
+  </p:timing>
 </p:sld>
 </file>
 

</xml_diff>

<commit_message>
delete diagrama errado, mockup partida e company init
</commit_message>
<xml_diff>
--- a/Mockup/mockup1.pptx
+++ b/Mockup/mockup1.pptx
@@ -6,8 +6,9 @@
   </p:sldMasterIdLst>
   <p:sldIdLst>
     <p:sldId id="258" r:id="rId2"/>
-    <p:sldId id="256" r:id="rId3"/>
-    <p:sldId id="257" r:id="rId4"/>
+    <p:sldId id="259" r:id="rId3"/>
+    <p:sldId id="256" r:id="rId4"/>
+    <p:sldId id="257" r:id="rId5"/>
   </p:sldIdLst>
   <p:sldSz cx="12192000" cy="6858000"/>
   <p:notesSz cx="6858000" cy="9144000"/>
@@ -243,7 +244,7 @@
           <a:p>
             <a:fld id="{8FD46BB3-C0C0-42DD-A915-951B3E7D476A}" type="datetimeFigureOut">
               <a:rPr lang="pt-BR" smtClean="0"/>
-              <a:t>21/04/2019</a:t>
+              <a:t>22/04/2019</a:t>
             </a:fld>
             <a:endParaRPr lang="pt-BR"/>
           </a:p>
@@ -411,7 +412,7 @@
           <a:p>
             <a:fld id="{8FD46BB3-C0C0-42DD-A915-951B3E7D476A}" type="datetimeFigureOut">
               <a:rPr lang="pt-BR" smtClean="0"/>
-              <a:t>21/04/2019</a:t>
+              <a:t>22/04/2019</a:t>
             </a:fld>
             <a:endParaRPr lang="pt-BR"/>
           </a:p>
@@ -589,7 +590,7 @@
           <a:p>
             <a:fld id="{8FD46BB3-C0C0-42DD-A915-951B3E7D476A}" type="datetimeFigureOut">
               <a:rPr lang="pt-BR" smtClean="0"/>
-              <a:t>21/04/2019</a:t>
+              <a:t>22/04/2019</a:t>
             </a:fld>
             <a:endParaRPr lang="pt-BR"/>
           </a:p>
@@ -757,7 +758,7 @@
           <a:p>
             <a:fld id="{8FD46BB3-C0C0-42DD-A915-951B3E7D476A}" type="datetimeFigureOut">
               <a:rPr lang="pt-BR" smtClean="0"/>
-              <a:t>21/04/2019</a:t>
+              <a:t>22/04/2019</a:t>
             </a:fld>
             <a:endParaRPr lang="pt-BR"/>
           </a:p>
@@ -1002,7 +1003,7 @@
           <a:p>
             <a:fld id="{8FD46BB3-C0C0-42DD-A915-951B3E7D476A}" type="datetimeFigureOut">
               <a:rPr lang="pt-BR" smtClean="0"/>
-              <a:t>21/04/2019</a:t>
+              <a:t>22/04/2019</a:t>
             </a:fld>
             <a:endParaRPr lang="pt-BR"/>
           </a:p>
@@ -1231,7 +1232,7 @@
           <a:p>
             <a:fld id="{8FD46BB3-C0C0-42DD-A915-951B3E7D476A}" type="datetimeFigureOut">
               <a:rPr lang="pt-BR" smtClean="0"/>
-              <a:t>21/04/2019</a:t>
+              <a:t>22/04/2019</a:t>
             </a:fld>
             <a:endParaRPr lang="pt-BR"/>
           </a:p>
@@ -1595,7 +1596,7 @@
           <a:p>
             <a:fld id="{8FD46BB3-C0C0-42DD-A915-951B3E7D476A}" type="datetimeFigureOut">
               <a:rPr lang="pt-BR" smtClean="0"/>
-              <a:t>21/04/2019</a:t>
+              <a:t>22/04/2019</a:t>
             </a:fld>
             <a:endParaRPr lang="pt-BR"/>
           </a:p>
@@ -1712,7 +1713,7 @@
           <a:p>
             <a:fld id="{8FD46BB3-C0C0-42DD-A915-951B3E7D476A}" type="datetimeFigureOut">
               <a:rPr lang="pt-BR" smtClean="0"/>
-              <a:t>21/04/2019</a:t>
+              <a:t>22/04/2019</a:t>
             </a:fld>
             <a:endParaRPr lang="pt-BR"/>
           </a:p>
@@ -1807,7 +1808,7 @@
           <a:p>
             <a:fld id="{8FD46BB3-C0C0-42DD-A915-951B3E7D476A}" type="datetimeFigureOut">
               <a:rPr lang="pt-BR" smtClean="0"/>
-              <a:t>21/04/2019</a:t>
+              <a:t>22/04/2019</a:t>
             </a:fld>
             <a:endParaRPr lang="pt-BR"/>
           </a:p>
@@ -2082,7 +2083,7 @@
           <a:p>
             <a:fld id="{8FD46BB3-C0C0-42DD-A915-951B3E7D476A}" type="datetimeFigureOut">
               <a:rPr lang="pt-BR" smtClean="0"/>
-              <a:t>21/04/2019</a:t>
+              <a:t>22/04/2019</a:t>
             </a:fld>
             <a:endParaRPr lang="pt-BR"/>
           </a:p>
@@ -2334,7 +2335,7 @@
           <a:p>
             <a:fld id="{8FD46BB3-C0C0-42DD-A915-951B3E7D476A}" type="datetimeFigureOut">
               <a:rPr lang="pt-BR" smtClean="0"/>
-              <a:t>21/04/2019</a:t>
+              <a:t>22/04/2019</a:t>
             </a:fld>
             <a:endParaRPr lang="pt-BR"/>
           </a:p>
@@ -2548,7 +2549,7 @@
           <a:p>
             <a:fld id="{8FD46BB3-C0C0-42DD-A915-951B3E7D476A}" type="datetimeFigureOut">
               <a:rPr lang="pt-BR" smtClean="0"/>
-              <a:t>21/04/2019</a:t>
+              <a:t>22/04/2019</a:t>
             </a:fld>
             <a:endParaRPr lang="pt-BR"/>
           </a:p>
@@ -3374,10 +3375,1496 @@
       <p:transition spd="slow" advClick="0"/>
     </mc:Fallback>
   </mc:AlternateContent>
+  <p:timing>
+    <p:tnLst>
+      <p:par>
+        <p:cTn id="1" dur="indefinite" restart="never" nodeType="tmRoot"/>
+      </p:par>
+    </p:tnLst>
+  </p:timing>
 </p:sld>
 </file>
 
 <file path=ppt/slides/slide2.xml><?xml version="1.0" encoding="utf-8"?>
+<p:sld xmlns:a="http://schemas.openxmlformats.org/drawingml/2006/main" xmlns:r="http://schemas.openxmlformats.org/officeDocument/2006/relationships" xmlns:p="http://schemas.openxmlformats.org/presentationml/2006/main">
+  <p:cSld>
+    <p:spTree>
+      <p:nvGrpSpPr>
+        <p:cNvPr id="1" name=""/>
+        <p:cNvGrpSpPr/>
+        <p:nvPr/>
+      </p:nvGrpSpPr>
+      <p:grpSpPr>
+        <a:xfrm>
+          <a:off x="0" y="0"/>
+          <a:ext cx="0" cy="0"/>
+          <a:chOff x="0" y="0"/>
+          <a:chExt cx="0" cy="0"/>
+        </a:xfrm>
+      </p:grpSpPr>
+      <p:sp>
+        <p:nvSpPr>
+          <p:cNvPr id="4" name="Retângulo 3"/>
+          <p:cNvSpPr/>
+          <p:nvPr/>
+        </p:nvSpPr>
+        <p:spPr>
+          <a:xfrm>
+            <a:off x="0" y="0"/>
+            <a:ext cx="12192000" cy="660400"/>
+          </a:xfrm>
+          <a:prstGeom prst="rect">
+            <a:avLst/>
+          </a:prstGeom>
+          <a:solidFill>
+            <a:srgbClr val="383C42"/>
+          </a:solidFill>
+          <a:ln>
+            <a:noFill/>
+          </a:ln>
+        </p:spPr>
+        <p:style>
+          <a:lnRef idx="2">
+            <a:schemeClr val="accent1">
+              <a:shade val="50000"/>
+            </a:schemeClr>
+          </a:lnRef>
+          <a:fillRef idx="1">
+            <a:schemeClr val="accent1"/>
+          </a:fillRef>
+          <a:effectRef idx="0">
+            <a:schemeClr val="accent1"/>
+          </a:effectRef>
+          <a:fontRef idx="minor">
+            <a:schemeClr val="lt1"/>
+          </a:fontRef>
+        </p:style>
+        <p:txBody>
+          <a:bodyPr rtlCol="0" anchor="ctr"/>
+          <a:lstStyle/>
+          <a:p>
+            <a:pPr algn="ctr"/>
+            <a:endParaRPr lang="pt-BR"/>
+          </a:p>
+        </p:txBody>
+      </p:sp>
+      <p:grpSp>
+        <p:nvGrpSpPr>
+          <p:cNvPr id="5" name="Agrupar 4"/>
+          <p:cNvGrpSpPr/>
+          <p:nvPr/>
+        </p:nvGrpSpPr>
+        <p:grpSpPr>
+          <a:xfrm>
+            <a:off x="116680" y="130145"/>
+            <a:ext cx="2717800" cy="400110"/>
+            <a:chOff x="116680" y="130145"/>
+            <a:chExt cx="2717800" cy="400110"/>
+          </a:xfrm>
+        </p:grpSpPr>
+        <p:sp>
+          <p:nvSpPr>
+            <p:cNvPr id="6" name="CaixaDeTexto 5"/>
+            <p:cNvSpPr txBox="1"/>
+            <p:nvPr/>
+          </p:nvSpPr>
+          <p:spPr>
+            <a:xfrm>
+              <a:off x="1170780" y="130145"/>
+              <a:ext cx="1663700" cy="400110"/>
+            </a:xfrm>
+            <a:prstGeom prst="rect">
+              <a:avLst/>
+            </a:prstGeom>
+            <a:noFill/>
+          </p:spPr>
+          <p:txBody>
+            <a:bodyPr wrap="square" rtlCol="0">
+              <a:spAutoFit/>
+            </a:bodyPr>
+            <a:lstStyle/>
+            <a:p>
+              <a:pPr algn="ctr"/>
+              <a:r>
+                <a:rPr lang="pt-BR" sz="2000" dirty="0">
+                  <a:solidFill>
+                    <a:srgbClr val="FF3F3F"/>
+                  </a:solidFill>
+                  <a:latin typeface="Century Gothic" panose="020B0502020202020204" pitchFamily="34" charset="0"/>
+                </a:rPr>
+                <a:t>CHAMPION</a:t>
+              </a:r>
+            </a:p>
+          </p:txBody>
+        </p:sp>
+        <p:sp>
+          <p:nvSpPr>
+            <p:cNvPr id="7" name="CaixaDeTexto 6"/>
+            <p:cNvSpPr txBox="1"/>
+            <p:nvPr/>
+          </p:nvSpPr>
+          <p:spPr>
+            <a:xfrm>
+              <a:off x="116680" y="130145"/>
+              <a:ext cx="1257300" cy="400110"/>
+            </a:xfrm>
+            <a:prstGeom prst="rect">
+              <a:avLst/>
+            </a:prstGeom>
+            <a:noFill/>
+          </p:spPr>
+          <p:txBody>
+            <a:bodyPr wrap="square" rtlCol="0">
+              <a:spAutoFit/>
+            </a:bodyPr>
+            <a:lstStyle/>
+            <a:p>
+              <a:pPr algn="ctr"/>
+              <a:r>
+                <a:rPr lang="pt-BR" sz="2000" dirty="0">
+                  <a:solidFill>
+                    <a:srgbClr val="96A0A0"/>
+                  </a:solidFill>
+                  <a:latin typeface="Century Gothic" panose="020B0502020202020204" pitchFamily="34" charset="0"/>
+                </a:rPr>
+                <a:t>STREAM</a:t>
+              </a:r>
+            </a:p>
+          </p:txBody>
+        </p:sp>
+      </p:grpSp>
+      <p:sp>
+        <p:nvSpPr>
+          <p:cNvPr id="8" name="CaixaDeTexto 7"/>
+          <p:cNvSpPr txBox="1"/>
+          <p:nvPr/>
+        </p:nvSpPr>
+        <p:spPr>
+          <a:xfrm>
+            <a:off x="10664826" y="137977"/>
+            <a:ext cx="1111526" cy="369332"/>
+          </a:xfrm>
+          <a:prstGeom prst="rect">
+            <a:avLst/>
+          </a:prstGeom>
+          <a:noFill/>
+        </p:spPr>
+        <p:txBody>
+          <a:bodyPr wrap="square" rtlCol="0">
+            <a:spAutoFit/>
+          </a:bodyPr>
+          <a:lstStyle/>
+          <a:p>
+            <a:pPr algn="ctr"/>
+            <a:r>
+              <a:rPr lang="pt-BR" dirty="0">
+                <a:solidFill>
+                  <a:srgbClr val="96A0A0"/>
+                </a:solidFill>
+                <a:latin typeface="Century Gothic" panose="020B0502020202020204" pitchFamily="34" charset="0"/>
+              </a:rPr>
+              <a:t>Lucas</a:t>
+            </a:r>
+          </a:p>
+        </p:txBody>
+      </p:sp>
+      <p:sp>
+        <p:nvSpPr>
+          <p:cNvPr id="9" name="Retângulo 8"/>
+          <p:cNvSpPr/>
+          <p:nvPr/>
+        </p:nvSpPr>
+        <p:spPr>
+          <a:xfrm>
+            <a:off x="0" y="660400"/>
+            <a:ext cx="2946401" cy="6197600"/>
+          </a:xfrm>
+          <a:prstGeom prst="rect">
+            <a:avLst/>
+          </a:prstGeom>
+          <a:solidFill>
+            <a:srgbClr val="383C42"/>
+          </a:solidFill>
+          <a:ln>
+            <a:noFill/>
+          </a:ln>
+        </p:spPr>
+        <p:style>
+          <a:lnRef idx="2">
+            <a:schemeClr val="accent1">
+              <a:shade val="50000"/>
+            </a:schemeClr>
+          </a:lnRef>
+          <a:fillRef idx="1">
+            <a:schemeClr val="accent1"/>
+          </a:fillRef>
+          <a:effectRef idx="0">
+            <a:schemeClr val="accent1"/>
+          </a:effectRef>
+          <a:fontRef idx="minor">
+            <a:schemeClr val="lt1"/>
+          </a:fontRef>
+        </p:style>
+        <p:txBody>
+          <a:bodyPr rtlCol="0" anchor="ctr"/>
+          <a:lstStyle/>
+          <a:p>
+            <a:pPr algn="ctr"/>
+            <a:endParaRPr lang="pt-BR"/>
+          </a:p>
+        </p:txBody>
+      </p:sp>
+      <p:sp>
+        <p:nvSpPr>
+          <p:cNvPr id="10" name="Retângulo 9">
+            <a:extLst>
+              <a:ext uri="{FF2B5EF4-FFF2-40B4-BE49-F238E27FC236}">
+                <a16:creationId xmlns:a16="http://schemas.microsoft.com/office/drawing/2014/main" id="{C705C556-7A01-4E74-9922-7A1755841669}"/>
+              </a:ext>
+            </a:extLst>
+          </p:cNvPr>
+          <p:cNvSpPr/>
+          <p:nvPr/>
+        </p:nvSpPr>
+        <p:spPr>
+          <a:xfrm>
+            <a:off x="0" y="660400"/>
+            <a:ext cx="2946399" cy="660400"/>
+          </a:xfrm>
+          <a:prstGeom prst="rect">
+            <a:avLst/>
+          </a:prstGeom>
+          <a:solidFill>
+            <a:srgbClr val="43484F"/>
+          </a:solidFill>
+          <a:ln>
+            <a:noFill/>
+          </a:ln>
+        </p:spPr>
+        <p:style>
+          <a:lnRef idx="2">
+            <a:schemeClr val="accent1">
+              <a:shade val="50000"/>
+            </a:schemeClr>
+          </a:lnRef>
+          <a:fillRef idx="1">
+            <a:schemeClr val="accent1"/>
+          </a:fillRef>
+          <a:effectRef idx="0">
+            <a:schemeClr val="accent1"/>
+          </a:effectRef>
+          <a:fontRef idx="minor">
+            <a:schemeClr val="lt1"/>
+          </a:fontRef>
+        </p:style>
+        <p:txBody>
+          <a:bodyPr rtlCol="0" anchor="ctr"/>
+          <a:lstStyle/>
+          <a:p>
+            <a:pPr algn="ctr"/>
+            <a:endParaRPr lang="pt-BR"/>
+          </a:p>
+        </p:txBody>
+      </p:sp>
+      <p:sp>
+        <p:nvSpPr>
+          <p:cNvPr id="11" name="CaixaDeTexto 10"/>
+          <p:cNvSpPr txBox="1"/>
+          <p:nvPr/>
+        </p:nvSpPr>
+        <p:spPr>
+          <a:xfrm>
+            <a:off x="527002" y="823368"/>
+            <a:ext cx="2062148" cy="307777"/>
+          </a:xfrm>
+          <a:prstGeom prst="rect">
+            <a:avLst/>
+          </a:prstGeom>
+          <a:noFill/>
+        </p:spPr>
+        <p:txBody>
+          <a:bodyPr wrap="square" rtlCol="0">
+            <a:spAutoFit/>
+          </a:bodyPr>
+          <a:lstStyle/>
+          <a:p>
+            <a:pPr algn="ctr"/>
+            <a:r>
+              <a:rPr lang="pt-BR" sz="1400" dirty="0">
+                <a:solidFill>
+                  <a:srgbClr val="8E959E"/>
+                </a:solidFill>
+                <a:latin typeface="Century Gothic" panose="020B0502020202020204" pitchFamily="34" charset="0"/>
+              </a:rPr>
+              <a:t>Campeonatos</a:t>
+            </a:r>
+          </a:p>
+        </p:txBody>
+      </p:sp>
+      <p:pic>
+        <p:nvPicPr>
+          <p:cNvPr id="12" name="Picture 2" descr="Resultado de imagem para user icon"/>
+          <p:cNvPicPr>
+            <a:picLocks noChangeAspect="1" noChangeArrowheads="1"/>
+          </p:cNvPicPr>
+          <p:nvPr/>
+        </p:nvPicPr>
+        <p:blipFill>
+          <a:blip r:embed="rId2" cstate="print">
+            <a:lum bright="70000" contrast="-70000"/>
+            <a:extLst>
+              <a:ext uri="{28A0092B-C50C-407E-A947-70E740481C1C}">
+                <a14:useLocalDpi xmlns:a14="http://schemas.microsoft.com/office/drawing/2010/main" val="0"/>
+              </a:ext>
+            </a:extLst>
+          </a:blip>
+          <a:srcRect/>
+          <a:stretch>
+            <a:fillRect/>
+          </a:stretch>
+        </p:blipFill>
+        <p:spPr bwMode="auto">
+          <a:xfrm>
+            <a:off x="11692007" y="153090"/>
+            <a:ext cx="354219" cy="354219"/>
+          </a:xfrm>
+          <a:prstGeom prst="rect">
+            <a:avLst/>
+          </a:prstGeom>
+          <a:noFill/>
+          <a:extLst>
+            <a:ext uri="{909E8E84-426E-40DD-AFC4-6F175D3DCCD1}">
+              <a14:hiddenFill xmlns:a14="http://schemas.microsoft.com/office/drawing/2010/main">
+                <a:solidFill>
+                  <a:srgbClr val="FFFFFF"/>
+                </a:solidFill>
+              </a14:hiddenFill>
+            </a:ext>
+          </a:extLst>
+        </p:spPr>
+      </p:pic>
+      <p:grpSp>
+        <p:nvGrpSpPr>
+          <p:cNvPr id="13" name="Agrupar 12"/>
+          <p:cNvGrpSpPr/>
+          <p:nvPr/>
+        </p:nvGrpSpPr>
+        <p:grpSpPr>
+          <a:xfrm>
+            <a:off x="228900" y="865016"/>
+            <a:ext cx="219104" cy="219104"/>
+            <a:chOff x="116680" y="900935"/>
+            <a:chExt cx="289720" cy="289720"/>
+          </a:xfrm>
+        </p:grpSpPr>
+        <p:sp>
+          <p:nvSpPr>
+            <p:cNvPr id="14" name="Estrela de 5 Pontas 13"/>
+            <p:cNvSpPr/>
+            <p:nvPr/>
+          </p:nvSpPr>
+          <p:spPr>
+            <a:xfrm>
+              <a:off x="175432" y="959687"/>
+              <a:ext cx="172215" cy="172215"/>
+            </a:xfrm>
+            <a:prstGeom prst="star5">
+              <a:avLst/>
+            </a:prstGeom>
+            <a:solidFill>
+              <a:srgbClr val="F54747"/>
+            </a:solidFill>
+            <a:ln>
+              <a:noFill/>
+            </a:ln>
+          </p:spPr>
+          <p:style>
+            <a:lnRef idx="2">
+              <a:schemeClr val="accent1">
+                <a:shade val="50000"/>
+              </a:schemeClr>
+            </a:lnRef>
+            <a:fillRef idx="1">
+              <a:schemeClr val="accent1"/>
+            </a:fillRef>
+            <a:effectRef idx="0">
+              <a:schemeClr val="accent1"/>
+            </a:effectRef>
+            <a:fontRef idx="minor">
+              <a:schemeClr val="lt1"/>
+            </a:fontRef>
+          </p:style>
+          <p:txBody>
+            <a:bodyPr rtlCol="0" anchor="ctr"/>
+            <a:lstStyle/>
+            <a:p>
+              <a:pPr algn="ctr"/>
+              <a:endParaRPr lang="pt-BR"/>
+            </a:p>
+          </p:txBody>
+        </p:sp>
+        <p:sp>
+          <p:nvSpPr>
+            <p:cNvPr id="15" name="Elipse 14"/>
+            <p:cNvSpPr/>
+            <p:nvPr/>
+          </p:nvSpPr>
+          <p:spPr>
+            <a:xfrm>
+              <a:off x="116680" y="900935"/>
+              <a:ext cx="289720" cy="289720"/>
+            </a:xfrm>
+            <a:prstGeom prst="ellipse">
+              <a:avLst/>
+            </a:prstGeom>
+            <a:noFill/>
+            <a:ln w="28575">
+              <a:solidFill>
+                <a:srgbClr val="F54747"/>
+              </a:solidFill>
+            </a:ln>
+          </p:spPr>
+          <p:style>
+            <a:lnRef idx="2">
+              <a:schemeClr val="accent1">
+                <a:shade val="50000"/>
+              </a:schemeClr>
+            </a:lnRef>
+            <a:fillRef idx="1">
+              <a:schemeClr val="accent1"/>
+            </a:fillRef>
+            <a:effectRef idx="0">
+              <a:schemeClr val="accent1"/>
+            </a:effectRef>
+            <a:fontRef idx="minor">
+              <a:schemeClr val="lt1"/>
+            </a:fontRef>
+          </p:style>
+          <p:txBody>
+            <a:bodyPr rtlCol="0" anchor="ctr"/>
+            <a:lstStyle/>
+            <a:p>
+              <a:pPr algn="ctr"/>
+              <a:endParaRPr lang="pt-BR" dirty="0"/>
+            </a:p>
+          </p:txBody>
+        </p:sp>
+      </p:grpSp>
+      <p:cxnSp>
+        <p:nvCxnSpPr>
+          <p:cNvPr id="16" name="Conector reto 15"/>
+          <p:cNvCxnSpPr/>
+          <p:nvPr/>
+        </p:nvCxnSpPr>
+        <p:spPr>
+          <a:xfrm>
+            <a:off x="653967" y="766591"/>
+            <a:ext cx="0" cy="425450"/>
+          </a:xfrm>
+          <a:prstGeom prst="line">
+            <a:avLst/>
+          </a:prstGeom>
+          <a:ln>
+            <a:solidFill>
+              <a:srgbClr val="51575F"/>
+            </a:solidFill>
+          </a:ln>
+        </p:spPr>
+        <p:style>
+          <a:lnRef idx="1">
+            <a:schemeClr val="accent1"/>
+          </a:lnRef>
+          <a:fillRef idx="0">
+            <a:schemeClr val="accent1"/>
+          </a:fillRef>
+          <a:effectRef idx="0">
+            <a:schemeClr val="accent1"/>
+          </a:effectRef>
+          <a:fontRef idx="minor">
+            <a:schemeClr val="tx1"/>
+          </a:fontRef>
+        </p:style>
+      </p:cxnSp>
+      <p:sp>
+        <p:nvSpPr>
+          <p:cNvPr id="17" name="CaixaDeTexto 16"/>
+          <p:cNvSpPr txBox="1"/>
+          <p:nvPr/>
+        </p:nvSpPr>
+        <p:spPr>
+          <a:xfrm>
+            <a:off x="6352580" y="122588"/>
+            <a:ext cx="2905920" cy="400110"/>
+          </a:xfrm>
+          <a:prstGeom prst="rect">
+            <a:avLst/>
+          </a:prstGeom>
+          <a:noFill/>
+        </p:spPr>
+        <p:txBody>
+          <a:bodyPr wrap="square" rtlCol="0">
+            <a:spAutoFit/>
+          </a:bodyPr>
+          <a:lstStyle/>
+          <a:p>
+            <a:r>
+              <a:rPr lang="pt-BR" sz="2000" dirty="0">
+                <a:solidFill>
+                  <a:srgbClr val="FF3F3F"/>
+                </a:solidFill>
+                <a:latin typeface="Century Gothic" panose="020B0502020202020204" pitchFamily="34" charset="0"/>
+              </a:rPr>
+              <a:t>Nome </a:t>
+            </a:r>
+            <a:r>
+              <a:rPr lang="pt-BR" sz="2000" dirty="0" smtClean="0">
+                <a:solidFill>
+                  <a:srgbClr val="FF3F3F"/>
+                </a:solidFill>
+                <a:latin typeface="Century Gothic" panose="020B0502020202020204" pitchFamily="34" charset="0"/>
+              </a:rPr>
+              <a:t>Empresa</a:t>
+            </a:r>
+            <a:endParaRPr lang="pt-BR" sz="2000" dirty="0">
+              <a:solidFill>
+                <a:srgbClr val="FF3F3F"/>
+              </a:solidFill>
+              <a:latin typeface="Century Gothic" panose="020B0502020202020204" pitchFamily="34" charset="0"/>
+            </a:endParaRPr>
+          </a:p>
+        </p:txBody>
+      </p:sp>
+      <p:sp>
+        <p:nvSpPr>
+          <p:cNvPr id="18" name="CaixaDeTexto 17"/>
+          <p:cNvSpPr txBox="1"/>
+          <p:nvPr/>
+        </p:nvSpPr>
+        <p:spPr>
+          <a:xfrm>
+            <a:off x="4544020" y="194685"/>
+            <a:ext cx="1551980" cy="276999"/>
+          </a:xfrm>
+          <a:prstGeom prst="rect">
+            <a:avLst/>
+          </a:prstGeom>
+          <a:noFill/>
+        </p:spPr>
+        <p:txBody>
+          <a:bodyPr wrap="square" rtlCol="0">
+            <a:spAutoFit/>
+          </a:bodyPr>
+          <a:lstStyle/>
+          <a:p>
+            <a:pPr algn="r"/>
+            <a:r>
+              <a:rPr lang="pt-BR" sz="1200" dirty="0" smtClean="0">
+                <a:solidFill>
+                  <a:srgbClr val="96A0A0"/>
+                </a:solidFill>
+                <a:latin typeface="Century Gothic" panose="020B0502020202020204" pitchFamily="34" charset="0"/>
+              </a:rPr>
+              <a:t>EMPRESA</a:t>
+            </a:r>
+            <a:endParaRPr lang="pt-BR" sz="1200" dirty="0">
+              <a:solidFill>
+                <a:srgbClr val="96A0A0"/>
+              </a:solidFill>
+              <a:latin typeface="Century Gothic" panose="020B0502020202020204" pitchFamily="34" charset="0"/>
+            </a:endParaRPr>
+          </a:p>
+        </p:txBody>
+      </p:sp>
+      <p:cxnSp>
+        <p:nvCxnSpPr>
+          <p:cNvPr id="19" name="Conector reto 18"/>
+          <p:cNvCxnSpPr/>
+          <p:nvPr/>
+        </p:nvCxnSpPr>
+        <p:spPr>
+          <a:xfrm>
+            <a:off x="6203739" y="153090"/>
+            <a:ext cx="0" cy="346647"/>
+          </a:xfrm>
+          <a:prstGeom prst="line">
+            <a:avLst/>
+          </a:prstGeom>
+          <a:ln>
+            <a:solidFill>
+              <a:srgbClr val="51575F"/>
+            </a:solidFill>
+          </a:ln>
+        </p:spPr>
+        <p:style>
+          <a:lnRef idx="1">
+            <a:schemeClr val="accent1"/>
+          </a:lnRef>
+          <a:fillRef idx="0">
+            <a:schemeClr val="accent1"/>
+          </a:fillRef>
+          <a:effectRef idx="0">
+            <a:schemeClr val="accent1"/>
+          </a:effectRef>
+          <a:fontRef idx="minor">
+            <a:schemeClr val="tx1"/>
+          </a:fontRef>
+        </p:style>
+      </p:cxnSp>
+      <p:sp>
+        <p:nvSpPr>
+          <p:cNvPr id="20" name="CaixaDeTexto 19"/>
+          <p:cNvSpPr txBox="1"/>
+          <p:nvPr/>
+        </p:nvSpPr>
+        <p:spPr>
+          <a:xfrm>
+            <a:off x="221755" y="1483768"/>
+            <a:ext cx="2062148" cy="307777"/>
+          </a:xfrm>
+          <a:prstGeom prst="rect">
+            <a:avLst/>
+          </a:prstGeom>
+          <a:noFill/>
+        </p:spPr>
+        <p:txBody>
+          <a:bodyPr wrap="square" rtlCol="0">
+            <a:spAutoFit/>
+          </a:bodyPr>
+          <a:lstStyle/>
+          <a:p>
+            <a:pPr algn="ctr"/>
+            <a:r>
+              <a:rPr lang="pt-BR" sz="1400" dirty="0" err="1">
+                <a:solidFill>
+                  <a:srgbClr val="8E959E"/>
+                </a:solidFill>
+                <a:latin typeface="Century Gothic" panose="020B0502020202020204" pitchFamily="34" charset="0"/>
+              </a:rPr>
+              <a:t>Stream</a:t>
+            </a:r>
+            <a:endParaRPr lang="pt-BR" sz="1400" dirty="0">
+              <a:solidFill>
+                <a:srgbClr val="8E959E"/>
+              </a:solidFill>
+              <a:latin typeface="Century Gothic" panose="020B0502020202020204" pitchFamily="34" charset="0"/>
+            </a:endParaRPr>
+          </a:p>
+        </p:txBody>
+      </p:sp>
+      <p:cxnSp>
+        <p:nvCxnSpPr>
+          <p:cNvPr id="21" name="Conector reto 20"/>
+          <p:cNvCxnSpPr/>
+          <p:nvPr/>
+        </p:nvCxnSpPr>
+        <p:spPr>
+          <a:xfrm>
+            <a:off x="653967" y="1437802"/>
+            <a:ext cx="0" cy="425450"/>
+          </a:xfrm>
+          <a:prstGeom prst="line">
+            <a:avLst/>
+          </a:prstGeom>
+          <a:ln>
+            <a:solidFill>
+              <a:srgbClr val="51575F"/>
+            </a:solidFill>
+          </a:ln>
+        </p:spPr>
+        <p:style>
+          <a:lnRef idx="1">
+            <a:schemeClr val="accent1"/>
+          </a:lnRef>
+          <a:fillRef idx="0">
+            <a:schemeClr val="accent1"/>
+          </a:fillRef>
+          <a:effectRef idx="0">
+            <a:schemeClr val="accent1"/>
+          </a:effectRef>
+          <a:fontRef idx="minor">
+            <a:schemeClr val="tx1"/>
+          </a:fontRef>
+        </p:style>
+      </p:cxnSp>
+      <p:sp>
+        <p:nvSpPr>
+          <p:cNvPr id="22" name="Retângulo 21">
+            <a:extLst>
+              <a:ext uri="{FF2B5EF4-FFF2-40B4-BE49-F238E27FC236}">
+                <a16:creationId xmlns:a16="http://schemas.microsoft.com/office/drawing/2014/main" id="{8E319368-83DC-4BBE-BF59-CF1093CA0BBE}"/>
+              </a:ext>
+            </a:extLst>
+          </p:cNvPr>
+          <p:cNvSpPr/>
+          <p:nvPr/>
+        </p:nvSpPr>
+        <p:spPr>
+          <a:xfrm>
+            <a:off x="-1355" y="660400"/>
+            <a:ext cx="45719" cy="660400"/>
+          </a:xfrm>
+          <a:prstGeom prst="rect">
+            <a:avLst/>
+          </a:prstGeom>
+          <a:solidFill>
+            <a:srgbClr val="F54747"/>
+          </a:solidFill>
+          <a:ln>
+            <a:noFill/>
+          </a:ln>
+        </p:spPr>
+        <p:style>
+          <a:lnRef idx="2">
+            <a:schemeClr val="accent1">
+              <a:shade val="50000"/>
+            </a:schemeClr>
+          </a:lnRef>
+          <a:fillRef idx="1">
+            <a:schemeClr val="accent1"/>
+          </a:fillRef>
+          <a:effectRef idx="0">
+            <a:schemeClr val="accent1"/>
+          </a:effectRef>
+          <a:fontRef idx="minor">
+            <a:schemeClr val="lt1"/>
+          </a:fontRef>
+        </p:style>
+        <p:txBody>
+          <a:bodyPr rtlCol="0" anchor="ctr"/>
+          <a:lstStyle/>
+          <a:p>
+            <a:pPr algn="ctr"/>
+            <a:endParaRPr lang="pt-BR"/>
+          </a:p>
+        </p:txBody>
+      </p:sp>
+      <p:pic>
+        <p:nvPicPr>
+          <p:cNvPr id="23" name="Imagem 22">
+            <a:extLst>
+              <a:ext uri="{FF2B5EF4-FFF2-40B4-BE49-F238E27FC236}">
+                <a16:creationId xmlns:a16="http://schemas.microsoft.com/office/drawing/2014/main" id="{2D9BF9F2-DF69-444D-A7DE-C8EDFEB24E9A}"/>
+              </a:ext>
+            </a:extLst>
+          </p:cNvPr>
+          <p:cNvPicPr>
+            <a:picLocks noChangeAspect="1"/>
+          </p:cNvPicPr>
+          <p:nvPr/>
+        </p:nvPicPr>
+        <p:blipFill>
+          <a:blip r:embed="rId3" cstate="print">
+            <a:extLst>
+              <a:ext uri="{28A0092B-C50C-407E-A947-70E740481C1C}">
+                <a14:useLocalDpi xmlns:a14="http://schemas.microsoft.com/office/drawing/2010/main" val="0"/>
+              </a:ext>
+            </a:extLst>
+          </a:blip>
+          <a:stretch>
+            <a:fillRect/>
+          </a:stretch>
+        </p:blipFill>
+        <p:spPr>
+          <a:xfrm>
+            <a:off x="195299" y="1494503"/>
+            <a:ext cx="286306" cy="286306"/>
+          </a:xfrm>
+          <a:prstGeom prst="rect">
+            <a:avLst/>
+          </a:prstGeom>
+        </p:spPr>
+      </p:pic>
+      <p:sp>
+        <p:nvSpPr>
+          <p:cNvPr id="24" name="Retângulo 23">
+            <a:hlinkClick r:id="rId4" action="ppaction://hlinksldjump"/>
+            <a:extLst>
+              <a:ext uri="{FF2B5EF4-FFF2-40B4-BE49-F238E27FC236}">
+                <a16:creationId xmlns:a16="http://schemas.microsoft.com/office/drawing/2014/main" id="{3BB04BED-09EA-4F10-A182-1371CCA30217}"/>
+              </a:ext>
+            </a:extLst>
+          </p:cNvPr>
+          <p:cNvSpPr/>
+          <p:nvPr/>
+        </p:nvSpPr>
+        <p:spPr>
+          <a:xfrm>
+            <a:off x="0" y="1315402"/>
+            <a:ext cx="2945320" cy="660400"/>
+          </a:xfrm>
+          <a:prstGeom prst="rect">
+            <a:avLst/>
+          </a:prstGeom>
+          <a:solidFill>
+            <a:srgbClr val="43484F">
+              <a:alpha val="0"/>
+            </a:srgbClr>
+          </a:solidFill>
+          <a:ln>
+            <a:noFill/>
+          </a:ln>
+        </p:spPr>
+        <p:style>
+          <a:lnRef idx="2">
+            <a:schemeClr val="accent1">
+              <a:shade val="50000"/>
+            </a:schemeClr>
+          </a:lnRef>
+          <a:fillRef idx="1">
+            <a:schemeClr val="accent1"/>
+          </a:fillRef>
+          <a:effectRef idx="0">
+            <a:schemeClr val="accent1"/>
+          </a:effectRef>
+          <a:fontRef idx="minor">
+            <a:schemeClr val="lt1"/>
+          </a:fontRef>
+        </p:style>
+        <p:txBody>
+          <a:bodyPr rtlCol="0" anchor="ctr"/>
+          <a:lstStyle/>
+          <a:p>
+            <a:pPr algn="ctr"/>
+            <a:endParaRPr lang="pt-BR"/>
+          </a:p>
+        </p:txBody>
+      </p:sp>
+      <p:sp>
+        <p:nvSpPr>
+          <p:cNvPr id="25" name="Retângulo 24">
+            <a:extLst>
+              <a:ext uri="{FF2B5EF4-FFF2-40B4-BE49-F238E27FC236}">
+                <a16:creationId xmlns:a16="http://schemas.microsoft.com/office/drawing/2014/main" id="{21CA09FC-C1CE-41AE-A231-35B1C662A7EA}"/>
+              </a:ext>
+            </a:extLst>
+          </p:cNvPr>
+          <p:cNvSpPr/>
+          <p:nvPr/>
+        </p:nvSpPr>
+        <p:spPr>
+          <a:xfrm>
+            <a:off x="3157998" y="865016"/>
+            <a:ext cx="4299916" cy="1420891"/>
+          </a:xfrm>
+          <a:prstGeom prst="rect">
+            <a:avLst/>
+          </a:prstGeom>
+          <a:solidFill>
+            <a:srgbClr val="35393F"/>
+          </a:solidFill>
+          <a:ln>
+            <a:noFill/>
+          </a:ln>
+        </p:spPr>
+        <p:style>
+          <a:lnRef idx="2">
+            <a:schemeClr val="accent1">
+              <a:shade val="50000"/>
+            </a:schemeClr>
+          </a:lnRef>
+          <a:fillRef idx="1">
+            <a:schemeClr val="accent1"/>
+          </a:fillRef>
+          <a:effectRef idx="0">
+            <a:schemeClr val="accent1"/>
+          </a:effectRef>
+          <a:fontRef idx="minor">
+            <a:schemeClr val="lt1"/>
+          </a:fontRef>
+        </p:style>
+        <p:txBody>
+          <a:bodyPr rtlCol="0" anchor="ctr"/>
+          <a:lstStyle/>
+          <a:p>
+            <a:pPr algn="ctr"/>
+            <a:endParaRPr lang="pt-BR"/>
+          </a:p>
+        </p:txBody>
+      </p:sp>
+      <p:sp>
+        <p:nvSpPr>
+          <p:cNvPr id="26" name="Retângulo 25">
+            <a:extLst>
+              <a:ext uri="{FF2B5EF4-FFF2-40B4-BE49-F238E27FC236}">
+                <a16:creationId xmlns:a16="http://schemas.microsoft.com/office/drawing/2014/main" id="{C368B579-8001-4B67-9E7F-D31C70ADCC8E}"/>
+              </a:ext>
+            </a:extLst>
+          </p:cNvPr>
+          <p:cNvSpPr/>
+          <p:nvPr/>
+        </p:nvSpPr>
+        <p:spPr>
+          <a:xfrm>
+            <a:off x="7688145" y="881063"/>
+            <a:ext cx="4299916" cy="1420891"/>
+          </a:xfrm>
+          <a:prstGeom prst="rect">
+            <a:avLst/>
+          </a:prstGeom>
+          <a:solidFill>
+            <a:srgbClr val="35393F"/>
+          </a:solidFill>
+          <a:ln>
+            <a:noFill/>
+          </a:ln>
+        </p:spPr>
+        <p:style>
+          <a:lnRef idx="2">
+            <a:schemeClr val="accent1">
+              <a:shade val="50000"/>
+            </a:schemeClr>
+          </a:lnRef>
+          <a:fillRef idx="1">
+            <a:schemeClr val="accent1"/>
+          </a:fillRef>
+          <a:effectRef idx="0">
+            <a:schemeClr val="accent1"/>
+          </a:effectRef>
+          <a:fontRef idx="minor">
+            <a:schemeClr val="lt1"/>
+          </a:fontRef>
+        </p:style>
+        <p:txBody>
+          <a:bodyPr rtlCol="0" anchor="ctr"/>
+          <a:lstStyle/>
+          <a:p>
+            <a:pPr algn="ctr"/>
+            <a:endParaRPr lang="pt-BR"/>
+          </a:p>
+        </p:txBody>
+      </p:sp>
+      <p:pic>
+        <p:nvPicPr>
+          <p:cNvPr id="28" name="Picture 10" descr="Resultado de imagem para youtube icon">
+            <a:extLst>
+              <a:ext uri="{FF2B5EF4-FFF2-40B4-BE49-F238E27FC236}">
+                <a16:creationId xmlns:a16="http://schemas.microsoft.com/office/drawing/2014/main" id="{E39AE99F-1A92-46AC-96BE-4ED4F0974D28}"/>
+              </a:ext>
+            </a:extLst>
+          </p:cNvPr>
+          <p:cNvPicPr>
+            <a:picLocks noChangeAspect="1" noChangeArrowheads="1"/>
+          </p:cNvPicPr>
+          <p:nvPr/>
+        </p:nvPicPr>
+        <p:blipFill>
+          <a:blip r:embed="rId5" cstate="print">
+            <a:extLst>
+              <a:ext uri="{BEBA8EAE-BF5A-486C-A8C5-ECC9F3942E4B}">
+                <a14:imgProps xmlns:a14="http://schemas.microsoft.com/office/drawing/2010/main">
+                  <a14:imgLayer r:embed="rId6">
+                    <a14:imgEffect>
+                      <a14:brightnessContrast contrast="-27000"/>
+                    </a14:imgEffect>
+                  </a14:imgLayer>
+                </a14:imgProps>
+              </a:ext>
+              <a:ext uri="{28A0092B-C50C-407E-A947-70E740481C1C}">
+                <a14:useLocalDpi xmlns:a14="http://schemas.microsoft.com/office/drawing/2010/main" val="0"/>
+              </a:ext>
+            </a:extLst>
+          </a:blip>
+          <a:srcRect/>
+          <a:stretch>
+            <a:fillRect/>
+          </a:stretch>
+        </p:blipFill>
+        <p:spPr bwMode="auto">
+          <a:xfrm>
+            <a:off x="8002875" y="1162302"/>
+            <a:ext cx="833194" cy="833194"/>
+          </a:xfrm>
+          <a:prstGeom prst="rect">
+            <a:avLst/>
+          </a:prstGeom>
+          <a:noFill/>
+          <a:extLst>
+            <a:ext uri="{909E8E84-426E-40DD-AFC4-6F175D3DCCD1}">
+              <a14:hiddenFill xmlns:a14="http://schemas.microsoft.com/office/drawing/2010/main">
+                <a:solidFill>
+                  <a:srgbClr val="FFFFFF"/>
+                </a:solidFill>
+              </a14:hiddenFill>
+            </a:ext>
+          </a:extLst>
+        </p:spPr>
+      </p:pic>
+      <p:sp>
+        <p:nvSpPr>
+          <p:cNvPr id="29" name="Retângulo 28">
+            <a:extLst>
+              <a:ext uri="{FF2B5EF4-FFF2-40B4-BE49-F238E27FC236}">
+                <a16:creationId xmlns:a16="http://schemas.microsoft.com/office/drawing/2014/main" id="{986FB9E3-D1C0-4262-9B2C-A7DAEE1F76F6}"/>
+              </a:ext>
+            </a:extLst>
+          </p:cNvPr>
+          <p:cNvSpPr/>
+          <p:nvPr/>
+        </p:nvSpPr>
+        <p:spPr>
+          <a:xfrm>
+            <a:off x="3167315" y="2499146"/>
+            <a:ext cx="4299916" cy="1420891"/>
+          </a:xfrm>
+          <a:prstGeom prst="rect">
+            <a:avLst/>
+          </a:prstGeom>
+          <a:solidFill>
+            <a:srgbClr val="35393F"/>
+          </a:solidFill>
+          <a:ln>
+            <a:noFill/>
+          </a:ln>
+        </p:spPr>
+        <p:style>
+          <a:lnRef idx="2">
+            <a:schemeClr val="accent1">
+              <a:shade val="50000"/>
+            </a:schemeClr>
+          </a:lnRef>
+          <a:fillRef idx="1">
+            <a:schemeClr val="accent1"/>
+          </a:fillRef>
+          <a:effectRef idx="0">
+            <a:schemeClr val="accent1"/>
+          </a:effectRef>
+          <a:fontRef idx="minor">
+            <a:schemeClr val="lt1"/>
+          </a:fontRef>
+        </p:style>
+        <p:txBody>
+          <a:bodyPr rtlCol="0" anchor="ctr"/>
+          <a:lstStyle/>
+          <a:p>
+            <a:pPr algn="ctr"/>
+            <a:endParaRPr lang="pt-BR"/>
+          </a:p>
+        </p:txBody>
+      </p:sp>
+      <p:sp>
+        <p:nvSpPr>
+          <p:cNvPr id="30" name="Retângulo 29">
+            <a:extLst>
+              <a:ext uri="{FF2B5EF4-FFF2-40B4-BE49-F238E27FC236}">
+                <a16:creationId xmlns:a16="http://schemas.microsoft.com/office/drawing/2014/main" id="{B6103B61-BAA5-41E6-8640-F927E985685A}"/>
+              </a:ext>
+            </a:extLst>
+          </p:cNvPr>
+          <p:cNvSpPr/>
+          <p:nvPr/>
+        </p:nvSpPr>
+        <p:spPr>
+          <a:xfrm>
+            <a:off x="7688145" y="2499146"/>
+            <a:ext cx="4299916" cy="1420891"/>
+          </a:xfrm>
+          <a:prstGeom prst="rect">
+            <a:avLst/>
+          </a:prstGeom>
+          <a:solidFill>
+            <a:srgbClr val="35393F"/>
+          </a:solidFill>
+          <a:ln>
+            <a:noFill/>
+          </a:ln>
+        </p:spPr>
+        <p:style>
+          <a:lnRef idx="2">
+            <a:schemeClr val="accent1">
+              <a:shade val="50000"/>
+            </a:schemeClr>
+          </a:lnRef>
+          <a:fillRef idx="1">
+            <a:schemeClr val="accent1"/>
+          </a:fillRef>
+          <a:effectRef idx="0">
+            <a:schemeClr val="accent1"/>
+          </a:effectRef>
+          <a:fontRef idx="minor">
+            <a:schemeClr val="lt1"/>
+          </a:fontRef>
+        </p:style>
+        <p:txBody>
+          <a:bodyPr rtlCol="0" anchor="ctr"/>
+          <a:lstStyle/>
+          <a:p>
+            <a:pPr algn="ctr"/>
+            <a:endParaRPr lang="pt-BR"/>
+          </a:p>
+        </p:txBody>
+      </p:sp>
+      <p:pic>
+        <p:nvPicPr>
+          <p:cNvPr id="31" name="Picture 12" descr="Resultado de imagem para smashcast">
+            <a:extLst>
+              <a:ext uri="{FF2B5EF4-FFF2-40B4-BE49-F238E27FC236}">
+                <a16:creationId xmlns:a16="http://schemas.microsoft.com/office/drawing/2014/main" id="{05136D1A-F45E-482E-894D-5C25653FAB65}"/>
+              </a:ext>
+            </a:extLst>
+          </p:cNvPr>
+          <p:cNvPicPr>
+            <a:picLocks noChangeAspect="1" noChangeArrowheads="1"/>
+          </p:cNvPicPr>
+          <p:nvPr/>
+        </p:nvPicPr>
+        <p:blipFill>
+          <a:blip r:embed="rId7" cstate="print">
+            <a:extLst>
+              <a:ext uri="{28A0092B-C50C-407E-A947-70E740481C1C}">
+                <a14:useLocalDpi xmlns:a14="http://schemas.microsoft.com/office/drawing/2010/main" val="0"/>
+              </a:ext>
+            </a:extLst>
+          </a:blip>
+          <a:srcRect/>
+          <a:stretch>
+            <a:fillRect/>
+          </a:stretch>
+        </p:blipFill>
+        <p:spPr bwMode="auto">
+          <a:xfrm>
+            <a:off x="3444133" y="2817736"/>
+            <a:ext cx="783710" cy="783710"/>
+          </a:xfrm>
+          <a:prstGeom prst="rect">
+            <a:avLst/>
+          </a:prstGeom>
+          <a:noFill/>
+          <a:extLst>
+            <a:ext uri="{909E8E84-426E-40DD-AFC4-6F175D3DCCD1}">
+              <a14:hiddenFill xmlns:a14="http://schemas.microsoft.com/office/drawing/2010/main">
+                <a:solidFill>
+                  <a:srgbClr val="FFFFFF"/>
+                </a:solidFill>
+              </a14:hiddenFill>
+            </a:ext>
+          </a:extLst>
+        </p:spPr>
+      </p:pic>
+      <p:pic>
+        <p:nvPicPr>
+          <p:cNvPr id="32" name="Picture 14" descr="Resultado de imagem para mixer stream">
+            <a:extLst>
+              <a:ext uri="{FF2B5EF4-FFF2-40B4-BE49-F238E27FC236}">
+                <a16:creationId xmlns:a16="http://schemas.microsoft.com/office/drawing/2014/main" id="{20D300FC-FAF8-41BD-BB26-74E48BA2553E}"/>
+              </a:ext>
+            </a:extLst>
+          </p:cNvPr>
+          <p:cNvPicPr>
+            <a:picLocks noChangeAspect="1" noChangeArrowheads="1"/>
+          </p:cNvPicPr>
+          <p:nvPr/>
+        </p:nvPicPr>
+        <p:blipFill>
+          <a:blip r:embed="rId8" cstate="print">
+            <a:extLst>
+              <a:ext uri="{BEBA8EAE-BF5A-486C-A8C5-ECC9F3942E4B}">
+                <a14:imgProps xmlns:a14="http://schemas.microsoft.com/office/drawing/2010/main">
+                  <a14:imgLayer r:embed="rId9">
+                    <a14:imgEffect>
+                      <a14:backgroundRemoval t="9778" b="89778" l="7556" r="92000">
+                        <a14:foregroundMark x1="9333" y1="20444" x2="9333" y2="20444"/>
+                        <a14:foregroundMark x1="74667" y1="32889" x2="74667" y2="32889"/>
+                        <a14:foregroundMark x1="92000" y1="80000" x2="92000" y2="80000"/>
+                        <a14:foregroundMark x1="13778" y1="80444" x2="13778" y2="80444"/>
+                        <a14:foregroundMark x1="11556" y1="77333" x2="11556" y2="77333"/>
+                        <a14:foregroundMark x1="8000" y1="78222" x2="8000" y2="78222"/>
+                        <a14:foregroundMark x1="7556" y1="17778" x2="7556" y2="17778"/>
+                      </a14:backgroundRemoval>
+                    </a14:imgEffect>
+                  </a14:imgLayer>
+                </a14:imgProps>
+              </a:ext>
+              <a:ext uri="{28A0092B-C50C-407E-A947-70E740481C1C}">
+                <a14:useLocalDpi xmlns:a14="http://schemas.microsoft.com/office/drawing/2010/main" val="0"/>
+              </a:ext>
+            </a:extLst>
+          </a:blip>
+          <a:srcRect/>
+          <a:stretch>
+            <a:fillRect/>
+          </a:stretch>
+        </p:blipFill>
+        <p:spPr bwMode="auto">
+          <a:xfrm>
+            <a:off x="8027617" y="2817736"/>
+            <a:ext cx="783710" cy="783710"/>
+          </a:xfrm>
+          <a:prstGeom prst="rect">
+            <a:avLst/>
+          </a:prstGeom>
+          <a:noFill/>
+          <a:extLst>
+            <a:ext uri="{909E8E84-426E-40DD-AFC4-6F175D3DCCD1}">
+              <a14:hiddenFill xmlns:a14="http://schemas.microsoft.com/office/drawing/2010/main">
+                <a:solidFill>
+                  <a:srgbClr val="FFFFFF"/>
+                </a:solidFill>
+              </a14:hiddenFill>
+            </a:ext>
+          </a:extLst>
+        </p:spPr>
+      </p:pic>
+      <p:sp>
+        <p:nvSpPr>
+          <p:cNvPr id="33" name="CaixaDeTexto 32">
+            <a:extLst>
+              <a:ext uri="{FF2B5EF4-FFF2-40B4-BE49-F238E27FC236}">
+                <a16:creationId xmlns:a16="http://schemas.microsoft.com/office/drawing/2014/main" id="{869E2FB8-AC9A-414E-A75D-4E93BD889321}"/>
+              </a:ext>
+            </a:extLst>
+          </p:cNvPr>
+          <p:cNvSpPr txBox="1"/>
+          <p:nvPr/>
+        </p:nvSpPr>
+        <p:spPr>
+          <a:xfrm>
+            <a:off x="4772765" y="1139491"/>
+            <a:ext cx="2062148" cy="307777"/>
+          </a:xfrm>
+          <a:prstGeom prst="rect">
+            <a:avLst/>
+          </a:prstGeom>
+          <a:noFill/>
+        </p:spPr>
+        <p:txBody>
+          <a:bodyPr wrap="square" rtlCol="0">
+            <a:spAutoFit/>
+          </a:bodyPr>
+          <a:lstStyle/>
+          <a:p>
+            <a:r>
+              <a:rPr lang="pt-BR" sz="1400" dirty="0">
+                <a:solidFill>
+                  <a:srgbClr val="8E959E"/>
+                </a:solidFill>
+                <a:latin typeface="Century Gothic" panose="020B0502020202020204" pitchFamily="34" charset="0"/>
+              </a:rPr>
+              <a:t>230394</a:t>
+            </a:r>
+          </a:p>
+        </p:txBody>
+      </p:sp>
+      <p:sp>
+        <p:nvSpPr>
+          <p:cNvPr id="35" name="CaixaDeTexto 34">
+            <a:extLst>
+              <a:ext uri="{FF2B5EF4-FFF2-40B4-BE49-F238E27FC236}">
+                <a16:creationId xmlns:a16="http://schemas.microsoft.com/office/drawing/2014/main" id="{46EB0027-88C6-4CB9-9577-14FF3BAC22E8}"/>
+              </a:ext>
+            </a:extLst>
+          </p:cNvPr>
+          <p:cNvSpPr txBox="1"/>
+          <p:nvPr/>
+        </p:nvSpPr>
+        <p:spPr>
+          <a:xfrm>
+            <a:off x="9306510" y="1131887"/>
+            <a:ext cx="2062148" cy="307777"/>
+          </a:xfrm>
+          <a:prstGeom prst="rect">
+            <a:avLst/>
+          </a:prstGeom>
+          <a:noFill/>
+        </p:spPr>
+        <p:txBody>
+          <a:bodyPr wrap="square" rtlCol="0">
+            <a:spAutoFit/>
+          </a:bodyPr>
+          <a:lstStyle/>
+          <a:p>
+            <a:r>
+              <a:rPr lang="pt-BR" sz="1400" dirty="0">
+                <a:solidFill>
+                  <a:srgbClr val="8E959E"/>
+                </a:solidFill>
+                <a:latin typeface="Century Gothic" panose="020B0502020202020204" pitchFamily="34" charset="0"/>
+              </a:rPr>
+              <a:t>230394</a:t>
+            </a:r>
+          </a:p>
+        </p:txBody>
+      </p:sp>
+      <p:sp>
+        <p:nvSpPr>
+          <p:cNvPr id="37" name="CaixaDeTexto 36">
+            <a:extLst>
+              <a:ext uri="{FF2B5EF4-FFF2-40B4-BE49-F238E27FC236}">
+                <a16:creationId xmlns:a16="http://schemas.microsoft.com/office/drawing/2014/main" id="{EB22B81B-4791-4DED-9EAD-0497484641E0}"/>
+              </a:ext>
+            </a:extLst>
+          </p:cNvPr>
+          <p:cNvSpPr txBox="1"/>
+          <p:nvPr/>
+        </p:nvSpPr>
+        <p:spPr>
+          <a:xfrm>
+            <a:off x="9306510" y="2761396"/>
+            <a:ext cx="2062148" cy="307777"/>
+          </a:xfrm>
+          <a:prstGeom prst="rect">
+            <a:avLst/>
+          </a:prstGeom>
+          <a:noFill/>
+        </p:spPr>
+        <p:txBody>
+          <a:bodyPr wrap="square" rtlCol="0">
+            <a:spAutoFit/>
+          </a:bodyPr>
+          <a:lstStyle/>
+          <a:p>
+            <a:r>
+              <a:rPr lang="pt-BR" sz="1400" dirty="0">
+                <a:solidFill>
+                  <a:srgbClr val="8E959E"/>
+                </a:solidFill>
+                <a:latin typeface="Century Gothic" panose="020B0502020202020204" pitchFamily="34" charset="0"/>
+              </a:rPr>
+              <a:t>230394</a:t>
+            </a:r>
+          </a:p>
+        </p:txBody>
+      </p:sp>
+      <p:sp>
+        <p:nvSpPr>
+          <p:cNvPr id="39" name="CaixaDeTexto 38">
+            <a:extLst>
+              <a:ext uri="{FF2B5EF4-FFF2-40B4-BE49-F238E27FC236}">
+                <a16:creationId xmlns:a16="http://schemas.microsoft.com/office/drawing/2014/main" id="{96863D6D-E5C9-4278-8E5D-D97EFD8B8A85}"/>
+              </a:ext>
+            </a:extLst>
+          </p:cNvPr>
+          <p:cNvSpPr txBox="1"/>
+          <p:nvPr/>
+        </p:nvSpPr>
+        <p:spPr>
+          <a:xfrm>
+            <a:off x="4708858" y="2761396"/>
+            <a:ext cx="2062148" cy="307777"/>
+          </a:xfrm>
+          <a:prstGeom prst="rect">
+            <a:avLst/>
+          </a:prstGeom>
+          <a:noFill/>
+        </p:spPr>
+        <p:txBody>
+          <a:bodyPr wrap="square" rtlCol="0">
+            <a:spAutoFit/>
+          </a:bodyPr>
+          <a:lstStyle/>
+          <a:p>
+            <a:r>
+              <a:rPr lang="pt-BR" sz="1400" dirty="0">
+                <a:solidFill>
+                  <a:srgbClr val="8E959E"/>
+                </a:solidFill>
+                <a:latin typeface="Century Gothic" panose="020B0502020202020204" pitchFamily="34" charset="0"/>
+              </a:rPr>
+              <a:t>230394</a:t>
+            </a:r>
+          </a:p>
+        </p:txBody>
+      </p:sp>
+      <p:sp>
+        <p:nvSpPr>
+          <p:cNvPr id="41" name="CaixaDeTexto 40">
+            <a:extLst>
+              <a:ext uri="{FF2B5EF4-FFF2-40B4-BE49-F238E27FC236}">
+                <a16:creationId xmlns:a16="http://schemas.microsoft.com/office/drawing/2014/main" id="{4A1EDBB6-27C9-4C9E-89DA-EA893209CD5F}"/>
+              </a:ext>
+            </a:extLst>
+          </p:cNvPr>
+          <p:cNvSpPr txBox="1"/>
+          <p:nvPr/>
+        </p:nvSpPr>
+        <p:spPr>
+          <a:xfrm>
+            <a:off x="6771587" y="2609426"/>
+            <a:ext cx="486030" cy="1200329"/>
+          </a:xfrm>
+          <a:prstGeom prst="rect">
+            <a:avLst/>
+          </a:prstGeom>
+          <a:noFill/>
+        </p:spPr>
+        <p:txBody>
+          <a:bodyPr wrap="none" rtlCol="0">
+            <a:spAutoFit/>
+          </a:bodyPr>
+          <a:lstStyle/>
+          <a:p>
+            <a:r>
+              <a:rPr lang="pt-BR" sz="7200" dirty="0">
+                <a:solidFill>
+                  <a:srgbClr val="F32121"/>
+                </a:solidFill>
+              </a:rPr>
+              <a:t>!</a:t>
+            </a:r>
+          </a:p>
+        </p:txBody>
+      </p:sp>
+      <p:pic>
+        <p:nvPicPr>
+          <p:cNvPr id="2050" name="Picture 2" descr="Resultado de imagem para esl pro league"/>
+          <p:cNvPicPr>
+            <a:picLocks noChangeAspect="1" noChangeArrowheads="1"/>
+          </p:cNvPicPr>
+          <p:nvPr/>
+        </p:nvPicPr>
+        <p:blipFill>
+          <a:blip r:embed="rId10" cstate="print">
+            <a:extLst>
+              <a:ext uri="{28A0092B-C50C-407E-A947-70E740481C1C}">
+                <a14:useLocalDpi xmlns:a14="http://schemas.microsoft.com/office/drawing/2010/main" val="0"/>
+              </a:ext>
+            </a:extLst>
+          </a:blip>
+          <a:srcRect/>
+          <a:stretch>
+            <a:fillRect/>
+          </a:stretch>
+        </p:blipFill>
+        <p:spPr bwMode="auto">
+          <a:xfrm>
+            <a:off x="3413909" y="1124444"/>
+            <a:ext cx="844157" cy="897621"/>
+          </a:xfrm>
+          <a:prstGeom prst="rect">
+            <a:avLst/>
+          </a:prstGeom>
+          <a:noFill/>
+          <a:extLst>
+            <a:ext uri="{909E8E84-426E-40DD-AFC4-6F175D3DCCD1}">
+              <a14:hiddenFill xmlns:a14="http://schemas.microsoft.com/office/drawing/2010/main">
+                <a:solidFill>
+                  <a:srgbClr val="FFFFFF"/>
+                </a:solidFill>
+              </a14:hiddenFill>
+            </a:ext>
+          </a:extLst>
+        </p:spPr>
+      </p:pic>
+    </p:spTree>
+    <p:extLst>
+      <p:ext uri="{BB962C8B-B14F-4D97-AF65-F5344CB8AC3E}">
+        <p14:creationId xmlns:p14="http://schemas.microsoft.com/office/powerpoint/2010/main" val="1483491497"/>
+      </p:ext>
+    </p:extLst>
+  </p:cSld>
+  <p:clrMapOvr>
+    <a:masterClrMapping/>
+  </p:clrMapOvr>
+  <p:timing>
+    <p:tnLst>
+      <p:par>
+        <p:cTn id="1" dur="indefinite" restart="never" nodeType="tmRoot"/>
+      </p:par>
+    </p:tnLst>
+  </p:timing>
+</p:sld>
+</file>
+
+<file path=ppt/slides/slide3.xml><?xml version="1.0" encoding="utf-8"?>
 <p:sld xmlns:a="http://schemas.openxmlformats.org/drawingml/2006/main" xmlns:r="http://schemas.openxmlformats.org/officeDocument/2006/relationships" xmlns:p="http://schemas.openxmlformats.org/presentationml/2006/main">
   <p:cSld>
     <p:spTree>
@@ -3666,7 +5153,7 @@
         </p:nvSpPr>
         <p:spPr>
           <a:xfrm>
-            <a:off x="527002" y="823368"/>
+            <a:off x="834531" y="823368"/>
             <a:ext cx="2062148" cy="307777"/>
           </a:xfrm>
           <a:prstGeom prst="rect">
@@ -3680,16 +5167,21 @@
           </a:bodyPr>
           <a:lstStyle/>
           <a:p>
-            <a:pPr algn="ctr"/>
-            <a:r>
-              <a:rPr lang="pt-BR" sz="1400" dirty="0">
+            <a:r>
+              <a:rPr lang="pt-BR" sz="1400" dirty="0" smtClean="0">
                 <a:solidFill>
                   <a:srgbClr val="8E959E"/>
                 </a:solidFill>
                 <a:latin typeface="Century Gothic" panose="020B0502020202020204" pitchFamily="34" charset="0"/>
               </a:rPr>
-              <a:t>Campeonatos</a:t>
-            </a:r>
+              <a:t>Campeonato</a:t>
+            </a:r>
+            <a:endParaRPr lang="pt-BR" sz="1400" dirty="0">
+              <a:solidFill>
+                <a:srgbClr val="8E959E"/>
+              </a:solidFill>
+              <a:latin typeface="Century Gothic" panose="020B0502020202020204" pitchFamily="34" charset="0"/>
+            </a:endParaRPr>
           </a:p>
         </p:txBody>
       </p:sp>
@@ -3919,7 +5411,7 @@
           <a:lstStyle/>
           <a:p>
             <a:pPr algn="ctr"/>
-            <a:endParaRPr lang="pt-BR"/>
+            <a:endParaRPr lang="pt-BR" dirty="0"/>
           </a:p>
         </p:txBody>
       </p:sp>
@@ -4152,7 +5644,7 @@
         </p:nvCxnSpPr>
         <p:spPr>
           <a:xfrm>
-            <a:off x="3730919" y="2353691"/>
+            <a:off x="3730919" y="2339781"/>
             <a:ext cx="3172708" cy="0"/>
           </a:xfrm>
           <a:prstGeom prst="line">
@@ -4187,7 +5679,7 @@
         </p:nvCxnSpPr>
         <p:spPr>
           <a:xfrm>
-            <a:off x="3730919" y="3420491"/>
+            <a:off x="3730919" y="3406581"/>
             <a:ext cx="3172708" cy="0"/>
           </a:xfrm>
           <a:prstGeom prst="line">
@@ -4222,7 +5714,7 @@
         </p:nvCxnSpPr>
         <p:spPr>
           <a:xfrm>
-            <a:off x="3730919" y="4423791"/>
+            <a:off x="3730919" y="4460681"/>
             <a:ext cx="3172708" cy="0"/>
           </a:xfrm>
           <a:prstGeom prst="line">
@@ -4257,7 +5749,7 @@
         </p:nvCxnSpPr>
         <p:spPr>
           <a:xfrm>
-            <a:off x="3730919" y="5452491"/>
+            <a:off x="3730919" y="5489381"/>
             <a:ext cx="3172708" cy="0"/>
           </a:xfrm>
           <a:prstGeom prst="line">
@@ -4292,7 +5784,7 @@
         </p:nvCxnSpPr>
         <p:spPr>
           <a:xfrm>
-            <a:off x="8251749" y="2353691"/>
+            <a:off x="8251749" y="2339781"/>
             <a:ext cx="3172708" cy="0"/>
           </a:xfrm>
           <a:prstGeom prst="line">
@@ -4327,7 +5819,7 @@
         </p:nvCxnSpPr>
         <p:spPr>
           <a:xfrm>
-            <a:off x="8251749" y="3420491"/>
+            <a:off x="8251749" y="3406581"/>
             <a:ext cx="3172708" cy="0"/>
           </a:xfrm>
           <a:prstGeom prst="line">
@@ -4362,7 +5854,7 @@
         </p:nvCxnSpPr>
         <p:spPr>
           <a:xfrm>
-            <a:off x="8251749" y="4423791"/>
+            <a:off x="8251749" y="4460681"/>
             <a:ext cx="3172708" cy="0"/>
           </a:xfrm>
           <a:prstGeom prst="line">
@@ -4397,7 +5889,7 @@
         </p:nvCxnSpPr>
         <p:spPr>
           <a:xfrm>
-            <a:off x="8251749" y="5452491"/>
+            <a:off x="8251749" y="5489381"/>
             <a:ext cx="3172708" cy="0"/>
           </a:xfrm>
           <a:prstGeom prst="line">
@@ -4514,7 +6006,7 @@
         </p:nvSpPr>
         <p:spPr>
           <a:xfrm>
-            <a:off x="6771587" y="1206589"/>
+            <a:off x="11205818" y="2284834"/>
             <a:ext cx="486030" cy="1200329"/>
           </a:xfrm>
           <a:prstGeom prst="rect">
@@ -4531,7 +6023,7 @@
             <a:r>
               <a:rPr lang="pt-BR" sz="7200" dirty="0">
                 <a:solidFill>
-                  <a:srgbClr val="FF0000"/>
+                  <a:srgbClr val="F32121"/>
                 </a:solidFill>
               </a:rPr>
               <a:t>!</a:t>
@@ -4679,6 +6171,2560 @@
           <a:p>
             <a:pPr algn="ctr"/>
             <a:endParaRPr lang="pt-BR"/>
+          </a:p>
+        </p:txBody>
+      </p:sp>
+      <p:pic>
+        <p:nvPicPr>
+          <p:cNvPr id="1034" name="Picture 10" descr="Resultado de imagem para pro player profile picture"/>
+          <p:cNvPicPr>
+            <a:picLocks noChangeAspect="1" noChangeArrowheads="1"/>
+          </p:cNvPicPr>
+          <p:nvPr/>
+        </p:nvPicPr>
+        <p:blipFill>
+          <a:blip r:embed="rId5" cstate="print">
+            <a:extLst>
+              <a:ext uri="{28A0092B-C50C-407E-A947-70E740481C1C}">
+                <a14:useLocalDpi xmlns:a14="http://schemas.microsoft.com/office/drawing/2010/main" val="0"/>
+              </a:ext>
+            </a:extLst>
+          </a:blip>
+          <a:srcRect/>
+          <a:stretch>
+            <a:fillRect/>
+          </a:stretch>
+        </p:blipFill>
+        <p:spPr bwMode="auto">
+          <a:xfrm>
+            <a:off x="3452908" y="1411333"/>
+            <a:ext cx="764351" cy="764351"/>
+          </a:xfrm>
+          <a:prstGeom prst="ellipse">
+            <a:avLst/>
+          </a:prstGeom>
+          <a:ln w="12700">
+            <a:solidFill>
+              <a:srgbClr val="43484F"/>
+            </a:solidFill>
+          </a:ln>
+          <a:extLst>
+            <a:ext uri="{909E8E84-426E-40DD-AFC4-6F175D3DCCD1}">
+              <a14:hiddenFill xmlns:a14="http://schemas.microsoft.com/office/drawing/2010/main">
+                <a:solidFill>
+                  <a:srgbClr val="FFFFFF"/>
+                </a:solidFill>
+              </a14:hiddenFill>
+            </a:ext>
+          </a:extLst>
+        </p:spPr>
+      </p:pic>
+      <p:pic>
+        <p:nvPicPr>
+          <p:cNvPr id="1036" name="Picture 12" descr="Imagem relacionada"/>
+          <p:cNvPicPr>
+            <a:picLocks noChangeAspect="1" noChangeArrowheads="1"/>
+          </p:cNvPicPr>
+          <p:nvPr/>
+        </p:nvPicPr>
+        <p:blipFill rotWithShape="1">
+          <a:blip r:embed="rId6" cstate="print">
+            <a:extLst>
+              <a:ext uri="{28A0092B-C50C-407E-A947-70E740481C1C}">
+                <a14:useLocalDpi xmlns:a14="http://schemas.microsoft.com/office/drawing/2010/main" val="0"/>
+              </a:ext>
+            </a:extLst>
+          </a:blip>
+          <a:srcRect l="2632" r="2632"/>
+          <a:stretch/>
+        </p:blipFill>
+        <p:spPr bwMode="auto">
+          <a:xfrm>
+            <a:off x="8006033" y="2501164"/>
+            <a:ext cx="744035" cy="744035"/>
+          </a:xfrm>
+          <a:prstGeom prst="ellipse">
+            <a:avLst/>
+          </a:prstGeom>
+          <a:noFill/>
+          <a:ln w="12700">
+            <a:solidFill>
+              <a:srgbClr val="43484F"/>
+            </a:solidFill>
+          </a:ln>
+          <a:extLst>
+            <a:ext uri="{909E8E84-426E-40DD-AFC4-6F175D3DCCD1}">
+              <a14:hiddenFill xmlns:a14="http://schemas.microsoft.com/office/drawing/2010/main">
+                <a:solidFill>
+                  <a:srgbClr val="FFFFFF"/>
+                </a:solidFill>
+              </a14:hiddenFill>
+            </a:ext>
+          </a:extLst>
+        </p:spPr>
+      </p:pic>
+      <p:pic>
+        <p:nvPicPr>
+          <p:cNvPr id="1040" name="Picture 16" descr="Imagem relacionada"/>
+          <p:cNvPicPr>
+            <a:picLocks noChangeAspect="1" noChangeArrowheads="1"/>
+          </p:cNvPicPr>
+          <p:nvPr/>
+        </p:nvPicPr>
+        <p:blipFill rotWithShape="1">
+          <a:blip r:embed="rId7" cstate="print">
+            <a:extLst>
+              <a:ext uri="{28A0092B-C50C-407E-A947-70E740481C1C}">
+                <a14:useLocalDpi xmlns:a14="http://schemas.microsoft.com/office/drawing/2010/main" val="0"/>
+              </a:ext>
+            </a:extLst>
+          </a:blip>
+          <a:srcRect l="2632" r="2632"/>
+          <a:stretch/>
+        </p:blipFill>
+        <p:spPr bwMode="auto">
+          <a:xfrm>
+            <a:off x="8019843" y="3565986"/>
+            <a:ext cx="730598" cy="730598"/>
+          </a:xfrm>
+          <a:prstGeom prst="ellipse">
+            <a:avLst/>
+          </a:prstGeom>
+          <a:noFill/>
+          <a:ln w="12700">
+            <a:solidFill>
+              <a:srgbClr val="43484F"/>
+            </a:solidFill>
+          </a:ln>
+          <a:extLst>
+            <a:ext uri="{909E8E84-426E-40DD-AFC4-6F175D3DCCD1}">
+              <a14:hiddenFill xmlns:a14="http://schemas.microsoft.com/office/drawing/2010/main">
+                <a:solidFill>
+                  <a:srgbClr val="FFFFFF"/>
+                </a:solidFill>
+              </a14:hiddenFill>
+            </a:ext>
+          </a:extLst>
+        </p:spPr>
+      </p:pic>
+      <p:pic>
+        <p:nvPicPr>
+          <p:cNvPr id="1042" name="Picture 18" descr="Resultado de imagem para pro player profile picture"/>
+          <p:cNvPicPr>
+            <a:picLocks noChangeAspect="1" noChangeArrowheads="1"/>
+          </p:cNvPicPr>
+          <p:nvPr/>
+        </p:nvPicPr>
+        <p:blipFill>
+          <a:blip r:embed="rId8" cstate="print">
+            <a:extLst>
+              <a:ext uri="{28A0092B-C50C-407E-A947-70E740481C1C}">
+                <a14:useLocalDpi xmlns:a14="http://schemas.microsoft.com/office/drawing/2010/main" val="0"/>
+              </a:ext>
+            </a:extLst>
+          </a:blip>
+          <a:srcRect/>
+          <a:stretch>
+            <a:fillRect/>
+          </a:stretch>
+        </p:blipFill>
+        <p:spPr bwMode="auto">
+          <a:xfrm>
+            <a:off x="3465840" y="4605790"/>
+            <a:ext cx="738483" cy="738483"/>
+          </a:xfrm>
+          <a:prstGeom prst="ellipse">
+            <a:avLst/>
+          </a:prstGeom>
+          <a:noFill/>
+          <a:ln w="12700">
+            <a:solidFill>
+              <a:srgbClr val="43484F"/>
+            </a:solidFill>
+          </a:ln>
+          <a:extLst>
+            <a:ext uri="{909E8E84-426E-40DD-AFC4-6F175D3DCCD1}">
+              <a14:hiddenFill xmlns:a14="http://schemas.microsoft.com/office/drawing/2010/main">
+                <a:solidFill>
+                  <a:srgbClr val="FFFFFF"/>
+                </a:solidFill>
+              </a14:hiddenFill>
+            </a:ext>
+          </a:extLst>
+        </p:spPr>
+      </p:pic>
+      <p:pic>
+        <p:nvPicPr>
+          <p:cNvPr id="1046" name="Picture 22" descr="Resultado de imagem para pro player profile picture"/>
+          <p:cNvPicPr>
+            <a:picLocks noChangeAspect="1" noChangeArrowheads="1"/>
+          </p:cNvPicPr>
+          <p:nvPr/>
+        </p:nvPicPr>
+        <p:blipFill rotWithShape="1">
+          <a:blip r:embed="rId9" cstate="print">
+            <a:extLst>
+              <a:ext uri="{28A0092B-C50C-407E-A947-70E740481C1C}">
+                <a14:useLocalDpi xmlns:a14="http://schemas.microsoft.com/office/drawing/2010/main" val="0"/>
+              </a:ext>
+            </a:extLst>
+          </a:blip>
+          <a:srcRect t="166" b="166"/>
+          <a:stretch/>
+        </p:blipFill>
+        <p:spPr bwMode="auto">
+          <a:xfrm>
+            <a:off x="8013441" y="4604900"/>
+            <a:ext cx="719184" cy="719184"/>
+          </a:xfrm>
+          <a:prstGeom prst="ellipse">
+            <a:avLst/>
+          </a:prstGeom>
+          <a:noFill/>
+          <a:ln w="12700">
+            <a:solidFill>
+              <a:srgbClr val="43484F"/>
+            </a:solidFill>
+          </a:ln>
+          <a:extLst>
+            <a:ext uri="{909E8E84-426E-40DD-AFC4-6F175D3DCCD1}">
+              <a14:hiddenFill xmlns:a14="http://schemas.microsoft.com/office/drawing/2010/main">
+                <a:solidFill>
+                  <a:srgbClr val="FFFFFF"/>
+                </a:solidFill>
+              </a14:hiddenFill>
+            </a:ext>
+          </a:extLst>
+        </p:spPr>
+      </p:pic>
+      <p:pic>
+        <p:nvPicPr>
+          <p:cNvPr id="57" name="Picture 20" descr="Imagem relacionada"/>
+          <p:cNvPicPr>
+            <a:picLocks noChangeAspect="1" noChangeArrowheads="1"/>
+          </p:cNvPicPr>
+          <p:nvPr/>
+        </p:nvPicPr>
+        <p:blipFill rotWithShape="1">
+          <a:blip r:embed="rId10" cstate="print">
+            <a:extLst>
+              <a:ext uri="{28A0092B-C50C-407E-A947-70E740481C1C}">
+                <a14:useLocalDpi xmlns:a14="http://schemas.microsoft.com/office/drawing/2010/main" val="0"/>
+              </a:ext>
+            </a:extLst>
+          </a:blip>
+          <a:srcRect l="6123" t="4141" r="6406" b="3819"/>
+          <a:stretch/>
+        </p:blipFill>
+        <p:spPr bwMode="auto">
+          <a:xfrm>
+            <a:off x="8006033" y="5632400"/>
+            <a:ext cx="756276" cy="756276"/>
+          </a:xfrm>
+          <a:prstGeom prst="ellipse">
+            <a:avLst/>
+          </a:prstGeom>
+          <a:noFill/>
+          <a:ln w="12700">
+            <a:solidFill>
+              <a:srgbClr val="43484F"/>
+            </a:solidFill>
+          </a:ln>
+          <a:extLst>
+            <a:ext uri="{909E8E84-426E-40DD-AFC4-6F175D3DCCD1}">
+              <a14:hiddenFill xmlns:a14="http://schemas.microsoft.com/office/drawing/2010/main">
+                <a:solidFill>
+                  <a:srgbClr val="FFFFFF"/>
+                </a:solidFill>
+              </a14:hiddenFill>
+            </a:ext>
+          </a:extLst>
+        </p:spPr>
+      </p:pic>
+      <p:pic>
+        <p:nvPicPr>
+          <p:cNvPr id="60" name="Picture 20" descr="Imagem relacionada"/>
+          <p:cNvPicPr>
+            <a:picLocks noChangeAspect="1" noChangeArrowheads="1"/>
+          </p:cNvPicPr>
+          <p:nvPr/>
+        </p:nvPicPr>
+        <p:blipFill rotWithShape="1">
+          <a:blip r:embed="rId10" cstate="print">
+            <a:extLst>
+              <a:ext uri="{28A0092B-C50C-407E-A947-70E740481C1C}">
+                <a14:useLocalDpi xmlns:a14="http://schemas.microsoft.com/office/drawing/2010/main" val="0"/>
+              </a:ext>
+            </a:extLst>
+          </a:blip>
+          <a:srcRect l="6123" t="4141" r="6406" b="3819"/>
+          <a:stretch/>
+        </p:blipFill>
+        <p:spPr bwMode="auto">
+          <a:xfrm>
+            <a:off x="8019843" y="1402671"/>
+            <a:ext cx="756276" cy="756276"/>
+          </a:xfrm>
+          <a:prstGeom prst="ellipse">
+            <a:avLst/>
+          </a:prstGeom>
+          <a:noFill/>
+          <a:ln w="12700">
+            <a:solidFill>
+              <a:srgbClr val="43484F"/>
+            </a:solidFill>
+          </a:ln>
+          <a:extLst>
+            <a:ext uri="{909E8E84-426E-40DD-AFC4-6F175D3DCCD1}">
+              <a14:hiddenFill xmlns:a14="http://schemas.microsoft.com/office/drawing/2010/main">
+                <a:solidFill>
+                  <a:srgbClr val="FFFFFF"/>
+                </a:solidFill>
+              </a14:hiddenFill>
+            </a:ext>
+          </a:extLst>
+        </p:spPr>
+      </p:pic>
+      <p:pic>
+        <p:nvPicPr>
+          <p:cNvPr id="61" name="Picture 20" descr="Imagem relacionada"/>
+          <p:cNvPicPr>
+            <a:picLocks noChangeAspect="1" noChangeArrowheads="1"/>
+          </p:cNvPicPr>
+          <p:nvPr/>
+        </p:nvPicPr>
+        <p:blipFill rotWithShape="1">
+          <a:blip r:embed="rId10" cstate="print">
+            <a:extLst>
+              <a:ext uri="{28A0092B-C50C-407E-A947-70E740481C1C}">
+                <a14:useLocalDpi xmlns:a14="http://schemas.microsoft.com/office/drawing/2010/main" val="0"/>
+              </a:ext>
+            </a:extLst>
+          </a:blip>
+          <a:srcRect l="6123" t="4141" r="6406" b="3819"/>
+          <a:stretch/>
+        </p:blipFill>
+        <p:spPr bwMode="auto">
+          <a:xfrm>
+            <a:off x="3448047" y="5646292"/>
+            <a:ext cx="756276" cy="756276"/>
+          </a:xfrm>
+          <a:prstGeom prst="ellipse">
+            <a:avLst/>
+          </a:prstGeom>
+          <a:noFill/>
+          <a:ln w="12700">
+            <a:solidFill>
+              <a:srgbClr val="43484F"/>
+            </a:solidFill>
+          </a:ln>
+          <a:extLst>
+            <a:ext uri="{909E8E84-426E-40DD-AFC4-6F175D3DCCD1}">
+              <a14:hiddenFill xmlns:a14="http://schemas.microsoft.com/office/drawing/2010/main">
+                <a:solidFill>
+                  <a:srgbClr val="FFFFFF"/>
+                </a:solidFill>
+              </a14:hiddenFill>
+            </a:ext>
+          </a:extLst>
+        </p:spPr>
+      </p:pic>
+      <p:pic>
+        <p:nvPicPr>
+          <p:cNvPr id="62" name="Picture 20" descr="Imagem relacionada"/>
+          <p:cNvPicPr>
+            <a:picLocks noChangeAspect="1" noChangeArrowheads="1"/>
+          </p:cNvPicPr>
+          <p:nvPr/>
+        </p:nvPicPr>
+        <p:blipFill rotWithShape="1">
+          <a:blip r:embed="rId10" cstate="print">
+            <a:extLst>
+              <a:ext uri="{28A0092B-C50C-407E-A947-70E740481C1C}">
+                <a14:useLocalDpi xmlns:a14="http://schemas.microsoft.com/office/drawing/2010/main" val="0"/>
+              </a:ext>
+            </a:extLst>
+          </a:blip>
+          <a:srcRect l="6123" t="4141" r="6406" b="3819"/>
+          <a:stretch/>
+        </p:blipFill>
+        <p:spPr bwMode="auto">
+          <a:xfrm>
+            <a:off x="3448047" y="3563492"/>
+            <a:ext cx="756276" cy="756276"/>
+          </a:xfrm>
+          <a:prstGeom prst="ellipse">
+            <a:avLst/>
+          </a:prstGeom>
+          <a:noFill/>
+          <a:ln w="12700">
+            <a:solidFill>
+              <a:srgbClr val="43484F"/>
+            </a:solidFill>
+          </a:ln>
+          <a:extLst>
+            <a:ext uri="{909E8E84-426E-40DD-AFC4-6F175D3DCCD1}">
+              <a14:hiddenFill xmlns:a14="http://schemas.microsoft.com/office/drawing/2010/main">
+                <a:solidFill>
+                  <a:srgbClr val="FFFFFF"/>
+                </a:solidFill>
+              </a14:hiddenFill>
+            </a:ext>
+          </a:extLst>
+        </p:spPr>
+      </p:pic>
+      <p:pic>
+        <p:nvPicPr>
+          <p:cNvPr id="63" name="Picture 20" descr="Imagem relacionada"/>
+          <p:cNvPicPr>
+            <a:picLocks noChangeAspect="1" noChangeArrowheads="1"/>
+          </p:cNvPicPr>
+          <p:nvPr/>
+        </p:nvPicPr>
+        <p:blipFill rotWithShape="1">
+          <a:blip r:embed="rId10" cstate="print">
+            <a:extLst>
+              <a:ext uri="{28A0092B-C50C-407E-A947-70E740481C1C}">
+                <a14:useLocalDpi xmlns:a14="http://schemas.microsoft.com/office/drawing/2010/main" val="0"/>
+              </a:ext>
+            </a:extLst>
+          </a:blip>
+          <a:srcRect l="6123" t="4141" r="6406" b="3819"/>
+          <a:stretch/>
+        </p:blipFill>
+        <p:spPr bwMode="auto">
+          <a:xfrm>
+            <a:off x="3448047" y="2501164"/>
+            <a:ext cx="756276" cy="756276"/>
+          </a:xfrm>
+          <a:prstGeom prst="ellipse">
+            <a:avLst/>
+          </a:prstGeom>
+          <a:noFill/>
+          <a:ln w="12700">
+            <a:solidFill>
+              <a:srgbClr val="43484F"/>
+            </a:solidFill>
+          </a:ln>
+          <a:extLst>
+            <a:ext uri="{909E8E84-426E-40DD-AFC4-6F175D3DCCD1}">
+              <a14:hiddenFill xmlns:a14="http://schemas.microsoft.com/office/drawing/2010/main">
+                <a:solidFill>
+                  <a:srgbClr val="FFFFFF"/>
+                </a:solidFill>
+              </a14:hiddenFill>
+            </a:ext>
+          </a:extLst>
+        </p:spPr>
+      </p:pic>
+      <p:sp>
+        <p:nvSpPr>
+          <p:cNvPr id="64" name="CaixaDeTexto 63"/>
+          <p:cNvSpPr txBox="1"/>
+          <p:nvPr/>
+        </p:nvSpPr>
+        <p:spPr>
+          <a:xfrm>
+            <a:off x="4139201" y="1441571"/>
+            <a:ext cx="730837" cy="307777"/>
+          </a:xfrm>
+          <a:prstGeom prst="rect">
+            <a:avLst/>
+          </a:prstGeom>
+          <a:noFill/>
+        </p:spPr>
+        <p:txBody>
+          <a:bodyPr wrap="square" rtlCol="0">
+            <a:spAutoFit/>
+          </a:bodyPr>
+          <a:lstStyle/>
+          <a:p>
+            <a:pPr algn="r"/>
+            <a:r>
+              <a:rPr lang="pt-BR" sz="1400" dirty="0" smtClean="0">
+                <a:solidFill>
+                  <a:srgbClr val="8E959E"/>
+                </a:solidFill>
+                <a:latin typeface="Century Gothic" panose="020B0502020202020204" pitchFamily="34" charset="0"/>
+              </a:rPr>
+              <a:t>CPU</a:t>
+            </a:r>
+            <a:endParaRPr lang="pt-BR" sz="1400" dirty="0">
+              <a:solidFill>
+                <a:srgbClr val="8E959E"/>
+              </a:solidFill>
+              <a:latin typeface="Century Gothic" panose="020B0502020202020204" pitchFamily="34" charset="0"/>
+            </a:endParaRPr>
+          </a:p>
+        </p:txBody>
+      </p:sp>
+      <p:sp>
+        <p:nvSpPr>
+          <p:cNvPr id="65" name="CaixaDeTexto 64"/>
+          <p:cNvSpPr txBox="1"/>
+          <p:nvPr/>
+        </p:nvSpPr>
+        <p:spPr>
+          <a:xfrm>
+            <a:off x="4799070" y="1370022"/>
+            <a:ext cx="730837" cy="400110"/>
+          </a:xfrm>
+          <a:prstGeom prst="rect">
+            <a:avLst/>
+          </a:prstGeom>
+          <a:noFill/>
+        </p:spPr>
+        <p:txBody>
+          <a:bodyPr wrap="square" rtlCol="0">
+            <a:spAutoFit/>
+          </a:bodyPr>
+          <a:lstStyle/>
+          <a:p>
+            <a:r>
+              <a:rPr lang="pt-BR" sz="2000" dirty="0" smtClean="0">
+                <a:solidFill>
+                  <a:schemeClr val="bg1">
+                    <a:lumMod val="75000"/>
+                  </a:schemeClr>
+                </a:solidFill>
+                <a:latin typeface="Century Gothic" panose="020B0502020202020204" pitchFamily="34" charset="0"/>
+              </a:rPr>
+              <a:t>76%</a:t>
+            </a:r>
+            <a:endParaRPr lang="pt-BR" sz="2000" dirty="0">
+              <a:solidFill>
+                <a:schemeClr val="bg1">
+                  <a:lumMod val="75000"/>
+                </a:schemeClr>
+              </a:solidFill>
+              <a:latin typeface="Century Gothic" panose="020B0502020202020204" pitchFamily="34" charset="0"/>
+            </a:endParaRPr>
+          </a:p>
+        </p:txBody>
+      </p:sp>
+      <p:sp>
+        <p:nvSpPr>
+          <p:cNvPr id="66" name="CaixaDeTexto 65"/>
+          <p:cNvSpPr txBox="1"/>
+          <p:nvPr/>
+        </p:nvSpPr>
+        <p:spPr>
+          <a:xfrm>
+            <a:off x="4139201" y="1808776"/>
+            <a:ext cx="730837" cy="307777"/>
+          </a:xfrm>
+          <a:prstGeom prst="rect">
+            <a:avLst/>
+          </a:prstGeom>
+          <a:noFill/>
+        </p:spPr>
+        <p:txBody>
+          <a:bodyPr wrap="square" rtlCol="0">
+            <a:spAutoFit/>
+          </a:bodyPr>
+          <a:lstStyle/>
+          <a:p>
+            <a:pPr algn="r"/>
+            <a:r>
+              <a:rPr lang="pt-BR" sz="1400" dirty="0" smtClean="0">
+                <a:solidFill>
+                  <a:srgbClr val="8E959E"/>
+                </a:solidFill>
+                <a:latin typeface="Century Gothic" panose="020B0502020202020204" pitchFamily="34" charset="0"/>
+              </a:rPr>
+              <a:t>GPU</a:t>
+            </a:r>
+            <a:endParaRPr lang="pt-BR" sz="1400" dirty="0">
+              <a:solidFill>
+                <a:srgbClr val="8E959E"/>
+              </a:solidFill>
+              <a:latin typeface="Century Gothic" panose="020B0502020202020204" pitchFamily="34" charset="0"/>
+            </a:endParaRPr>
+          </a:p>
+        </p:txBody>
+      </p:sp>
+      <p:sp>
+        <p:nvSpPr>
+          <p:cNvPr id="67" name="CaixaDeTexto 66"/>
+          <p:cNvSpPr txBox="1"/>
+          <p:nvPr/>
+        </p:nvSpPr>
+        <p:spPr>
+          <a:xfrm>
+            <a:off x="4799070" y="1737227"/>
+            <a:ext cx="730837" cy="400110"/>
+          </a:xfrm>
+          <a:prstGeom prst="rect">
+            <a:avLst/>
+          </a:prstGeom>
+          <a:noFill/>
+        </p:spPr>
+        <p:txBody>
+          <a:bodyPr wrap="square" rtlCol="0">
+            <a:spAutoFit/>
+          </a:bodyPr>
+          <a:lstStyle/>
+          <a:p>
+            <a:r>
+              <a:rPr lang="pt-BR" sz="2000" dirty="0" smtClean="0">
+                <a:solidFill>
+                  <a:schemeClr val="bg1">
+                    <a:lumMod val="75000"/>
+                  </a:schemeClr>
+                </a:solidFill>
+                <a:latin typeface="Century Gothic" panose="020B0502020202020204" pitchFamily="34" charset="0"/>
+              </a:rPr>
+              <a:t>55%</a:t>
+            </a:r>
+            <a:endParaRPr lang="pt-BR" sz="2000" dirty="0">
+              <a:solidFill>
+                <a:schemeClr val="bg1">
+                  <a:lumMod val="75000"/>
+                </a:schemeClr>
+              </a:solidFill>
+              <a:latin typeface="Century Gothic" panose="020B0502020202020204" pitchFamily="34" charset="0"/>
+            </a:endParaRPr>
+          </a:p>
+        </p:txBody>
+      </p:sp>
+      <p:sp>
+        <p:nvSpPr>
+          <p:cNvPr id="78" name="CaixaDeTexto 77"/>
+          <p:cNvSpPr txBox="1"/>
+          <p:nvPr/>
+        </p:nvSpPr>
+        <p:spPr>
+          <a:xfrm>
+            <a:off x="4139201" y="2556438"/>
+            <a:ext cx="730837" cy="307777"/>
+          </a:xfrm>
+          <a:prstGeom prst="rect">
+            <a:avLst/>
+          </a:prstGeom>
+          <a:noFill/>
+        </p:spPr>
+        <p:txBody>
+          <a:bodyPr wrap="square" rtlCol="0">
+            <a:spAutoFit/>
+          </a:bodyPr>
+          <a:lstStyle/>
+          <a:p>
+            <a:pPr algn="r"/>
+            <a:r>
+              <a:rPr lang="pt-BR" sz="1400" dirty="0" smtClean="0">
+                <a:solidFill>
+                  <a:srgbClr val="8E959E"/>
+                </a:solidFill>
+                <a:latin typeface="Century Gothic" panose="020B0502020202020204" pitchFamily="34" charset="0"/>
+              </a:rPr>
+              <a:t>CPU</a:t>
+            </a:r>
+            <a:endParaRPr lang="pt-BR" sz="1400" dirty="0">
+              <a:solidFill>
+                <a:srgbClr val="8E959E"/>
+              </a:solidFill>
+              <a:latin typeface="Century Gothic" panose="020B0502020202020204" pitchFamily="34" charset="0"/>
+            </a:endParaRPr>
+          </a:p>
+        </p:txBody>
+      </p:sp>
+      <p:sp>
+        <p:nvSpPr>
+          <p:cNvPr id="79" name="CaixaDeTexto 78"/>
+          <p:cNvSpPr txBox="1"/>
+          <p:nvPr/>
+        </p:nvSpPr>
+        <p:spPr>
+          <a:xfrm>
+            <a:off x="4799070" y="2484889"/>
+            <a:ext cx="730837" cy="400110"/>
+          </a:xfrm>
+          <a:prstGeom prst="rect">
+            <a:avLst/>
+          </a:prstGeom>
+          <a:noFill/>
+        </p:spPr>
+        <p:txBody>
+          <a:bodyPr wrap="square" rtlCol="0">
+            <a:spAutoFit/>
+          </a:bodyPr>
+          <a:lstStyle/>
+          <a:p>
+            <a:r>
+              <a:rPr lang="pt-BR" sz="2000" dirty="0" smtClean="0">
+                <a:solidFill>
+                  <a:schemeClr val="bg1">
+                    <a:lumMod val="75000"/>
+                  </a:schemeClr>
+                </a:solidFill>
+                <a:latin typeface="Century Gothic" panose="020B0502020202020204" pitchFamily="34" charset="0"/>
+              </a:rPr>
+              <a:t>76%</a:t>
+            </a:r>
+            <a:endParaRPr lang="pt-BR" sz="2000" dirty="0">
+              <a:solidFill>
+                <a:schemeClr val="bg1">
+                  <a:lumMod val="75000"/>
+                </a:schemeClr>
+              </a:solidFill>
+              <a:latin typeface="Century Gothic" panose="020B0502020202020204" pitchFamily="34" charset="0"/>
+            </a:endParaRPr>
+          </a:p>
+        </p:txBody>
+      </p:sp>
+      <p:sp>
+        <p:nvSpPr>
+          <p:cNvPr id="80" name="CaixaDeTexto 79"/>
+          <p:cNvSpPr txBox="1"/>
+          <p:nvPr/>
+        </p:nvSpPr>
+        <p:spPr>
+          <a:xfrm>
+            <a:off x="4139201" y="2923643"/>
+            <a:ext cx="730837" cy="307777"/>
+          </a:xfrm>
+          <a:prstGeom prst="rect">
+            <a:avLst/>
+          </a:prstGeom>
+          <a:noFill/>
+        </p:spPr>
+        <p:txBody>
+          <a:bodyPr wrap="square" rtlCol="0">
+            <a:spAutoFit/>
+          </a:bodyPr>
+          <a:lstStyle/>
+          <a:p>
+            <a:pPr algn="r"/>
+            <a:r>
+              <a:rPr lang="pt-BR" sz="1400" dirty="0" smtClean="0">
+                <a:solidFill>
+                  <a:srgbClr val="8E959E"/>
+                </a:solidFill>
+                <a:latin typeface="Century Gothic" panose="020B0502020202020204" pitchFamily="34" charset="0"/>
+              </a:rPr>
+              <a:t>GPU</a:t>
+            </a:r>
+            <a:endParaRPr lang="pt-BR" sz="1400" dirty="0">
+              <a:solidFill>
+                <a:srgbClr val="8E959E"/>
+              </a:solidFill>
+              <a:latin typeface="Century Gothic" panose="020B0502020202020204" pitchFamily="34" charset="0"/>
+            </a:endParaRPr>
+          </a:p>
+        </p:txBody>
+      </p:sp>
+      <p:sp>
+        <p:nvSpPr>
+          <p:cNvPr id="82" name="CaixaDeTexto 81"/>
+          <p:cNvSpPr txBox="1"/>
+          <p:nvPr/>
+        </p:nvSpPr>
+        <p:spPr>
+          <a:xfrm>
+            <a:off x="4799070" y="2852094"/>
+            <a:ext cx="730837" cy="400110"/>
+          </a:xfrm>
+          <a:prstGeom prst="rect">
+            <a:avLst/>
+          </a:prstGeom>
+          <a:noFill/>
+        </p:spPr>
+        <p:txBody>
+          <a:bodyPr wrap="square" rtlCol="0">
+            <a:spAutoFit/>
+          </a:bodyPr>
+          <a:lstStyle/>
+          <a:p>
+            <a:r>
+              <a:rPr lang="pt-BR" sz="2000" dirty="0" smtClean="0">
+                <a:solidFill>
+                  <a:schemeClr val="bg1">
+                    <a:lumMod val="75000"/>
+                  </a:schemeClr>
+                </a:solidFill>
+                <a:latin typeface="Century Gothic" panose="020B0502020202020204" pitchFamily="34" charset="0"/>
+              </a:rPr>
+              <a:t>55%</a:t>
+            </a:r>
+            <a:endParaRPr lang="pt-BR" sz="2000" dirty="0">
+              <a:solidFill>
+                <a:schemeClr val="bg1">
+                  <a:lumMod val="75000"/>
+                </a:schemeClr>
+              </a:solidFill>
+              <a:latin typeface="Century Gothic" panose="020B0502020202020204" pitchFamily="34" charset="0"/>
+            </a:endParaRPr>
+          </a:p>
+        </p:txBody>
+      </p:sp>
+      <p:sp>
+        <p:nvSpPr>
+          <p:cNvPr id="83" name="CaixaDeTexto 82"/>
+          <p:cNvSpPr txBox="1"/>
+          <p:nvPr/>
+        </p:nvSpPr>
+        <p:spPr>
+          <a:xfrm>
+            <a:off x="4139201" y="1441571"/>
+            <a:ext cx="730837" cy="307777"/>
+          </a:xfrm>
+          <a:prstGeom prst="rect">
+            <a:avLst/>
+          </a:prstGeom>
+          <a:noFill/>
+        </p:spPr>
+        <p:txBody>
+          <a:bodyPr wrap="square" rtlCol="0">
+            <a:spAutoFit/>
+          </a:bodyPr>
+          <a:lstStyle/>
+          <a:p>
+            <a:pPr algn="r"/>
+            <a:r>
+              <a:rPr lang="pt-BR" sz="1400" dirty="0" smtClean="0">
+                <a:solidFill>
+                  <a:srgbClr val="8E959E"/>
+                </a:solidFill>
+                <a:latin typeface="Century Gothic" panose="020B0502020202020204" pitchFamily="34" charset="0"/>
+              </a:rPr>
+              <a:t>CPU</a:t>
+            </a:r>
+            <a:endParaRPr lang="pt-BR" sz="1400" dirty="0">
+              <a:solidFill>
+                <a:srgbClr val="8E959E"/>
+              </a:solidFill>
+              <a:latin typeface="Century Gothic" panose="020B0502020202020204" pitchFamily="34" charset="0"/>
+            </a:endParaRPr>
+          </a:p>
+        </p:txBody>
+      </p:sp>
+      <p:sp>
+        <p:nvSpPr>
+          <p:cNvPr id="84" name="CaixaDeTexto 83"/>
+          <p:cNvSpPr txBox="1"/>
+          <p:nvPr/>
+        </p:nvSpPr>
+        <p:spPr>
+          <a:xfrm>
+            <a:off x="4799070" y="1370022"/>
+            <a:ext cx="730837" cy="400110"/>
+          </a:xfrm>
+          <a:prstGeom prst="rect">
+            <a:avLst/>
+          </a:prstGeom>
+          <a:noFill/>
+        </p:spPr>
+        <p:txBody>
+          <a:bodyPr wrap="square" rtlCol="0">
+            <a:spAutoFit/>
+          </a:bodyPr>
+          <a:lstStyle/>
+          <a:p>
+            <a:r>
+              <a:rPr lang="pt-BR" sz="2000" dirty="0" smtClean="0">
+                <a:solidFill>
+                  <a:schemeClr val="bg1">
+                    <a:lumMod val="75000"/>
+                  </a:schemeClr>
+                </a:solidFill>
+                <a:latin typeface="Century Gothic" panose="020B0502020202020204" pitchFamily="34" charset="0"/>
+              </a:rPr>
+              <a:t>76%</a:t>
+            </a:r>
+            <a:endParaRPr lang="pt-BR" sz="2000" dirty="0">
+              <a:solidFill>
+                <a:schemeClr val="bg1">
+                  <a:lumMod val="75000"/>
+                </a:schemeClr>
+              </a:solidFill>
+              <a:latin typeface="Century Gothic" panose="020B0502020202020204" pitchFamily="34" charset="0"/>
+            </a:endParaRPr>
+          </a:p>
+        </p:txBody>
+      </p:sp>
+      <p:sp>
+        <p:nvSpPr>
+          <p:cNvPr id="85" name="CaixaDeTexto 84"/>
+          <p:cNvSpPr txBox="1"/>
+          <p:nvPr/>
+        </p:nvSpPr>
+        <p:spPr>
+          <a:xfrm>
+            <a:off x="4139201" y="1808776"/>
+            <a:ext cx="730837" cy="307777"/>
+          </a:xfrm>
+          <a:prstGeom prst="rect">
+            <a:avLst/>
+          </a:prstGeom>
+          <a:noFill/>
+        </p:spPr>
+        <p:txBody>
+          <a:bodyPr wrap="square" rtlCol="0">
+            <a:spAutoFit/>
+          </a:bodyPr>
+          <a:lstStyle/>
+          <a:p>
+            <a:pPr algn="r"/>
+            <a:r>
+              <a:rPr lang="pt-BR" sz="1400" dirty="0" smtClean="0">
+                <a:solidFill>
+                  <a:srgbClr val="8E959E"/>
+                </a:solidFill>
+                <a:latin typeface="Century Gothic" panose="020B0502020202020204" pitchFamily="34" charset="0"/>
+              </a:rPr>
+              <a:t>GPU</a:t>
+            </a:r>
+            <a:endParaRPr lang="pt-BR" sz="1400" dirty="0">
+              <a:solidFill>
+                <a:srgbClr val="8E959E"/>
+              </a:solidFill>
+              <a:latin typeface="Century Gothic" panose="020B0502020202020204" pitchFamily="34" charset="0"/>
+            </a:endParaRPr>
+          </a:p>
+        </p:txBody>
+      </p:sp>
+      <p:sp>
+        <p:nvSpPr>
+          <p:cNvPr id="86" name="CaixaDeTexto 85"/>
+          <p:cNvSpPr txBox="1"/>
+          <p:nvPr/>
+        </p:nvSpPr>
+        <p:spPr>
+          <a:xfrm>
+            <a:off x="4799070" y="1737227"/>
+            <a:ext cx="730837" cy="400110"/>
+          </a:xfrm>
+          <a:prstGeom prst="rect">
+            <a:avLst/>
+          </a:prstGeom>
+          <a:noFill/>
+        </p:spPr>
+        <p:txBody>
+          <a:bodyPr wrap="square" rtlCol="0">
+            <a:spAutoFit/>
+          </a:bodyPr>
+          <a:lstStyle/>
+          <a:p>
+            <a:r>
+              <a:rPr lang="pt-BR" sz="2000" dirty="0" smtClean="0">
+                <a:solidFill>
+                  <a:schemeClr val="bg1">
+                    <a:lumMod val="75000"/>
+                  </a:schemeClr>
+                </a:solidFill>
+                <a:latin typeface="Century Gothic" panose="020B0502020202020204" pitchFamily="34" charset="0"/>
+              </a:rPr>
+              <a:t>55%</a:t>
+            </a:r>
+            <a:endParaRPr lang="pt-BR" sz="2000" dirty="0">
+              <a:solidFill>
+                <a:schemeClr val="bg1">
+                  <a:lumMod val="75000"/>
+                </a:schemeClr>
+              </a:solidFill>
+              <a:latin typeface="Century Gothic" panose="020B0502020202020204" pitchFamily="34" charset="0"/>
+            </a:endParaRPr>
+          </a:p>
+        </p:txBody>
+      </p:sp>
+      <p:sp>
+        <p:nvSpPr>
+          <p:cNvPr id="87" name="CaixaDeTexto 86"/>
+          <p:cNvSpPr txBox="1"/>
+          <p:nvPr/>
+        </p:nvSpPr>
+        <p:spPr>
+          <a:xfrm>
+            <a:off x="4139201" y="2556438"/>
+            <a:ext cx="730837" cy="307777"/>
+          </a:xfrm>
+          <a:prstGeom prst="rect">
+            <a:avLst/>
+          </a:prstGeom>
+          <a:noFill/>
+        </p:spPr>
+        <p:txBody>
+          <a:bodyPr wrap="square" rtlCol="0">
+            <a:spAutoFit/>
+          </a:bodyPr>
+          <a:lstStyle/>
+          <a:p>
+            <a:pPr algn="r"/>
+            <a:r>
+              <a:rPr lang="pt-BR" sz="1400" dirty="0" smtClean="0">
+                <a:solidFill>
+                  <a:srgbClr val="8E959E"/>
+                </a:solidFill>
+                <a:latin typeface="Century Gothic" panose="020B0502020202020204" pitchFamily="34" charset="0"/>
+              </a:rPr>
+              <a:t>CPU</a:t>
+            </a:r>
+            <a:endParaRPr lang="pt-BR" sz="1400" dirty="0">
+              <a:solidFill>
+                <a:srgbClr val="8E959E"/>
+              </a:solidFill>
+              <a:latin typeface="Century Gothic" panose="020B0502020202020204" pitchFamily="34" charset="0"/>
+            </a:endParaRPr>
+          </a:p>
+        </p:txBody>
+      </p:sp>
+      <p:sp>
+        <p:nvSpPr>
+          <p:cNvPr id="88" name="CaixaDeTexto 87"/>
+          <p:cNvSpPr txBox="1"/>
+          <p:nvPr/>
+        </p:nvSpPr>
+        <p:spPr>
+          <a:xfrm>
+            <a:off x="4799070" y="2484889"/>
+            <a:ext cx="730837" cy="400110"/>
+          </a:xfrm>
+          <a:prstGeom prst="rect">
+            <a:avLst/>
+          </a:prstGeom>
+          <a:noFill/>
+        </p:spPr>
+        <p:txBody>
+          <a:bodyPr wrap="square" rtlCol="0">
+            <a:spAutoFit/>
+          </a:bodyPr>
+          <a:lstStyle/>
+          <a:p>
+            <a:r>
+              <a:rPr lang="pt-BR" sz="2000" dirty="0" smtClean="0">
+                <a:solidFill>
+                  <a:schemeClr val="bg1">
+                    <a:lumMod val="75000"/>
+                  </a:schemeClr>
+                </a:solidFill>
+                <a:latin typeface="Century Gothic" panose="020B0502020202020204" pitchFamily="34" charset="0"/>
+              </a:rPr>
+              <a:t>76%</a:t>
+            </a:r>
+            <a:endParaRPr lang="pt-BR" sz="2000" dirty="0">
+              <a:solidFill>
+                <a:schemeClr val="bg1">
+                  <a:lumMod val="75000"/>
+                </a:schemeClr>
+              </a:solidFill>
+              <a:latin typeface="Century Gothic" panose="020B0502020202020204" pitchFamily="34" charset="0"/>
+            </a:endParaRPr>
+          </a:p>
+        </p:txBody>
+      </p:sp>
+      <p:sp>
+        <p:nvSpPr>
+          <p:cNvPr id="89" name="CaixaDeTexto 88"/>
+          <p:cNvSpPr txBox="1"/>
+          <p:nvPr/>
+        </p:nvSpPr>
+        <p:spPr>
+          <a:xfrm>
+            <a:off x="4139201" y="2923643"/>
+            <a:ext cx="730837" cy="307777"/>
+          </a:xfrm>
+          <a:prstGeom prst="rect">
+            <a:avLst/>
+          </a:prstGeom>
+          <a:noFill/>
+        </p:spPr>
+        <p:txBody>
+          <a:bodyPr wrap="square" rtlCol="0">
+            <a:spAutoFit/>
+          </a:bodyPr>
+          <a:lstStyle/>
+          <a:p>
+            <a:pPr algn="r"/>
+            <a:r>
+              <a:rPr lang="pt-BR" sz="1400" dirty="0" smtClean="0">
+                <a:solidFill>
+                  <a:srgbClr val="8E959E"/>
+                </a:solidFill>
+                <a:latin typeface="Century Gothic" panose="020B0502020202020204" pitchFamily="34" charset="0"/>
+              </a:rPr>
+              <a:t>GPU</a:t>
+            </a:r>
+            <a:endParaRPr lang="pt-BR" sz="1400" dirty="0">
+              <a:solidFill>
+                <a:srgbClr val="8E959E"/>
+              </a:solidFill>
+              <a:latin typeface="Century Gothic" panose="020B0502020202020204" pitchFamily="34" charset="0"/>
+            </a:endParaRPr>
+          </a:p>
+        </p:txBody>
+      </p:sp>
+      <p:sp>
+        <p:nvSpPr>
+          <p:cNvPr id="90" name="CaixaDeTexto 89"/>
+          <p:cNvSpPr txBox="1"/>
+          <p:nvPr/>
+        </p:nvSpPr>
+        <p:spPr>
+          <a:xfrm>
+            <a:off x="4799070" y="2852094"/>
+            <a:ext cx="730837" cy="400110"/>
+          </a:xfrm>
+          <a:prstGeom prst="rect">
+            <a:avLst/>
+          </a:prstGeom>
+          <a:noFill/>
+        </p:spPr>
+        <p:txBody>
+          <a:bodyPr wrap="square" rtlCol="0">
+            <a:spAutoFit/>
+          </a:bodyPr>
+          <a:lstStyle/>
+          <a:p>
+            <a:r>
+              <a:rPr lang="pt-BR" sz="2000" dirty="0" smtClean="0">
+                <a:solidFill>
+                  <a:schemeClr val="bg1">
+                    <a:lumMod val="75000"/>
+                  </a:schemeClr>
+                </a:solidFill>
+                <a:latin typeface="Century Gothic" panose="020B0502020202020204" pitchFamily="34" charset="0"/>
+              </a:rPr>
+              <a:t>55%</a:t>
+            </a:r>
+            <a:endParaRPr lang="pt-BR" sz="2000" dirty="0">
+              <a:solidFill>
+                <a:schemeClr val="bg1">
+                  <a:lumMod val="75000"/>
+                </a:schemeClr>
+              </a:solidFill>
+              <a:latin typeface="Century Gothic" panose="020B0502020202020204" pitchFamily="34" charset="0"/>
+            </a:endParaRPr>
+          </a:p>
+        </p:txBody>
+      </p:sp>
+      <p:sp>
+        <p:nvSpPr>
+          <p:cNvPr id="99" name="CaixaDeTexto 98"/>
+          <p:cNvSpPr txBox="1"/>
+          <p:nvPr/>
+        </p:nvSpPr>
+        <p:spPr>
+          <a:xfrm>
+            <a:off x="4139201" y="3610978"/>
+            <a:ext cx="730837" cy="307777"/>
+          </a:xfrm>
+          <a:prstGeom prst="rect">
+            <a:avLst/>
+          </a:prstGeom>
+          <a:noFill/>
+        </p:spPr>
+        <p:txBody>
+          <a:bodyPr wrap="square" rtlCol="0">
+            <a:spAutoFit/>
+          </a:bodyPr>
+          <a:lstStyle/>
+          <a:p>
+            <a:pPr algn="r"/>
+            <a:r>
+              <a:rPr lang="pt-BR" sz="1400" dirty="0" smtClean="0">
+                <a:solidFill>
+                  <a:srgbClr val="8E959E"/>
+                </a:solidFill>
+                <a:latin typeface="Century Gothic" panose="020B0502020202020204" pitchFamily="34" charset="0"/>
+              </a:rPr>
+              <a:t>CPU</a:t>
+            </a:r>
+            <a:endParaRPr lang="pt-BR" sz="1400" dirty="0">
+              <a:solidFill>
+                <a:srgbClr val="8E959E"/>
+              </a:solidFill>
+              <a:latin typeface="Century Gothic" panose="020B0502020202020204" pitchFamily="34" charset="0"/>
+            </a:endParaRPr>
+          </a:p>
+        </p:txBody>
+      </p:sp>
+      <p:sp>
+        <p:nvSpPr>
+          <p:cNvPr id="100" name="CaixaDeTexto 99"/>
+          <p:cNvSpPr txBox="1"/>
+          <p:nvPr/>
+        </p:nvSpPr>
+        <p:spPr>
+          <a:xfrm>
+            <a:off x="4799070" y="3539429"/>
+            <a:ext cx="730837" cy="400110"/>
+          </a:xfrm>
+          <a:prstGeom prst="rect">
+            <a:avLst/>
+          </a:prstGeom>
+          <a:noFill/>
+        </p:spPr>
+        <p:txBody>
+          <a:bodyPr wrap="square" rtlCol="0">
+            <a:spAutoFit/>
+          </a:bodyPr>
+          <a:lstStyle/>
+          <a:p>
+            <a:r>
+              <a:rPr lang="pt-BR" sz="2000" dirty="0" smtClean="0">
+                <a:solidFill>
+                  <a:schemeClr val="bg1">
+                    <a:lumMod val="75000"/>
+                  </a:schemeClr>
+                </a:solidFill>
+                <a:latin typeface="Century Gothic" panose="020B0502020202020204" pitchFamily="34" charset="0"/>
+              </a:rPr>
+              <a:t>76%</a:t>
+            </a:r>
+            <a:endParaRPr lang="pt-BR" sz="2000" dirty="0">
+              <a:solidFill>
+                <a:schemeClr val="bg1">
+                  <a:lumMod val="75000"/>
+                </a:schemeClr>
+              </a:solidFill>
+              <a:latin typeface="Century Gothic" panose="020B0502020202020204" pitchFamily="34" charset="0"/>
+            </a:endParaRPr>
+          </a:p>
+        </p:txBody>
+      </p:sp>
+      <p:sp>
+        <p:nvSpPr>
+          <p:cNvPr id="101" name="CaixaDeTexto 100"/>
+          <p:cNvSpPr txBox="1"/>
+          <p:nvPr/>
+        </p:nvSpPr>
+        <p:spPr>
+          <a:xfrm>
+            <a:off x="4139201" y="3978183"/>
+            <a:ext cx="730837" cy="307777"/>
+          </a:xfrm>
+          <a:prstGeom prst="rect">
+            <a:avLst/>
+          </a:prstGeom>
+          <a:noFill/>
+        </p:spPr>
+        <p:txBody>
+          <a:bodyPr wrap="square" rtlCol="0">
+            <a:spAutoFit/>
+          </a:bodyPr>
+          <a:lstStyle/>
+          <a:p>
+            <a:pPr algn="r"/>
+            <a:r>
+              <a:rPr lang="pt-BR" sz="1400" dirty="0" smtClean="0">
+                <a:solidFill>
+                  <a:srgbClr val="8E959E"/>
+                </a:solidFill>
+                <a:latin typeface="Century Gothic" panose="020B0502020202020204" pitchFamily="34" charset="0"/>
+              </a:rPr>
+              <a:t>GPU</a:t>
+            </a:r>
+            <a:endParaRPr lang="pt-BR" sz="1400" dirty="0">
+              <a:solidFill>
+                <a:srgbClr val="8E959E"/>
+              </a:solidFill>
+              <a:latin typeface="Century Gothic" panose="020B0502020202020204" pitchFamily="34" charset="0"/>
+            </a:endParaRPr>
+          </a:p>
+        </p:txBody>
+      </p:sp>
+      <p:sp>
+        <p:nvSpPr>
+          <p:cNvPr id="102" name="CaixaDeTexto 101"/>
+          <p:cNvSpPr txBox="1"/>
+          <p:nvPr/>
+        </p:nvSpPr>
+        <p:spPr>
+          <a:xfrm>
+            <a:off x="4799070" y="3906634"/>
+            <a:ext cx="730837" cy="400110"/>
+          </a:xfrm>
+          <a:prstGeom prst="rect">
+            <a:avLst/>
+          </a:prstGeom>
+          <a:noFill/>
+        </p:spPr>
+        <p:txBody>
+          <a:bodyPr wrap="square" rtlCol="0">
+            <a:spAutoFit/>
+          </a:bodyPr>
+          <a:lstStyle/>
+          <a:p>
+            <a:r>
+              <a:rPr lang="pt-BR" sz="2000" dirty="0" smtClean="0">
+                <a:solidFill>
+                  <a:schemeClr val="bg1">
+                    <a:lumMod val="75000"/>
+                  </a:schemeClr>
+                </a:solidFill>
+                <a:latin typeface="Century Gothic" panose="020B0502020202020204" pitchFamily="34" charset="0"/>
+              </a:rPr>
+              <a:t>55%</a:t>
+            </a:r>
+            <a:endParaRPr lang="pt-BR" sz="2000" dirty="0">
+              <a:solidFill>
+                <a:schemeClr val="bg1">
+                  <a:lumMod val="75000"/>
+                </a:schemeClr>
+              </a:solidFill>
+              <a:latin typeface="Century Gothic" panose="020B0502020202020204" pitchFamily="34" charset="0"/>
+            </a:endParaRPr>
+          </a:p>
+        </p:txBody>
+      </p:sp>
+      <p:sp>
+        <p:nvSpPr>
+          <p:cNvPr id="103" name="CaixaDeTexto 102"/>
+          <p:cNvSpPr txBox="1"/>
+          <p:nvPr/>
+        </p:nvSpPr>
+        <p:spPr>
+          <a:xfrm>
+            <a:off x="4139201" y="4665077"/>
+            <a:ext cx="730837" cy="307777"/>
+          </a:xfrm>
+          <a:prstGeom prst="rect">
+            <a:avLst/>
+          </a:prstGeom>
+          <a:noFill/>
+        </p:spPr>
+        <p:txBody>
+          <a:bodyPr wrap="square" rtlCol="0">
+            <a:spAutoFit/>
+          </a:bodyPr>
+          <a:lstStyle/>
+          <a:p>
+            <a:pPr algn="r"/>
+            <a:r>
+              <a:rPr lang="pt-BR" sz="1400" dirty="0" smtClean="0">
+                <a:solidFill>
+                  <a:srgbClr val="8E959E"/>
+                </a:solidFill>
+                <a:latin typeface="Century Gothic" panose="020B0502020202020204" pitchFamily="34" charset="0"/>
+              </a:rPr>
+              <a:t>CPU</a:t>
+            </a:r>
+            <a:endParaRPr lang="pt-BR" sz="1400" dirty="0">
+              <a:solidFill>
+                <a:srgbClr val="8E959E"/>
+              </a:solidFill>
+              <a:latin typeface="Century Gothic" panose="020B0502020202020204" pitchFamily="34" charset="0"/>
+            </a:endParaRPr>
+          </a:p>
+        </p:txBody>
+      </p:sp>
+      <p:sp>
+        <p:nvSpPr>
+          <p:cNvPr id="104" name="CaixaDeTexto 103"/>
+          <p:cNvSpPr txBox="1"/>
+          <p:nvPr/>
+        </p:nvSpPr>
+        <p:spPr>
+          <a:xfrm>
+            <a:off x="4799070" y="4593528"/>
+            <a:ext cx="730837" cy="400110"/>
+          </a:xfrm>
+          <a:prstGeom prst="rect">
+            <a:avLst/>
+          </a:prstGeom>
+          <a:noFill/>
+        </p:spPr>
+        <p:txBody>
+          <a:bodyPr wrap="square" rtlCol="0">
+            <a:spAutoFit/>
+          </a:bodyPr>
+          <a:lstStyle/>
+          <a:p>
+            <a:r>
+              <a:rPr lang="pt-BR" sz="2000" dirty="0" smtClean="0">
+                <a:solidFill>
+                  <a:schemeClr val="bg1">
+                    <a:lumMod val="75000"/>
+                  </a:schemeClr>
+                </a:solidFill>
+                <a:latin typeface="Century Gothic" panose="020B0502020202020204" pitchFamily="34" charset="0"/>
+              </a:rPr>
+              <a:t>76%</a:t>
+            </a:r>
+            <a:endParaRPr lang="pt-BR" sz="2000" dirty="0">
+              <a:solidFill>
+                <a:schemeClr val="bg1">
+                  <a:lumMod val="75000"/>
+                </a:schemeClr>
+              </a:solidFill>
+              <a:latin typeface="Century Gothic" panose="020B0502020202020204" pitchFamily="34" charset="0"/>
+            </a:endParaRPr>
+          </a:p>
+        </p:txBody>
+      </p:sp>
+      <p:sp>
+        <p:nvSpPr>
+          <p:cNvPr id="105" name="CaixaDeTexto 104"/>
+          <p:cNvSpPr txBox="1"/>
+          <p:nvPr/>
+        </p:nvSpPr>
+        <p:spPr>
+          <a:xfrm>
+            <a:off x="4139201" y="5032282"/>
+            <a:ext cx="730837" cy="307777"/>
+          </a:xfrm>
+          <a:prstGeom prst="rect">
+            <a:avLst/>
+          </a:prstGeom>
+          <a:noFill/>
+        </p:spPr>
+        <p:txBody>
+          <a:bodyPr wrap="square" rtlCol="0">
+            <a:spAutoFit/>
+          </a:bodyPr>
+          <a:lstStyle/>
+          <a:p>
+            <a:pPr algn="r"/>
+            <a:r>
+              <a:rPr lang="pt-BR" sz="1400" dirty="0" smtClean="0">
+                <a:ln w="3175">
+                  <a:solidFill>
+                    <a:srgbClr val="FF3F3F"/>
+                  </a:solidFill>
+                </a:ln>
+                <a:solidFill>
+                  <a:srgbClr val="FF3F3F"/>
+                </a:solidFill>
+                <a:latin typeface="Century Gothic" panose="020B0502020202020204" pitchFamily="34" charset="0"/>
+              </a:rPr>
+              <a:t>GPU</a:t>
+            </a:r>
+            <a:endParaRPr lang="pt-BR" sz="1400" dirty="0">
+              <a:ln w="3175">
+                <a:solidFill>
+                  <a:srgbClr val="FF3F3F"/>
+                </a:solidFill>
+              </a:ln>
+              <a:solidFill>
+                <a:srgbClr val="FF3F3F"/>
+              </a:solidFill>
+              <a:latin typeface="Century Gothic" panose="020B0502020202020204" pitchFamily="34" charset="0"/>
+            </a:endParaRPr>
+          </a:p>
+        </p:txBody>
+      </p:sp>
+      <p:sp>
+        <p:nvSpPr>
+          <p:cNvPr id="106" name="CaixaDeTexto 105"/>
+          <p:cNvSpPr txBox="1"/>
+          <p:nvPr/>
+        </p:nvSpPr>
+        <p:spPr>
+          <a:xfrm>
+            <a:off x="4799070" y="4960733"/>
+            <a:ext cx="986944" cy="400110"/>
+          </a:xfrm>
+          <a:prstGeom prst="rect">
+            <a:avLst/>
+          </a:prstGeom>
+          <a:noFill/>
+        </p:spPr>
+        <p:txBody>
+          <a:bodyPr wrap="square" rtlCol="0">
+            <a:spAutoFit/>
+          </a:bodyPr>
+          <a:lstStyle/>
+          <a:p>
+            <a:r>
+              <a:rPr lang="pt-BR" sz="2000" dirty="0" smtClean="0">
+                <a:ln w="3175">
+                  <a:solidFill>
+                    <a:srgbClr val="FF3F3F"/>
+                  </a:solidFill>
+                </a:ln>
+                <a:solidFill>
+                  <a:srgbClr val="FF3F3F"/>
+                </a:solidFill>
+                <a:latin typeface="Century Gothic" panose="020B0502020202020204" pitchFamily="34" charset="0"/>
+              </a:rPr>
+              <a:t>100%</a:t>
+            </a:r>
+            <a:endParaRPr lang="pt-BR" sz="2000" dirty="0">
+              <a:ln w="3175">
+                <a:solidFill>
+                  <a:srgbClr val="FF3F3F"/>
+                </a:solidFill>
+              </a:ln>
+              <a:solidFill>
+                <a:srgbClr val="FF3F3F"/>
+              </a:solidFill>
+              <a:latin typeface="Century Gothic" panose="020B0502020202020204" pitchFamily="34" charset="0"/>
+            </a:endParaRPr>
+          </a:p>
+        </p:txBody>
+      </p:sp>
+      <p:sp>
+        <p:nvSpPr>
+          <p:cNvPr id="107" name="CaixaDeTexto 106"/>
+          <p:cNvSpPr txBox="1"/>
+          <p:nvPr/>
+        </p:nvSpPr>
+        <p:spPr>
+          <a:xfrm>
+            <a:off x="4139201" y="5707296"/>
+            <a:ext cx="730837" cy="307777"/>
+          </a:xfrm>
+          <a:prstGeom prst="rect">
+            <a:avLst/>
+          </a:prstGeom>
+          <a:noFill/>
+        </p:spPr>
+        <p:txBody>
+          <a:bodyPr wrap="square" rtlCol="0">
+            <a:spAutoFit/>
+          </a:bodyPr>
+          <a:lstStyle/>
+          <a:p>
+            <a:pPr algn="r"/>
+            <a:r>
+              <a:rPr lang="pt-BR" sz="1400" dirty="0" smtClean="0">
+                <a:solidFill>
+                  <a:srgbClr val="8E959E"/>
+                </a:solidFill>
+                <a:latin typeface="Century Gothic" panose="020B0502020202020204" pitchFamily="34" charset="0"/>
+              </a:rPr>
+              <a:t>CPU</a:t>
+            </a:r>
+            <a:endParaRPr lang="pt-BR" sz="1400" dirty="0">
+              <a:solidFill>
+                <a:srgbClr val="8E959E"/>
+              </a:solidFill>
+              <a:latin typeface="Century Gothic" panose="020B0502020202020204" pitchFamily="34" charset="0"/>
+            </a:endParaRPr>
+          </a:p>
+        </p:txBody>
+      </p:sp>
+      <p:sp>
+        <p:nvSpPr>
+          <p:cNvPr id="108" name="CaixaDeTexto 107"/>
+          <p:cNvSpPr txBox="1"/>
+          <p:nvPr/>
+        </p:nvSpPr>
+        <p:spPr>
+          <a:xfrm>
+            <a:off x="4799070" y="5635747"/>
+            <a:ext cx="730837" cy="400110"/>
+          </a:xfrm>
+          <a:prstGeom prst="rect">
+            <a:avLst/>
+          </a:prstGeom>
+          <a:noFill/>
+        </p:spPr>
+        <p:txBody>
+          <a:bodyPr wrap="square" rtlCol="0">
+            <a:spAutoFit/>
+          </a:bodyPr>
+          <a:lstStyle/>
+          <a:p>
+            <a:r>
+              <a:rPr lang="pt-BR" sz="2000" dirty="0" smtClean="0">
+                <a:solidFill>
+                  <a:schemeClr val="bg1">
+                    <a:lumMod val="75000"/>
+                  </a:schemeClr>
+                </a:solidFill>
+                <a:latin typeface="Century Gothic" panose="020B0502020202020204" pitchFamily="34" charset="0"/>
+              </a:rPr>
+              <a:t>76%</a:t>
+            </a:r>
+            <a:endParaRPr lang="pt-BR" sz="2000" dirty="0">
+              <a:solidFill>
+                <a:schemeClr val="bg1">
+                  <a:lumMod val="75000"/>
+                </a:schemeClr>
+              </a:solidFill>
+              <a:latin typeface="Century Gothic" panose="020B0502020202020204" pitchFamily="34" charset="0"/>
+            </a:endParaRPr>
+          </a:p>
+        </p:txBody>
+      </p:sp>
+      <p:sp>
+        <p:nvSpPr>
+          <p:cNvPr id="109" name="CaixaDeTexto 108"/>
+          <p:cNvSpPr txBox="1"/>
+          <p:nvPr/>
+        </p:nvSpPr>
+        <p:spPr>
+          <a:xfrm>
+            <a:off x="4139201" y="6074501"/>
+            <a:ext cx="730837" cy="307777"/>
+          </a:xfrm>
+          <a:prstGeom prst="rect">
+            <a:avLst/>
+          </a:prstGeom>
+          <a:noFill/>
+        </p:spPr>
+        <p:txBody>
+          <a:bodyPr wrap="square" rtlCol="0">
+            <a:spAutoFit/>
+          </a:bodyPr>
+          <a:lstStyle/>
+          <a:p>
+            <a:pPr algn="r"/>
+            <a:r>
+              <a:rPr lang="pt-BR" sz="1400" dirty="0" smtClean="0">
+                <a:solidFill>
+                  <a:srgbClr val="8E959E"/>
+                </a:solidFill>
+                <a:latin typeface="Century Gothic" panose="020B0502020202020204" pitchFamily="34" charset="0"/>
+              </a:rPr>
+              <a:t>GPU</a:t>
+            </a:r>
+            <a:endParaRPr lang="pt-BR" sz="1400" dirty="0">
+              <a:solidFill>
+                <a:srgbClr val="8E959E"/>
+              </a:solidFill>
+              <a:latin typeface="Century Gothic" panose="020B0502020202020204" pitchFamily="34" charset="0"/>
+            </a:endParaRPr>
+          </a:p>
+        </p:txBody>
+      </p:sp>
+      <p:sp>
+        <p:nvSpPr>
+          <p:cNvPr id="110" name="CaixaDeTexto 109"/>
+          <p:cNvSpPr txBox="1"/>
+          <p:nvPr/>
+        </p:nvSpPr>
+        <p:spPr>
+          <a:xfrm>
+            <a:off x="4799070" y="6002952"/>
+            <a:ext cx="730837" cy="400110"/>
+          </a:xfrm>
+          <a:prstGeom prst="rect">
+            <a:avLst/>
+          </a:prstGeom>
+          <a:noFill/>
+        </p:spPr>
+        <p:txBody>
+          <a:bodyPr wrap="square" rtlCol="0">
+            <a:spAutoFit/>
+          </a:bodyPr>
+          <a:lstStyle/>
+          <a:p>
+            <a:r>
+              <a:rPr lang="pt-BR" sz="2000" dirty="0" smtClean="0">
+                <a:solidFill>
+                  <a:schemeClr val="bg1">
+                    <a:lumMod val="75000"/>
+                  </a:schemeClr>
+                </a:solidFill>
+                <a:latin typeface="Century Gothic" panose="020B0502020202020204" pitchFamily="34" charset="0"/>
+              </a:rPr>
+              <a:t>55%</a:t>
+            </a:r>
+            <a:endParaRPr lang="pt-BR" sz="2000" dirty="0">
+              <a:solidFill>
+                <a:schemeClr val="bg1">
+                  <a:lumMod val="75000"/>
+                </a:schemeClr>
+              </a:solidFill>
+              <a:latin typeface="Century Gothic" panose="020B0502020202020204" pitchFamily="34" charset="0"/>
+            </a:endParaRPr>
+          </a:p>
+        </p:txBody>
+      </p:sp>
+      <p:sp>
+        <p:nvSpPr>
+          <p:cNvPr id="111" name="CaixaDeTexto 110"/>
+          <p:cNvSpPr txBox="1"/>
+          <p:nvPr/>
+        </p:nvSpPr>
+        <p:spPr>
+          <a:xfrm>
+            <a:off x="8695224" y="1420787"/>
+            <a:ext cx="730837" cy="307777"/>
+          </a:xfrm>
+          <a:prstGeom prst="rect">
+            <a:avLst/>
+          </a:prstGeom>
+          <a:noFill/>
+        </p:spPr>
+        <p:txBody>
+          <a:bodyPr wrap="square" rtlCol="0">
+            <a:spAutoFit/>
+          </a:bodyPr>
+          <a:lstStyle/>
+          <a:p>
+            <a:pPr algn="r"/>
+            <a:r>
+              <a:rPr lang="pt-BR" sz="1400" dirty="0" smtClean="0">
+                <a:solidFill>
+                  <a:srgbClr val="8E959E"/>
+                </a:solidFill>
+                <a:latin typeface="Century Gothic" panose="020B0502020202020204" pitchFamily="34" charset="0"/>
+              </a:rPr>
+              <a:t>CPU</a:t>
+            </a:r>
+            <a:endParaRPr lang="pt-BR" sz="1400" dirty="0">
+              <a:solidFill>
+                <a:srgbClr val="8E959E"/>
+              </a:solidFill>
+              <a:latin typeface="Century Gothic" panose="020B0502020202020204" pitchFamily="34" charset="0"/>
+            </a:endParaRPr>
+          </a:p>
+        </p:txBody>
+      </p:sp>
+      <p:sp>
+        <p:nvSpPr>
+          <p:cNvPr id="112" name="CaixaDeTexto 111"/>
+          <p:cNvSpPr txBox="1"/>
+          <p:nvPr/>
+        </p:nvSpPr>
+        <p:spPr>
+          <a:xfrm>
+            <a:off x="9355093" y="1349238"/>
+            <a:ext cx="730837" cy="400110"/>
+          </a:xfrm>
+          <a:prstGeom prst="rect">
+            <a:avLst/>
+          </a:prstGeom>
+          <a:noFill/>
+        </p:spPr>
+        <p:txBody>
+          <a:bodyPr wrap="square" rtlCol="0">
+            <a:spAutoFit/>
+          </a:bodyPr>
+          <a:lstStyle/>
+          <a:p>
+            <a:r>
+              <a:rPr lang="pt-BR" sz="2000" dirty="0" smtClean="0">
+                <a:solidFill>
+                  <a:schemeClr val="bg1">
+                    <a:lumMod val="75000"/>
+                  </a:schemeClr>
+                </a:solidFill>
+                <a:latin typeface="Century Gothic" panose="020B0502020202020204" pitchFamily="34" charset="0"/>
+              </a:rPr>
+              <a:t>76%</a:t>
+            </a:r>
+            <a:endParaRPr lang="pt-BR" sz="2000" dirty="0">
+              <a:solidFill>
+                <a:schemeClr val="bg1">
+                  <a:lumMod val="75000"/>
+                </a:schemeClr>
+              </a:solidFill>
+              <a:latin typeface="Century Gothic" panose="020B0502020202020204" pitchFamily="34" charset="0"/>
+            </a:endParaRPr>
+          </a:p>
+        </p:txBody>
+      </p:sp>
+      <p:sp>
+        <p:nvSpPr>
+          <p:cNvPr id="113" name="CaixaDeTexto 112"/>
+          <p:cNvSpPr txBox="1"/>
+          <p:nvPr/>
+        </p:nvSpPr>
+        <p:spPr>
+          <a:xfrm>
+            <a:off x="8695224" y="1787992"/>
+            <a:ext cx="730837" cy="307777"/>
+          </a:xfrm>
+          <a:prstGeom prst="rect">
+            <a:avLst/>
+          </a:prstGeom>
+          <a:noFill/>
+        </p:spPr>
+        <p:txBody>
+          <a:bodyPr wrap="square" rtlCol="0">
+            <a:spAutoFit/>
+          </a:bodyPr>
+          <a:lstStyle/>
+          <a:p>
+            <a:pPr algn="r"/>
+            <a:r>
+              <a:rPr lang="pt-BR" sz="1400" dirty="0" smtClean="0">
+                <a:solidFill>
+                  <a:srgbClr val="8E959E"/>
+                </a:solidFill>
+                <a:latin typeface="Century Gothic" panose="020B0502020202020204" pitchFamily="34" charset="0"/>
+              </a:rPr>
+              <a:t>GPU</a:t>
+            </a:r>
+            <a:endParaRPr lang="pt-BR" sz="1400" dirty="0">
+              <a:solidFill>
+                <a:srgbClr val="8E959E"/>
+              </a:solidFill>
+              <a:latin typeface="Century Gothic" panose="020B0502020202020204" pitchFamily="34" charset="0"/>
+            </a:endParaRPr>
+          </a:p>
+        </p:txBody>
+      </p:sp>
+      <p:sp>
+        <p:nvSpPr>
+          <p:cNvPr id="114" name="CaixaDeTexto 113"/>
+          <p:cNvSpPr txBox="1"/>
+          <p:nvPr/>
+        </p:nvSpPr>
+        <p:spPr>
+          <a:xfrm>
+            <a:off x="9355093" y="1716443"/>
+            <a:ext cx="730837" cy="400110"/>
+          </a:xfrm>
+          <a:prstGeom prst="rect">
+            <a:avLst/>
+          </a:prstGeom>
+          <a:noFill/>
+        </p:spPr>
+        <p:txBody>
+          <a:bodyPr wrap="square" rtlCol="0">
+            <a:spAutoFit/>
+          </a:bodyPr>
+          <a:lstStyle/>
+          <a:p>
+            <a:r>
+              <a:rPr lang="pt-BR" sz="2000" dirty="0" smtClean="0">
+                <a:solidFill>
+                  <a:schemeClr val="bg1">
+                    <a:lumMod val="75000"/>
+                  </a:schemeClr>
+                </a:solidFill>
+                <a:latin typeface="Century Gothic" panose="020B0502020202020204" pitchFamily="34" charset="0"/>
+              </a:rPr>
+              <a:t>55%</a:t>
+            </a:r>
+            <a:endParaRPr lang="pt-BR" sz="2000" dirty="0">
+              <a:solidFill>
+                <a:schemeClr val="bg1">
+                  <a:lumMod val="75000"/>
+                </a:schemeClr>
+              </a:solidFill>
+              <a:latin typeface="Century Gothic" panose="020B0502020202020204" pitchFamily="34" charset="0"/>
+            </a:endParaRPr>
+          </a:p>
+        </p:txBody>
+      </p:sp>
+      <p:sp>
+        <p:nvSpPr>
+          <p:cNvPr id="115" name="CaixaDeTexto 114"/>
+          <p:cNvSpPr txBox="1"/>
+          <p:nvPr/>
+        </p:nvSpPr>
+        <p:spPr>
+          <a:xfrm>
+            <a:off x="8695224" y="2535654"/>
+            <a:ext cx="730837" cy="307777"/>
+          </a:xfrm>
+          <a:prstGeom prst="rect">
+            <a:avLst/>
+          </a:prstGeom>
+          <a:noFill/>
+        </p:spPr>
+        <p:txBody>
+          <a:bodyPr wrap="square" rtlCol="0">
+            <a:spAutoFit/>
+          </a:bodyPr>
+          <a:lstStyle/>
+          <a:p>
+            <a:pPr algn="r"/>
+            <a:r>
+              <a:rPr lang="pt-BR" sz="1400" dirty="0" smtClean="0">
+                <a:ln w="3175">
+                  <a:solidFill>
+                    <a:srgbClr val="FF3F3F"/>
+                  </a:solidFill>
+                </a:ln>
+                <a:solidFill>
+                  <a:srgbClr val="FF3F3F"/>
+                </a:solidFill>
+                <a:latin typeface="Century Gothic" panose="020B0502020202020204" pitchFamily="34" charset="0"/>
+              </a:rPr>
+              <a:t>CPU</a:t>
+            </a:r>
+            <a:endParaRPr lang="pt-BR" sz="1400" dirty="0">
+              <a:ln w="3175">
+                <a:solidFill>
+                  <a:srgbClr val="FF3F3F"/>
+                </a:solidFill>
+              </a:ln>
+              <a:solidFill>
+                <a:srgbClr val="FF3F3F"/>
+              </a:solidFill>
+              <a:latin typeface="Century Gothic" panose="020B0502020202020204" pitchFamily="34" charset="0"/>
+            </a:endParaRPr>
+          </a:p>
+        </p:txBody>
+      </p:sp>
+      <p:sp>
+        <p:nvSpPr>
+          <p:cNvPr id="116" name="CaixaDeTexto 115"/>
+          <p:cNvSpPr txBox="1"/>
+          <p:nvPr/>
+        </p:nvSpPr>
+        <p:spPr>
+          <a:xfrm>
+            <a:off x="9355093" y="2464105"/>
+            <a:ext cx="730837" cy="400110"/>
+          </a:xfrm>
+          <a:prstGeom prst="rect">
+            <a:avLst/>
+          </a:prstGeom>
+          <a:noFill/>
+        </p:spPr>
+        <p:txBody>
+          <a:bodyPr wrap="square" rtlCol="0">
+            <a:spAutoFit/>
+          </a:bodyPr>
+          <a:lstStyle/>
+          <a:p>
+            <a:r>
+              <a:rPr lang="pt-BR" sz="2000" dirty="0" smtClean="0">
+                <a:ln w="3175">
+                  <a:solidFill>
+                    <a:srgbClr val="FF3F3F"/>
+                  </a:solidFill>
+                </a:ln>
+                <a:solidFill>
+                  <a:srgbClr val="FF3F3F"/>
+                </a:solidFill>
+                <a:latin typeface="Century Gothic" panose="020B0502020202020204" pitchFamily="34" charset="0"/>
+              </a:rPr>
+              <a:t>99%</a:t>
+            </a:r>
+            <a:endParaRPr lang="pt-BR" sz="2000" dirty="0">
+              <a:ln w="3175">
+                <a:solidFill>
+                  <a:srgbClr val="FF3F3F"/>
+                </a:solidFill>
+              </a:ln>
+              <a:solidFill>
+                <a:srgbClr val="FF3F3F"/>
+              </a:solidFill>
+              <a:latin typeface="Century Gothic" panose="020B0502020202020204" pitchFamily="34" charset="0"/>
+            </a:endParaRPr>
+          </a:p>
+        </p:txBody>
+      </p:sp>
+      <p:sp>
+        <p:nvSpPr>
+          <p:cNvPr id="117" name="CaixaDeTexto 116"/>
+          <p:cNvSpPr txBox="1"/>
+          <p:nvPr/>
+        </p:nvSpPr>
+        <p:spPr>
+          <a:xfrm>
+            <a:off x="8695224" y="2902859"/>
+            <a:ext cx="730837" cy="307777"/>
+          </a:xfrm>
+          <a:prstGeom prst="rect">
+            <a:avLst/>
+          </a:prstGeom>
+          <a:noFill/>
+        </p:spPr>
+        <p:txBody>
+          <a:bodyPr wrap="square" rtlCol="0">
+            <a:spAutoFit/>
+          </a:bodyPr>
+          <a:lstStyle/>
+          <a:p>
+            <a:pPr algn="r"/>
+            <a:r>
+              <a:rPr lang="pt-BR" sz="1400" dirty="0" smtClean="0">
+                <a:solidFill>
+                  <a:srgbClr val="8E959E"/>
+                </a:solidFill>
+                <a:latin typeface="Century Gothic" panose="020B0502020202020204" pitchFamily="34" charset="0"/>
+              </a:rPr>
+              <a:t>GPU</a:t>
+            </a:r>
+            <a:endParaRPr lang="pt-BR" sz="1400" dirty="0">
+              <a:solidFill>
+                <a:srgbClr val="8E959E"/>
+              </a:solidFill>
+              <a:latin typeface="Century Gothic" panose="020B0502020202020204" pitchFamily="34" charset="0"/>
+            </a:endParaRPr>
+          </a:p>
+        </p:txBody>
+      </p:sp>
+      <p:sp>
+        <p:nvSpPr>
+          <p:cNvPr id="118" name="CaixaDeTexto 117"/>
+          <p:cNvSpPr txBox="1"/>
+          <p:nvPr/>
+        </p:nvSpPr>
+        <p:spPr>
+          <a:xfrm>
+            <a:off x="9355093" y="2831310"/>
+            <a:ext cx="730837" cy="400110"/>
+          </a:xfrm>
+          <a:prstGeom prst="rect">
+            <a:avLst/>
+          </a:prstGeom>
+          <a:noFill/>
+        </p:spPr>
+        <p:txBody>
+          <a:bodyPr wrap="square" rtlCol="0">
+            <a:spAutoFit/>
+          </a:bodyPr>
+          <a:lstStyle/>
+          <a:p>
+            <a:r>
+              <a:rPr lang="pt-BR" sz="2000" dirty="0" smtClean="0">
+                <a:solidFill>
+                  <a:schemeClr val="bg1">
+                    <a:lumMod val="75000"/>
+                  </a:schemeClr>
+                </a:solidFill>
+                <a:latin typeface="Century Gothic" panose="020B0502020202020204" pitchFamily="34" charset="0"/>
+              </a:rPr>
+              <a:t>55%</a:t>
+            </a:r>
+            <a:endParaRPr lang="pt-BR" sz="2000" dirty="0">
+              <a:solidFill>
+                <a:schemeClr val="bg1">
+                  <a:lumMod val="75000"/>
+                </a:schemeClr>
+              </a:solidFill>
+              <a:latin typeface="Century Gothic" panose="020B0502020202020204" pitchFamily="34" charset="0"/>
+            </a:endParaRPr>
+          </a:p>
+        </p:txBody>
+      </p:sp>
+      <p:sp>
+        <p:nvSpPr>
+          <p:cNvPr id="119" name="CaixaDeTexto 118"/>
+          <p:cNvSpPr txBox="1"/>
+          <p:nvPr/>
+        </p:nvSpPr>
+        <p:spPr>
+          <a:xfrm>
+            <a:off x="8695224" y="3590194"/>
+            <a:ext cx="730837" cy="307777"/>
+          </a:xfrm>
+          <a:prstGeom prst="rect">
+            <a:avLst/>
+          </a:prstGeom>
+          <a:noFill/>
+        </p:spPr>
+        <p:txBody>
+          <a:bodyPr wrap="square" rtlCol="0">
+            <a:spAutoFit/>
+          </a:bodyPr>
+          <a:lstStyle/>
+          <a:p>
+            <a:pPr algn="r"/>
+            <a:r>
+              <a:rPr lang="pt-BR" sz="1400" dirty="0" smtClean="0">
+                <a:solidFill>
+                  <a:srgbClr val="8E959E"/>
+                </a:solidFill>
+                <a:latin typeface="Century Gothic" panose="020B0502020202020204" pitchFamily="34" charset="0"/>
+              </a:rPr>
+              <a:t>CPU</a:t>
+            </a:r>
+            <a:endParaRPr lang="pt-BR" sz="1400" dirty="0">
+              <a:solidFill>
+                <a:srgbClr val="8E959E"/>
+              </a:solidFill>
+              <a:latin typeface="Century Gothic" panose="020B0502020202020204" pitchFamily="34" charset="0"/>
+            </a:endParaRPr>
+          </a:p>
+        </p:txBody>
+      </p:sp>
+      <p:sp>
+        <p:nvSpPr>
+          <p:cNvPr id="120" name="CaixaDeTexto 119"/>
+          <p:cNvSpPr txBox="1"/>
+          <p:nvPr/>
+        </p:nvSpPr>
+        <p:spPr>
+          <a:xfrm>
+            <a:off x="9355093" y="3518645"/>
+            <a:ext cx="730837" cy="400110"/>
+          </a:xfrm>
+          <a:prstGeom prst="rect">
+            <a:avLst/>
+          </a:prstGeom>
+          <a:noFill/>
+        </p:spPr>
+        <p:txBody>
+          <a:bodyPr wrap="square" rtlCol="0">
+            <a:spAutoFit/>
+          </a:bodyPr>
+          <a:lstStyle/>
+          <a:p>
+            <a:r>
+              <a:rPr lang="pt-BR" sz="2000" dirty="0" smtClean="0">
+                <a:solidFill>
+                  <a:schemeClr val="bg1">
+                    <a:lumMod val="75000"/>
+                  </a:schemeClr>
+                </a:solidFill>
+                <a:latin typeface="Century Gothic" panose="020B0502020202020204" pitchFamily="34" charset="0"/>
+              </a:rPr>
+              <a:t>76%</a:t>
+            </a:r>
+            <a:endParaRPr lang="pt-BR" sz="2000" dirty="0">
+              <a:solidFill>
+                <a:schemeClr val="bg1">
+                  <a:lumMod val="75000"/>
+                </a:schemeClr>
+              </a:solidFill>
+              <a:latin typeface="Century Gothic" panose="020B0502020202020204" pitchFamily="34" charset="0"/>
+            </a:endParaRPr>
+          </a:p>
+        </p:txBody>
+      </p:sp>
+      <p:sp>
+        <p:nvSpPr>
+          <p:cNvPr id="121" name="CaixaDeTexto 120"/>
+          <p:cNvSpPr txBox="1"/>
+          <p:nvPr/>
+        </p:nvSpPr>
+        <p:spPr>
+          <a:xfrm>
+            <a:off x="8695224" y="3957399"/>
+            <a:ext cx="730837" cy="307777"/>
+          </a:xfrm>
+          <a:prstGeom prst="rect">
+            <a:avLst/>
+          </a:prstGeom>
+          <a:noFill/>
+        </p:spPr>
+        <p:txBody>
+          <a:bodyPr wrap="square" rtlCol="0">
+            <a:spAutoFit/>
+          </a:bodyPr>
+          <a:lstStyle/>
+          <a:p>
+            <a:pPr algn="r"/>
+            <a:r>
+              <a:rPr lang="pt-BR" sz="1400" dirty="0" smtClean="0">
+                <a:solidFill>
+                  <a:srgbClr val="8E959E"/>
+                </a:solidFill>
+                <a:latin typeface="Century Gothic" panose="020B0502020202020204" pitchFamily="34" charset="0"/>
+              </a:rPr>
+              <a:t>GPU</a:t>
+            </a:r>
+            <a:endParaRPr lang="pt-BR" sz="1400" dirty="0">
+              <a:solidFill>
+                <a:srgbClr val="8E959E"/>
+              </a:solidFill>
+              <a:latin typeface="Century Gothic" panose="020B0502020202020204" pitchFamily="34" charset="0"/>
+            </a:endParaRPr>
+          </a:p>
+        </p:txBody>
+      </p:sp>
+      <p:sp>
+        <p:nvSpPr>
+          <p:cNvPr id="122" name="CaixaDeTexto 121"/>
+          <p:cNvSpPr txBox="1"/>
+          <p:nvPr/>
+        </p:nvSpPr>
+        <p:spPr>
+          <a:xfrm>
+            <a:off x="9355093" y="3885850"/>
+            <a:ext cx="730837" cy="400110"/>
+          </a:xfrm>
+          <a:prstGeom prst="rect">
+            <a:avLst/>
+          </a:prstGeom>
+          <a:noFill/>
+        </p:spPr>
+        <p:txBody>
+          <a:bodyPr wrap="square" rtlCol="0">
+            <a:spAutoFit/>
+          </a:bodyPr>
+          <a:lstStyle/>
+          <a:p>
+            <a:r>
+              <a:rPr lang="pt-BR" sz="2000" dirty="0" smtClean="0">
+                <a:solidFill>
+                  <a:schemeClr val="bg1">
+                    <a:lumMod val="75000"/>
+                  </a:schemeClr>
+                </a:solidFill>
+                <a:latin typeface="Century Gothic" panose="020B0502020202020204" pitchFamily="34" charset="0"/>
+              </a:rPr>
+              <a:t>55%</a:t>
+            </a:r>
+            <a:endParaRPr lang="pt-BR" sz="2000" dirty="0">
+              <a:solidFill>
+                <a:schemeClr val="bg1">
+                  <a:lumMod val="75000"/>
+                </a:schemeClr>
+              </a:solidFill>
+              <a:latin typeface="Century Gothic" panose="020B0502020202020204" pitchFamily="34" charset="0"/>
+            </a:endParaRPr>
+          </a:p>
+        </p:txBody>
+      </p:sp>
+      <p:sp>
+        <p:nvSpPr>
+          <p:cNvPr id="123" name="CaixaDeTexto 122"/>
+          <p:cNvSpPr txBox="1"/>
+          <p:nvPr/>
+        </p:nvSpPr>
+        <p:spPr>
+          <a:xfrm>
+            <a:off x="8695224" y="4644293"/>
+            <a:ext cx="730837" cy="307777"/>
+          </a:xfrm>
+          <a:prstGeom prst="rect">
+            <a:avLst/>
+          </a:prstGeom>
+          <a:noFill/>
+        </p:spPr>
+        <p:txBody>
+          <a:bodyPr wrap="square" rtlCol="0">
+            <a:spAutoFit/>
+          </a:bodyPr>
+          <a:lstStyle/>
+          <a:p>
+            <a:pPr algn="r"/>
+            <a:r>
+              <a:rPr lang="pt-BR" sz="1400" dirty="0" smtClean="0">
+                <a:solidFill>
+                  <a:srgbClr val="8E959E"/>
+                </a:solidFill>
+                <a:latin typeface="Century Gothic" panose="020B0502020202020204" pitchFamily="34" charset="0"/>
+              </a:rPr>
+              <a:t>CPU</a:t>
+            </a:r>
+            <a:endParaRPr lang="pt-BR" sz="1400" dirty="0">
+              <a:solidFill>
+                <a:srgbClr val="8E959E"/>
+              </a:solidFill>
+              <a:latin typeface="Century Gothic" panose="020B0502020202020204" pitchFamily="34" charset="0"/>
+            </a:endParaRPr>
+          </a:p>
+        </p:txBody>
+      </p:sp>
+      <p:sp>
+        <p:nvSpPr>
+          <p:cNvPr id="124" name="CaixaDeTexto 123"/>
+          <p:cNvSpPr txBox="1"/>
+          <p:nvPr/>
+        </p:nvSpPr>
+        <p:spPr>
+          <a:xfrm>
+            <a:off x="9355093" y="4572744"/>
+            <a:ext cx="730837" cy="400110"/>
+          </a:xfrm>
+          <a:prstGeom prst="rect">
+            <a:avLst/>
+          </a:prstGeom>
+          <a:noFill/>
+        </p:spPr>
+        <p:txBody>
+          <a:bodyPr wrap="square" rtlCol="0">
+            <a:spAutoFit/>
+          </a:bodyPr>
+          <a:lstStyle/>
+          <a:p>
+            <a:r>
+              <a:rPr lang="pt-BR" sz="2000" dirty="0" smtClean="0">
+                <a:solidFill>
+                  <a:schemeClr val="bg1">
+                    <a:lumMod val="75000"/>
+                  </a:schemeClr>
+                </a:solidFill>
+                <a:latin typeface="Century Gothic" panose="020B0502020202020204" pitchFamily="34" charset="0"/>
+              </a:rPr>
+              <a:t>76%</a:t>
+            </a:r>
+            <a:endParaRPr lang="pt-BR" sz="2000" dirty="0">
+              <a:solidFill>
+                <a:schemeClr val="bg1">
+                  <a:lumMod val="75000"/>
+                </a:schemeClr>
+              </a:solidFill>
+              <a:latin typeface="Century Gothic" panose="020B0502020202020204" pitchFamily="34" charset="0"/>
+            </a:endParaRPr>
+          </a:p>
+        </p:txBody>
+      </p:sp>
+      <p:sp>
+        <p:nvSpPr>
+          <p:cNvPr id="125" name="CaixaDeTexto 124"/>
+          <p:cNvSpPr txBox="1"/>
+          <p:nvPr/>
+        </p:nvSpPr>
+        <p:spPr>
+          <a:xfrm>
+            <a:off x="8695224" y="5011498"/>
+            <a:ext cx="730837" cy="307777"/>
+          </a:xfrm>
+          <a:prstGeom prst="rect">
+            <a:avLst/>
+          </a:prstGeom>
+          <a:noFill/>
+        </p:spPr>
+        <p:txBody>
+          <a:bodyPr wrap="square" rtlCol="0">
+            <a:spAutoFit/>
+          </a:bodyPr>
+          <a:lstStyle/>
+          <a:p>
+            <a:pPr algn="r"/>
+            <a:r>
+              <a:rPr lang="pt-BR" sz="1400" dirty="0" smtClean="0">
+                <a:solidFill>
+                  <a:srgbClr val="8E959E"/>
+                </a:solidFill>
+                <a:latin typeface="Century Gothic" panose="020B0502020202020204" pitchFamily="34" charset="0"/>
+              </a:rPr>
+              <a:t>GPU</a:t>
+            </a:r>
+            <a:endParaRPr lang="pt-BR" sz="1400" dirty="0">
+              <a:solidFill>
+                <a:srgbClr val="8E959E"/>
+              </a:solidFill>
+              <a:latin typeface="Century Gothic" panose="020B0502020202020204" pitchFamily="34" charset="0"/>
+            </a:endParaRPr>
+          </a:p>
+        </p:txBody>
+      </p:sp>
+      <p:sp>
+        <p:nvSpPr>
+          <p:cNvPr id="126" name="CaixaDeTexto 125"/>
+          <p:cNvSpPr txBox="1"/>
+          <p:nvPr/>
+        </p:nvSpPr>
+        <p:spPr>
+          <a:xfrm>
+            <a:off x="9355093" y="4939949"/>
+            <a:ext cx="730837" cy="400110"/>
+          </a:xfrm>
+          <a:prstGeom prst="rect">
+            <a:avLst/>
+          </a:prstGeom>
+          <a:noFill/>
+        </p:spPr>
+        <p:txBody>
+          <a:bodyPr wrap="square" rtlCol="0">
+            <a:spAutoFit/>
+          </a:bodyPr>
+          <a:lstStyle/>
+          <a:p>
+            <a:r>
+              <a:rPr lang="pt-BR" sz="2000" dirty="0" smtClean="0">
+                <a:solidFill>
+                  <a:schemeClr val="bg1">
+                    <a:lumMod val="75000"/>
+                  </a:schemeClr>
+                </a:solidFill>
+                <a:latin typeface="Century Gothic" panose="020B0502020202020204" pitchFamily="34" charset="0"/>
+              </a:rPr>
+              <a:t>55%</a:t>
+            </a:r>
+            <a:endParaRPr lang="pt-BR" sz="2000" dirty="0">
+              <a:solidFill>
+                <a:schemeClr val="bg1">
+                  <a:lumMod val="75000"/>
+                </a:schemeClr>
+              </a:solidFill>
+              <a:latin typeface="Century Gothic" panose="020B0502020202020204" pitchFamily="34" charset="0"/>
+            </a:endParaRPr>
+          </a:p>
+        </p:txBody>
+      </p:sp>
+      <p:sp>
+        <p:nvSpPr>
+          <p:cNvPr id="127" name="CaixaDeTexto 126"/>
+          <p:cNvSpPr txBox="1"/>
+          <p:nvPr/>
+        </p:nvSpPr>
+        <p:spPr>
+          <a:xfrm>
+            <a:off x="8695224" y="5686512"/>
+            <a:ext cx="730837" cy="307777"/>
+          </a:xfrm>
+          <a:prstGeom prst="rect">
+            <a:avLst/>
+          </a:prstGeom>
+          <a:noFill/>
+        </p:spPr>
+        <p:txBody>
+          <a:bodyPr wrap="square" rtlCol="0">
+            <a:spAutoFit/>
+          </a:bodyPr>
+          <a:lstStyle/>
+          <a:p>
+            <a:pPr algn="r"/>
+            <a:r>
+              <a:rPr lang="pt-BR" sz="1400" dirty="0" smtClean="0">
+                <a:solidFill>
+                  <a:srgbClr val="8E959E"/>
+                </a:solidFill>
+                <a:latin typeface="Century Gothic" panose="020B0502020202020204" pitchFamily="34" charset="0"/>
+              </a:rPr>
+              <a:t>CPU</a:t>
+            </a:r>
+            <a:endParaRPr lang="pt-BR" sz="1400" dirty="0">
+              <a:solidFill>
+                <a:srgbClr val="8E959E"/>
+              </a:solidFill>
+              <a:latin typeface="Century Gothic" panose="020B0502020202020204" pitchFamily="34" charset="0"/>
+            </a:endParaRPr>
+          </a:p>
+        </p:txBody>
+      </p:sp>
+      <p:sp>
+        <p:nvSpPr>
+          <p:cNvPr id="128" name="CaixaDeTexto 127"/>
+          <p:cNvSpPr txBox="1"/>
+          <p:nvPr/>
+        </p:nvSpPr>
+        <p:spPr>
+          <a:xfrm>
+            <a:off x="9355093" y="5614963"/>
+            <a:ext cx="730837" cy="400110"/>
+          </a:xfrm>
+          <a:prstGeom prst="rect">
+            <a:avLst/>
+          </a:prstGeom>
+          <a:noFill/>
+        </p:spPr>
+        <p:txBody>
+          <a:bodyPr wrap="square" rtlCol="0">
+            <a:spAutoFit/>
+          </a:bodyPr>
+          <a:lstStyle/>
+          <a:p>
+            <a:r>
+              <a:rPr lang="pt-BR" sz="2000" dirty="0" smtClean="0">
+                <a:solidFill>
+                  <a:schemeClr val="bg1">
+                    <a:lumMod val="75000"/>
+                  </a:schemeClr>
+                </a:solidFill>
+                <a:latin typeface="Century Gothic" panose="020B0502020202020204" pitchFamily="34" charset="0"/>
+              </a:rPr>
+              <a:t>76%</a:t>
+            </a:r>
+            <a:endParaRPr lang="pt-BR" sz="2000" dirty="0">
+              <a:solidFill>
+                <a:schemeClr val="bg1">
+                  <a:lumMod val="75000"/>
+                </a:schemeClr>
+              </a:solidFill>
+              <a:latin typeface="Century Gothic" panose="020B0502020202020204" pitchFamily="34" charset="0"/>
+            </a:endParaRPr>
+          </a:p>
+        </p:txBody>
+      </p:sp>
+      <p:sp>
+        <p:nvSpPr>
+          <p:cNvPr id="129" name="CaixaDeTexto 128"/>
+          <p:cNvSpPr txBox="1"/>
+          <p:nvPr/>
+        </p:nvSpPr>
+        <p:spPr>
+          <a:xfrm>
+            <a:off x="8695224" y="6053717"/>
+            <a:ext cx="730837" cy="307777"/>
+          </a:xfrm>
+          <a:prstGeom prst="rect">
+            <a:avLst/>
+          </a:prstGeom>
+          <a:noFill/>
+        </p:spPr>
+        <p:txBody>
+          <a:bodyPr wrap="square" rtlCol="0">
+            <a:spAutoFit/>
+          </a:bodyPr>
+          <a:lstStyle/>
+          <a:p>
+            <a:pPr algn="r"/>
+            <a:r>
+              <a:rPr lang="pt-BR" sz="1400" dirty="0" smtClean="0">
+                <a:solidFill>
+                  <a:srgbClr val="8E959E"/>
+                </a:solidFill>
+                <a:latin typeface="Century Gothic" panose="020B0502020202020204" pitchFamily="34" charset="0"/>
+              </a:rPr>
+              <a:t>GPU</a:t>
+            </a:r>
+            <a:endParaRPr lang="pt-BR" sz="1400" dirty="0">
+              <a:solidFill>
+                <a:srgbClr val="8E959E"/>
+              </a:solidFill>
+              <a:latin typeface="Century Gothic" panose="020B0502020202020204" pitchFamily="34" charset="0"/>
+            </a:endParaRPr>
+          </a:p>
+        </p:txBody>
+      </p:sp>
+      <p:sp>
+        <p:nvSpPr>
+          <p:cNvPr id="130" name="CaixaDeTexto 129"/>
+          <p:cNvSpPr txBox="1"/>
+          <p:nvPr/>
+        </p:nvSpPr>
+        <p:spPr>
+          <a:xfrm>
+            <a:off x="9355093" y="5982168"/>
+            <a:ext cx="730837" cy="400110"/>
+          </a:xfrm>
+          <a:prstGeom prst="rect">
+            <a:avLst/>
+          </a:prstGeom>
+          <a:noFill/>
+        </p:spPr>
+        <p:txBody>
+          <a:bodyPr wrap="square" rtlCol="0">
+            <a:spAutoFit/>
+          </a:bodyPr>
+          <a:lstStyle/>
+          <a:p>
+            <a:r>
+              <a:rPr lang="pt-BR" sz="2000" dirty="0" smtClean="0">
+                <a:solidFill>
+                  <a:schemeClr val="bg1">
+                    <a:lumMod val="75000"/>
+                  </a:schemeClr>
+                </a:solidFill>
+                <a:latin typeface="Century Gothic" panose="020B0502020202020204" pitchFamily="34" charset="0"/>
+              </a:rPr>
+              <a:t>55%</a:t>
+            </a:r>
+            <a:endParaRPr lang="pt-BR" sz="2000" dirty="0">
+              <a:solidFill>
+                <a:schemeClr val="bg1">
+                  <a:lumMod val="75000"/>
+                </a:schemeClr>
+              </a:solidFill>
+              <a:latin typeface="Century Gothic" panose="020B0502020202020204" pitchFamily="34" charset="0"/>
+            </a:endParaRPr>
+          </a:p>
+        </p:txBody>
+      </p:sp>
+      <p:sp>
+        <p:nvSpPr>
+          <p:cNvPr id="131" name="CaixaDeTexto 130">
+            <a:extLst>
+              <a:ext uri="{FF2B5EF4-FFF2-40B4-BE49-F238E27FC236}">
+                <a16:creationId xmlns:a16="http://schemas.microsoft.com/office/drawing/2014/main" id="{D49FFA6C-9A50-4238-B562-4A7C73E02608}"/>
+              </a:ext>
+            </a:extLst>
+          </p:cNvPr>
+          <p:cNvSpPr txBox="1"/>
+          <p:nvPr/>
+        </p:nvSpPr>
+        <p:spPr>
+          <a:xfrm>
+            <a:off x="6589542" y="4372689"/>
+            <a:ext cx="486030" cy="1200329"/>
+          </a:xfrm>
+          <a:prstGeom prst="rect">
+            <a:avLst/>
+          </a:prstGeom>
+          <a:noFill/>
+        </p:spPr>
+        <p:txBody>
+          <a:bodyPr wrap="none" rtlCol="0">
+            <a:spAutoFit/>
+          </a:bodyPr>
+          <a:lstStyle/>
+          <a:p>
+            <a:r>
+              <a:rPr lang="pt-BR" sz="7200" dirty="0">
+                <a:solidFill>
+                  <a:srgbClr val="F32121"/>
+                </a:solidFill>
+              </a:rPr>
+              <a:t>!</a:t>
+            </a:r>
           </a:p>
         </p:txBody>
       </p:sp>
@@ -4700,10 +8746,17 @@
       <p:transition spd="slow" advClick="0"/>
     </mc:Fallback>
   </mc:AlternateContent>
+  <p:timing>
+    <p:tnLst>
+      <p:par>
+        <p:cTn id="1" dur="indefinite" restart="never" nodeType="tmRoot"/>
+      </p:par>
+    </p:tnLst>
+  </p:timing>
 </p:sld>
 </file>
 
-<file path=ppt/slides/slide3.xml><?xml version="1.0" encoding="utf-8"?>
+<file path=ppt/slides/slide4.xml><?xml version="1.0" encoding="utf-8"?>
 <p:sld xmlns:a="http://schemas.openxmlformats.org/drawingml/2006/main" xmlns:r="http://schemas.openxmlformats.org/officeDocument/2006/relationships" xmlns:p="http://schemas.openxmlformats.org/presentationml/2006/main">
   <p:cSld>
     <p:spTree>
@@ -6568,7 +10621,7 @@
             <a:r>
               <a:rPr lang="pt-BR" sz="7200" dirty="0">
                 <a:solidFill>
-                  <a:srgbClr val="FF0000"/>
+                  <a:srgbClr val="F32121"/>
                 </a:solidFill>
               </a:rPr>
               <a:t>!</a:t>

</xml_diff>

<commit_message>
mockup e diagrama att
</commit_message>
<xml_diff>
--- a/Mockup/mockup1.pptx
+++ b/Mockup/mockup1.pptx
@@ -7,8 +7,9 @@
   <p:sldIdLst>
     <p:sldId id="258" r:id="rId2"/>
     <p:sldId id="259" r:id="rId3"/>
-    <p:sldId id="256" r:id="rId4"/>
-    <p:sldId id="257" r:id="rId5"/>
+    <p:sldId id="260" r:id="rId4"/>
+    <p:sldId id="256" r:id="rId5"/>
+    <p:sldId id="257" r:id="rId6"/>
   </p:sldIdLst>
   <p:sldSz cx="12192000" cy="6858000"/>
   <p:notesSz cx="6858000" cy="9144000"/>
@@ -5185,6 +5186,43 @@
           <a:chExt cx="0" cy="0"/>
         </a:xfrm>
       </p:grpSpPr>
+    </p:spTree>
+    <p:extLst>
+      <p:ext uri="{BB962C8B-B14F-4D97-AF65-F5344CB8AC3E}">
+        <p14:creationId xmlns:p14="http://schemas.microsoft.com/office/powerpoint/2010/main" val="1878649003"/>
+      </p:ext>
+    </p:extLst>
+  </p:cSld>
+  <p:clrMapOvr>
+    <a:masterClrMapping/>
+  </p:clrMapOvr>
+  <p:timing>
+    <p:tnLst>
+      <p:par>
+        <p:cTn id="1" dur="indefinite" restart="never" nodeType="tmRoot"/>
+      </p:par>
+    </p:tnLst>
+  </p:timing>
+</p:sld>
+</file>
+
+<file path=ppt/slides/slide4.xml><?xml version="1.0" encoding="utf-8"?>
+<p:sld xmlns:a="http://schemas.openxmlformats.org/drawingml/2006/main" xmlns:r="http://schemas.openxmlformats.org/officeDocument/2006/relationships" xmlns:p="http://schemas.openxmlformats.org/presentationml/2006/main">
+  <p:cSld>
+    <p:spTree>
+      <p:nvGrpSpPr>
+        <p:cNvPr id="1" name=""/>
+        <p:cNvGrpSpPr/>
+        <p:nvPr/>
+      </p:nvGrpSpPr>
+      <p:grpSpPr>
+        <a:xfrm>
+          <a:off x="0" y="0"/>
+          <a:ext cx="0" cy="0"/>
+          <a:chOff x="0" y="0"/>
+          <a:chExt cx="0" cy="0"/>
+        </a:xfrm>
+      </p:grpSpPr>
       <p:sp>
         <p:nvSpPr>
           <p:cNvPr id="2" name="Retângulo 1"/>
@@ -9060,7 +9098,7 @@
 </p:sld>
 </file>
 
-<file path=ppt/slides/slide4.xml><?xml version="1.0" encoding="utf-8"?>
+<file path=ppt/slides/slide5.xml><?xml version="1.0" encoding="utf-8"?>
 <p:sld xmlns:a="http://schemas.openxmlformats.org/drawingml/2006/main" xmlns:r="http://schemas.openxmlformats.org/officeDocument/2006/relationships" xmlns:p="http://schemas.openxmlformats.org/presentationml/2006/main">
   <p:cSld>
     <p:spTree>

</xml_diff>

<commit_message>
cpf ou cnpj ao inves de usuario
</commit_message>
<xml_diff>
--- a/Mockup/mockup1.pptx
+++ b/Mockup/mockup1.pptx
@@ -245,7 +245,7 @@
           <a:p>
             <a:fld id="{8FD46BB3-C0C0-42DD-A915-951B3E7D476A}" type="datetimeFigureOut">
               <a:rPr lang="pt-BR" smtClean="0"/>
-              <a:t>26/04/2019</a:t>
+              <a:t>29/04/2019</a:t>
             </a:fld>
             <a:endParaRPr lang="pt-BR"/>
           </a:p>
@@ -287,7 +287,7 @@
           <a:p>
             <a:fld id="{BD3A66D9-57AD-496A-86AC-E21F49D27121}" type="slidenum">
               <a:rPr lang="pt-BR" smtClean="0"/>
-              <a:t>‹#›</a:t>
+              <a:t>‹nº›</a:t>
             </a:fld>
             <a:endParaRPr lang="pt-BR"/>
           </a:p>
@@ -413,7 +413,7 @@
           <a:p>
             <a:fld id="{8FD46BB3-C0C0-42DD-A915-951B3E7D476A}" type="datetimeFigureOut">
               <a:rPr lang="pt-BR" smtClean="0"/>
-              <a:t>26/04/2019</a:t>
+              <a:t>29/04/2019</a:t>
             </a:fld>
             <a:endParaRPr lang="pt-BR"/>
           </a:p>
@@ -455,7 +455,7 @@
           <a:p>
             <a:fld id="{BD3A66D9-57AD-496A-86AC-E21F49D27121}" type="slidenum">
               <a:rPr lang="pt-BR" smtClean="0"/>
-              <a:t>‹#›</a:t>
+              <a:t>‹nº›</a:t>
             </a:fld>
             <a:endParaRPr lang="pt-BR"/>
           </a:p>
@@ -591,7 +591,7 @@
           <a:p>
             <a:fld id="{8FD46BB3-C0C0-42DD-A915-951B3E7D476A}" type="datetimeFigureOut">
               <a:rPr lang="pt-BR" smtClean="0"/>
-              <a:t>26/04/2019</a:t>
+              <a:t>29/04/2019</a:t>
             </a:fld>
             <a:endParaRPr lang="pt-BR"/>
           </a:p>
@@ -633,7 +633,7 @@
           <a:p>
             <a:fld id="{BD3A66D9-57AD-496A-86AC-E21F49D27121}" type="slidenum">
               <a:rPr lang="pt-BR" smtClean="0"/>
-              <a:t>‹#›</a:t>
+              <a:t>‹nº›</a:t>
             </a:fld>
             <a:endParaRPr lang="pt-BR"/>
           </a:p>
@@ -759,7 +759,7 @@
           <a:p>
             <a:fld id="{8FD46BB3-C0C0-42DD-A915-951B3E7D476A}" type="datetimeFigureOut">
               <a:rPr lang="pt-BR" smtClean="0"/>
-              <a:t>26/04/2019</a:t>
+              <a:t>29/04/2019</a:t>
             </a:fld>
             <a:endParaRPr lang="pt-BR"/>
           </a:p>
@@ -801,7 +801,7 @@
           <a:p>
             <a:fld id="{BD3A66D9-57AD-496A-86AC-E21F49D27121}" type="slidenum">
               <a:rPr lang="pt-BR" smtClean="0"/>
-              <a:t>‹#›</a:t>
+              <a:t>‹nº›</a:t>
             </a:fld>
             <a:endParaRPr lang="pt-BR"/>
           </a:p>
@@ -1004,7 +1004,7 @@
           <a:p>
             <a:fld id="{8FD46BB3-C0C0-42DD-A915-951B3E7D476A}" type="datetimeFigureOut">
               <a:rPr lang="pt-BR" smtClean="0"/>
-              <a:t>26/04/2019</a:t>
+              <a:t>29/04/2019</a:t>
             </a:fld>
             <a:endParaRPr lang="pt-BR"/>
           </a:p>
@@ -1046,7 +1046,7 @@
           <a:p>
             <a:fld id="{BD3A66D9-57AD-496A-86AC-E21F49D27121}" type="slidenum">
               <a:rPr lang="pt-BR" smtClean="0"/>
-              <a:t>‹#›</a:t>
+              <a:t>‹nº›</a:t>
             </a:fld>
             <a:endParaRPr lang="pt-BR"/>
           </a:p>
@@ -1233,7 +1233,7 @@
           <a:p>
             <a:fld id="{8FD46BB3-C0C0-42DD-A915-951B3E7D476A}" type="datetimeFigureOut">
               <a:rPr lang="pt-BR" smtClean="0"/>
-              <a:t>26/04/2019</a:t>
+              <a:t>29/04/2019</a:t>
             </a:fld>
             <a:endParaRPr lang="pt-BR"/>
           </a:p>
@@ -1275,7 +1275,7 @@
           <a:p>
             <a:fld id="{BD3A66D9-57AD-496A-86AC-E21F49D27121}" type="slidenum">
               <a:rPr lang="pt-BR" smtClean="0"/>
-              <a:t>‹#›</a:t>
+              <a:t>‹nº›</a:t>
             </a:fld>
             <a:endParaRPr lang="pt-BR"/>
           </a:p>
@@ -1597,7 +1597,7 @@
           <a:p>
             <a:fld id="{8FD46BB3-C0C0-42DD-A915-951B3E7D476A}" type="datetimeFigureOut">
               <a:rPr lang="pt-BR" smtClean="0"/>
-              <a:t>26/04/2019</a:t>
+              <a:t>29/04/2019</a:t>
             </a:fld>
             <a:endParaRPr lang="pt-BR"/>
           </a:p>
@@ -1639,7 +1639,7 @@
           <a:p>
             <a:fld id="{BD3A66D9-57AD-496A-86AC-E21F49D27121}" type="slidenum">
               <a:rPr lang="pt-BR" smtClean="0"/>
-              <a:t>‹#›</a:t>
+              <a:t>‹nº›</a:t>
             </a:fld>
             <a:endParaRPr lang="pt-BR"/>
           </a:p>
@@ -1714,7 +1714,7 @@
           <a:p>
             <a:fld id="{8FD46BB3-C0C0-42DD-A915-951B3E7D476A}" type="datetimeFigureOut">
               <a:rPr lang="pt-BR" smtClean="0"/>
-              <a:t>26/04/2019</a:t>
+              <a:t>29/04/2019</a:t>
             </a:fld>
             <a:endParaRPr lang="pt-BR"/>
           </a:p>
@@ -1756,7 +1756,7 @@
           <a:p>
             <a:fld id="{BD3A66D9-57AD-496A-86AC-E21F49D27121}" type="slidenum">
               <a:rPr lang="pt-BR" smtClean="0"/>
-              <a:t>‹#›</a:t>
+              <a:t>‹nº›</a:t>
             </a:fld>
             <a:endParaRPr lang="pt-BR"/>
           </a:p>
@@ -1809,7 +1809,7 @@
           <a:p>
             <a:fld id="{8FD46BB3-C0C0-42DD-A915-951B3E7D476A}" type="datetimeFigureOut">
               <a:rPr lang="pt-BR" smtClean="0"/>
-              <a:t>26/04/2019</a:t>
+              <a:t>29/04/2019</a:t>
             </a:fld>
             <a:endParaRPr lang="pt-BR"/>
           </a:p>
@@ -1851,7 +1851,7 @@
           <a:p>
             <a:fld id="{BD3A66D9-57AD-496A-86AC-E21F49D27121}" type="slidenum">
               <a:rPr lang="pt-BR" smtClean="0"/>
-              <a:t>‹#›</a:t>
+              <a:t>‹nº›</a:t>
             </a:fld>
             <a:endParaRPr lang="pt-BR"/>
           </a:p>
@@ -2084,7 +2084,7 @@
           <a:p>
             <a:fld id="{8FD46BB3-C0C0-42DD-A915-951B3E7D476A}" type="datetimeFigureOut">
               <a:rPr lang="pt-BR" smtClean="0"/>
-              <a:t>26/04/2019</a:t>
+              <a:t>29/04/2019</a:t>
             </a:fld>
             <a:endParaRPr lang="pt-BR"/>
           </a:p>
@@ -2126,7 +2126,7 @@
           <a:p>
             <a:fld id="{BD3A66D9-57AD-496A-86AC-E21F49D27121}" type="slidenum">
               <a:rPr lang="pt-BR" smtClean="0"/>
-              <a:t>‹#›</a:t>
+              <a:t>‹nº›</a:t>
             </a:fld>
             <a:endParaRPr lang="pt-BR"/>
           </a:p>
@@ -2336,7 +2336,7 @@
           <a:p>
             <a:fld id="{8FD46BB3-C0C0-42DD-A915-951B3E7D476A}" type="datetimeFigureOut">
               <a:rPr lang="pt-BR" smtClean="0"/>
-              <a:t>26/04/2019</a:t>
+              <a:t>29/04/2019</a:t>
             </a:fld>
             <a:endParaRPr lang="pt-BR"/>
           </a:p>
@@ -2378,7 +2378,7 @@
           <a:p>
             <a:fld id="{BD3A66D9-57AD-496A-86AC-E21F49D27121}" type="slidenum">
               <a:rPr lang="pt-BR" smtClean="0"/>
-              <a:t>‹#›</a:t>
+              <a:t>‹nº›</a:t>
             </a:fld>
             <a:endParaRPr lang="pt-BR"/>
           </a:p>
@@ -2550,7 +2550,7 @@
           <a:p>
             <a:fld id="{8FD46BB3-C0C0-42DD-A915-951B3E7D476A}" type="datetimeFigureOut">
               <a:rPr lang="pt-BR" smtClean="0"/>
-              <a:t>26/04/2019</a:t>
+              <a:t>29/04/2019</a:t>
             </a:fld>
             <a:endParaRPr lang="pt-BR"/>
           </a:p>
@@ -2628,7 +2628,7 @@
           <a:p>
             <a:fld id="{BD3A66D9-57AD-496A-86AC-E21F49D27121}" type="slidenum">
               <a:rPr lang="pt-BR" smtClean="0"/>
-              <a:t>‹#›</a:t>
+              <a:t>‹nº›</a:t>
             </a:fld>
             <a:endParaRPr lang="pt-BR"/>
           </a:p>
@@ -3158,14 +3158,20 @@
           <a:lstStyle/>
           <a:p>
             <a:r>
-              <a:rPr lang="pt-BR" sz="1200" dirty="0">
+              <a:rPr lang="pt-BR" sz="1200" dirty="0" smtClean="0">
                 <a:solidFill>
                   <a:srgbClr val="606770"/>
                 </a:solidFill>
                 <a:latin typeface="Century Gothic" panose="020B0502020202020204" pitchFamily="34" charset="0"/>
               </a:rPr>
-              <a:t>Usuário</a:t>
-            </a:r>
+              <a:t>CPF ou CNPJ</a:t>
+            </a:r>
+            <a:endParaRPr lang="pt-BR" sz="1200" dirty="0">
+              <a:solidFill>
+                <a:srgbClr val="606770"/>
+              </a:solidFill>
+              <a:latin typeface="Century Gothic" panose="020B0502020202020204" pitchFamily="34" charset="0"/>
+            </a:endParaRPr>
           </a:p>
         </p:txBody>
       </p:sp>
@@ -3440,6 +3446,13 @@
       <p:transition spd="slow" advClick="0"/>
     </mc:Fallback>
   </mc:AlternateContent>
+  <p:timing>
+    <p:tnLst>
+      <p:par>
+        <p:cTn id="1" dur="indefinite" restart="never" nodeType="tmRoot"/>
+      </p:par>
+    </p:tnLst>
+  </p:timing>
 </p:sld>
 </file>
 

</xml_diff>